<commit_message>
More work on docco and heading towards equilib calcs
</commit_message>
<xml_diff>
--- a/docs/smbkc/smbkc.pptx
+++ b/docs/smbkc/smbkc.pptx
@@ -7,27 +7,29 @@
   <p:sldIdLst>
     <p:sldId id="256" r:id="rId2"/>
     <p:sldId id="276" r:id="rId3"/>
-    <p:sldId id="277" r:id="rId4"/>
-    <p:sldId id="278" r:id="rId5"/>
-    <p:sldId id="258" r:id="rId6"/>
-    <p:sldId id="257" r:id="rId7"/>
-    <p:sldId id="259" r:id="rId8"/>
-    <p:sldId id="260" r:id="rId9"/>
-    <p:sldId id="268" r:id="rId10"/>
-    <p:sldId id="267" r:id="rId11"/>
-    <p:sldId id="261" r:id="rId12"/>
-    <p:sldId id="262" r:id="rId13"/>
-    <p:sldId id="263" r:id="rId14"/>
-    <p:sldId id="264" r:id="rId15"/>
-    <p:sldId id="265" r:id="rId16"/>
-    <p:sldId id="266" r:id="rId17"/>
-    <p:sldId id="269" r:id="rId18"/>
-    <p:sldId id="270" r:id="rId19"/>
-    <p:sldId id="271" r:id="rId20"/>
-    <p:sldId id="272" r:id="rId21"/>
-    <p:sldId id="273" r:id="rId22"/>
-    <p:sldId id="274" r:id="rId23"/>
-    <p:sldId id="275" r:id="rId24"/>
+    <p:sldId id="279" r:id="rId4"/>
+    <p:sldId id="277" r:id="rId5"/>
+    <p:sldId id="278" r:id="rId6"/>
+    <p:sldId id="280" r:id="rId7"/>
+    <p:sldId id="258" r:id="rId8"/>
+    <p:sldId id="257" r:id="rId9"/>
+    <p:sldId id="259" r:id="rId10"/>
+    <p:sldId id="260" r:id="rId11"/>
+    <p:sldId id="268" r:id="rId12"/>
+    <p:sldId id="267" r:id="rId13"/>
+    <p:sldId id="261" r:id="rId14"/>
+    <p:sldId id="262" r:id="rId15"/>
+    <p:sldId id="263" r:id="rId16"/>
+    <p:sldId id="264" r:id="rId17"/>
+    <p:sldId id="265" r:id="rId18"/>
+    <p:sldId id="266" r:id="rId19"/>
+    <p:sldId id="269" r:id="rId20"/>
+    <p:sldId id="270" r:id="rId21"/>
+    <p:sldId id="271" r:id="rId22"/>
+    <p:sldId id="272" r:id="rId23"/>
+    <p:sldId id="273" r:id="rId24"/>
+    <p:sldId id="274" r:id="rId25"/>
+    <p:sldId id="275" r:id="rId26"/>
   </p:sldIdLst>
   <p:sldSz cx="9144000" cy="6858000" type="screen4x3"/>
   <p:notesSz cx="6858000" cy="9144000"/>
@@ -126,6 +128,11 @@
       </a:defRPr>
     </a:lvl9pPr>
   </p:defaultTextStyle>
+  <p:extLst>
+    <p:ext uri="{EFAFB233-063F-42B5-8137-9DF3F51BA10A}">
+      <p15:sldGuideLst xmlns:p15="http://schemas.microsoft.com/office/powerpoint/2012/main"/>
+    </p:ext>
+  </p:extLst>
 </p:presentation>
 </file>
 
@@ -260,7 +267,7 @@
           <a:p>
             <a:fld id="{3E45189A-2ADC-4953-9C8B-F5DAD551F2A3}" type="datetimeFigureOut">
               <a:rPr lang="en-NZ" smtClean="0"/>
-              <a:t>4/05/2016</a:t>
+              <a:t>8/05/2016</a:t>
             </a:fld>
             <a:endParaRPr lang="en-NZ"/>
           </a:p>
@@ -430,7 +437,7 @@
           <a:p>
             <a:fld id="{3E45189A-2ADC-4953-9C8B-F5DAD551F2A3}" type="datetimeFigureOut">
               <a:rPr lang="en-NZ" smtClean="0"/>
-              <a:t>4/05/2016</a:t>
+              <a:t>8/05/2016</a:t>
             </a:fld>
             <a:endParaRPr lang="en-NZ"/>
           </a:p>
@@ -610,7 +617,7 @@
           <a:p>
             <a:fld id="{3E45189A-2ADC-4953-9C8B-F5DAD551F2A3}" type="datetimeFigureOut">
               <a:rPr lang="en-NZ" smtClean="0"/>
-              <a:t>4/05/2016</a:t>
+              <a:t>8/05/2016</a:t>
             </a:fld>
             <a:endParaRPr lang="en-NZ"/>
           </a:p>
@@ -780,7 +787,7 @@
           <a:p>
             <a:fld id="{3E45189A-2ADC-4953-9C8B-F5DAD551F2A3}" type="datetimeFigureOut">
               <a:rPr lang="en-NZ" smtClean="0"/>
-              <a:t>4/05/2016</a:t>
+              <a:t>8/05/2016</a:t>
             </a:fld>
             <a:endParaRPr lang="en-NZ"/>
           </a:p>
@@ -1024,7 +1031,7 @@
           <a:p>
             <a:fld id="{3E45189A-2ADC-4953-9C8B-F5DAD551F2A3}" type="datetimeFigureOut">
               <a:rPr lang="en-NZ" smtClean="0"/>
-              <a:t>4/05/2016</a:t>
+              <a:t>8/05/2016</a:t>
             </a:fld>
             <a:endParaRPr lang="en-NZ"/>
           </a:p>
@@ -1256,7 +1263,7 @@
           <a:p>
             <a:fld id="{3E45189A-2ADC-4953-9C8B-F5DAD551F2A3}" type="datetimeFigureOut">
               <a:rPr lang="en-NZ" smtClean="0"/>
-              <a:t>4/05/2016</a:t>
+              <a:t>8/05/2016</a:t>
             </a:fld>
             <a:endParaRPr lang="en-NZ"/>
           </a:p>
@@ -1623,7 +1630,7 @@
           <a:p>
             <a:fld id="{3E45189A-2ADC-4953-9C8B-F5DAD551F2A3}" type="datetimeFigureOut">
               <a:rPr lang="en-NZ" smtClean="0"/>
-              <a:t>4/05/2016</a:t>
+              <a:t>8/05/2016</a:t>
             </a:fld>
             <a:endParaRPr lang="en-NZ"/>
           </a:p>
@@ -1741,7 +1748,7 @@
           <a:p>
             <a:fld id="{3E45189A-2ADC-4953-9C8B-F5DAD551F2A3}" type="datetimeFigureOut">
               <a:rPr lang="en-NZ" smtClean="0"/>
-              <a:t>4/05/2016</a:t>
+              <a:t>8/05/2016</a:t>
             </a:fld>
             <a:endParaRPr lang="en-NZ"/>
           </a:p>
@@ -1836,7 +1843,7 @@
           <a:p>
             <a:fld id="{3E45189A-2ADC-4953-9C8B-F5DAD551F2A3}" type="datetimeFigureOut">
               <a:rPr lang="en-NZ" smtClean="0"/>
-              <a:t>4/05/2016</a:t>
+              <a:t>8/05/2016</a:t>
             </a:fld>
             <a:endParaRPr lang="en-NZ"/>
           </a:p>
@@ -2113,7 +2120,7 @@
           <a:p>
             <a:fld id="{3E45189A-2ADC-4953-9C8B-F5DAD551F2A3}" type="datetimeFigureOut">
               <a:rPr lang="en-NZ" smtClean="0"/>
-              <a:t>4/05/2016</a:t>
+              <a:t>8/05/2016</a:t>
             </a:fld>
             <a:endParaRPr lang="en-NZ"/>
           </a:p>
@@ -2370,7 +2377,7 @@
           <a:p>
             <a:fld id="{3E45189A-2ADC-4953-9C8B-F5DAD551F2A3}" type="datetimeFigureOut">
               <a:rPr lang="en-NZ" smtClean="0"/>
-              <a:t>4/05/2016</a:t>
+              <a:t>8/05/2016</a:t>
             </a:fld>
             <a:endParaRPr lang="en-NZ"/>
           </a:p>
@@ -2583,7 +2590,7 @@
           <a:p>
             <a:fld id="{3E45189A-2ADC-4953-9C8B-F5DAD551F2A3}" type="datetimeFigureOut">
               <a:rPr lang="en-NZ" smtClean="0"/>
-              <a:t>4/05/2016</a:t>
+              <a:t>8/05/2016</a:t>
             </a:fld>
             <a:endParaRPr lang="en-NZ"/>
           </a:p>
@@ -2998,7 +3005,12 @@
             <p:ph type="ctrTitle"/>
           </p:nvPr>
         </p:nvSpPr>
-        <p:spPr/>
+        <p:spPr>
+          <a:xfrm>
+            <a:off x="685800" y="1993628"/>
+            <a:ext cx="7772400" cy="2387600"/>
+          </a:xfrm>
+        </p:spPr>
         <p:txBody>
           <a:bodyPr>
             <a:normAutofit fontScale="90000"/>
@@ -3041,7 +3053,12 @@
             <p:ph type="subTitle" idx="1"/>
           </p:nvPr>
         </p:nvSpPr>
-        <p:spPr/>
+        <p:spPr>
+          <a:xfrm>
+            <a:off x="1143000" y="5016761"/>
+            <a:ext cx="6858000" cy="1655762"/>
+          </a:xfrm>
+        </p:spPr>
         <p:txBody>
           <a:bodyPr/>
           <a:lstStyle/>
@@ -3088,6 +3105,162 @@
 </file>
 
 <file path=ppt/slides/slide10.xml><?xml version="1.0" encoding="utf-8"?>
+<p:sld xmlns:a="http://schemas.openxmlformats.org/drawingml/2006/main" xmlns:r="http://schemas.openxmlformats.org/officeDocument/2006/relationships" xmlns:p="http://schemas.openxmlformats.org/presentationml/2006/main">
+  <p:cSld>
+    <p:spTree>
+      <p:nvGrpSpPr>
+        <p:cNvPr id="1" name=""/>
+        <p:cNvGrpSpPr/>
+        <p:nvPr/>
+      </p:nvGrpSpPr>
+      <p:grpSpPr>
+        <a:xfrm>
+          <a:off x="0" y="0"/>
+          <a:ext cx="0" cy="0"/>
+          <a:chOff x="0" y="0"/>
+          <a:chExt cx="0" cy="0"/>
+        </a:xfrm>
+      </p:grpSpPr>
+      <p:sp>
+        <p:nvSpPr>
+          <p:cNvPr id="2" name="Title 1"/>
+          <p:cNvSpPr>
+            <a:spLocks noGrp="1"/>
+          </p:cNvSpPr>
+          <p:nvPr>
+            <p:ph type="title"/>
+          </p:nvPr>
+        </p:nvSpPr>
+        <p:spPr/>
+        <p:txBody>
+          <a:bodyPr/>
+          <a:lstStyle/>
+          <a:p>
+            <a:endParaRPr lang="en-NZ"/>
+          </a:p>
+        </p:txBody>
+      </p:sp>
+      <p:pic>
+        <p:nvPicPr>
+          <p:cNvPr id="4" name="Content Placeholder 3"/>
+          <p:cNvPicPr>
+            <a:picLocks noGrp="1" noChangeAspect="1"/>
+          </p:cNvPicPr>
+          <p:nvPr>
+            <p:ph idx="1"/>
+          </p:nvPr>
+        </p:nvPicPr>
+        <p:blipFill>
+          <a:blip r:embed="rId2">
+            <a:extLst>
+              <a:ext uri="{28A0092B-C50C-407E-A947-70E740481C1C}">
+                <a14:useLocalDpi xmlns:a14="http://schemas.microsoft.com/office/drawing/2010/main" val="0"/>
+              </a:ext>
+            </a:extLst>
+          </a:blip>
+          <a:stretch>
+            <a:fillRect/>
+          </a:stretch>
+        </p:blipFill>
+        <p:spPr>
+          <a:xfrm>
+            <a:off x="0" y="1523999"/>
+            <a:ext cx="9144000" cy="5334001"/>
+          </a:xfrm>
+        </p:spPr>
+      </p:pic>
+    </p:spTree>
+    <p:extLst>
+      <p:ext uri="{BB962C8B-B14F-4D97-AF65-F5344CB8AC3E}">
+        <p14:creationId xmlns:p14="http://schemas.microsoft.com/office/powerpoint/2010/main" val="3657479237"/>
+      </p:ext>
+    </p:extLst>
+  </p:cSld>
+  <p:clrMapOvr>
+    <a:masterClrMapping/>
+  </p:clrMapOvr>
+</p:sld>
+</file>
+
+<file path=ppt/slides/slide11.xml><?xml version="1.0" encoding="utf-8"?>
+<p:sld xmlns:a="http://schemas.openxmlformats.org/drawingml/2006/main" xmlns:r="http://schemas.openxmlformats.org/officeDocument/2006/relationships" xmlns:p="http://schemas.openxmlformats.org/presentationml/2006/main">
+  <p:cSld>
+    <p:spTree>
+      <p:nvGrpSpPr>
+        <p:cNvPr id="1" name=""/>
+        <p:cNvGrpSpPr/>
+        <p:nvPr/>
+      </p:nvGrpSpPr>
+      <p:grpSpPr>
+        <a:xfrm>
+          <a:off x="0" y="0"/>
+          <a:ext cx="0" cy="0"/>
+          <a:chOff x="0" y="0"/>
+          <a:chExt cx="0" cy="0"/>
+        </a:xfrm>
+      </p:grpSpPr>
+      <p:sp>
+        <p:nvSpPr>
+          <p:cNvPr id="2" name="Title 1"/>
+          <p:cNvSpPr>
+            <a:spLocks noGrp="1"/>
+          </p:cNvSpPr>
+          <p:nvPr>
+            <p:ph type="title"/>
+          </p:nvPr>
+        </p:nvSpPr>
+        <p:spPr/>
+        <p:txBody>
+          <a:bodyPr/>
+          <a:lstStyle/>
+          <a:p>
+            <a:endParaRPr lang="en-NZ"/>
+          </a:p>
+        </p:txBody>
+      </p:sp>
+      <p:pic>
+        <p:nvPicPr>
+          <p:cNvPr id="4" name="Content Placeholder 3"/>
+          <p:cNvPicPr>
+            <a:picLocks noGrp="1" noChangeAspect="1"/>
+          </p:cNvPicPr>
+          <p:nvPr>
+            <p:ph idx="1"/>
+          </p:nvPr>
+        </p:nvPicPr>
+        <p:blipFill>
+          <a:blip r:embed="rId2">
+            <a:extLst>
+              <a:ext uri="{28A0092B-C50C-407E-A947-70E740481C1C}">
+                <a14:useLocalDpi xmlns:a14="http://schemas.microsoft.com/office/drawing/2010/main" val="0"/>
+              </a:ext>
+            </a:extLst>
+          </a:blip>
+          <a:stretch>
+            <a:fillRect/>
+          </a:stretch>
+        </p:blipFill>
+        <p:spPr>
+          <a:xfrm>
+            <a:off x="0" y="1523999"/>
+            <a:ext cx="9144000" cy="5334001"/>
+          </a:xfrm>
+        </p:spPr>
+      </p:pic>
+    </p:spTree>
+    <p:extLst>
+      <p:ext uri="{BB962C8B-B14F-4D97-AF65-F5344CB8AC3E}">
+        <p14:creationId xmlns:p14="http://schemas.microsoft.com/office/powerpoint/2010/main" val="2727842710"/>
+      </p:ext>
+    </p:extLst>
+  </p:cSld>
+  <p:clrMapOvr>
+    <a:masterClrMapping/>
+  </p:clrMapOvr>
+</p:sld>
+</file>
+
+<file path=ppt/slides/slide12.xml><?xml version="1.0" encoding="utf-8"?>
 <p:sld xmlns:a="http://schemas.openxmlformats.org/drawingml/2006/main" xmlns:r="http://schemas.openxmlformats.org/officeDocument/2006/relationships" xmlns:p="http://schemas.openxmlformats.org/presentationml/2006/main">
   <p:cSld>
     <p:spTree>
@@ -3165,7 +3338,7 @@
 </p:sld>
 </file>
 
-<file path=ppt/slides/slide11.xml><?xml version="1.0" encoding="utf-8"?>
+<file path=ppt/slides/slide13.xml><?xml version="1.0" encoding="utf-8"?>
 <p:sld xmlns:a="http://schemas.openxmlformats.org/drawingml/2006/main" xmlns:r="http://schemas.openxmlformats.org/officeDocument/2006/relationships" xmlns:p="http://schemas.openxmlformats.org/presentationml/2006/main">
   <p:cSld>
     <p:spTree>
@@ -3243,7 +3416,7 @@
 </p:sld>
 </file>
 
-<file path=ppt/slides/slide12.xml><?xml version="1.0" encoding="utf-8"?>
+<file path=ppt/slides/slide14.xml><?xml version="1.0" encoding="utf-8"?>
 <p:sld xmlns:a="http://schemas.openxmlformats.org/drawingml/2006/main" xmlns:r="http://schemas.openxmlformats.org/officeDocument/2006/relationships" xmlns:p="http://schemas.openxmlformats.org/presentationml/2006/main">
   <p:cSld>
     <p:spTree>
@@ -3321,7 +3494,7 @@
 </p:sld>
 </file>
 
-<file path=ppt/slides/slide13.xml><?xml version="1.0" encoding="utf-8"?>
+<file path=ppt/slides/slide15.xml><?xml version="1.0" encoding="utf-8"?>
 <p:sld xmlns:a="http://schemas.openxmlformats.org/drawingml/2006/main" xmlns:r="http://schemas.openxmlformats.org/officeDocument/2006/relationships" xmlns:p="http://schemas.openxmlformats.org/presentationml/2006/main">
   <p:cSld>
     <p:spTree>
@@ -3399,7 +3572,7 @@
 </p:sld>
 </file>
 
-<file path=ppt/slides/slide14.xml><?xml version="1.0" encoding="utf-8"?>
+<file path=ppt/slides/slide16.xml><?xml version="1.0" encoding="utf-8"?>
 <p:sld xmlns:a="http://schemas.openxmlformats.org/drawingml/2006/main" xmlns:r="http://schemas.openxmlformats.org/officeDocument/2006/relationships" xmlns:p="http://schemas.openxmlformats.org/presentationml/2006/main">
   <p:cSld>
     <p:spTree>
@@ -3477,7 +3650,7 @@
 </p:sld>
 </file>
 
-<file path=ppt/slides/slide15.xml><?xml version="1.0" encoding="utf-8"?>
+<file path=ppt/slides/slide17.xml><?xml version="1.0" encoding="utf-8"?>
 <p:sld xmlns:a="http://schemas.openxmlformats.org/drawingml/2006/main" xmlns:r="http://schemas.openxmlformats.org/officeDocument/2006/relationships" xmlns:p="http://schemas.openxmlformats.org/presentationml/2006/main">
   <p:cSld>
     <p:spTree>
@@ -3555,7 +3728,7 @@
 </p:sld>
 </file>
 
-<file path=ppt/slides/slide16.xml><?xml version="1.0" encoding="utf-8"?>
+<file path=ppt/slides/slide18.xml><?xml version="1.0" encoding="utf-8"?>
 <p:sld xmlns:a="http://schemas.openxmlformats.org/drawingml/2006/main" xmlns:r="http://schemas.openxmlformats.org/officeDocument/2006/relationships" xmlns:p="http://schemas.openxmlformats.org/presentationml/2006/main">
   <p:cSld>
     <p:spTree>
@@ -3633,7 +3806,7 @@
 </p:sld>
 </file>
 
-<file path=ppt/slides/slide17.xml><?xml version="1.0" encoding="utf-8"?>
+<file path=ppt/slides/slide19.xml><?xml version="1.0" encoding="utf-8"?>
 <p:sld xmlns:a="http://schemas.openxmlformats.org/drawingml/2006/main" xmlns:r="http://schemas.openxmlformats.org/officeDocument/2006/relationships" xmlns:p="http://schemas.openxmlformats.org/presentationml/2006/main">
   <p:cSld>
     <p:spTree>
@@ -3711,7 +3884,212 @@
 </p:sld>
 </file>
 
-<file path=ppt/slides/slide18.xml><?xml version="1.0" encoding="utf-8"?>
+<file path=ppt/slides/slide2.xml><?xml version="1.0" encoding="utf-8"?>
+<p:sld xmlns:a="http://schemas.openxmlformats.org/drawingml/2006/main" xmlns:r="http://schemas.openxmlformats.org/officeDocument/2006/relationships" xmlns:p="http://schemas.openxmlformats.org/presentationml/2006/main">
+  <p:cSld>
+    <p:spTree>
+      <p:nvGrpSpPr>
+        <p:cNvPr id="1" name=""/>
+        <p:cNvGrpSpPr/>
+        <p:nvPr/>
+      </p:nvGrpSpPr>
+      <p:grpSpPr>
+        <a:xfrm>
+          <a:off x="0" y="0"/>
+          <a:ext cx="0" cy="0"/>
+          <a:chOff x="0" y="0"/>
+          <a:chExt cx="0" cy="0"/>
+        </a:xfrm>
+      </p:grpSpPr>
+      <p:sp>
+        <p:nvSpPr>
+          <p:cNvPr id="2" name="Title 1"/>
+          <p:cNvSpPr>
+            <a:spLocks noGrp="1"/>
+          </p:cNvSpPr>
+          <p:nvPr>
+            <p:ph type="title"/>
+          </p:nvPr>
+        </p:nvSpPr>
+        <p:spPr/>
+        <p:txBody>
+          <a:bodyPr/>
+          <a:lstStyle/>
+          <a:p>
+            <a:r>
+              <a:rPr lang="en-US" dirty="0" err="1" smtClean="0"/>
+              <a:t>Gmacs</a:t>
+            </a:r>
+            <a:r>
+              <a:rPr lang="en-US" dirty="0" smtClean="0"/>
+              <a:t> progress</a:t>
+            </a:r>
+            <a:endParaRPr lang="en-NZ" dirty="0"/>
+          </a:p>
+        </p:txBody>
+      </p:sp>
+      <p:sp>
+        <p:nvSpPr>
+          <p:cNvPr id="3" name="Content Placeholder 2"/>
+          <p:cNvSpPr>
+            <a:spLocks noGrp="1"/>
+          </p:cNvSpPr>
+          <p:nvPr>
+            <p:ph idx="1"/>
+          </p:nvPr>
+        </p:nvSpPr>
+        <p:spPr/>
+        <p:txBody>
+          <a:bodyPr>
+            <a:normAutofit fontScale="92500" lnSpcReduction="10000"/>
+          </a:bodyPr>
+          <a:lstStyle/>
+          <a:p>
+            <a:r>
+              <a:rPr lang="en-US" dirty="0" smtClean="0"/>
+              <a:t>Added seasons to </a:t>
+            </a:r>
+            <a:r>
+              <a:rPr lang="en-US" dirty="0" err="1" smtClean="0"/>
+              <a:t>Gmacs</a:t>
+            </a:r>
+            <a:r>
+              <a:rPr lang="en-US" dirty="0" smtClean="0"/>
+              <a:t> dynamics</a:t>
+            </a:r>
+          </a:p>
+          <a:p>
+            <a:pPr lvl="1"/>
+            <a:r>
+              <a:rPr lang="en-US" dirty="0" smtClean="0"/>
+              <a:t>Continuous </a:t>
+            </a:r>
+            <a:r>
+              <a:rPr lang="en-US" i="1" dirty="0" smtClean="0"/>
+              <a:t>M</a:t>
+            </a:r>
+            <a:r>
+              <a:rPr lang="en-US" dirty="0" smtClean="0"/>
+              <a:t>/</a:t>
+            </a:r>
+            <a:r>
+              <a:rPr lang="en-US" i="1" dirty="0" smtClean="0"/>
+              <a:t>F</a:t>
+            </a:r>
+            <a:r>
+              <a:rPr lang="en-US" dirty="0" smtClean="0"/>
+              <a:t> within seasons</a:t>
+            </a:r>
+            <a:endParaRPr lang="en-US" i="1" dirty="0"/>
+          </a:p>
+          <a:p>
+            <a:pPr lvl="1"/>
+            <a:r>
+              <a:rPr lang="en-US" dirty="0" smtClean="0"/>
+              <a:t>Number </a:t>
+            </a:r>
+            <a:r>
+              <a:rPr lang="en-US" dirty="0" smtClean="0"/>
+              <a:t>of seasons</a:t>
+            </a:r>
+          </a:p>
+          <a:p>
+            <a:pPr lvl="1"/>
+            <a:r>
+              <a:rPr lang="en-US" dirty="0" smtClean="0"/>
+              <a:t>Proportion of </a:t>
+            </a:r>
+            <a:r>
+              <a:rPr lang="en-US" i="1" dirty="0" smtClean="0"/>
+              <a:t>M</a:t>
+            </a:r>
+            <a:r>
+              <a:rPr lang="en-US" dirty="0" smtClean="0"/>
+              <a:t> each season</a:t>
+            </a:r>
+          </a:p>
+          <a:p>
+            <a:pPr lvl="1"/>
+            <a:r>
+              <a:rPr lang="en-US" dirty="0" smtClean="0"/>
+              <a:t>Season molting and </a:t>
+            </a:r>
+            <a:r>
+              <a:rPr lang="en-US" dirty="0" smtClean="0"/>
+              <a:t>growth occur</a:t>
+            </a:r>
+            <a:endParaRPr lang="en-US" dirty="0" smtClean="0"/>
+          </a:p>
+          <a:p>
+            <a:pPr lvl="1"/>
+            <a:r>
+              <a:rPr lang="en-US" dirty="0" smtClean="0"/>
+              <a:t>Season </a:t>
+            </a:r>
+            <a:r>
+              <a:rPr lang="en-US" dirty="0" smtClean="0"/>
+              <a:t>recruitment occurs</a:t>
+            </a:r>
+            <a:endParaRPr lang="en-US" dirty="0" smtClean="0"/>
+          </a:p>
+          <a:p>
+            <a:pPr lvl="1"/>
+            <a:r>
+              <a:rPr lang="en-US" dirty="0" smtClean="0"/>
+              <a:t>Season </a:t>
+            </a:r>
+            <a:r>
+              <a:rPr lang="en-US" dirty="0" smtClean="0"/>
+              <a:t>SSB is to be calculated</a:t>
+            </a:r>
+            <a:endParaRPr lang="en-US" dirty="0" smtClean="0"/>
+          </a:p>
+          <a:p>
+            <a:pPr lvl="1"/>
+            <a:r>
+              <a:rPr lang="en-US" dirty="0" smtClean="0"/>
+              <a:t>All </a:t>
+            </a:r>
+            <a:r>
+              <a:rPr lang="en-US" dirty="0" smtClean="0"/>
+              <a:t>data sets have a time stamp (season/year)</a:t>
+            </a:r>
+          </a:p>
+          <a:p>
+            <a:r>
+              <a:rPr lang="en-US" dirty="0" smtClean="0"/>
+              <a:t>Added option to initialize numbers as free parameters</a:t>
+            </a:r>
+          </a:p>
+          <a:p>
+            <a:r>
+              <a:rPr lang="en-US" dirty="0" smtClean="0"/>
+              <a:t>Plots</a:t>
+            </a:r>
+          </a:p>
+          <a:p>
+            <a:r>
+              <a:rPr lang="en-US" dirty="0" smtClean="0"/>
+              <a:t>Draft SMBKC document</a:t>
+            </a:r>
+            <a:endParaRPr lang="en-US" dirty="0" smtClean="0"/>
+          </a:p>
+        </p:txBody>
+      </p:sp>
+    </p:spTree>
+    <p:extLst>
+      <p:ext uri="{BB962C8B-B14F-4D97-AF65-F5344CB8AC3E}">
+        <p14:creationId xmlns:p14="http://schemas.microsoft.com/office/powerpoint/2010/main" val="1127452723"/>
+      </p:ext>
+    </p:extLst>
+  </p:cSld>
+  <p:clrMapOvr>
+    <a:masterClrMapping/>
+  </p:clrMapOvr>
+</p:sld>
+</file>
+
+<file path=ppt/slides/slide20.xml><?xml version="1.0" encoding="utf-8"?>
 <p:sld xmlns:a="http://schemas.openxmlformats.org/drawingml/2006/main" xmlns:r="http://schemas.openxmlformats.org/officeDocument/2006/relationships" xmlns:p="http://schemas.openxmlformats.org/presentationml/2006/main">
   <p:cSld>
     <p:spTree>
@@ -3789,7 +4167,7 @@
 </p:sld>
 </file>
 
-<file path=ppt/slides/slide19.xml><?xml version="1.0" encoding="utf-8"?>
+<file path=ppt/slides/slide21.xml><?xml version="1.0" encoding="utf-8"?>
 <p:sld xmlns:a="http://schemas.openxmlformats.org/drawingml/2006/main" xmlns:r="http://schemas.openxmlformats.org/officeDocument/2006/relationships" xmlns:p="http://schemas.openxmlformats.org/presentationml/2006/main">
   <p:cSld>
     <p:spTree>
@@ -3867,153 +4245,7 @@
 </p:sld>
 </file>
 
-<file path=ppt/slides/slide2.xml><?xml version="1.0" encoding="utf-8"?>
-<p:sld xmlns:a="http://schemas.openxmlformats.org/drawingml/2006/main" xmlns:r="http://schemas.openxmlformats.org/officeDocument/2006/relationships" xmlns:p="http://schemas.openxmlformats.org/presentationml/2006/main">
-  <p:cSld>
-    <p:spTree>
-      <p:nvGrpSpPr>
-        <p:cNvPr id="1" name=""/>
-        <p:cNvGrpSpPr/>
-        <p:nvPr/>
-      </p:nvGrpSpPr>
-      <p:grpSpPr>
-        <a:xfrm>
-          <a:off x="0" y="0"/>
-          <a:ext cx="0" cy="0"/>
-          <a:chOff x="0" y="0"/>
-          <a:chExt cx="0" cy="0"/>
-        </a:xfrm>
-      </p:grpSpPr>
-      <p:sp>
-        <p:nvSpPr>
-          <p:cNvPr id="2" name="Title 1"/>
-          <p:cNvSpPr>
-            <a:spLocks noGrp="1"/>
-          </p:cNvSpPr>
-          <p:nvPr>
-            <p:ph type="title"/>
-          </p:nvPr>
-        </p:nvSpPr>
-        <p:spPr/>
-        <p:txBody>
-          <a:bodyPr/>
-          <a:lstStyle/>
-          <a:p>
-            <a:r>
-              <a:rPr lang="en-US" dirty="0" err="1" smtClean="0"/>
-              <a:t>Gmacs</a:t>
-            </a:r>
-            <a:endParaRPr lang="en-NZ" dirty="0"/>
-          </a:p>
-        </p:txBody>
-      </p:sp>
-      <p:sp>
-        <p:nvSpPr>
-          <p:cNvPr id="3" name="Content Placeholder 2"/>
-          <p:cNvSpPr>
-            <a:spLocks noGrp="1"/>
-          </p:cNvSpPr>
-          <p:nvPr>
-            <p:ph idx="1"/>
-          </p:nvPr>
-        </p:nvSpPr>
-        <p:spPr/>
-        <p:txBody>
-          <a:bodyPr>
-            <a:normAutofit lnSpcReduction="10000"/>
-          </a:bodyPr>
-          <a:lstStyle/>
-          <a:p>
-            <a:r>
-              <a:rPr lang="en-US" dirty="0" smtClean="0"/>
-              <a:t>Added seasons to </a:t>
-            </a:r>
-            <a:r>
-              <a:rPr lang="en-US" dirty="0" err="1" smtClean="0"/>
-              <a:t>Gmacs</a:t>
-            </a:r>
-            <a:r>
-              <a:rPr lang="en-US" dirty="0" smtClean="0"/>
-              <a:t> dynamics</a:t>
-            </a:r>
-          </a:p>
-          <a:p>
-            <a:pPr lvl="1"/>
-            <a:r>
-              <a:rPr lang="en-US" dirty="0" smtClean="0"/>
-              <a:t>Number of seasons</a:t>
-            </a:r>
-          </a:p>
-          <a:p>
-            <a:pPr lvl="1"/>
-            <a:r>
-              <a:rPr lang="en-US" dirty="0" smtClean="0"/>
-              <a:t>Proportion of M each season</a:t>
-            </a:r>
-          </a:p>
-          <a:p>
-            <a:pPr lvl="1"/>
-            <a:r>
-              <a:rPr lang="en-US" dirty="0" smtClean="0"/>
-              <a:t>Season molting and growth</a:t>
-            </a:r>
-          </a:p>
-          <a:p>
-            <a:pPr lvl="1"/>
-            <a:r>
-              <a:rPr lang="en-US" dirty="0" smtClean="0"/>
-              <a:t>Season recruitment</a:t>
-            </a:r>
-          </a:p>
-          <a:p>
-            <a:pPr lvl="1"/>
-            <a:r>
-              <a:rPr lang="en-US" dirty="0" smtClean="0"/>
-              <a:t>Season SSB</a:t>
-            </a:r>
-          </a:p>
-          <a:p>
-            <a:pPr lvl="1"/>
-            <a:r>
-              <a:rPr lang="en-US" dirty="0" smtClean="0"/>
-              <a:t>Retained continuous M/F</a:t>
-            </a:r>
-          </a:p>
-          <a:p>
-            <a:pPr lvl="1"/>
-            <a:r>
-              <a:rPr lang="en-US" dirty="0" smtClean="0"/>
-              <a:t>All data sets have a time stamp (season/year)</a:t>
-            </a:r>
-          </a:p>
-          <a:p>
-            <a:r>
-              <a:rPr lang="en-US" dirty="0" smtClean="0"/>
-              <a:t>Added option to initialize numbers as free parameters</a:t>
-            </a:r>
-          </a:p>
-          <a:p>
-            <a:r>
-              <a:rPr lang="en-US" dirty="0" smtClean="0"/>
-              <a:t>Plots</a:t>
-            </a:r>
-          </a:p>
-        </p:txBody>
-      </p:sp>
-    </p:spTree>
-    <p:extLst>
-      <p:ext uri="{BB962C8B-B14F-4D97-AF65-F5344CB8AC3E}">
-        <p14:creationId xmlns:p14="http://schemas.microsoft.com/office/powerpoint/2010/main" val="1127452723"/>
-      </p:ext>
-    </p:extLst>
-  </p:cSld>
-  <p:clrMapOvr>
-    <a:masterClrMapping/>
-  </p:clrMapOvr>
-</p:sld>
-</file>
-
-<file path=ppt/slides/slide20.xml><?xml version="1.0" encoding="utf-8"?>
+<file path=ppt/slides/slide22.xml><?xml version="1.0" encoding="utf-8"?>
 <p:sld xmlns:a="http://schemas.openxmlformats.org/drawingml/2006/main" xmlns:r="http://schemas.openxmlformats.org/officeDocument/2006/relationships" xmlns:p="http://schemas.openxmlformats.org/presentationml/2006/main">
   <p:cSld>
     <p:spTree>
@@ -4091,7 +4323,7 @@
 </p:sld>
 </file>
 
-<file path=ppt/slides/slide21.xml><?xml version="1.0" encoding="utf-8"?>
+<file path=ppt/slides/slide23.xml><?xml version="1.0" encoding="utf-8"?>
 <p:sld xmlns:a="http://schemas.openxmlformats.org/drawingml/2006/main" xmlns:r="http://schemas.openxmlformats.org/officeDocument/2006/relationships" xmlns:p="http://schemas.openxmlformats.org/presentationml/2006/main">
   <p:cSld>
     <p:spTree>
@@ -4169,7 +4401,7 @@
 </p:sld>
 </file>
 
-<file path=ppt/slides/slide22.xml><?xml version="1.0" encoding="utf-8"?>
+<file path=ppt/slides/slide24.xml><?xml version="1.0" encoding="utf-8"?>
 <p:sld xmlns:a="http://schemas.openxmlformats.org/drawingml/2006/main" xmlns:r="http://schemas.openxmlformats.org/officeDocument/2006/relationships" xmlns:p="http://schemas.openxmlformats.org/presentationml/2006/main">
   <p:cSld>
     <p:spTree>
@@ -4247,7 +4479,7 @@
 </p:sld>
 </file>
 
-<file path=ppt/slides/slide23.xml><?xml version="1.0" encoding="utf-8"?>
+<file path=ppt/slides/slide25.xml><?xml version="1.0" encoding="utf-8"?>
 <p:sld xmlns:a="http://schemas.openxmlformats.org/drawingml/2006/main" xmlns:r="http://schemas.openxmlformats.org/officeDocument/2006/relationships" xmlns:p="http://schemas.openxmlformats.org/presentationml/2006/main">
   <p:cSld>
     <p:spTree>
@@ -4358,13 +4590,13 @@
           <a:lstStyle/>
           <a:p>
             <a:r>
-              <a:rPr lang="en-US" dirty="0" smtClean="0"/>
-              <a:t>SMBKC in </a:t>
-            </a:r>
-            <a:r>
               <a:rPr lang="en-US" dirty="0" err="1" smtClean="0"/>
               <a:t>Gmacs</a:t>
             </a:r>
+            <a:r>
+              <a:rPr lang="en-US" dirty="0" smtClean="0"/>
+              <a:t> in progress</a:t>
+            </a:r>
             <a:endParaRPr lang="en-NZ" dirty="0"/>
           </a:p>
         </p:txBody>
@@ -4382,100 +4614,67 @@
         <p:spPr/>
         <p:txBody>
           <a:bodyPr>
-            <a:normAutofit fontScale="92500" lnSpcReduction="20000"/>
+            <a:normAutofit fontScale="92500" lnSpcReduction="10000"/>
           </a:bodyPr>
           <a:lstStyle/>
           <a:p>
             <a:r>
               <a:rPr lang="en-US" dirty="0" smtClean="0"/>
-              <a:t>1978-2015</a:t>
-            </a:r>
-          </a:p>
-          <a:p>
-            <a:r>
-              <a:rPr lang="en-US" dirty="0" smtClean="0"/>
-              <a:t>4 seasons (M = 0, 0.44, 0.185, 0.375)</a:t>
-            </a:r>
-          </a:p>
-          <a:p>
-            <a:r>
-              <a:rPr lang="en-US" dirty="0" smtClean="0"/>
-              <a:t>1 </a:t>
-            </a:r>
-            <a:r>
-              <a:rPr lang="en-US" dirty="0"/>
-              <a:t>sex, 1 shell type, 1 maturity </a:t>
-            </a:r>
-            <a:r>
-              <a:rPr lang="en-US" dirty="0" smtClean="0"/>
-              <a:t>class</a:t>
-            </a:r>
-          </a:p>
-          <a:p>
-            <a:r>
-              <a:rPr lang="en-US" dirty="0"/>
-              <a:t>3 stages (size-classes)</a:t>
-            </a:r>
-          </a:p>
-          <a:p>
-            <a:r>
-              <a:rPr lang="en-US" dirty="0" smtClean="0"/>
-              <a:t>3 fleets (pot</a:t>
-            </a:r>
-            <a:r>
-              <a:rPr lang="en-US" dirty="0"/>
-              <a:t>, trawl </a:t>
-            </a:r>
-            <a:r>
-              <a:rPr lang="en-US" dirty="0" err="1"/>
-              <a:t>bycatch</a:t>
-            </a:r>
-            <a:r>
-              <a:rPr lang="en-US" dirty="0"/>
-              <a:t>, fixed </a:t>
-            </a:r>
-            <a:r>
-              <a:rPr lang="en-US" dirty="0" err="1" smtClean="0"/>
-              <a:t>bycatch</a:t>
-            </a:r>
-            <a:r>
-              <a:rPr lang="en-US" dirty="0" smtClean="0"/>
-              <a:t>)</a:t>
-            </a:r>
-            <a:endParaRPr lang="en-US" dirty="0"/>
-          </a:p>
-          <a:p>
-            <a:r>
-              <a:rPr lang="en-US" dirty="0"/>
-              <a:t>2 surveys (NMFS trawl and ADF&amp;G pot) both in season 1</a:t>
-            </a:r>
-          </a:p>
-          <a:p>
-            <a:r>
-              <a:rPr lang="en-US" dirty="0" smtClean="0"/>
-              <a:t>4 catch types (directed pot, pot discards, trawl </a:t>
-            </a:r>
-            <a:r>
-              <a:rPr lang="en-US" dirty="0" err="1" smtClean="0"/>
-              <a:t>bycatch</a:t>
-            </a:r>
-            <a:r>
-              <a:rPr lang="en-US" dirty="0" smtClean="0"/>
-              <a:t>, fixed </a:t>
-            </a:r>
-            <a:r>
-              <a:rPr lang="en-US" dirty="0" err="1" smtClean="0"/>
-              <a:t>bycatch</a:t>
-            </a:r>
-            <a:r>
-              <a:rPr lang="en-US" dirty="0" smtClean="0"/>
-              <a:t>) all during season 2</a:t>
-            </a:r>
-          </a:p>
-          <a:p>
-            <a:r>
-              <a:rPr lang="en-US" dirty="0" smtClean="0"/>
-              <a:t>3 size compositions (pot season 2, NMFS trawl season 1, ADF&amp;G pot season 1)</a:t>
+              <a:t>Equilibrium numbers at length</a:t>
+            </a:r>
+          </a:p>
+          <a:p>
+            <a:pPr lvl="1"/>
+            <a:r>
+              <a:rPr lang="en-US" dirty="0" smtClean="0"/>
+              <a:t>Broke when seasonal changes added, can’t use the elegant solutions anymore</a:t>
+            </a:r>
+          </a:p>
+          <a:p>
+            <a:pPr lvl="1"/>
+            <a:r>
+              <a:rPr lang="en-US" dirty="0" smtClean="0"/>
+              <a:t>Not required for SMBKC as we estimate initial numbers as free parameters</a:t>
+            </a:r>
+          </a:p>
+          <a:p>
+            <a:pPr lvl="1"/>
+            <a:r>
+              <a:rPr lang="en-US" dirty="0" smtClean="0"/>
+              <a:t>The new function is complete but yet to be put in the right places</a:t>
+            </a:r>
+          </a:p>
+          <a:p>
+            <a:r>
+              <a:rPr lang="en-US" dirty="0" smtClean="0"/>
+              <a:t>SPR calculations</a:t>
+            </a:r>
+          </a:p>
+          <a:p>
+            <a:pPr lvl="1"/>
+            <a:r>
+              <a:rPr lang="en-US" dirty="0" smtClean="0"/>
+              <a:t>As above/required equilibrium numbers</a:t>
+            </a:r>
+          </a:p>
+          <a:p>
+            <a:pPr lvl="1"/>
+            <a:r>
+              <a:rPr lang="en-US" dirty="0" smtClean="0"/>
+              <a:t>Probably only a day or two of work but I fell asleep yesterday</a:t>
+            </a:r>
+          </a:p>
+          <a:p>
+            <a:r>
+              <a:rPr lang="en-US" dirty="0" smtClean="0"/>
+              <a:t>BBRKC model</a:t>
+            </a:r>
+          </a:p>
+          <a:p>
+            <a:pPr lvl="1"/>
+            <a:r>
+              <a:rPr lang="en-US" dirty="0" smtClean="0"/>
+              <a:t>Runs but as above</a:t>
             </a:r>
             <a:endParaRPr lang="en-NZ" dirty="0"/>
           </a:p>
@@ -4484,7 +4683,7 @@
     </p:spTree>
     <p:extLst>
       <p:ext uri="{BB962C8B-B14F-4D97-AF65-F5344CB8AC3E}">
-        <p14:creationId xmlns:p14="http://schemas.microsoft.com/office/powerpoint/2010/main" val="3508581728"/>
+        <p14:creationId xmlns:p14="http://schemas.microsoft.com/office/powerpoint/2010/main" val="939631492"/>
       </p:ext>
     </p:extLst>
   </p:cSld>
@@ -4527,12 +4726,12 @@
           <a:lstStyle/>
           <a:p>
             <a:r>
+              <a:rPr lang="en-US" dirty="0" smtClean="0"/>
+              <a:t>SMBKC in </a:t>
+            </a:r>
+            <a:r>
               <a:rPr lang="en-US" dirty="0" err="1" smtClean="0"/>
               <a:t>Gmacs</a:t>
-            </a:r>
-            <a:r>
-              <a:rPr lang="en-US" dirty="0" smtClean="0"/>
-              <a:t> dynamics</a:t>
             </a:r>
             <a:endParaRPr lang="en-NZ" dirty="0"/>
           </a:p>
@@ -4557,6 +4756,208 @@
           <a:p>
             <a:r>
               <a:rPr lang="en-US" dirty="0" smtClean="0"/>
+              <a:t>1978-2015</a:t>
+            </a:r>
+          </a:p>
+          <a:p>
+            <a:r>
+              <a:rPr lang="en-US" dirty="0" smtClean="0"/>
+              <a:t>4 seasons (M = 0, 0.44, 0.185, 0.375)</a:t>
+            </a:r>
+          </a:p>
+          <a:p>
+            <a:r>
+              <a:rPr lang="en-US" dirty="0" smtClean="0"/>
+              <a:t>3 </a:t>
+            </a:r>
+            <a:r>
+              <a:rPr lang="en-US" dirty="0"/>
+              <a:t>stages </a:t>
+            </a:r>
+            <a:r>
+              <a:rPr lang="en-US" dirty="0" smtClean="0"/>
+              <a:t>(90-104, 105-119, 120+)</a:t>
+            </a:r>
+            <a:endParaRPr lang="en-US" dirty="0"/>
+          </a:p>
+          <a:p>
+            <a:r>
+              <a:rPr lang="en-US" dirty="0"/>
+              <a:t>1 sex, 1 shell type, 1 maturity class</a:t>
+            </a:r>
+          </a:p>
+          <a:p>
+            <a:r>
+              <a:rPr lang="en-US" dirty="0" smtClean="0"/>
+              <a:t>3 </a:t>
+            </a:r>
+            <a:r>
+              <a:rPr lang="en-US" dirty="0" smtClean="0"/>
+              <a:t>fleets (pot</a:t>
+            </a:r>
+            <a:r>
+              <a:rPr lang="en-US" dirty="0"/>
+              <a:t>, trawl </a:t>
+            </a:r>
+            <a:r>
+              <a:rPr lang="en-US" dirty="0" err="1"/>
+              <a:t>bycatch</a:t>
+            </a:r>
+            <a:r>
+              <a:rPr lang="en-US" dirty="0"/>
+              <a:t>, fixed </a:t>
+            </a:r>
+            <a:r>
+              <a:rPr lang="en-US" dirty="0" err="1" smtClean="0"/>
+              <a:t>bycatch</a:t>
+            </a:r>
+            <a:r>
+              <a:rPr lang="en-US" dirty="0" smtClean="0"/>
+              <a:t>)</a:t>
+            </a:r>
+            <a:endParaRPr lang="en-US" dirty="0"/>
+          </a:p>
+          <a:p>
+            <a:r>
+              <a:rPr lang="en-US" dirty="0"/>
+              <a:t>2 surveys (NMFS trawl and ADF&amp;G </a:t>
+            </a:r>
+            <a:r>
+              <a:rPr lang="en-US" dirty="0" smtClean="0"/>
+              <a:t>pot CPUE) </a:t>
+            </a:r>
+            <a:r>
+              <a:rPr lang="en-US" dirty="0"/>
+              <a:t>both in season 1</a:t>
+            </a:r>
+          </a:p>
+          <a:p>
+            <a:r>
+              <a:rPr lang="en-US" dirty="0" smtClean="0"/>
+              <a:t>4 catch types (directed pot, pot discards, trawl </a:t>
+            </a:r>
+            <a:r>
+              <a:rPr lang="en-US" dirty="0" err="1" smtClean="0"/>
+              <a:t>bycatch</a:t>
+            </a:r>
+            <a:r>
+              <a:rPr lang="en-US" dirty="0" smtClean="0"/>
+              <a:t>, fixed </a:t>
+            </a:r>
+            <a:r>
+              <a:rPr lang="en-US" dirty="0" err="1" smtClean="0"/>
+              <a:t>bycatch</a:t>
+            </a:r>
+            <a:r>
+              <a:rPr lang="en-US" dirty="0" smtClean="0"/>
+              <a:t>) all during season 2</a:t>
+            </a:r>
+          </a:p>
+          <a:p>
+            <a:r>
+              <a:rPr lang="en-US" dirty="0" smtClean="0"/>
+              <a:t>3 size compositions (pot </a:t>
+            </a:r>
+            <a:r>
+              <a:rPr lang="en-US" dirty="0" smtClean="0"/>
+              <a:t>in season </a:t>
+            </a:r>
+            <a:r>
+              <a:rPr lang="en-US" dirty="0" smtClean="0"/>
+              <a:t>2, NMFS trawl </a:t>
+            </a:r>
+            <a:r>
+              <a:rPr lang="en-US" dirty="0" smtClean="0"/>
+              <a:t>in season </a:t>
+            </a:r>
+            <a:r>
+              <a:rPr lang="en-US" dirty="0" smtClean="0"/>
+              <a:t>1, ADF&amp;G pot </a:t>
+            </a:r>
+            <a:r>
+              <a:rPr lang="en-US" dirty="0" smtClean="0"/>
+              <a:t>in season </a:t>
+            </a:r>
+            <a:r>
+              <a:rPr lang="en-US" dirty="0" smtClean="0"/>
+              <a:t>1)</a:t>
+            </a:r>
+            <a:endParaRPr lang="en-NZ" dirty="0"/>
+          </a:p>
+        </p:txBody>
+      </p:sp>
+    </p:spTree>
+    <p:extLst>
+      <p:ext uri="{BB962C8B-B14F-4D97-AF65-F5344CB8AC3E}">
+        <p14:creationId xmlns:p14="http://schemas.microsoft.com/office/powerpoint/2010/main" val="3508581728"/>
+      </p:ext>
+    </p:extLst>
+  </p:cSld>
+  <p:clrMapOvr>
+    <a:masterClrMapping/>
+  </p:clrMapOvr>
+</p:sld>
+</file>
+
+<file path=ppt/slides/slide5.xml><?xml version="1.0" encoding="utf-8"?>
+<p:sld xmlns:a="http://schemas.openxmlformats.org/drawingml/2006/main" xmlns:r="http://schemas.openxmlformats.org/officeDocument/2006/relationships" xmlns:p="http://schemas.openxmlformats.org/presentationml/2006/main">
+  <p:cSld>
+    <p:spTree>
+      <p:nvGrpSpPr>
+        <p:cNvPr id="1" name=""/>
+        <p:cNvGrpSpPr/>
+        <p:nvPr/>
+      </p:nvGrpSpPr>
+      <p:grpSpPr>
+        <a:xfrm>
+          <a:off x="0" y="0"/>
+          <a:ext cx="0" cy="0"/>
+          <a:chOff x="0" y="0"/>
+          <a:chExt cx="0" cy="0"/>
+        </a:xfrm>
+      </p:grpSpPr>
+      <p:sp>
+        <p:nvSpPr>
+          <p:cNvPr id="2" name="Title 1"/>
+          <p:cNvSpPr>
+            <a:spLocks noGrp="1"/>
+          </p:cNvSpPr>
+          <p:nvPr>
+            <p:ph type="title"/>
+          </p:nvPr>
+        </p:nvSpPr>
+        <p:spPr/>
+        <p:txBody>
+          <a:bodyPr/>
+          <a:lstStyle/>
+          <a:p>
+            <a:r>
+              <a:rPr lang="en-US" dirty="0" smtClean="0"/>
+              <a:t>SMBKC dynamics</a:t>
+            </a:r>
+            <a:endParaRPr lang="en-NZ" dirty="0"/>
+          </a:p>
+        </p:txBody>
+      </p:sp>
+      <p:sp>
+        <p:nvSpPr>
+          <p:cNvPr id="3" name="Content Placeholder 2"/>
+          <p:cNvSpPr>
+            <a:spLocks noGrp="1"/>
+          </p:cNvSpPr>
+          <p:nvPr>
+            <p:ph idx="1"/>
+          </p:nvPr>
+        </p:nvSpPr>
+        <p:spPr/>
+        <p:txBody>
+          <a:bodyPr>
+            <a:normAutofit fontScale="92500" lnSpcReduction="20000"/>
+          </a:bodyPr>
+          <a:lstStyle/>
+          <a:p>
+            <a:r>
+              <a:rPr lang="en-US" dirty="0" smtClean="0"/>
               <a:t>Season 1</a:t>
             </a:r>
           </a:p>
@@ -4631,7 +5032,7 @@
             <a:pPr lvl="1"/>
             <a:r>
               <a:rPr lang="en-US" dirty="0" smtClean="0"/>
-              <a:t>Recruitment</a:t>
+              <a:t>Recruitment (all to stage-1)</a:t>
             </a:r>
             <a:endParaRPr lang="en-NZ" dirty="0"/>
           </a:p>
@@ -4650,7 +5051,86 @@
 </p:sld>
 </file>
 
-<file path=ppt/slides/slide5.xml><?xml version="1.0" encoding="utf-8"?>
+<file path=ppt/slides/slide6.xml><?xml version="1.0" encoding="utf-8"?>
+<p:sld xmlns:a="http://schemas.openxmlformats.org/drawingml/2006/main" xmlns:r="http://schemas.openxmlformats.org/officeDocument/2006/relationships" xmlns:p="http://schemas.openxmlformats.org/presentationml/2006/main">
+  <p:cSld>
+    <p:spTree>
+      <p:nvGrpSpPr>
+        <p:cNvPr id="1" name=""/>
+        <p:cNvGrpSpPr/>
+        <p:nvPr/>
+      </p:nvGrpSpPr>
+      <p:grpSpPr>
+        <a:xfrm>
+          <a:off x="0" y="0"/>
+          <a:ext cx="0" cy="0"/>
+          <a:chOff x="0" y="0"/>
+          <a:chExt cx="0" cy="0"/>
+        </a:xfrm>
+      </p:grpSpPr>
+      <p:sp>
+        <p:nvSpPr>
+          <p:cNvPr id="2" name="Title 1"/>
+          <p:cNvSpPr>
+            <a:spLocks noGrp="1"/>
+          </p:cNvSpPr>
+          <p:nvPr>
+            <p:ph type="title"/>
+          </p:nvPr>
+        </p:nvSpPr>
+        <p:spPr/>
+        <p:txBody>
+          <a:bodyPr/>
+          <a:lstStyle/>
+          <a:p>
+            <a:r>
+              <a:rPr lang="en-US" dirty="0" smtClean="0"/>
+              <a:t>SMBKC</a:t>
+            </a:r>
+            <a:endParaRPr lang="en-NZ" dirty="0"/>
+          </a:p>
+        </p:txBody>
+      </p:sp>
+      <p:sp>
+        <p:nvSpPr>
+          <p:cNvPr id="3" name="Content Placeholder 2"/>
+          <p:cNvSpPr>
+            <a:spLocks noGrp="1"/>
+          </p:cNvSpPr>
+          <p:nvPr>
+            <p:ph idx="1"/>
+          </p:nvPr>
+        </p:nvSpPr>
+        <p:spPr/>
+        <p:txBody>
+          <a:bodyPr/>
+          <a:lstStyle/>
+          <a:p>
+            <a:pPr marL="0" indent="0">
+              <a:buNone/>
+            </a:pPr>
+            <a:r>
+              <a:rPr lang="en-US" dirty="0" smtClean="0"/>
+              <a:t>See document</a:t>
+            </a:r>
+            <a:endParaRPr lang="en-NZ" dirty="0"/>
+          </a:p>
+        </p:txBody>
+      </p:sp>
+    </p:spTree>
+    <p:extLst>
+      <p:ext uri="{BB962C8B-B14F-4D97-AF65-F5344CB8AC3E}">
+        <p14:creationId xmlns:p14="http://schemas.microsoft.com/office/powerpoint/2010/main" val="1571411259"/>
+      </p:ext>
+    </p:extLst>
+  </p:cSld>
+  <p:clrMapOvr>
+    <a:masterClrMapping/>
+  </p:clrMapOvr>
+</p:sld>
+</file>
+
+<file path=ppt/slides/slide7.xml><?xml version="1.0" encoding="utf-8"?>
 <p:sld xmlns:a="http://schemas.openxmlformats.org/drawingml/2006/main" xmlns:r="http://schemas.openxmlformats.org/officeDocument/2006/relationships" xmlns:p="http://schemas.openxmlformats.org/presentationml/2006/main">
   <p:cSld>
     <p:spTree>
@@ -4731,7 +5211,7 @@
 </p:sld>
 </file>
 
-<file path=ppt/slides/slide6.xml><?xml version="1.0" encoding="utf-8"?>
+<file path=ppt/slides/slide8.xml><?xml version="1.0" encoding="utf-8"?>
 <p:sld xmlns:a="http://schemas.openxmlformats.org/drawingml/2006/main" xmlns:r="http://schemas.openxmlformats.org/officeDocument/2006/relationships" xmlns:p="http://schemas.openxmlformats.org/presentationml/2006/main">
   <p:cSld>
     <p:spTree>
@@ -4899,7 +5379,7 @@
 </p:sld>
 </file>
 
-<file path=ppt/slides/slide7.xml><?xml version="1.0" encoding="utf-8"?>
+<file path=ppt/slides/slide9.xml><?xml version="1.0" encoding="utf-8"?>
 <p:sld xmlns:a="http://schemas.openxmlformats.org/drawingml/2006/main" xmlns:r="http://schemas.openxmlformats.org/officeDocument/2006/relationships" xmlns:p="http://schemas.openxmlformats.org/presentationml/2006/main">
   <p:cSld>
     <p:spTree>
@@ -4968,162 +5448,6 @@
     <p:extLst>
       <p:ext uri="{BB962C8B-B14F-4D97-AF65-F5344CB8AC3E}">
         <p14:creationId xmlns:p14="http://schemas.microsoft.com/office/powerpoint/2010/main" val="2388954811"/>
-      </p:ext>
-    </p:extLst>
-  </p:cSld>
-  <p:clrMapOvr>
-    <a:masterClrMapping/>
-  </p:clrMapOvr>
-</p:sld>
-</file>
-
-<file path=ppt/slides/slide8.xml><?xml version="1.0" encoding="utf-8"?>
-<p:sld xmlns:a="http://schemas.openxmlformats.org/drawingml/2006/main" xmlns:r="http://schemas.openxmlformats.org/officeDocument/2006/relationships" xmlns:p="http://schemas.openxmlformats.org/presentationml/2006/main">
-  <p:cSld>
-    <p:spTree>
-      <p:nvGrpSpPr>
-        <p:cNvPr id="1" name=""/>
-        <p:cNvGrpSpPr/>
-        <p:nvPr/>
-      </p:nvGrpSpPr>
-      <p:grpSpPr>
-        <a:xfrm>
-          <a:off x="0" y="0"/>
-          <a:ext cx="0" cy="0"/>
-          <a:chOff x="0" y="0"/>
-          <a:chExt cx="0" cy="0"/>
-        </a:xfrm>
-      </p:grpSpPr>
-      <p:sp>
-        <p:nvSpPr>
-          <p:cNvPr id="2" name="Title 1"/>
-          <p:cNvSpPr>
-            <a:spLocks noGrp="1"/>
-          </p:cNvSpPr>
-          <p:nvPr>
-            <p:ph type="title"/>
-          </p:nvPr>
-        </p:nvSpPr>
-        <p:spPr/>
-        <p:txBody>
-          <a:bodyPr/>
-          <a:lstStyle/>
-          <a:p>
-            <a:endParaRPr lang="en-NZ"/>
-          </a:p>
-        </p:txBody>
-      </p:sp>
-      <p:pic>
-        <p:nvPicPr>
-          <p:cNvPr id="4" name="Content Placeholder 3"/>
-          <p:cNvPicPr>
-            <a:picLocks noGrp="1" noChangeAspect="1"/>
-          </p:cNvPicPr>
-          <p:nvPr>
-            <p:ph idx="1"/>
-          </p:nvPr>
-        </p:nvPicPr>
-        <p:blipFill>
-          <a:blip r:embed="rId2">
-            <a:extLst>
-              <a:ext uri="{28A0092B-C50C-407E-A947-70E740481C1C}">
-                <a14:useLocalDpi xmlns:a14="http://schemas.microsoft.com/office/drawing/2010/main" val="0"/>
-              </a:ext>
-            </a:extLst>
-          </a:blip>
-          <a:stretch>
-            <a:fillRect/>
-          </a:stretch>
-        </p:blipFill>
-        <p:spPr>
-          <a:xfrm>
-            <a:off x="0" y="1523999"/>
-            <a:ext cx="9144000" cy="5334001"/>
-          </a:xfrm>
-        </p:spPr>
-      </p:pic>
-    </p:spTree>
-    <p:extLst>
-      <p:ext uri="{BB962C8B-B14F-4D97-AF65-F5344CB8AC3E}">
-        <p14:creationId xmlns:p14="http://schemas.microsoft.com/office/powerpoint/2010/main" val="3657479237"/>
-      </p:ext>
-    </p:extLst>
-  </p:cSld>
-  <p:clrMapOvr>
-    <a:masterClrMapping/>
-  </p:clrMapOvr>
-</p:sld>
-</file>
-
-<file path=ppt/slides/slide9.xml><?xml version="1.0" encoding="utf-8"?>
-<p:sld xmlns:a="http://schemas.openxmlformats.org/drawingml/2006/main" xmlns:r="http://schemas.openxmlformats.org/officeDocument/2006/relationships" xmlns:p="http://schemas.openxmlformats.org/presentationml/2006/main">
-  <p:cSld>
-    <p:spTree>
-      <p:nvGrpSpPr>
-        <p:cNvPr id="1" name=""/>
-        <p:cNvGrpSpPr/>
-        <p:nvPr/>
-      </p:nvGrpSpPr>
-      <p:grpSpPr>
-        <a:xfrm>
-          <a:off x="0" y="0"/>
-          <a:ext cx="0" cy="0"/>
-          <a:chOff x="0" y="0"/>
-          <a:chExt cx="0" cy="0"/>
-        </a:xfrm>
-      </p:grpSpPr>
-      <p:sp>
-        <p:nvSpPr>
-          <p:cNvPr id="2" name="Title 1"/>
-          <p:cNvSpPr>
-            <a:spLocks noGrp="1"/>
-          </p:cNvSpPr>
-          <p:nvPr>
-            <p:ph type="title"/>
-          </p:nvPr>
-        </p:nvSpPr>
-        <p:spPr/>
-        <p:txBody>
-          <a:bodyPr/>
-          <a:lstStyle/>
-          <a:p>
-            <a:endParaRPr lang="en-NZ"/>
-          </a:p>
-        </p:txBody>
-      </p:sp>
-      <p:pic>
-        <p:nvPicPr>
-          <p:cNvPr id="4" name="Content Placeholder 3"/>
-          <p:cNvPicPr>
-            <a:picLocks noGrp="1" noChangeAspect="1"/>
-          </p:cNvPicPr>
-          <p:nvPr>
-            <p:ph idx="1"/>
-          </p:nvPr>
-        </p:nvPicPr>
-        <p:blipFill>
-          <a:blip r:embed="rId2">
-            <a:extLst>
-              <a:ext uri="{28A0092B-C50C-407E-A947-70E740481C1C}">
-                <a14:useLocalDpi xmlns:a14="http://schemas.microsoft.com/office/drawing/2010/main" val="0"/>
-              </a:ext>
-            </a:extLst>
-          </a:blip>
-          <a:stretch>
-            <a:fillRect/>
-          </a:stretch>
-        </p:blipFill>
-        <p:spPr>
-          <a:xfrm>
-            <a:off x="0" y="1523999"/>
-            <a:ext cx="9144000" cy="5334001"/>
-          </a:xfrm>
-        </p:spPr>
-      </p:pic>
-    </p:spTree>
-    <p:extLst>
-      <p:ext uri="{BB962C8B-B14F-4D97-AF65-F5344CB8AC3E}">
-        <p14:creationId xmlns:p14="http://schemas.microsoft.com/office/powerpoint/2010/main" val="2727842710"/>
       </p:ext>
     </p:extLst>
   </p:cSld>

</xml_diff>

<commit_message>
More work on docco
</commit_message>
<xml_diff>
--- a/docs/smbkc/smbkc.pptx
+++ b/docs/smbkc/smbkc.pptx
@@ -10,26 +10,27 @@
     <p:sldId id="279" r:id="rId4"/>
     <p:sldId id="277" r:id="rId5"/>
     <p:sldId id="278" r:id="rId6"/>
-    <p:sldId id="280" r:id="rId7"/>
-    <p:sldId id="258" r:id="rId8"/>
-    <p:sldId id="257" r:id="rId9"/>
-    <p:sldId id="259" r:id="rId10"/>
-    <p:sldId id="260" r:id="rId11"/>
-    <p:sldId id="268" r:id="rId12"/>
-    <p:sldId id="267" r:id="rId13"/>
-    <p:sldId id="261" r:id="rId14"/>
-    <p:sldId id="262" r:id="rId15"/>
-    <p:sldId id="263" r:id="rId16"/>
-    <p:sldId id="264" r:id="rId17"/>
-    <p:sldId id="265" r:id="rId18"/>
-    <p:sldId id="266" r:id="rId19"/>
-    <p:sldId id="269" r:id="rId20"/>
-    <p:sldId id="270" r:id="rId21"/>
-    <p:sldId id="271" r:id="rId22"/>
-    <p:sldId id="272" r:id="rId23"/>
-    <p:sldId id="273" r:id="rId24"/>
-    <p:sldId id="274" r:id="rId25"/>
-    <p:sldId id="275" r:id="rId26"/>
+    <p:sldId id="258" r:id="rId7"/>
+    <p:sldId id="281" r:id="rId8"/>
+    <p:sldId id="280" r:id="rId9"/>
+    <p:sldId id="257" r:id="rId10"/>
+    <p:sldId id="259" r:id="rId11"/>
+    <p:sldId id="260" r:id="rId12"/>
+    <p:sldId id="268" r:id="rId13"/>
+    <p:sldId id="267" r:id="rId14"/>
+    <p:sldId id="261" r:id="rId15"/>
+    <p:sldId id="262" r:id="rId16"/>
+    <p:sldId id="263" r:id="rId17"/>
+    <p:sldId id="264" r:id="rId18"/>
+    <p:sldId id="265" r:id="rId19"/>
+    <p:sldId id="266" r:id="rId20"/>
+    <p:sldId id="269" r:id="rId21"/>
+    <p:sldId id="270" r:id="rId22"/>
+    <p:sldId id="271" r:id="rId23"/>
+    <p:sldId id="272" r:id="rId24"/>
+    <p:sldId id="273" r:id="rId25"/>
+    <p:sldId id="274" r:id="rId26"/>
+    <p:sldId id="275" r:id="rId27"/>
   </p:sldIdLst>
   <p:sldSz cx="9144000" cy="6858000" type="screen4x3"/>
   <p:notesSz cx="6858000" cy="9144000"/>
@@ -3136,6 +3137,84 @@
           <a:bodyPr/>
           <a:lstStyle/>
           <a:p>
+            <a:endParaRPr lang="en-NZ" dirty="0"/>
+          </a:p>
+        </p:txBody>
+      </p:sp>
+      <p:pic>
+        <p:nvPicPr>
+          <p:cNvPr id="4" name="Content Placeholder 3"/>
+          <p:cNvPicPr>
+            <a:picLocks noGrp="1" noChangeAspect="1"/>
+          </p:cNvPicPr>
+          <p:nvPr>
+            <p:ph idx="1"/>
+          </p:nvPr>
+        </p:nvPicPr>
+        <p:blipFill>
+          <a:blip r:embed="rId2">
+            <a:extLst>
+              <a:ext uri="{28A0092B-C50C-407E-A947-70E740481C1C}">
+                <a14:useLocalDpi xmlns:a14="http://schemas.microsoft.com/office/drawing/2010/main" val="0"/>
+              </a:ext>
+            </a:extLst>
+          </a:blip>
+          <a:stretch>
+            <a:fillRect/>
+          </a:stretch>
+        </p:blipFill>
+        <p:spPr>
+          <a:xfrm>
+            <a:off x="2493034" y="103967"/>
+            <a:ext cx="6650966" cy="6650966"/>
+          </a:xfrm>
+        </p:spPr>
+      </p:pic>
+    </p:spTree>
+    <p:extLst>
+      <p:ext uri="{BB962C8B-B14F-4D97-AF65-F5344CB8AC3E}">
+        <p14:creationId xmlns:p14="http://schemas.microsoft.com/office/powerpoint/2010/main" val="2388954811"/>
+      </p:ext>
+    </p:extLst>
+  </p:cSld>
+  <p:clrMapOvr>
+    <a:masterClrMapping/>
+  </p:clrMapOvr>
+</p:sld>
+</file>
+
+<file path=ppt/slides/slide11.xml><?xml version="1.0" encoding="utf-8"?>
+<p:sld xmlns:a="http://schemas.openxmlformats.org/drawingml/2006/main" xmlns:r="http://schemas.openxmlformats.org/officeDocument/2006/relationships" xmlns:p="http://schemas.openxmlformats.org/presentationml/2006/main">
+  <p:cSld>
+    <p:spTree>
+      <p:nvGrpSpPr>
+        <p:cNvPr id="1" name=""/>
+        <p:cNvGrpSpPr/>
+        <p:nvPr/>
+      </p:nvGrpSpPr>
+      <p:grpSpPr>
+        <a:xfrm>
+          <a:off x="0" y="0"/>
+          <a:ext cx="0" cy="0"/>
+          <a:chOff x="0" y="0"/>
+          <a:chExt cx="0" cy="0"/>
+        </a:xfrm>
+      </p:grpSpPr>
+      <p:sp>
+        <p:nvSpPr>
+          <p:cNvPr id="2" name="Title 1"/>
+          <p:cNvSpPr>
+            <a:spLocks noGrp="1"/>
+          </p:cNvSpPr>
+          <p:nvPr>
+            <p:ph type="title"/>
+          </p:nvPr>
+        </p:nvSpPr>
+        <p:spPr/>
+        <p:txBody>
+          <a:bodyPr/>
+          <a:lstStyle/>
+          <a:p>
             <a:endParaRPr lang="en-NZ"/>
           </a:p>
         </p:txBody>
@@ -3182,7 +3261,7 @@
 </p:sld>
 </file>
 
-<file path=ppt/slides/slide11.xml><?xml version="1.0" encoding="utf-8"?>
+<file path=ppt/slides/slide12.xml><?xml version="1.0" encoding="utf-8"?>
 <p:sld xmlns:a="http://schemas.openxmlformats.org/drawingml/2006/main" xmlns:r="http://schemas.openxmlformats.org/officeDocument/2006/relationships" xmlns:p="http://schemas.openxmlformats.org/presentationml/2006/main">
   <p:cSld>
     <p:spTree>
@@ -3260,7 +3339,7 @@
 </p:sld>
 </file>
 
-<file path=ppt/slides/slide12.xml><?xml version="1.0" encoding="utf-8"?>
+<file path=ppt/slides/slide13.xml><?xml version="1.0" encoding="utf-8"?>
 <p:sld xmlns:a="http://schemas.openxmlformats.org/drawingml/2006/main" xmlns:r="http://schemas.openxmlformats.org/officeDocument/2006/relationships" xmlns:p="http://schemas.openxmlformats.org/presentationml/2006/main">
   <p:cSld>
     <p:spTree>
@@ -3338,7 +3417,7 @@
 </p:sld>
 </file>
 
-<file path=ppt/slides/slide13.xml><?xml version="1.0" encoding="utf-8"?>
+<file path=ppt/slides/slide14.xml><?xml version="1.0" encoding="utf-8"?>
 <p:sld xmlns:a="http://schemas.openxmlformats.org/drawingml/2006/main" xmlns:r="http://schemas.openxmlformats.org/officeDocument/2006/relationships" xmlns:p="http://schemas.openxmlformats.org/presentationml/2006/main">
   <p:cSld>
     <p:spTree>
@@ -3416,7 +3495,7 @@
 </p:sld>
 </file>
 
-<file path=ppt/slides/slide14.xml><?xml version="1.0" encoding="utf-8"?>
+<file path=ppt/slides/slide15.xml><?xml version="1.0" encoding="utf-8"?>
 <p:sld xmlns:a="http://schemas.openxmlformats.org/drawingml/2006/main" xmlns:r="http://schemas.openxmlformats.org/officeDocument/2006/relationships" xmlns:p="http://schemas.openxmlformats.org/presentationml/2006/main">
   <p:cSld>
     <p:spTree>
@@ -3494,7 +3573,7 @@
 </p:sld>
 </file>
 
-<file path=ppt/slides/slide15.xml><?xml version="1.0" encoding="utf-8"?>
+<file path=ppt/slides/slide16.xml><?xml version="1.0" encoding="utf-8"?>
 <p:sld xmlns:a="http://schemas.openxmlformats.org/drawingml/2006/main" xmlns:r="http://schemas.openxmlformats.org/officeDocument/2006/relationships" xmlns:p="http://schemas.openxmlformats.org/presentationml/2006/main">
   <p:cSld>
     <p:spTree>
@@ -3572,7 +3651,7 @@
 </p:sld>
 </file>
 
-<file path=ppt/slides/slide16.xml><?xml version="1.0" encoding="utf-8"?>
+<file path=ppt/slides/slide17.xml><?xml version="1.0" encoding="utf-8"?>
 <p:sld xmlns:a="http://schemas.openxmlformats.org/drawingml/2006/main" xmlns:r="http://schemas.openxmlformats.org/officeDocument/2006/relationships" xmlns:p="http://schemas.openxmlformats.org/presentationml/2006/main">
   <p:cSld>
     <p:spTree>
@@ -3650,7 +3729,7 @@
 </p:sld>
 </file>
 
-<file path=ppt/slides/slide17.xml><?xml version="1.0" encoding="utf-8"?>
+<file path=ppt/slides/slide18.xml><?xml version="1.0" encoding="utf-8"?>
 <p:sld xmlns:a="http://schemas.openxmlformats.org/drawingml/2006/main" xmlns:r="http://schemas.openxmlformats.org/officeDocument/2006/relationships" xmlns:p="http://schemas.openxmlformats.org/presentationml/2006/main">
   <p:cSld>
     <p:spTree>
@@ -3728,7 +3807,7 @@
 </p:sld>
 </file>
 
-<file path=ppt/slides/slide18.xml><?xml version="1.0" encoding="utf-8"?>
+<file path=ppt/slides/slide19.xml><?xml version="1.0" encoding="utf-8"?>
 <p:sld xmlns:a="http://schemas.openxmlformats.org/drawingml/2006/main" xmlns:r="http://schemas.openxmlformats.org/officeDocument/2006/relationships" xmlns:p="http://schemas.openxmlformats.org/presentationml/2006/main">
   <p:cSld>
     <p:spTree>
@@ -3806,7 +3885,212 @@
 </p:sld>
 </file>
 
-<file path=ppt/slides/slide19.xml><?xml version="1.0" encoding="utf-8"?>
+<file path=ppt/slides/slide2.xml><?xml version="1.0" encoding="utf-8"?>
+<p:sld xmlns:a="http://schemas.openxmlformats.org/drawingml/2006/main" xmlns:r="http://schemas.openxmlformats.org/officeDocument/2006/relationships" xmlns:p="http://schemas.openxmlformats.org/presentationml/2006/main">
+  <p:cSld>
+    <p:spTree>
+      <p:nvGrpSpPr>
+        <p:cNvPr id="1" name=""/>
+        <p:cNvGrpSpPr/>
+        <p:nvPr/>
+      </p:nvGrpSpPr>
+      <p:grpSpPr>
+        <a:xfrm>
+          <a:off x="0" y="0"/>
+          <a:ext cx="0" cy="0"/>
+          <a:chOff x="0" y="0"/>
+          <a:chExt cx="0" cy="0"/>
+        </a:xfrm>
+      </p:grpSpPr>
+      <p:sp>
+        <p:nvSpPr>
+          <p:cNvPr id="2" name="Title 1"/>
+          <p:cNvSpPr>
+            <a:spLocks noGrp="1"/>
+          </p:cNvSpPr>
+          <p:nvPr>
+            <p:ph type="title"/>
+          </p:nvPr>
+        </p:nvSpPr>
+        <p:spPr/>
+        <p:txBody>
+          <a:bodyPr/>
+          <a:lstStyle/>
+          <a:p>
+            <a:r>
+              <a:rPr lang="en-US" dirty="0" err="1" smtClean="0"/>
+              <a:t>Gmacs</a:t>
+            </a:r>
+            <a:r>
+              <a:rPr lang="en-US" dirty="0" smtClean="0"/>
+              <a:t> progress</a:t>
+            </a:r>
+            <a:endParaRPr lang="en-NZ" dirty="0"/>
+          </a:p>
+        </p:txBody>
+      </p:sp>
+      <p:sp>
+        <p:nvSpPr>
+          <p:cNvPr id="3" name="Content Placeholder 2"/>
+          <p:cNvSpPr>
+            <a:spLocks noGrp="1"/>
+          </p:cNvSpPr>
+          <p:nvPr>
+            <p:ph idx="1"/>
+          </p:nvPr>
+        </p:nvSpPr>
+        <p:spPr/>
+        <p:txBody>
+          <a:bodyPr>
+            <a:normAutofit fontScale="92500" lnSpcReduction="10000"/>
+          </a:bodyPr>
+          <a:lstStyle/>
+          <a:p>
+            <a:r>
+              <a:rPr lang="en-US" dirty="0" smtClean="0"/>
+              <a:t>Added seasons to </a:t>
+            </a:r>
+            <a:r>
+              <a:rPr lang="en-US" dirty="0" err="1" smtClean="0"/>
+              <a:t>Gmacs</a:t>
+            </a:r>
+            <a:r>
+              <a:rPr lang="en-US" dirty="0" smtClean="0"/>
+              <a:t> dynamics</a:t>
+            </a:r>
+          </a:p>
+          <a:p>
+            <a:pPr lvl="1"/>
+            <a:r>
+              <a:rPr lang="en-US" dirty="0" smtClean="0"/>
+              <a:t>Continuous </a:t>
+            </a:r>
+            <a:r>
+              <a:rPr lang="en-US" i="1" dirty="0" smtClean="0"/>
+              <a:t>M</a:t>
+            </a:r>
+            <a:r>
+              <a:rPr lang="en-US" dirty="0" smtClean="0"/>
+              <a:t>/</a:t>
+            </a:r>
+            <a:r>
+              <a:rPr lang="en-US" i="1" dirty="0" smtClean="0"/>
+              <a:t>F</a:t>
+            </a:r>
+            <a:r>
+              <a:rPr lang="en-US" dirty="0" smtClean="0"/>
+              <a:t> within seasons</a:t>
+            </a:r>
+            <a:endParaRPr lang="en-US" i="1" dirty="0"/>
+          </a:p>
+          <a:p>
+            <a:pPr lvl="1"/>
+            <a:r>
+              <a:rPr lang="en-US" dirty="0" smtClean="0"/>
+              <a:t>Number </a:t>
+            </a:r>
+            <a:r>
+              <a:rPr lang="en-US" dirty="0" smtClean="0"/>
+              <a:t>of seasons</a:t>
+            </a:r>
+          </a:p>
+          <a:p>
+            <a:pPr lvl="1"/>
+            <a:r>
+              <a:rPr lang="en-US" dirty="0" smtClean="0"/>
+              <a:t>Proportion of </a:t>
+            </a:r>
+            <a:r>
+              <a:rPr lang="en-US" i="1" dirty="0" smtClean="0"/>
+              <a:t>M</a:t>
+            </a:r>
+            <a:r>
+              <a:rPr lang="en-US" dirty="0" smtClean="0"/>
+              <a:t> each season</a:t>
+            </a:r>
+          </a:p>
+          <a:p>
+            <a:pPr lvl="1"/>
+            <a:r>
+              <a:rPr lang="en-US" dirty="0" smtClean="0"/>
+              <a:t>Season molting and </a:t>
+            </a:r>
+            <a:r>
+              <a:rPr lang="en-US" dirty="0" smtClean="0"/>
+              <a:t>growth occur</a:t>
+            </a:r>
+            <a:endParaRPr lang="en-US" dirty="0" smtClean="0"/>
+          </a:p>
+          <a:p>
+            <a:pPr lvl="1"/>
+            <a:r>
+              <a:rPr lang="en-US" dirty="0" smtClean="0"/>
+              <a:t>Season </a:t>
+            </a:r>
+            <a:r>
+              <a:rPr lang="en-US" dirty="0" smtClean="0"/>
+              <a:t>recruitment occurs</a:t>
+            </a:r>
+            <a:endParaRPr lang="en-US" dirty="0" smtClean="0"/>
+          </a:p>
+          <a:p>
+            <a:pPr lvl="1"/>
+            <a:r>
+              <a:rPr lang="en-US" dirty="0" smtClean="0"/>
+              <a:t>Season </a:t>
+            </a:r>
+            <a:r>
+              <a:rPr lang="en-US" dirty="0" smtClean="0"/>
+              <a:t>SSB is to be calculated</a:t>
+            </a:r>
+            <a:endParaRPr lang="en-US" dirty="0" smtClean="0"/>
+          </a:p>
+          <a:p>
+            <a:pPr lvl="1"/>
+            <a:r>
+              <a:rPr lang="en-US" dirty="0" smtClean="0"/>
+              <a:t>All </a:t>
+            </a:r>
+            <a:r>
+              <a:rPr lang="en-US" dirty="0" smtClean="0"/>
+              <a:t>data sets have a time stamp (season/year)</a:t>
+            </a:r>
+          </a:p>
+          <a:p>
+            <a:r>
+              <a:rPr lang="en-US" dirty="0" smtClean="0"/>
+              <a:t>Added option to initialize numbers as free parameters</a:t>
+            </a:r>
+          </a:p>
+          <a:p>
+            <a:r>
+              <a:rPr lang="en-US" dirty="0" smtClean="0"/>
+              <a:t>Plots</a:t>
+            </a:r>
+          </a:p>
+          <a:p>
+            <a:r>
+              <a:rPr lang="en-US" dirty="0" smtClean="0"/>
+              <a:t>Draft SMBKC document</a:t>
+            </a:r>
+            <a:endParaRPr lang="en-US" dirty="0" smtClean="0"/>
+          </a:p>
+        </p:txBody>
+      </p:sp>
+    </p:spTree>
+    <p:extLst>
+      <p:ext uri="{BB962C8B-B14F-4D97-AF65-F5344CB8AC3E}">
+        <p14:creationId xmlns:p14="http://schemas.microsoft.com/office/powerpoint/2010/main" val="1127452723"/>
+      </p:ext>
+    </p:extLst>
+  </p:cSld>
+  <p:clrMapOvr>
+    <a:masterClrMapping/>
+  </p:clrMapOvr>
+</p:sld>
+</file>
+
+<file path=ppt/slides/slide20.xml><?xml version="1.0" encoding="utf-8"?>
 <p:sld xmlns:a="http://schemas.openxmlformats.org/drawingml/2006/main" xmlns:r="http://schemas.openxmlformats.org/officeDocument/2006/relationships" xmlns:p="http://schemas.openxmlformats.org/presentationml/2006/main">
   <p:cSld>
     <p:spTree>
@@ -3884,212 +4168,7 @@
 </p:sld>
 </file>
 
-<file path=ppt/slides/slide2.xml><?xml version="1.0" encoding="utf-8"?>
-<p:sld xmlns:a="http://schemas.openxmlformats.org/drawingml/2006/main" xmlns:r="http://schemas.openxmlformats.org/officeDocument/2006/relationships" xmlns:p="http://schemas.openxmlformats.org/presentationml/2006/main">
-  <p:cSld>
-    <p:spTree>
-      <p:nvGrpSpPr>
-        <p:cNvPr id="1" name=""/>
-        <p:cNvGrpSpPr/>
-        <p:nvPr/>
-      </p:nvGrpSpPr>
-      <p:grpSpPr>
-        <a:xfrm>
-          <a:off x="0" y="0"/>
-          <a:ext cx="0" cy="0"/>
-          <a:chOff x="0" y="0"/>
-          <a:chExt cx="0" cy="0"/>
-        </a:xfrm>
-      </p:grpSpPr>
-      <p:sp>
-        <p:nvSpPr>
-          <p:cNvPr id="2" name="Title 1"/>
-          <p:cNvSpPr>
-            <a:spLocks noGrp="1"/>
-          </p:cNvSpPr>
-          <p:nvPr>
-            <p:ph type="title"/>
-          </p:nvPr>
-        </p:nvSpPr>
-        <p:spPr/>
-        <p:txBody>
-          <a:bodyPr/>
-          <a:lstStyle/>
-          <a:p>
-            <a:r>
-              <a:rPr lang="en-US" dirty="0" err="1" smtClean="0"/>
-              <a:t>Gmacs</a:t>
-            </a:r>
-            <a:r>
-              <a:rPr lang="en-US" dirty="0" smtClean="0"/>
-              <a:t> progress</a:t>
-            </a:r>
-            <a:endParaRPr lang="en-NZ" dirty="0"/>
-          </a:p>
-        </p:txBody>
-      </p:sp>
-      <p:sp>
-        <p:nvSpPr>
-          <p:cNvPr id="3" name="Content Placeholder 2"/>
-          <p:cNvSpPr>
-            <a:spLocks noGrp="1"/>
-          </p:cNvSpPr>
-          <p:nvPr>
-            <p:ph idx="1"/>
-          </p:nvPr>
-        </p:nvSpPr>
-        <p:spPr/>
-        <p:txBody>
-          <a:bodyPr>
-            <a:normAutofit fontScale="92500" lnSpcReduction="10000"/>
-          </a:bodyPr>
-          <a:lstStyle/>
-          <a:p>
-            <a:r>
-              <a:rPr lang="en-US" dirty="0" smtClean="0"/>
-              <a:t>Added seasons to </a:t>
-            </a:r>
-            <a:r>
-              <a:rPr lang="en-US" dirty="0" err="1" smtClean="0"/>
-              <a:t>Gmacs</a:t>
-            </a:r>
-            <a:r>
-              <a:rPr lang="en-US" dirty="0" smtClean="0"/>
-              <a:t> dynamics</a:t>
-            </a:r>
-          </a:p>
-          <a:p>
-            <a:pPr lvl="1"/>
-            <a:r>
-              <a:rPr lang="en-US" dirty="0" smtClean="0"/>
-              <a:t>Continuous </a:t>
-            </a:r>
-            <a:r>
-              <a:rPr lang="en-US" i="1" dirty="0" smtClean="0"/>
-              <a:t>M</a:t>
-            </a:r>
-            <a:r>
-              <a:rPr lang="en-US" dirty="0" smtClean="0"/>
-              <a:t>/</a:t>
-            </a:r>
-            <a:r>
-              <a:rPr lang="en-US" i="1" dirty="0" smtClean="0"/>
-              <a:t>F</a:t>
-            </a:r>
-            <a:r>
-              <a:rPr lang="en-US" dirty="0" smtClean="0"/>
-              <a:t> within seasons</a:t>
-            </a:r>
-            <a:endParaRPr lang="en-US" i="1" dirty="0"/>
-          </a:p>
-          <a:p>
-            <a:pPr lvl="1"/>
-            <a:r>
-              <a:rPr lang="en-US" dirty="0" smtClean="0"/>
-              <a:t>Number </a:t>
-            </a:r>
-            <a:r>
-              <a:rPr lang="en-US" dirty="0" smtClean="0"/>
-              <a:t>of seasons</a:t>
-            </a:r>
-          </a:p>
-          <a:p>
-            <a:pPr lvl="1"/>
-            <a:r>
-              <a:rPr lang="en-US" dirty="0" smtClean="0"/>
-              <a:t>Proportion of </a:t>
-            </a:r>
-            <a:r>
-              <a:rPr lang="en-US" i="1" dirty="0" smtClean="0"/>
-              <a:t>M</a:t>
-            </a:r>
-            <a:r>
-              <a:rPr lang="en-US" dirty="0" smtClean="0"/>
-              <a:t> each season</a:t>
-            </a:r>
-          </a:p>
-          <a:p>
-            <a:pPr lvl="1"/>
-            <a:r>
-              <a:rPr lang="en-US" dirty="0" smtClean="0"/>
-              <a:t>Season molting and </a:t>
-            </a:r>
-            <a:r>
-              <a:rPr lang="en-US" dirty="0" smtClean="0"/>
-              <a:t>growth occur</a:t>
-            </a:r>
-            <a:endParaRPr lang="en-US" dirty="0" smtClean="0"/>
-          </a:p>
-          <a:p>
-            <a:pPr lvl="1"/>
-            <a:r>
-              <a:rPr lang="en-US" dirty="0" smtClean="0"/>
-              <a:t>Season </a:t>
-            </a:r>
-            <a:r>
-              <a:rPr lang="en-US" dirty="0" smtClean="0"/>
-              <a:t>recruitment occurs</a:t>
-            </a:r>
-            <a:endParaRPr lang="en-US" dirty="0" smtClean="0"/>
-          </a:p>
-          <a:p>
-            <a:pPr lvl="1"/>
-            <a:r>
-              <a:rPr lang="en-US" dirty="0" smtClean="0"/>
-              <a:t>Season </a:t>
-            </a:r>
-            <a:r>
-              <a:rPr lang="en-US" dirty="0" smtClean="0"/>
-              <a:t>SSB is to be calculated</a:t>
-            </a:r>
-            <a:endParaRPr lang="en-US" dirty="0" smtClean="0"/>
-          </a:p>
-          <a:p>
-            <a:pPr lvl="1"/>
-            <a:r>
-              <a:rPr lang="en-US" dirty="0" smtClean="0"/>
-              <a:t>All </a:t>
-            </a:r>
-            <a:r>
-              <a:rPr lang="en-US" dirty="0" smtClean="0"/>
-              <a:t>data sets have a time stamp (season/year)</a:t>
-            </a:r>
-          </a:p>
-          <a:p>
-            <a:r>
-              <a:rPr lang="en-US" dirty="0" smtClean="0"/>
-              <a:t>Added option to initialize numbers as free parameters</a:t>
-            </a:r>
-          </a:p>
-          <a:p>
-            <a:r>
-              <a:rPr lang="en-US" dirty="0" smtClean="0"/>
-              <a:t>Plots</a:t>
-            </a:r>
-          </a:p>
-          <a:p>
-            <a:r>
-              <a:rPr lang="en-US" dirty="0" smtClean="0"/>
-              <a:t>Draft SMBKC document</a:t>
-            </a:r>
-            <a:endParaRPr lang="en-US" dirty="0" smtClean="0"/>
-          </a:p>
-        </p:txBody>
-      </p:sp>
-    </p:spTree>
-    <p:extLst>
-      <p:ext uri="{BB962C8B-B14F-4D97-AF65-F5344CB8AC3E}">
-        <p14:creationId xmlns:p14="http://schemas.microsoft.com/office/powerpoint/2010/main" val="1127452723"/>
-      </p:ext>
-    </p:extLst>
-  </p:cSld>
-  <p:clrMapOvr>
-    <a:masterClrMapping/>
-  </p:clrMapOvr>
-</p:sld>
-</file>
-
-<file path=ppt/slides/slide20.xml><?xml version="1.0" encoding="utf-8"?>
+<file path=ppt/slides/slide21.xml><?xml version="1.0" encoding="utf-8"?>
 <p:sld xmlns:a="http://schemas.openxmlformats.org/drawingml/2006/main" xmlns:r="http://schemas.openxmlformats.org/officeDocument/2006/relationships" xmlns:p="http://schemas.openxmlformats.org/presentationml/2006/main">
   <p:cSld>
     <p:spTree>
@@ -4167,7 +4246,7 @@
 </p:sld>
 </file>
 
-<file path=ppt/slides/slide21.xml><?xml version="1.0" encoding="utf-8"?>
+<file path=ppt/slides/slide22.xml><?xml version="1.0" encoding="utf-8"?>
 <p:sld xmlns:a="http://schemas.openxmlformats.org/drawingml/2006/main" xmlns:r="http://schemas.openxmlformats.org/officeDocument/2006/relationships" xmlns:p="http://schemas.openxmlformats.org/presentationml/2006/main">
   <p:cSld>
     <p:spTree>
@@ -4245,7 +4324,7 @@
 </p:sld>
 </file>
 
-<file path=ppt/slides/slide22.xml><?xml version="1.0" encoding="utf-8"?>
+<file path=ppt/slides/slide23.xml><?xml version="1.0" encoding="utf-8"?>
 <p:sld xmlns:a="http://schemas.openxmlformats.org/drawingml/2006/main" xmlns:r="http://schemas.openxmlformats.org/officeDocument/2006/relationships" xmlns:p="http://schemas.openxmlformats.org/presentationml/2006/main">
   <p:cSld>
     <p:spTree>
@@ -4323,7 +4402,7 @@
 </p:sld>
 </file>
 
-<file path=ppt/slides/slide23.xml><?xml version="1.0" encoding="utf-8"?>
+<file path=ppt/slides/slide24.xml><?xml version="1.0" encoding="utf-8"?>
 <p:sld xmlns:a="http://schemas.openxmlformats.org/drawingml/2006/main" xmlns:r="http://schemas.openxmlformats.org/officeDocument/2006/relationships" xmlns:p="http://schemas.openxmlformats.org/presentationml/2006/main">
   <p:cSld>
     <p:spTree>
@@ -4401,7 +4480,7 @@
 </p:sld>
 </file>
 
-<file path=ppt/slides/slide24.xml><?xml version="1.0" encoding="utf-8"?>
+<file path=ppt/slides/slide25.xml><?xml version="1.0" encoding="utf-8"?>
 <p:sld xmlns:a="http://schemas.openxmlformats.org/drawingml/2006/main" xmlns:r="http://schemas.openxmlformats.org/officeDocument/2006/relationships" xmlns:p="http://schemas.openxmlformats.org/presentationml/2006/main">
   <p:cSld>
     <p:spTree>
@@ -4479,7 +4558,7 @@
 </p:sld>
 </file>
 
-<file path=ppt/slides/slide25.xml><?xml version="1.0" encoding="utf-8"?>
+<file path=ppt/slides/slide26.xml><?xml version="1.0" encoding="utf-8"?>
 <p:sld xmlns:a="http://schemas.openxmlformats.org/drawingml/2006/main" xmlns:r="http://schemas.openxmlformats.org/officeDocument/2006/relationships" xmlns:p="http://schemas.openxmlformats.org/presentationml/2006/main">
   <p:cSld>
     <p:spTree>
@@ -4614,7 +4693,7 @@
         <p:spPr/>
         <p:txBody>
           <a:bodyPr>
-            <a:normAutofit fontScale="92500" lnSpcReduction="10000"/>
+            <a:normAutofit fontScale="92500" lnSpcReduction="20000"/>
           </a:bodyPr>
           <a:lstStyle/>
           <a:p>
@@ -4654,7 +4733,7 @@
             <a:pPr lvl="1"/>
             <a:r>
               <a:rPr lang="en-US" dirty="0" smtClean="0"/>
-              <a:t>As above/required equilibrium numbers</a:t>
+              <a:t>As above/requires equilibrium numbers</a:t>
             </a:r>
           </a:p>
           <a:p>
@@ -4667,6 +4746,12 @@
           <a:p>
             <a:r>
               <a:rPr lang="en-US" dirty="0" smtClean="0"/>
+              <a:t>Began retrospective code</a:t>
+            </a:r>
+          </a:p>
+          <a:p>
+            <a:r>
+              <a:rPr lang="en-US" dirty="0" smtClean="0"/>
               <a:t>BBRKC model</a:t>
             </a:r>
           </a:p>
@@ -4675,6 +4760,10 @@
             <a:r>
               <a:rPr lang="en-US" dirty="0" smtClean="0"/>
               <a:t>Runs but as above</a:t>
+            </a:r>
+            <a:r>
+              <a:rPr lang="en-US" dirty="0"/>
+              <a:t>/requires equilibrium numbers</a:t>
             </a:r>
             <a:endParaRPr lang="en-NZ" dirty="0"/>
           </a:p>
@@ -5085,86 +5174,11 @@
           <a:p>
             <a:r>
               <a:rPr lang="en-US" dirty="0" smtClean="0"/>
-              <a:t>SMBKC</a:t>
-            </a:r>
-            <a:endParaRPr lang="en-NZ" dirty="0"/>
-          </a:p>
-        </p:txBody>
-      </p:sp>
-      <p:sp>
-        <p:nvSpPr>
-          <p:cNvPr id="3" name="Content Placeholder 2"/>
-          <p:cNvSpPr>
-            <a:spLocks noGrp="1"/>
-          </p:cNvSpPr>
-          <p:nvPr>
-            <p:ph idx="1"/>
-          </p:nvPr>
-        </p:nvSpPr>
-        <p:spPr/>
-        <p:txBody>
-          <a:bodyPr/>
-          <a:lstStyle/>
-          <a:p>
-            <a:pPr marL="0" indent="0">
-              <a:buNone/>
-            </a:pPr>
-            <a:r>
-              <a:rPr lang="en-US" dirty="0" smtClean="0"/>
-              <a:t>See document</a:t>
-            </a:r>
-            <a:endParaRPr lang="en-NZ" dirty="0"/>
-          </a:p>
-        </p:txBody>
-      </p:sp>
-    </p:spTree>
-    <p:extLst>
-      <p:ext uri="{BB962C8B-B14F-4D97-AF65-F5344CB8AC3E}">
-        <p14:creationId xmlns:p14="http://schemas.microsoft.com/office/powerpoint/2010/main" val="1571411259"/>
-      </p:ext>
-    </p:extLst>
-  </p:cSld>
-  <p:clrMapOvr>
-    <a:masterClrMapping/>
-  </p:clrMapOvr>
-</p:sld>
-</file>
-
-<file path=ppt/slides/slide7.xml><?xml version="1.0" encoding="utf-8"?>
-<p:sld xmlns:a="http://schemas.openxmlformats.org/drawingml/2006/main" xmlns:r="http://schemas.openxmlformats.org/officeDocument/2006/relationships" xmlns:p="http://schemas.openxmlformats.org/presentationml/2006/main">
-  <p:cSld>
-    <p:spTree>
-      <p:nvGrpSpPr>
-        <p:cNvPr id="1" name=""/>
-        <p:cNvGrpSpPr/>
-        <p:nvPr/>
-      </p:nvGrpSpPr>
-      <p:grpSpPr>
-        <a:xfrm>
-          <a:off x="0" y="0"/>
-          <a:ext cx="0" cy="0"/>
-          <a:chOff x="0" y="0"/>
-          <a:chExt cx="0" cy="0"/>
-        </a:xfrm>
-      </p:grpSpPr>
-      <p:sp>
-        <p:nvSpPr>
-          <p:cNvPr id="2" name="Title 1"/>
-          <p:cNvSpPr>
-            <a:spLocks noGrp="1"/>
-          </p:cNvSpPr>
-          <p:nvPr>
-            <p:ph type="title"/>
-          </p:nvPr>
-        </p:nvSpPr>
-        <p:spPr/>
-        <p:txBody>
-          <a:bodyPr/>
-          <a:lstStyle/>
-          <a:p>
-            <a:r>
-              <a:rPr lang="en-US" dirty="0" smtClean="0"/>
-              <a:t>Data</a:t>
+              <a:t>Da</a:t>
+            </a:r>
+            <a:r>
+              <a:rPr lang="en-US" dirty="0" smtClean="0"/>
+              <a:t>ta</a:t>
             </a:r>
             <a:endParaRPr lang="en-NZ" dirty="0"/>
           </a:p>
@@ -5211,7 +5225,168 @@
 </p:sld>
 </file>
 
+<file path=ppt/slides/slide7.xml><?xml version="1.0" encoding="utf-8"?>
+<p:sld xmlns:a="http://schemas.openxmlformats.org/drawingml/2006/main" xmlns:r="http://schemas.openxmlformats.org/officeDocument/2006/relationships" xmlns:p="http://schemas.openxmlformats.org/presentationml/2006/main">
+  <p:cSld>
+    <p:spTree>
+      <p:nvGrpSpPr>
+        <p:cNvPr id="1" name=""/>
+        <p:cNvGrpSpPr/>
+        <p:nvPr/>
+      </p:nvGrpSpPr>
+      <p:grpSpPr>
+        <a:xfrm>
+          <a:off x="0" y="0"/>
+          <a:ext cx="0" cy="0"/>
+          <a:chOff x="0" y="0"/>
+          <a:chExt cx="0" cy="0"/>
+        </a:xfrm>
+      </p:grpSpPr>
+      <p:sp>
+        <p:nvSpPr>
+          <p:cNvPr id="2" name="Title 1"/>
+          <p:cNvSpPr>
+            <a:spLocks noGrp="1"/>
+          </p:cNvSpPr>
+          <p:nvPr>
+            <p:ph type="title"/>
+          </p:nvPr>
+        </p:nvSpPr>
+        <p:spPr/>
+        <p:txBody>
+          <a:bodyPr/>
+          <a:lstStyle/>
+          <a:p>
+            <a:r>
+              <a:rPr lang="en-US" dirty="0" smtClean="0"/>
+              <a:t>Size transition matrix</a:t>
+            </a:r>
+            <a:endParaRPr lang="en-NZ" dirty="0"/>
+          </a:p>
+        </p:txBody>
+      </p:sp>
+      <p:pic>
+        <p:nvPicPr>
+          <p:cNvPr id="4" name="Content Placeholder 3"/>
+          <p:cNvPicPr>
+            <a:picLocks noGrp="1" noChangeAspect="1"/>
+          </p:cNvPicPr>
+          <p:nvPr>
+            <p:ph idx="1"/>
+          </p:nvPr>
+        </p:nvPicPr>
+        <p:blipFill>
+          <a:blip r:embed="rId2">
+            <a:extLst>
+              <a:ext uri="{28A0092B-C50C-407E-A947-70E740481C1C}">
+                <a14:useLocalDpi xmlns:a14="http://schemas.microsoft.com/office/drawing/2010/main" val="0"/>
+              </a:ext>
+            </a:extLst>
+          </a:blip>
+          <a:stretch>
+            <a:fillRect/>
+          </a:stretch>
+        </p:blipFill>
+        <p:spPr>
+          <a:xfrm>
+            <a:off x="842282" y="1825625"/>
+            <a:ext cx="7459435" cy="4351337"/>
+          </a:xfrm>
+        </p:spPr>
+      </p:pic>
+    </p:spTree>
+    <p:extLst>
+      <p:ext uri="{BB962C8B-B14F-4D97-AF65-F5344CB8AC3E}">
+        <p14:creationId xmlns:p14="http://schemas.microsoft.com/office/powerpoint/2010/main" val="1273947952"/>
+      </p:ext>
+    </p:extLst>
+  </p:cSld>
+  <p:clrMapOvr>
+    <a:masterClrMapping/>
+  </p:clrMapOvr>
+</p:sld>
+</file>
+
 <file path=ppt/slides/slide8.xml><?xml version="1.0" encoding="utf-8"?>
+<p:sld xmlns:a="http://schemas.openxmlformats.org/drawingml/2006/main" xmlns:r="http://schemas.openxmlformats.org/officeDocument/2006/relationships" xmlns:p="http://schemas.openxmlformats.org/presentationml/2006/main">
+  <p:cSld>
+    <p:spTree>
+      <p:nvGrpSpPr>
+        <p:cNvPr id="1" name=""/>
+        <p:cNvGrpSpPr/>
+        <p:nvPr/>
+      </p:nvGrpSpPr>
+      <p:grpSpPr>
+        <a:xfrm>
+          <a:off x="0" y="0"/>
+          <a:ext cx="0" cy="0"/>
+          <a:chOff x="0" y="0"/>
+          <a:chExt cx="0" cy="0"/>
+        </a:xfrm>
+      </p:grpSpPr>
+      <p:sp>
+        <p:nvSpPr>
+          <p:cNvPr id="2" name="Title 1"/>
+          <p:cNvSpPr>
+            <a:spLocks noGrp="1"/>
+          </p:cNvSpPr>
+          <p:nvPr>
+            <p:ph type="title"/>
+          </p:nvPr>
+        </p:nvSpPr>
+        <p:spPr/>
+        <p:txBody>
+          <a:bodyPr/>
+          <a:lstStyle/>
+          <a:p>
+            <a:r>
+              <a:rPr lang="en-US" dirty="0" smtClean="0"/>
+              <a:t>SMBKC</a:t>
+            </a:r>
+            <a:endParaRPr lang="en-NZ" dirty="0"/>
+          </a:p>
+        </p:txBody>
+      </p:sp>
+      <p:sp>
+        <p:nvSpPr>
+          <p:cNvPr id="3" name="Content Placeholder 2"/>
+          <p:cNvSpPr>
+            <a:spLocks noGrp="1"/>
+          </p:cNvSpPr>
+          <p:nvPr>
+            <p:ph idx="1"/>
+          </p:nvPr>
+        </p:nvSpPr>
+        <p:spPr/>
+        <p:txBody>
+          <a:bodyPr/>
+          <a:lstStyle/>
+          <a:p>
+            <a:pPr marL="0" indent="0">
+              <a:buNone/>
+            </a:pPr>
+            <a:r>
+              <a:rPr lang="en-US" dirty="0" smtClean="0"/>
+              <a:t>See document</a:t>
+            </a:r>
+            <a:endParaRPr lang="en-NZ" dirty="0"/>
+          </a:p>
+        </p:txBody>
+      </p:sp>
+    </p:spTree>
+    <p:extLst>
+      <p:ext uri="{BB962C8B-B14F-4D97-AF65-F5344CB8AC3E}">
+        <p14:creationId xmlns:p14="http://schemas.microsoft.com/office/powerpoint/2010/main" val="1571411259"/>
+      </p:ext>
+    </p:extLst>
+  </p:cSld>
+  <p:clrMapOvr>
+    <a:masterClrMapping/>
+  </p:clrMapOvr>
+</p:sld>
+</file>
+
+<file path=ppt/slides/slide9.xml><?xml version="1.0" encoding="utf-8"?>
 <p:sld xmlns:a="http://schemas.openxmlformats.org/drawingml/2006/main" xmlns:r="http://schemas.openxmlformats.org/officeDocument/2006/relationships" xmlns:p="http://schemas.openxmlformats.org/presentationml/2006/main">
   <p:cSld>
     <p:spTree>
@@ -5370,84 +5545,6 @@
     <p:extLst>
       <p:ext uri="{BB962C8B-B14F-4D97-AF65-F5344CB8AC3E}">
         <p14:creationId xmlns:p14="http://schemas.microsoft.com/office/powerpoint/2010/main" val="2921751489"/>
-      </p:ext>
-    </p:extLst>
-  </p:cSld>
-  <p:clrMapOvr>
-    <a:masterClrMapping/>
-  </p:clrMapOvr>
-</p:sld>
-</file>
-
-<file path=ppt/slides/slide9.xml><?xml version="1.0" encoding="utf-8"?>
-<p:sld xmlns:a="http://schemas.openxmlformats.org/drawingml/2006/main" xmlns:r="http://schemas.openxmlformats.org/officeDocument/2006/relationships" xmlns:p="http://schemas.openxmlformats.org/presentationml/2006/main">
-  <p:cSld>
-    <p:spTree>
-      <p:nvGrpSpPr>
-        <p:cNvPr id="1" name=""/>
-        <p:cNvGrpSpPr/>
-        <p:nvPr/>
-      </p:nvGrpSpPr>
-      <p:grpSpPr>
-        <a:xfrm>
-          <a:off x="0" y="0"/>
-          <a:ext cx="0" cy="0"/>
-          <a:chOff x="0" y="0"/>
-          <a:chExt cx="0" cy="0"/>
-        </a:xfrm>
-      </p:grpSpPr>
-      <p:sp>
-        <p:nvSpPr>
-          <p:cNvPr id="2" name="Title 1"/>
-          <p:cNvSpPr>
-            <a:spLocks noGrp="1"/>
-          </p:cNvSpPr>
-          <p:nvPr>
-            <p:ph type="title"/>
-          </p:nvPr>
-        </p:nvSpPr>
-        <p:spPr/>
-        <p:txBody>
-          <a:bodyPr/>
-          <a:lstStyle/>
-          <a:p>
-            <a:endParaRPr lang="en-NZ" dirty="0"/>
-          </a:p>
-        </p:txBody>
-      </p:sp>
-      <p:pic>
-        <p:nvPicPr>
-          <p:cNvPr id="4" name="Content Placeholder 3"/>
-          <p:cNvPicPr>
-            <a:picLocks noGrp="1" noChangeAspect="1"/>
-          </p:cNvPicPr>
-          <p:nvPr>
-            <p:ph idx="1"/>
-          </p:nvPr>
-        </p:nvPicPr>
-        <p:blipFill>
-          <a:blip r:embed="rId2">
-            <a:extLst>
-              <a:ext uri="{28A0092B-C50C-407E-A947-70E740481C1C}">
-                <a14:useLocalDpi xmlns:a14="http://schemas.microsoft.com/office/drawing/2010/main" val="0"/>
-              </a:ext>
-            </a:extLst>
-          </a:blip>
-          <a:stretch>
-            <a:fillRect/>
-          </a:stretch>
-        </p:blipFill>
-        <p:spPr>
-          <a:xfrm>
-            <a:off x="2493034" y="103967"/>
-            <a:ext cx="6650966" cy="6650966"/>
-          </a:xfrm>
-        </p:spPr>
-      </p:pic>
-    </p:spTree>
-    <p:extLst>
-      <p:ext uri="{BB962C8B-B14F-4D97-AF65-F5344CB8AC3E}">
-        <p14:creationId xmlns:p14="http://schemas.microsoft.com/office/powerpoint/2010/main" val="2388954811"/>
       </p:ext>
     </p:extLst>
   </p:cSld>

</xml_diff>

<commit_message>
More on docco and ppt
</commit_message>
<xml_diff>
--- a/docs/smbkc/smbkc.pptx
+++ b/docs/smbkc/smbkc.pptx
@@ -7,30 +7,34 @@
   <p:sldIdLst>
     <p:sldId id="256" r:id="rId2"/>
     <p:sldId id="276" r:id="rId3"/>
-    <p:sldId id="279" r:id="rId4"/>
-    <p:sldId id="277" r:id="rId5"/>
-    <p:sldId id="278" r:id="rId6"/>
-    <p:sldId id="258" r:id="rId7"/>
-    <p:sldId id="281" r:id="rId8"/>
-    <p:sldId id="280" r:id="rId9"/>
-    <p:sldId id="257" r:id="rId10"/>
-    <p:sldId id="259" r:id="rId11"/>
-    <p:sldId id="260" r:id="rId12"/>
-    <p:sldId id="268" r:id="rId13"/>
-    <p:sldId id="267" r:id="rId14"/>
-    <p:sldId id="261" r:id="rId15"/>
-    <p:sldId id="262" r:id="rId16"/>
-    <p:sldId id="263" r:id="rId17"/>
-    <p:sldId id="264" r:id="rId18"/>
-    <p:sldId id="265" r:id="rId19"/>
-    <p:sldId id="266" r:id="rId20"/>
-    <p:sldId id="269" r:id="rId21"/>
-    <p:sldId id="270" r:id="rId22"/>
-    <p:sldId id="271" r:id="rId23"/>
-    <p:sldId id="272" r:id="rId24"/>
-    <p:sldId id="273" r:id="rId25"/>
-    <p:sldId id="274" r:id="rId26"/>
-    <p:sldId id="275" r:id="rId27"/>
+    <p:sldId id="283" r:id="rId4"/>
+    <p:sldId id="284" r:id="rId5"/>
+    <p:sldId id="285" r:id="rId6"/>
+    <p:sldId id="279" r:id="rId7"/>
+    <p:sldId id="277" r:id="rId8"/>
+    <p:sldId id="278" r:id="rId9"/>
+    <p:sldId id="258" r:id="rId10"/>
+    <p:sldId id="281" r:id="rId11"/>
+    <p:sldId id="280" r:id="rId12"/>
+    <p:sldId id="282" r:id="rId13"/>
+    <p:sldId id="257" r:id="rId14"/>
+    <p:sldId id="259" r:id="rId15"/>
+    <p:sldId id="260" r:id="rId16"/>
+    <p:sldId id="268" r:id="rId17"/>
+    <p:sldId id="267" r:id="rId18"/>
+    <p:sldId id="261" r:id="rId19"/>
+    <p:sldId id="262" r:id="rId20"/>
+    <p:sldId id="263" r:id="rId21"/>
+    <p:sldId id="264" r:id="rId22"/>
+    <p:sldId id="265" r:id="rId23"/>
+    <p:sldId id="266" r:id="rId24"/>
+    <p:sldId id="269" r:id="rId25"/>
+    <p:sldId id="270" r:id="rId26"/>
+    <p:sldId id="271" r:id="rId27"/>
+    <p:sldId id="272" r:id="rId28"/>
+    <p:sldId id="273" r:id="rId29"/>
+    <p:sldId id="274" r:id="rId30"/>
+    <p:sldId id="275" r:id="rId31"/>
   </p:sldIdLst>
   <p:sldSz cx="9144000" cy="6858000" type="screen4x3"/>
   <p:notesSz cx="6858000" cy="9144000"/>
@@ -3038,7 +3042,18 @@
             </a:br>
             <a:r>
               <a:rPr lang="en-US" dirty="0" smtClean="0"/>
-              <a:t>Saint Matthew Island Blue King Crab Assessment 2016</a:t>
+              <a:t>Saint Matthew Island Blue King Crab Assessment </a:t>
+            </a:r>
+            <a:r>
+              <a:rPr lang="en-US" dirty="0" smtClean="0"/>
+              <a:t/>
+            </a:r>
+            <a:br>
+              <a:rPr lang="en-US" dirty="0" smtClean="0"/>
+            </a:br>
+            <a:r>
+              <a:rPr lang="en-US" dirty="0" smtClean="0"/>
+              <a:t>May 2016</a:t>
             </a:r>
             <a:endParaRPr lang="en-NZ" dirty="0"/>
           </a:p>
@@ -3106,2126 +3121,6 @@
 </file>
 
 <file path=ppt/slides/slide10.xml><?xml version="1.0" encoding="utf-8"?>
-<p:sld xmlns:a="http://schemas.openxmlformats.org/drawingml/2006/main" xmlns:r="http://schemas.openxmlformats.org/officeDocument/2006/relationships" xmlns:p="http://schemas.openxmlformats.org/presentationml/2006/main">
-  <p:cSld>
-    <p:spTree>
-      <p:nvGrpSpPr>
-        <p:cNvPr id="1" name=""/>
-        <p:cNvGrpSpPr/>
-        <p:nvPr/>
-      </p:nvGrpSpPr>
-      <p:grpSpPr>
-        <a:xfrm>
-          <a:off x="0" y="0"/>
-          <a:ext cx="0" cy="0"/>
-          <a:chOff x="0" y="0"/>
-          <a:chExt cx="0" cy="0"/>
-        </a:xfrm>
-      </p:grpSpPr>
-      <p:sp>
-        <p:nvSpPr>
-          <p:cNvPr id="2" name="Title 1"/>
-          <p:cNvSpPr>
-            <a:spLocks noGrp="1"/>
-          </p:cNvSpPr>
-          <p:nvPr>
-            <p:ph type="title"/>
-          </p:nvPr>
-        </p:nvSpPr>
-        <p:spPr/>
-        <p:txBody>
-          <a:bodyPr/>
-          <a:lstStyle/>
-          <a:p>
-            <a:endParaRPr lang="en-NZ" dirty="0"/>
-          </a:p>
-        </p:txBody>
-      </p:sp>
-      <p:pic>
-        <p:nvPicPr>
-          <p:cNvPr id="4" name="Content Placeholder 3"/>
-          <p:cNvPicPr>
-            <a:picLocks noGrp="1" noChangeAspect="1"/>
-          </p:cNvPicPr>
-          <p:nvPr>
-            <p:ph idx="1"/>
-          </p:nvPr>
-        </p:nvPicPr>
-        <p:blipFill>
-          <a:blip r:embed="rId2">
-            <a:extLst>
-              <a:ext uri="{28A0092B-C50C-407E-A947-70E740481C1C}">
-                <a14:useLocalDpi xmlns:a14="http://schemas.microsoft.com/office/drawing/2010/main" val="0"/>
-              </a:ext>
-            </a:extLst>
-          </a:blip>
-          <a:stretch>
-            <a:fillRect/>
-          </a:stretch>
-        </p:blipFill>
-        <p:spPr>
-          <a:xfrm>
-            <a:off x="2493034" y="103967"/>
-            <a:ext cx="6650966" cy="6650966"/>
-          </a:xfrm>
-        </p:spPr>
-      </p:pic>
-    </p:spTree>
-    <p:extLst>
-      <p:ext uri="{BB962C8B-B14F-4D97-AF65-F5344CB8AC3E}">
-        <p14:creationId xmlns:p14="http://schemas.microsoft.com/office/powerpoint/2010/main" val="2388954811"/>
-      </p:ext>
-    </p:extLst>
-  </p:cSld>
-  <p:clrMapOvr>
-    <a:masterClrMapping/>
-  </p:clrMapOvr>
-</p:sld>
-</file>
-
-<file path=ppt/slides/slide11.xml><?xml version="1.0" encoding="utf-8"?>
-<p:sld xmlns:a="http://schemas.openxmlformats.org/drawingml/2006/main" xmlns:r="http://schemas.openxmlformats.org/officeDocument/2006/relationships" xmlns:p="http://schemas.openxmlformats.org/presentationml/2006/main">
-  <p:cSld>
-    <p:spTree>
-      <p:nvGrpSpPr>
-        <p:cNvPr id="1" name=""/>
-        <p:cNvGrpSpPr/>
-        <p:nvPr/>
-      </p:nvGrpSpPr>
-      <p:grpSpPr>
-        <a:xfrm>
-          <a:off x="0" y="0"/>
-          <a:ext cx="0" cy="0"/>
-          <a:chOff x="0" y="0"/>
-          <a:chExt cx="0" cy="0"/>
-        </a:xfrm>
-      </p:grpSpPr>
-      <p:sp>
-        <p:nvSpPr>
-          <p:cNvPr id="2" name="Title 1"/>
-          <p:cNvSpPr>
-            <a:spLocks noGrp="1"/>
-          </p:cNvSpPr>
-          <p:nvPr>
-            <p:ph type="title"/>
-          </p:nvPr>
-        </p:nvSpPr>
-        <p:spPr/>
-        <p:txBody>
-          <a:bodyPr/>
-          <a:lstStyle/>
-          <a:p>
-            <a:endParaRPr lang="en-NZ"/>
-          </a:p>
-        </p:txBody>
-      </p:sp>
-      <p:pic>
-        <p:nvPicPr>
-          <p:cNvPr id="4" name="Content Placeholder 3"/>
-          <p:cNvPicPr>
-            <a:picLocks noGrp="1" noChangeAspect="1"/>
-          </p:cNvPicPr>
-          <p:nvPr>
-            <p:ph idx="1"/>
-          </p:nvPr>
-        </p:nvPicPr>
-        <p:blipFill>
-          <a:blip r:embed="rId2">
-            <a:extLst>
-              <a:ext uri="{28A0092B-C50C-407E-A947-70E740481C1C}">
-                <a14:useLocalDpi xmlns:a14="http://schemas.microsoft.com/office/drawing/2010/main" val="0"/>
-              </a:ext>
-            </a:extLst>
-          </a:blip>
-          <a:stretch>
-            <a:fillRect/>
-          </a:stretch>
-        </p:blipFill>
-        <p:spPr>
-          <a:xfrm>
-            <a:off x="0" y="1523999"/>
-            <a:ext cx="9144000" cy="5334001"/>
-          </a:xfrm>
-        </p:spPr>
-      </p:pic>
-    </p:spTree>
-    <p:extLst>
-      <p:ext uri="{BB962C8B-B14F-4D97-AF65-F5344CB8AC3E}">
-        <p14:creationId xmlns:p14="http://schemas.microsoft.com/office/powerpoint/2010/main" val="3657479237"/>
-      </p:ext>
-    </p:extLst>
-  </p:cSld>
-  <p:clrMapOvr>
-    <a:masterClrMapping/>
-  </p:clrMapOvr>
-</p:sld>
-</file>
-
-<file path=ppt/slides/slide12.xml><?xml version="1.0" encoding="utf-8"?>
-<p:sld xmlns:a="http://schemas.openxmlformats.org/drawingml/2006/main" xmlns:r="http://schemas.openxmlformats.org/officeDocument/2006/relationships" xmlns:p="http://schemas.openxmlformats.org/presentationml/2006/main">
-  <p:cSld>
-    <p:spTree>
-      <p:nvGrpSpPr>
-        <p:cNvPr id="1" name=""/>
-        <p:cNvGrpSpPr/>
-        <p:nvPr/>
-      </p:nvGrpSpPr>
-      <p:grpSpPr>
-        <a:xfrm>
-          <a:off x="0" y="0"/>
-          <a:ext cx="0" cy="0"/>
-          <a:chOff x="0" y="0"/>
-          <a:chExt cx="0" cy="0"/>
-        </a:xfrm>
-      </p:grpSpPr>
-      <p:sp>
-        <p:nvSpPr>
-          <p:cNvPr id="2" name="Title 1"/>
-          <p:cNvSpPr>
-            <a:spLocks noGrp="1"/>
-          </p:cNvSpPr>
-          <p:nvPr>
-            <p:ph type="title"/>
-          </p:nvPr>
-        </p:nvSpPr>
-        <p:spPr/>
-        <p:txBody>
-          <a:bodyPr/>
-          <a:lstStyle/>
-          <a:p>
-            <a:endParaRPr lang="en-NZ"/>
-          </a:p>
-        </p:txBody>
-      </p:sp>
-      <p:pic>
-        <p:nvPicPr>
-          <p:cNvPr id="4" name="Content Placeholder 3"/>
-          <p:cNvPicPr>
-            <a:picLocks noGrp="1" noChangeAspect="1"/>
-          </p:cNvPicPr>
-          <p:nvPr>
-            <p:ph idx="1"/>
-          </p:nvPr>
-        </p:nvPicPr>
-        <p:blipFill>
-          <a:blip r:embed="rId2">
-            <a:extLst>
-              <a:ext uri="{28A0092B-C50C-407E-A947-70E740481C1C}">
-                <a14:useLocalDpi xmlns:a14="http://schemas.microsoft.com/office/drawing/2010/main" val="0"/>
-              </a:ext>
-            </a:extLst>
-          </a:blip>
-          <a:stretch>
-            <a:fillRect/>
-          </a:stretch>
-        </p:blipFill>
-        <p:spPr>
-          <a:xfrm>
-            <a:off x="0" y="1523999"/>
-            <a:ext cx="9144000" cy="5334001"/>
-          </a:xfrm>
-        </p:spPr>
-      </p:pic>
-    </p:spTree>
-    <p:extLst>
-      <p:ext uri="{BB962C8B-B14F-4D97-AF65-F5344CB8AC3E}">
-        <p14:creationId xmlns:p14="http://schemas.microsoft.com/office/powerpoint/2010/main" val="2727842710"/>
-      </p:ext>
-    </p:extLst>
-  </p:cSld>
-  <p:clrMapOvr>
-    <a:masterClrMapping/>
-  </p:clrMapOvr>
-</p:sld>
-</file>
-
-<file path=ppt/slides/slide13.xml><?xml version="1.0" encoding="utf-8"?>
-<p:sld xmlns:a="http://schemas.openxmlformats.org/drawingml/2006/main" xmlns:r="http://schemas.openxmlformats.org/officeDocument/2006/relationships" xmlns:p="http://schemas.openxmlformats.org/presentationml/2006/main">
-  <p:cSld>
-    <p:spTree>
-      <p:nvGrpSpPr>
-        <p:cNvPr id="1" name=""/>
-        <p:cNvGrpSpPr/>
-        <p:nvPr/>
-      </p:nvGrpSpPr>
-      <p:grpSpPr>
-        <a:xfrm>
-          <a:off x="0" y="0"/>
-          <a:ext cx="0" cy="0"/>
-          <a:chOff x="0" y="0"/>
-          <a:chExt cx="0" cy="0"/>
-        </a:xfrm>
-      </p:grpSpPr>
-      <p:sp>
-        <p:nvSpPr>
-          <p:cNvPr id="2" name="Title 1"/>
-          <p:cNvSpPr>
-            <a:spLocks noGrp="1"/>
-          </p:cNvSpPr>
-          <p:nvPr>
-            <p:ph type="title"/>
-          </p:nvPr>
-        </p:nvSpPr>
-        <p:spPr/>
-        <p:txBody>
-          <a:bodyPr/>
-          <a:lstStyle/>
-          <a:p>
-            <a:endParaRPr lang="en-NZ"/>
-          </a:p>
-        </p:txBody>
-      </p:sp>
-      <p:pic>
-        <p:nvPicPr>
-          <p:cNvPr id="4" name="Content Placeholder 3"/>
-          <p:cNvPicPr>
-            <a:picLocks noGrp="1" noChangeAspect="1"/>
-          </p:cNvPicPr>
-          <p:nvPr>
-            <p:ph idx="1"/>
-          </p:nvPr>
-        </p:nvPicPr>
-        <p:blipFill>
-          <a:blip r:embed="rId2">
-            <a:extLst>
-              <a:ext uri="{28A0092B-C50C-407E-A947-70E740481C1C}">
-                <a14:useLocalDpi xmlns:a14="http://schemas.microsoft.com/office/drawing/2010/main" val="0"/>
-              </a:ext>
-            </a:extLst>
-          </a:blip>
-          <a:stretch>
-            <a:fillRect/>
-          </a:stretch>
-        </p:blipFill>
-        <p:spPr>
-          <a:xfrm>
-            <a:off x="842282" y="1825625"/>
-            <a:ext cx="7459435" cy="4351338"/>
-          </a:xfrm>
-        </p:spPr>
-      </p:pic>
-    </p:spTree>
-    <p:extLst>
-      <p:ext uri="{BB962C8B-B14F-4D97-AF65-F5344CB8AC3E}">
-        <p14:creationId xmlns:p14="http://schemas.microsoft.com/office/powerpoint/2010/main" val="2495900732"/>
-      </p:ext>
-    </p:extLst>
-  </p:cSld>
-  <p:clrMapOvr>
-    <a:masterClrMapping/>
-  </p:clrMapOvr>
-</p:sld>
-</file>
-
-<file path=ppt/slides/slide14.xml><?xml version="1.0" encoding="utf-8"?>
-<p:sld xmlns:a="http://schemas.openxmlformats.org/drawingml/2006/main" xmlns:r="http://schemas.openxmlformats.org/officeDocument/2006/relationships" xmlns:p="http://schemas.openxmlformats.org/presentationml/2006/main">
-  <p:cSld>
-    <p:spTree>
-      <p:nvGrpSpPr>
-        <p:cNvPr id="1" name=""/>
-        <p:cNvGrpSpPr/>
-        <p:nvPr/>
-      </p:nvGrpSpPr>
-      <p:grpSpPr>
-        <a:xfrm>
-          <a:off x="0" y="0"/>
-          <a:ext cx="0" cy="0"/>
-          <a:chOff x="0" y="0"/>
-          <a:chExt cx="0" cy="0"/>
-        </a:xfrm>
-      </p:grpSpPr>
-      <p:sp>
-        <p:nvSpPr>
-          <p:cNvPr id="2" name="Title 1"/>
-          <p:cNvSpPr>
-            <a:spLocks noGrp="1"/>
-          </p:cNvSpPr>
-          <p:nvPr>
-            <p:ph type="title"/>
-          </p:nvPr>
-        </p:nvSpPr>
-        <p:spPr/>
-        <p:txBody>
-          <a:bodyPr/>
-          <a:lstStyle/>
-          <a:p>
-            <a:endParaRPr lang="en-NZ"/>
-          </a:p>
-        </p:txBody>
-      </p:sp>
-      <p:pic>
-        <p:nvPicPr>
-          <p:cNvPr id="4" name="Content Placeholder 3"/>
-          <p:cNvPicPr>
-            <a:picLocks noGrp="1" noChangeAspect="1"/>
-          </p:cNvPicPr>
-          <p:nvPr>
-            <p:ph idx="1"/>
-          </p:nvPr>
-        </p:nvPicPr>
-        <p:blipFill>
-          <a:blip r:embed="rId2">
-            <a:extLst>
-              <a:ext uri="{28A0092B-C50C-407E-A947-70E740481C1C}">
-                <a14:useLocalDpi xmlns:a14="http://schemas.microsoft.com/office/drawing/2010/main" val="0"/>
-              </a:ext>
-            </a:extLst>
-          </a:blip>
-          <a:stretch>
-            <a:fillRect/>
-          </a:stretch>
-        </p:blipFill>
-        <p:spPr>
-          <a:xfrm>
-            <a:off x="842282" y="1825625"/>
-            <a:ext cx="7459435" cy="4351338"/>
-          </a:xfrm>
-        </p:spPr>
-      </p:pic>
-    </p:spTree>
-    <p:extLst>
-      <p:ext uri="{BB962C8B-B14F-4D97-AF65-F5344CB8AC3E}">
-        <p14:creationId xmlns:p14="http://schemas.microsoft.com/office/powerpoint/2010/main" val="2974112269"/>
-      </p:ext>
-    </p:extLst>
-  </p:cSld>
-  <p:clrMapOvr>
-    <a:masterClrMapping/>
-  </p:clrMapOvr>
-</p:sld>
-</file>
-
-<file path=ppt/slides/slide15.xml><?xml version="1.0" encoding="utf-8"?>
-<p:sld xmlns:a="http://schemas.openxmlformats.org/drawingml/2006/main" xmlns:r="http://schemas.openxmlformats.org/officeDocument/2006/relationships" xmlns:p="http://schemas.openxmlformats.org/presentationml/2006/main">
-  <p:cSld>
-    <p:spTree>
-      <p:nvGrpSpPr>
-        <p:cNvPr id="1" name=""/>
-        <p:cNvGrpSpPr/>
-        <p:nvPr/>
-      </p:nvGrpSpPr>
-      <p:grpSpPr>
-        <a:xfrm>
-          <a:off x="0" y="0"/>
-          <a:ext cx="0" cy="0"/>
-          <a:chOff x="0" y="0"/>
-          <a:chExt cx="0" cy="0"/>
-        </a:xfrm>
-      </p:grpSpPr>
-      <p:sp>
-        <p:nvSpPr>
-          <p:cNvPr id="2" name="Title 1"/>
-          <p:cNvSpPr>
-            <a:spLocks noGrp="1"/>
-          </p:cNvSpPr>
-          <p:nvPr>
-            <p:ph type="title"/>
-          </p:nvPr>
-        </p:nvSpPr>
-        <p:spPr/>
-        <p:txBody>
-          <a:bodyPr/>
-          <a:lstStyle/>
-          <a:p>
-            <a:endParaRPr lang="en-NZ"/>
-          </a:p>
-        </p:txBody>
-      </p:sp>
-      <p:pic>
-        <p:nvPicPr>
-          <p:cNvPr id="4" name="Content Placeholder 3"/>
-          <p:cNvPicPr>
-            <a:picLocks noGrp="1" noChangeAspect="1"/>
-          </p:cNvPicPr>
-          <p:nvPr>
-            <p:ph idx="1"/>
-          </p:nvPr>
-        </p:nvPicPr>
-        <p:blipFill>
-          <a:blip r:embed="rId2" cstate="print">
-            <a:extLst>
-              <a:ext uri="{28A0092B-C50C-407E-A947-70E740481C1C}">
-                <a14:useLocalDpi xmlns:a14="http://schemas.microsoft.com/office/drawing/2010/main" val="0"/>
-              </a:ext>
-            </a:extLst>
-          </a:blip>
-          <a:stretch>
-            <a:fillRect/>
-          </a:stretch>
-        </p:blipFill>
-        <p:spPr>
-          <a:xfrm>
-            <a:off x="3795622" y="172528"/>
-            <a:ext cx="5348377" cy="6685472"/>
-          </a:xfrm>
-        </p:spPr>
-      </p:pic>
-    </p:spTree>
-    <p:extLst>
-      <p:ext uri="{BB962C8B-B14F-4D97-AF65-F5344CB8AC3E}">
-        <p14:creationId xmlns:p14="http://schemas.microsoft.com/office/powerpoint/2010/main" val="3326670117"/>
-      </p:ext>
-    </p:extLst>
-  </p:cSld>
-  <p:clrMapOvr>
-    <a:masterClrMapping/>
-  </p:clrMapOvr>
-</p:sld>
-</file>
-
-<file path=ppt/slides/slide16.xml><?xml version="1.0" encoding="utf-8"?>
-<p:sld xmlns:a="http://schemas.openxmlformats.org/drawingml/2006/main" xmlns:r="http://schemas.openxmlformats.org/officeDocument/2006/relationships" xmlns:p="http://schemas.openxmlformats.org/presentationml/2006/main">
-  <p:cSld>
-    <p:spTree>
-      <p:nvGrpSpPr>
-        <p:cNvPr id="1" name=""/>
-        <p:cNvGrpSpPr/>
-        <p:nvPr/>
-      </p:nvGrpSpPr>
-      <p:grpSpPr>
-        <a:xfrm>
-          <a:off x="0" y="0"/>
-          <a:ext cx="0" cy="0"/>
-          <a:chOff x="0" y="0"/>
-          <a:chExt cx="0" cy="0"/>
-        </a:xfrm>
-      </p:grpSpPr>
-      <p:sp>
-        <p:nvSpPr>
-          <p:cNvPr id="2" name="Title 1"/>
-          <p:cNvSpPr>
-            <a:spLocks noGrp="1"/>
-          </p:cNvSpPr>
-          <p:nvPr>
-            <p:ph type="title"/>
-          </p:nvPr>
-        </p:nvSpPr>
-        <p:spPr/>
-        <p:txBody>
-          <a:bodyPr/>
-          <a:lstStyle/>
-          <a:p>
-            <a:endParaRPr lang="en-NZ"/>
-          </a:p>
-        </p:txBody>
-      </p:sp>
-      <p:pic>
-        <p:nvPicPr>
-          <p:cNvPr id="4" name="Content Placeholder 3"/>
-          <p:cNvPicPr>
-            <a:picLocks noGrp="1" noChangeAspect="1"/>
-          </p:cNvPicPr>
-          <p:nvPr>
-            <p:ph idx="1"/>
-          </p:nvPr>
-        </p:nvPicPr>
-        <p:blipFill>
-          <a:blip r:embed="rId2" cstate="print">
-            <a:extLst>
-              <a:ext uri="{28A0092B-C50C-407E-A947-70E740481C1C}">
-                <a14:useLocalDpi xmlns:a14="http://schemas.microsoft.com/office/drawing/2010/main" val="0"/>
-              </a:ext>
-            </a:extLst>
-          </a:blip>
-          <a:stretch>
-            <a:fillRect/>
-          </a:stretch>
-        </p:blipFill>
-        <p:spPr>
-          <a:xfrm>
-            <a:off x="3735238" y="97047"/>
-            <a:ext cx="5408762" cy="6760953"/>
-          </a:xfrm>
-        </p:spPr>
-      </p:pic>
-    </p:spTree>
-    <p:extLst>
-      <p:ext uri="{BB962C8B-B14F-4D97-AF65-F5344CB8AC3E}">
-        <p14:creationId xmlns:p14="http://schemas.microsoft.com/office/powerpoint/2010/main" val="2798668124"/>
-      </p:ext>
-    </p:extLst>
-  </p:cSld>
-  <p:clrMapOvr>
-    <a:masterClrMapping/>
-  </p:clrMapOvr>
-</p:sld>
-</file>
-
-<file path=ppt/slides/slide17.xml><?xml version="1.0" encoding="utf-8"?>
-<p:sld xmlns:a="http://schemas.openxmlformats.org/drawingml/2006/main" xmlns:r="http://schemas.openxmlformats.org/officeDocument/2006/relationships" xmlns:p="http://schemas.openxmlformats.org/presentationml/2006/main">
-  <p:cSld>
-    <p:spTree>
-      <p:nvGrpSpPr>
-        <p:cNvPr id="1" name=""/>
-        <p:cNvGrpSpPr/>
-        <p:nvPr/>
-      </p:nvGrpSpPr>
-      <p:grpSpPr>
-        <a:xfrm>
-          <a:off x="0" y="0"/>
-          <a:ext cx="0" cy="0"/>
-          <a:chOff x="0" y="0"/>
-          <a:chExt cx="0" cy="0"/>
-        </a:xfrm>
-      </p:grpSpPr>
-      <p:sp>
-        <p:nvSpPr>
-          <p:cNvPr id="2" name="Title 1"/>
-          <p:cNvSpPr>
-            <a:spLocks noGrp="1"/>
-          </p:cNvSpPr>
-          <p:nvPr>
-            <p:ph type="title"/>
-          </p:nvPr>
-        </p:nvSpPr>
-        <p:spPr/>
-        <p:txBody>
-          <a:bodyPr/>
-          <a:lstStyle/>
-          <a:p>
-            <a:endParaRPr lang="en-NZ"/>
-          </a:p>
-        </p:txBody>
-      </p:sp>
-      <p:pic>
-        <p:nvPicPr>
-          <p:cNvPr id="4" name="Content Placeholder 3"/>
-          <p:cNvPicPr>
-            <a:picLocks noGrp="1" noChangeAspect="1"/>
-          </p:cNvPicPr>
-          <p:nvPr>
-            <p:ph idx="1"/>
-          </p:nvPr>
-        </p:nvPicPr>
-        <p:blipFill>
-          <a:blip r:embed="rId2">
-            <a:extLst>
-              <a:ext uri="{28A0092B-C50C-407E-A947-70E740481C1C}">
-                <a14:useLocalDpi xmlns:a14="http://schemas.microsoft.com/office/drawing/2010/main" val="0"/>
-              </a:ext>
-            </a:extLst>
-          </a:blip>
-          <a:stretch>
-            <a:fillRect/>
-          </a:stretch>
-        </p:blipFill>
-        <p:spPr>
-          <a:xfrm>
-            <a:off x="842282" y="1825625"/>
-            <a:ext cx="7459435" cy="4351338"/>
-          </a:xfrm>
-        </p:spPr>
-      </p:pic>
-    </p:spTree>
-    <p:extLst>
-      <p:ext uri="{BB962C8B-B14F-4D97-AF65-F5344CB8AC3E}">
-        <p14:creationId xmlns:p14="http://schemas.microsoft.com/office/powerpoint/2010/main" val="1181803697"/>
-      </p:ext>
-    </p:extLst>
-  </p:cSld>
-  <p:clrMapOvr>
-    <a:masterClrMapping/>
-  </p:clrMapOvr>
-</p:sld>
-</file>
-
-<file path=ppt/slides/slide18.xml><?xml version="1.0" encoding="utf-8"?>
-<p:sld xmlns:a="http://schemas.openxmlformats.org/drawingml/2006/main" xmlns:r="http://schemas.openxmlformats.org/officeDocument/2006/relationships" xmlns:p="http://schemas.openxmlformats.org/presentationml/2006/main">
-  <p:cSld>
-    <p:spTree>
-      <p:nvGrpSpPr>
-        <p:cNvPr id="1" name=""/>
-        <p:cNvGrpSpPr/>
-        <p:nvPr/>
-      </p:nvGrpSpPr>
-      <p:grpSpPr>
-        <a:xfrm>
-          <a:off x="0" y="0"/>
-          <a:ext cx="0" cy="0"/>
-          <a:chOff x="0" y="0"/>
-          <a:chExt cx="0" cy="0"/>
-        </a:xfrm>
-      </p:grpSpPr>
-      <p:sp>
-        <p:nvSpPr>
-          <p:cNvPr id="2" name="Title 1"/>
-          <p:cNvSpPr>
-            <a:spLocks noGrp="1"/>
-          </p:cNvSpPr>
-          <p:nvPr>
-            <p:ph type="title"/>
-          </p:nvPr>
-        </p:nvSpPr>
-        <p:spPr/>
-        <p:txBody>
-          <a:bodyPr/>
-          <a:lstStyle/>
-          <a:p>
-            <a:endParaRPr lang="en-NZ"/>
-          </a:p>
-        </p:txBody>
-      </p:sp>
-      <p:pic>
-        <p:nvPicPr>
-          <p:cNvPr id="4" name="Content Placeholder 3"/>
-          <p:cNvPicPr>
-            <a:picLocks noGrp="1" noChangeAspect="1"/>
-          </p:cNvPicPr>
-          <p:nvPr>
-            <p:ph idx="1"/>
-          </p:nvPr>
-        </p:nvPicPr>
-        <p:blipFill>
-          <a:blip r:embed="rId2">
-            <a:extLst>
-              <a:ext uri="{28A0092B-C50C-407E-A947-70E740481C1C}">
-                <a14:useLocalDpi xmlns:a14="http://schemas.microsoft.com/office/drawing/2010/main" val="0"/>
-              </a:ext>
-            </a:extLst>
-          </a:blip>
-          <a:stretch>
-            <a:fillRect/>
-          </a:stretch>
-        </p:blipFill>
-        <p:spPr>
-          <a:xfrm>
-            <a:off x="1" y="1523999"/>
-            <a:ext cx="9144000" cy="5334001"/>
-          </a:xfrm>
-        </p:spPr>
-      </p:pic>
-    </p:spTree>
-    <p:extLst>
-      <p:ext uri="{BB962C8B-B14F-4D97-AF65-F5344CB8AC3E}">
-        <p14:creationId xmlns:p14="http://schemas.microsoft.com/office/powerpoint/2010/main" val="1579544255"/>
-      </p:ext>
-    </p:extLst>
-  </p:cSld>
-  <p:clrMapOvr>
-    <a:masterClrMapping/>
-  </p:clrMapOvr>
-</p:sld>
-</file>
-
-<file path=ppt/slides/slide19.xml><?xml version="1.0" encoding="utf-8"?>
-<p:sld xmlns:a="http://schemas.openxmlformats.org/drawingml/2006/main" xmlns:r="http://schemas.openxmlformats.org/officeDocument/2006/relationships" xmlns:p="http://schemas.openxmlformats.org/presentationml/2006/main">
-  <p:cSld>
-    <p:spTree>
-      <p:nvGrpSpPr>
-        <p:cNvPr id="1" name=""/>
-        <p:cNvGrpSpPr/>
-        <p:nvPr/>
-      </p:nvGrpSpPr>
-      <p:grpSpPr>
-        <a:xfrm>
-          <a:off x="0" y="0"/>
-          <a:ext cx="0" cy="0"/>
-          <a:chOff x="0" y="0"/>
-          <a:chExt cx="0" cy="0"/>
-        </a:xfrm>
-      </p:grpSpPr>
-      <p:sp>
-        <p:nvSpPr>
-          <p:cNvPr id="2" name="Title 1"/>
-          <p:cNvSpPr>
-            <a:spLocks noGrp="1"/>
-          </p:cNvSpPr>
-          <p:nvPr>
-            <p:ph type="title"/>
-          </p:nvPr>
-        </p:nvSpPr>
-        <p:spPr/>
-        <p:txBody>
-          <a:bodyPr/>
-          <a:lstStyle/>
-          <a:p>
-            <a:endParaRPr lang="en-NZ"/>
-          </a:p>
-        </p:txBody>
-      </p:sp>
-      <p:pic>
-        <p:nvPicPr>
-          <p:cNvPr id="4" name="Content Placeholder 3"/>
-          <p:cNvPicPr>
-            <a:picLocks noGrp="1" noChangeAspect="1"/>
-          </p:cNvPicPr>
-          <p:nvPr>
-            <p:ph idx="1"/>
-          </p:nvPr>
-        </p:nvPicPr>
-        <p:blipFill>
-          <a:blip r:embed="rId2">
-            <a:extLst>
-              <a:ext uri="{28A0092B-C50C-407E-A947-70E740481C1C}">
-                <a14:useLocalDpi xmlns:a14="http://schemas.microsoft.com/office/drawing/2010/main" val="0"/>
-              </a:ext>
-            </a:extLst>
-          </a:blip>
-          <a:stretch>
-            <a:fillRect/>
-          </a:stretch>
-        </p:blipFill>
-        <p:spPr>
-          <a:xfrm>
-            <a:off x="842282" y="1825625"/>
-            <a:ext cx="7459435" cy="4351338"/>
-          </a:xfrm>
-        </p:spPr>
-      </p:pic>
-    </p:spTree>
-    <p:extLst>
-      <p:ext uri="{BB962C8B-B14F-4D97-AF65-F5344CB8AC3E}">
-        <p14:creationId xmlns:p14="http://schemas.microsoft.com/office/powerpoint/2010/main" val="1624705444"/>
-      </p:ext>
-    </p:extLst>
-  </p:cSld>
-  <p:clrMapOvr>
-    <a:masterClrMapping/>
-  </p:clrMapOvr>
-</p:sld>
-</file>
-
-<file path=ppt/slides/slide2.xml><?xml version="1.0" encoding="utf-8"?>
-<p:sld xmlns:a="http://schemas.openxmlformats.org/drawingml/2006/main" xmlns:r="http://schemas.openxmlformats.org/officeDocument/2006/relationships" xmlns:p="http://schemas.openxmlformats.org/presentationml/2006/main">
-  <p:cSld>
-    <p:spTree>
-      <p:nvGrpSpPr>
-        <p:cNvPr id="1" name=""/>
-        <p:cNvGrpSpPr/>
-        <p:nvPr/>
-      </p:nvGrpSpPr>
-      <p:grpSpPr>
-        <a:xfrm>
-          <a:off x="0" y="0"/>
-          <a:ext cx="0" cy="0"/>
-          <a:chOff x="0" y="0"/>
-          <a:chExt cx="0" cy="0"/>
-        </a:xfrm>
-      </p:grpSpPr>
-      <p:sp>
-        <p:nvSpPr>
-          <p:cNvPr id="2" name="Title 1"/>
-          <p:cNvSpPr>
-            <a:spLocks noGrp="1"/>
-          </p:cNvSpPr>
-          <p:nvPr>
-            <p:ph type="title"/>
-          </p:nvPr>
-        </p:nvSpPr>
-        <p:spPr/>
-        <p:txBody>
-          <a:bodyPr/>
-          <a:lstStyle/>
-          <a:p>
-            <a:r>
-              <a:rPr lang="en-US" dirty="0" err="1" smtClean="0"/>
-              <a:t>Gmacs</a:t>
-            </a:r>
-            <a:r>
-              <a:rPr lang="en-US" dirty="0" smtClean="0"/>
-              <a:t> progress</a:t>
-            </a:r>
-            <a:endParaRPr lang="en-NZ" dirty="0"/>
-          </a:p>
-        </p:txBody>
-      </p:sp>
-      <p:sp>
-        <p:nvSpPr>
-          <p:cNvPr id="3" name="Content Placeholder 2"/>
-          <p:cNvSpPr>
-            <a:spLocks noGrp="1"/>
-          </p:cNvSpPr>
-          <p:nvPr>
-            <p:ph idx="1"/>
-          </p:nvPr>
-        </p:nvSpPr>
-        <p:spPr/>
-        <p:txBody>
-          <a:bodyPr>
-            <a:normAutofit fontScale="92500" lnSpcReduction="10000"/>
-          </a:bodyPr>
-          <a:lstStyle/>
-          <a:p>
-            <a:r>
-              <a:rPr lang="en-US" dirty="0" smtClean="0"/>
-              <a:t>Added seasons to </a:t>
-            </a:r>
-            <a:r>
-              <a:rPr lang="en-US" dirty="0" err="1" smtClean="0"/>
-              <a:t>Gmacs</a:t>
-            </a:r>
-            <a:r>
-              <a:rPr lang="en-US" dirty="0" smtClean="0"/>
-              <a:t> dynamics</a:t>
-            </a:r>
-          </a:p>
-          <a:p>
-            <a:pPr lvl="1"/>
-            <a:r>
-              <a:rPr lang="en-US" dirty="0" smtClean="0"/>
-              <a:t>Continuous </a:t>
-            </a:r>
-            <a:r>
-              <a:rPr lang="en-US" i="1" dirty="0" smtClean="0"/>
-              <a:t>M</a:t>
-            </a:r>
-            <a:r>
-              <a:rPr lang="en-US" dirty="0" smtClean="0"/>
-              <a:t>/</a:t>
-            </a:r>
-            <a:r>
-              <a:rPr lang="en-US" i="1" dirty="0" smtClean="0"/>
-              <a:t>F</a:t>
-            </a:r>
-            <a:r>
-              <a:rPr lang="en-US" dirty="0" smtClean="0"/>
-              <a:t> within seasons</a:t>
-            </a:r>
-            <a:endParaRPr lang="en-US" i="1" dirty="0"/>
-          </a:p>
-          <a:p>
-            <a:pPr lvl="1"/>
-            <a:r>
-              <a:rPr lang="en-US" dirty="0" smtClean="0"/>
-              <a:t>Number </a:t>
-            </a:r>
-            <a:r>
-              <a:rPr lang="en-US" dirty="0" smtClean="0"/>
-              <a:t>of seasons</a:t>
-            </a:r>
-          </a:p>
-          <a:p>
-            <a:pPr lvl="1"/>
-            <a:r>
-              <a:rPr lang="en-US" dirty="0" smtClean="0"/>
-              <a:t>Proportion of </a:t>
-            </a:r>
-            <a:r>
-              <a:rPr lang="en-US" i="1" dirty="0" smtClean="0"/>
-              <a:t>M</a:t>
-            </a:r>
-            <a:r>
-              <a:rPr lang="en-US" dirty="0" smtClean="0"/>
-              <a:t> each season</a:t>
-            </a:r>
-          </a:p>
-          <a:p>
-            <a:pPr lvl="1"/>
-            <a:r>
-              <a:rPr lang="en-US" dirty="0" smtClean="0"/>
-              <a:t>Season molting and </a:t>
-            </a:r>
-            <a:r>
-              <a:rPr lang="en-US" dirty="0" smtClean="0"/>
-              <a:t>growth occur</a:t>
-            </a:r>
-            <a:endParaRPr lang="en-US" dirty="0" smtClean="0"/>
-          </a:p>
-          <a:p>
-            <a:pPr lvl="1"/>
-            <a:r>
-              <a:rPr lang="en-US" dirty="0" smtClean="0"/>
-              <a:t>Season </a:t>
-            </a:r>
-            <a:r>
-              <a:rPr lang="en-US" dirty="0" smtClean="0"/>
-              <a:t>recruitment occurs</a:t>
-            </a:r>
-            <a:endParaRPr lang="en-US" dirty="0" smtClean="0"/>
-          </a:p>
-          <a:p>
-            <a:pPr lvl="1"/>
-            <a:r>
-              <a:rPr lang="en-US" dirty="0" smtClean="0"/>
-              <a:t>Season </a:t>
-            </a:r>
-            <a:r>
-              <a:rPr lang="en-US" dirty="0" smtClean="0"/>
-              <a:t>SSB is to be calculated</a:t>
-            </a:r>
-            <a:endParaRPr lang="en-US" dirty="0" smtClean="0"/>
-          </a:p>
-          <a:p>
-            <a:pPr lvl="1"/>
-            <a:r>
-              <a:rPr lang="en-US" dirty="0" smtClean="0"/>
-              <a:t>All </a:t>
-            </a:r>
-            <a:r>
-              <a:rPr lang="en-US" dirty="0" smtClean="0"/>
-              <a:t>data sets have a time stamp (season/year)</a:t>
-            </a:r>
-          </a:p>
-          <a:p>
-            <a:r>
-              <a:rPr lang="en-US" dirty="0" smtClean="0"/>
-              <a:t>Added option to initialize numbers as free parameters</a:t>
-            </a:r>
-          </a:p>
-          <a:p>
-            <a:r>
-              <a:rPr lang="en-US" dirty="0" smtClean="0"/>
-              <a:t>Plots</a:t>
-            </a:r>
-          </a:p>
-          <a:p>
-            <a:r>
-              <a:rPr lang="en-US" dirty="0" smtClean="0"/>
-              <a:t>Draft SMBKC document</a:t>
-            </a:r>
-            <a:endParaRPr lang="en-US" dirty="0" smtClean="0"/>
-          </a:p>
-        </p:txBody>
-      </p:sp>
-    </p:spTree>
-    <p:extLst>
-      <p:ext uri="{BB962C8B-B14F-4D97-AF65-F5344CB8AC3E}">
-        <p14:creationId xmlns:p14="http://schemas.microsoft.com/office/powerpoint/2010/main" val="1127452723"/>
-      </p:ext>
-    </p:extLst>
-  </p:cSld>
-  <p:clrMapOvr>
-    <a:masterClrMapping/>
-  </p:clrMapOvr>
-</p:sld>
-</file>
-
-<file path=ppt/slides/slide20.xml><?xml version="1.0" encoding="utf-8"?>
-<p:sld xmlns:a="http://schemas.openxmlformats.org/drawingml/2006/main" xmlns:r="http://schemas.openxmlformats.org/officeDocument/2006/relationships" xmlns:p="http://schemas.openxmlformats.org/presentationml/2006/main">
-  <p:cSld>
-    <p:spTree>
-      <p:nvGrpSpPr>
-        <p:cNvPr id="1" name=""/>
-        <p:cNvGrpSpPr/>
-        <p:nvPr/>
-      </p:nvGrpSpPr>
-      <p:grpSpPr>
-        <a:xfrm>
-          <a:off x="0" y="0"/>
-          <a:ext cx="0" cy="0"/>
-          <a:chOff x="0" y="0"/>
-          <a:chExt cx="0" cy="0"/>
-        </a:xfrm>
-      </p:grpSpPr>
-      <p:sp>
-        <p:nvSpPr>
-          <p:cNvPr id="2" name="Title 1"/>
-          <p:cNvSpPr>
-            <a:spLocks noGrp="1"/>
-          </p:cNvSpPr>
-          <p:nvPr>
-            <p:ph type="title"/>
-          </p:nvPr>
-        </p:nvSpPr>
-        <p:spPr/>
-        <p:txBody>
-          <a:bodyPr/>
-          <a:lstStyle/>
-          <a:p>
-            <a:endParaRPr lang="en-NZ"/>
-          </a:p>
-        </p:txBody>
-      </p:sp>
-      <p:pic>
-        <p:nvPicPr>
-          <p:cNvPr id="4" name="Content Placeholder 3"/>
-          <p:cNvPicPr>
-            <a:picLocks noGrp="1" noChangeAspect="1"/>
-          </p:cNvPicPr>
-          <p:nvPr>
-            <p:ph idx="1"/>
-          </p:nvPr>
-        </p:nvPicPr>
-        <p:blipFill>
-          <a:blip r:embed="rId2">
-            <a:extLst>
-              <a:ext uri="{28A0092B-C50C-407E-A947-70E740481C1C}">
-                <a14:useLocalDpi xmlns:a14="http://schemas.microsoft.com/office/drawing/2010/main" val="0"/>
-              </a:ext>
-            </a:extLst>
-          </a:blip>
-          <a:stretch>
-            <a:fillRect/>
-          </a:stretch>
-        </p:blipFill>
-        <p:spPr>
-          <a:xfrm>
-            <a:off x="842282" y="1825625"/>
-            <a:ext cx="7459435" cy="4351338"/>
-          </a:xfrm>
-        </p:spPr>
-      </p:pic>
-    </p:spTree>
-    <p:extLst>
-      <p:ext uri="{BB962C8B-B14F-4D97-AF65-F5344CB8AC3E}">
-        <p14:creationId xmlns:p14="http://schemas.microsoft.com/office/powerpoint/2010/main" val="2122499807"/>
-      </p:ext>
-    </p:extLst>
-  </p:cSld>
-  <p:clrMapOvr>
-    <a:masterClrMapping/>
-  </p:clrMapOvr>
-</p:sld>
-</file>
-
-<file path=ppt/slides/slide21.xml><?xml version="1.0" encoding="utf-8"?>
-<p:sld xmlns:a="http://schemas.openxmlformats.org/drawingml/2006/main" xmlns:r="http://schemas.openxmlformats.org/officeDocument/2006/relationships" xmlns:p="http://schemas.openxmlformats.org/presentationml/2006/main">
-  <p:cSld>
-    <p:spTree>
-      <p:nvGrpSpPr>
-        <p:cNvPr id="1" name=""/>
-        <p:cNvGrpSpPr/>
-        <p:nvPr/>
-      </p:nvGrpSpPr>
-      <p:grpSpPr>
-        <a:xfrm>
-          <a:off x="0" y="0"/>
-          <a:ext cx="0" cy="0"/>
-          <a:chOff x="0" y="0"/>
-          <a:chExt cx="0" cy="0"/>
-        </a:xfrm>
-      </p:grpSpPr>
-      <p:sp>
-        <p:nvSpPr>
-          <p:cNvPr id="2" name="Title 1"/>
-          <p:cNvSpPr>
-            <a:spLocks noGrp="1"/>
-          </p:cNvSpPr>
-          <p:nvPr>
-            <p:ph type="title"/>
-          </p:nvPr>
-        </p:nvSpPr>
-        <p:spPr/>
-        <p:txBody>
-          <a:bodyPr/>
-          <a:lstStyle/>
-          <a:p>
-            <a:endParaRPr lang="en-NZ"/>
-          </a:p>
-        </p:txBody>
-      </p:sp>
-      <p:pic>
-        <p:nvPicPr>
-          <p:cNvPr id="4" name="Content Placeholder 3"/>
-          <p:cNvPicPr>
-            <a:picLocks noGrp="1" noChangeAspect="1"/>
-          </p:cNvPicPr>
-          <p:nvPr>
-            <p:ph idx="1"/>
-          </p:nvPr>
-        </p:nvPicPr>
-        <p:blipFill>
-          <a:blip r:embed="rId2">
-            <a:extLst>
-              <a:ext uri="{28A0092B-C50C-407E-A947-70E740481C1C}">
-                <a14:useLocalDpi xmlns:a14="http://schemas.microsoft.com/office/drawing/2010/main" val="0"/>
-              </a:ext>
-            </a:extLst>
-          </a:blip>
-          <a:stretch>
-            <a:fillRect/>
-          </a:stretch>
-        </p:blipFill>
-        <p:spPr>
-          <a:xfrm>
-            <a:off x="842282" y="1825625"/>
-            <a:ext cx="7459435" cy="4351338"/>
-          </a:xfrm>
-        </p:spPr>
-      </p:pic>
-    </p:spTree>
-    <p:extLst>
-      <p:ext uri="{BB962C8B-B14F-4D97-AF65-F5344CB8AC3E}">
-        <p14:creationId xmlns:p14="http://schemas.microsoft.com/office/powerpoint/2010/main" val="1977388319"/>
-      </p:ext>
-    </p:extLst>
-  </p:cSld>
-  <p:clrMapOvr>
-    <a:masterClrMapping/>
-  </p:clrMapOvr>
-</p:sld>
-</file>
-
-<file path=ppt/slides/slide22.xml><?xml version="1.0" encoding="utf-8"?>
-<p:sld xmlns:a="http://schemas.openxmlformats.org/drawingml/2006/main" xmlns:r="http://schemas.openxmlformats.org/officeDocument/2006/relationships" xmlns:p="http://schemas.openxmlformats.org/presentationml/2006/main">
-  <p:cSld>
-    <p:spTree>
-      <p:nvGrpSpPr>
-        <p:cNvPr id="1" name=""/>
-        <p:cNvGrpSpPr/>
-        <p:nvPr/>
-      </p:nvGrpSpPr>
-      <p:grpSpPr>
-        <a:xfrm>
-          <a:off x="0" y="0"/>
-          <a:ext cx="0" cy="0"/>
-          <a:chOff x="0" y="0"/>
-          <a:chExt cx="0" cy="0"/>
-        </a:xfrm>
-      </p:grpSpPr>
-      <p:sp>
-        <p:nvSpPr>
-          <p:cNvPr id="2" name="Title 1"/>
-          <p:cNvSpPr>
-            <a:spLocks noGrp="1"/>
-          </p:cNvSpPr>
-          <p:nvPr>
-            <p:ph type="title"/>
-          </p:nvPr>
-        </p:nvSpPr>
-        <p:spPr/>
-        <p:txBody>
-          <a:bodyPr/>
-          <a:lstStyle/>
-          <a:p>
-            <a:endParaRPr lang="en-NZ"/>
-          </a:p>
-        </p:txBody>
-      </p:sp>
-      <p:pic>
-        <p:nvPicPr>
-          <p:cNvPr id="4" name="Content Placeholder 3"/>
-          <p:cNvPicPr>
-            <a:picLocks noGrp="1" noChangeAspect="1"/>
-          </p:cNvPicPr>
-          <p:nvPr>
-            <p:ph idx="1"/>
-          </p:nvPr>
-        </p:nvPicPr>
-        <p:blipFill>
-          <a:blip r:embed="rId2">
-            <a:extLst>
-              <a:ext uri="{28A0092B-C50C-407E-A947-70E740481C1C}">
-                <a14:useLocalDpi xmlns:a14="http://schemas.microsoft.com/office/drawing/2010/main" val="0"/>
-              </a:ext>
-            </a:extLst>
-          </a:blip>
-          <a:stretch>
-            <a:fillRect/>
-          </a:stretch>
-        </p:blipFill>
-        <p:spPr>
-          <a:xfrm>
-            <a:off x="842282" y="1825625"/>
-            <a:ext cx="7459435" cy="4351338"/>
-          </a:xfrm>
-        </p:spPr>
-      </p:pic>
-    </p:spTree>
-    <p:extLst>
-      <p:ext uri="{BB962C8B-B14F-4D97-AF65-F5344CB8AC3E}">
-        <p14:creationId xmlns:p14="http://schemas.microsoft.com/office/powerpoint/2010/main" val="1816968888"/>
-      </p:ext>
-    </p:extLst>
-  </p:cSld>
-  <p:clrMapOvr>
-    <a:masterClrMapping/>
-  </p:clrMapOvr>
-</p:sld>
-</file>
-
-<file path=ppt/slides/slide23.xml><?xml version="1.0" encoding="utf-8"?>
-<p:sld xmlns:a="http://schemas.openxmlformats.org/drawingml/2006/main" xmlns:r="http://schemas.openxmlformats.org/officeDocument/2006/relationships" xmlns:p="http://schemas.openxmlformats.org/presentationml/2006/main">
-  <p:cSld>
-    <p:spTree>
-      <p:nvGrpSpPr>
-        <p:cNvPr id="1" name=""/>
-        <p:cNvGrpSpPr/>
-        <p:nvPr/>
-      </p:nvGrpSpPr>
-      <p:grpSpPr>
-        <a:xfrm>
-          <a:off x="0" y="0"/>
-          <a:ext cx="0" cy="0"/>
-          <a:chOff x="0" y="0"/>
-          <a:chExt cx="0" cy="0"/>
-        </a:xfrm>
-      </p:grpSpPr>
-      <p:sp>
-        <p:nvSpPr>
-          <p:cNvPr id="2" name="Title 1"/>
-          <p:cNvSpPr>
-            <a:spLocks noGrp="1"/>
-          </p:cNvSpPr>
-          <p:nvPr>
-            <p:ph type="title"/>
-          </p:nvPr>
-        </p:nvSpPr>
-        <p:spPr/>
-        <p:txBody>
-          <a:bodyPr/>
-          <a:lstStyle/>
-          <a:p>
-            <a:endParaRPr lang="en-NZ"/>
-          </a:p>
-        </p:txBody>
-      </p:sp>
-      <p:pic>
-        <p:nvPicPr>
-          <p:cNvPr id="4" name="Content Placeholder 3"/>
-          <p:cNvPicPr>
-            <a:picLocks noGrp="1" noChangeAspect="1"/>
-          </p:cNvPicPr>
-          <p:nvPr>
-            <p:ph idx="1"/>
-          </p:nvPr>
-        </p:nvPicPr>
-        <p:blipFill>
-          <a:blip r:embed="rId2">
-            <a:extLst>
-              <a:ext uri="{28A0092B-C50C-407E-A947-70E740481C1C}">
-                <a14:useLocalDpi xmlns:a14="http://schemas.microsoft.com/office/drawing/2010/main" val="0"/>
-              </a:ext>
-            </a:extLst>
-          </a:blip>
-          <a:stretch>
-            <a:fillRect/>
-          </a:stretch>
-        </p:blipFill>
-        <p:spPr>
-          <a:xfrm>
-            <a:off x="842282" y="1825625"/>
-            <a:ext cx="7459435" cy="4351338"/>
-          </a:xfrm>
-        </p:spPr>
-      </p:pic>
-    </p:spTree>
-    <p:extLst>
-      <p:ext uri="{BB962C8B-B14F-4D97-AF65-F5344CB8AC3E}">
-        <p14:creationId xmlns:p14="http://schemas.microsoft.com/office/powerpoint/2010/main" val="387008885"/>
-      </p:ext>
-    </p:extLst>
-  </p:cSld>
-  <p:clrMapOvr>
-    <a:masterClrMapping/>
-  </p:clrMapOvr>
-</p:sld>
-</file>
-
-<file path=ppt/slides/slide24.xml><?xml version="1.0" encoding="utf-8"?>
-<p:sld xmlns:a="http://schemas.openxmlformats.org/drawingml/2006/main" xmlns:r="http://schemas.openxmlformats.org/officeDocument/2006/relationships" xmlns:p="http://schemas.openxmlformats.org/presentationml/2006/main">
-  <p:cSld>
-    <p:spTree>
-      <p:nvGrpSpPr>
-        <p:cNvPr id="1" name=""/>
-        <p:cNvGrpSpPr/>
-        <p:nvPr/>
-      </p:nvGrpSpPr>
-      <p:grpSpPr>
-        <a:xfrm>
-          <a:off x="0" y="0"/>
-          <a:ext cx="0" cy="0"/>
-          <a:chOff x="0" y="0"/>
-          <a:chExt cx="0" cy="0"/>
-        </a:xfrm>
-      </p:grpSpPr>
-      <p:sp>
-        <p:nvSpPr>
-          <p:cNvPr id="2" name="Title 1"/>
-          <p:cNvSpPr>
-            <a:spLocks noGrp="1"/>
-          </p:cNvSpPr>
-          <p:nvPr>
-            <p:ph type="title"/>
-          </p:nvPr>
-        </p:nvSpPr>
-        <p:spPr/>
-        <p:txBody>
-          <a:bodyPr/>
-          <a:lstStyle/>
-          <a:p>
-            <a:endParaRPr lang="en-NZ"/>
-          </a:p>
-        </p:txBody>
-      </p:sp>
-      <p:pic>
-        <p:nvPicPr>
-          <p:cNvPr id="4" name="Content Placeholder 3"/>
-          <p:cNvPicPr>
-            <a:picLocks noGrp="1" noChangeAspect="1"/>
-          </p:cNvPicPr>
-          <p:nvPr>
-            <p:ph idx="1"/>
-          </p:nvPr>
-        </p:nvPicPr>
-        <p:blipFill>
-          <a:blip r:embed="rId2">
-            <a:extLst>
-              <a:ext uri="{28A0092B-C50C-407E-A947-70E740481C1C}">
-                <a14:useLocalDpi xmlns:a14="http://schemas.microsoft.com/office/drawing/2010/main" val="0"/>
-              </a:ext>
-            </a:extLst>
-          </a:blip>
-          <a:stretch>
-            <a:fillRect/>
-          </a:stretch>
-        </p:blipFill>
-        <p:spPr>
-          <a:xfrm>
-            <a:off x="842282" y="1825625"/>
-            <a:ext cx="7459435" cy="4351338"/>
-          </a:xfrm>
-        </p:spPr>
-      </p:pic>
-    </p:spTree>
-    <p:extLst>
-      <p:ext uri="{BB962C8B-B14F-4D97-AF65-F5344CB8AC3E}">
-        <p14:creationId xmlns:p14="http://schemas.microsoft.com/office/powerpoint/2010/main" val="173411110"/>
-      </p:ext>
-    </p:extLst>
-  </p:cSld>
-  <p:clrMapOvr>
-    <a:masterClrMapping/>
-  </p:clrMapOvr>
-</p:sld>
-</file>
-
-<file path=ppt/slides/slide25.xml><?xml version="1.0" encoding="utf-8"?>
-<p:sld xmlns:a="http://schemas.openxmlformats.org/drawingml/2006/main" xmlns:r="http://schemas.openxmlformats.org/officeDocument/2006/relationships" xmlns:p="http://schemas.openxmlformats.org/presentationml/2006/main">
-  <p:cSld>
-    <p:spTree>
-      <p:nvGrpSpPr>
-        <p:cNvPr id="1" name=""/>
-        <p:cNvGrpSpPr/>
-        <p:nvPr/>
-      </p:nvGrpSpPr>
-      <p:grpSpPr>
-        <a:xfrm>
-          <a:off x="0" y="0"/>
-          <a:ext cx="0" cy="0"/>
-          <a:chOff x="0" y="0"/>
-          <a:chExt cx="0" cy="0"/>
-        </a:xfrm>
-      </p:grpSpPr>
-      <p:sp>
-        <p:nvSpPr>
-          <p:cNvPr id="2" name="Title 1"/>
-          <p:cNvSpPr>
-            <a:spLocks noGrp="1"/>
-          </p:cNvSpPr>
-          <p:nvPr>
-            <p:ph type="title"/>
-          </p:nvPr>
-        </p:nvSpPr>
-        <p:spPr/>
-        <p:txBody>
-          <a:bodyPr/>
-          <a:lstStyle/>
-          <a:p>
-            <a:endParaRPr lang="en-NZ"/>
-          </a:p>
-        </p:txBody>
-      </p:sp>
-      <p:pic>
-        <p:nvPicPr>
-          <p:cNvPr id="4" name="Content Placeholder 3"/>
-          <p:cNvPicPr>
-            <a:picLocks noGrp="1" noChangeAspect="1"/>
-          </p:cNvPicPr>
-          <p:nvPr>
-            <p:ph idx="1"/>
-          </p:nvPr>
-        </p:nvPicPr>
-        <p:blipFill>
-          <a:blip r:embed="rId2">
-            <a:extLst>
-              <a:ext uri="{28A0092B-C50C-407E-A947-70E740481C1C}">
-                <a14:useLocalDpi xmlns:a14="http://schemas.microsoft.com/office/drawing/2010/main" val="0"/>
-              </a:ext>
-            </a:extLst>
-          </a:blip>
-          <a:stretch>
-            <a:fillRect/>
-          </a:stretch>
-        </p:blipFill>
-        <p:spPr>
-          <a:xfrm>
-            <a:off x="842282" y="1825625"/>
-            <a:ext cx="7459435" cy="4351338"/>
-          </a:xfrm>
-        </p:spPr>
-      </p:pic>
-    </p:spTree>
-    <p:extLst>
-      <p:ext uri="{BB962C8B-B14F-4D97-AF65-F5344CB8AC3E}">
-        <p14:creationId xmlns:p14="http://schemas.microsoft.com/office/powerpoint/2010/main" val="3318011065"/>
-      </p:ext>
-    </p:extLst>
-  </p:cSld>
-  <p:clrMapOvr>
-    <a:masterClrMapping/>
-  </p:clrMapOvr>
-</p:sld>
-</file>
-
-<file path=ppt/slides/slide26.xml><?xml version="1.0" encoding="utf-8"?>
-<p:sld xmlns:a="http://schemas.openxmlformats.org/drawingml/2006/main" xmlns:r="http://schemas.openxmlformats.org/officeDocument/2006/relationships" xmlns:p="http://schemas.openxmlformats.org/presentationml/2006/main">
-  <p:cSld>
-    <p:spTree>
-      <p:nvGrpSpPr>
-        <p:cNvPr id="1" name=""/>
-        <p:cNvGrpSpPr/>
-        <p:nvPr/>
-      </p:nvGrpSpPr>
-      <p:grpSpPr>
-        <a:xfrm>
-          <a:off x="0" y="0"/>
-          <a:ext cx="0" cy="0"/>
-          <a:chOff x="0" y="0"/>
-          <a:chExt cx="0" cy="0"/>
-        </a:xfrm>
-      </p:grpSpPr>
-      <p:sp>
-        <p:nvSpPr>
-          <p:cNvPr id="2" name="Title 1"/>
-          <p:cNvSpPr>
-            <a:spLocks noGrp="1"/>
-          </p:cNvSpPr>
-          <p:nvPr>
-            <p:ph type="title"/>
-          </p:nvPr>
-        </p:nvSpPr>
-        <p:spPr/>
-        <p:txBody>
-          <a:bodyPr/>
-          <a:lstStyle/>
-          <a:p>
-            <a:endParaRPr lang="en-NZ"/>
-          </a:p>
-        </p:txBody>
-      </p:sp>
-      <p:pic>
-        <p:nvPicPr>
-          <p:cNvPr id="4" name="Content Placeholder 3"/>
-          <p:cNvPicPr>
-            <a:picLocks noGrp="1" noChangeAspect="1"/>
-          </p:cNvPicPr>
-          <p:nvPr>
-            <p:ph idx="1"/>
-          </p:nvPr>
-        </p:nvPicPr>
-        <p:blipFill>
-          <a:blip r:embed="rId2">
-            <a:extLst>
-              <a:ext uri="{28A0092B-C50C-407E-A947-70E740481C1C}">
-                <a14:useLocalDpi xmlns:a14="http://schemas.microsoft.com/office/drawing/2010/main" val="0"/>
-              </a:ext>
-            </a:extLst>
-          </a:blip>
-          <a:stretch>
-            <a:fillRect/>
-          </a:stretch>
-        </p:blipFill>
-        <p:spPr>
-          <a:xfrm>
-            <a:off x="842282" y="1825625"/>
-            <a:ext cx="7459435" cy="4351338"/>
-          </a:xfrm>
-        </p:spPr>
-      </p:pic>
-    </p:spTree>
-    <p:extLst>
-      <p:ext uri="{BB962C8B-B14F-4D97-AF65-F5344CB8AC3E}">
-        <p14:creationId xmlns:p14="http://schemas.microsoft.com/office/powerpoint/2010/main" val="166404701"/>
-      </p:ext>
-    </p:extLst>
-  </p:cSld>
-  <p:clrMapOvr>
-    <a:masterClrMapping/>
-  </p:clrMapOvr>
-</p:sld>
-</file>
-
-<file path=ppt/slides/slide3.xml><?xml version="1.0" encoding="utf-8"?>
-<p:sld xmlns:a="http://schemas.openxmlformats.org/drawingml/2006/main" xmlns:r="http://schemas.openxmlformats.org/officeDocument/2006/relationships" xmlns:p="http://schemas.openxmlformats.org/presentationml/2006/main">
-  <p:cSld>
-    <p:spTree>
-      <p:nvGrpSpPr>
-        <p:cNvPr id="1" name=""/>
-        <p:cNvGrpSpPr/>
-        <p:nvPr/>
-      </p:nvGrpSpPr>
-      <p:grpSpPr>
-        <a:xfrm>
-          <a:off x="0" y="0"/>
-          <a:ext cx="0" cy="0"/>
-          <a:chOff x="0" y="0"/>
-          <a:chExt cx="0" cy="0"/>
-        </a:xfrm>
-      </p:grpSpPr>
-      <p:sp>
-        <p:nvSpPr>
-          <p:cNvPr id="2" name="Title 1"/>
-          <p:cNvSpPr>
-            <a:spLocks noGrp="1"/>
-          </p:cNvSpPr>
-          <p:nvPr>
-            <p:ph type="title"/>
-          </p:nvPr>
-        </p:nvSpPr>
-        <p:spPr/>
-        <p:txBody>
-          <a:bodyPr/>
-          <a:lstStyle/>
-          <a:p>
-            <a:r>
-              <a:rPr lang="en-US" dirty="0" err="1" smtClean="0"/>
-              <a:t>Gmacs</a:t>
-            </a:r>
-            <a:r>
-              <a:rPr lang="en-US" dirty="0" smtClean="0"/>
-              <a:t> in progress</a:t>
-            </a:r>
-            <a:endParaRPr lang="en-NZ" dirty="0"/>
-          </a:p>
-        </p:txBody>
-      </p:sp>
-      <p:sp>
-        <p:nvSpPr>
-          <p:cNvPr id="3" name="Content Placeholder 2"/>
-          <p:cNvSpPr>
-            <a:spLocks noGrp="1"/>
-          </p:cNvSpPr>
-          <p:nvPr>
-            <p:ph idx="1"/>
-          </p:nvPr>
-        </p:nvSpPr>
-        <p:spPr/>
-        <p:txBody>
-          <a:bodyPr>
-            <a:normAutofit fontScale="92500" lnSpcReduction="20000"/>
-          </a:bodyPr>
-          <a:lstStyle/>
-          <a:p>
-            <a:r>
-              <a:rPr lang="en-US" dirty="0" smtClean="0"/>
-              <a:t>Equilibrium numbers at length</a:t>
-            </a:r>
-          </a:p>
-          <a:p>
-            <a:pPr lvl="1"/>
-            <a:r>
-              <a:rPr lang="en-US" dirty="0" smtClean="0"/>
-              <a:t>Broke when seasonal changes added, can’t use the elegant solutions anymore</a:t>
-            </a:r>
-          </a:p>
-          <a:p>
-            <a:pPr lvl="1"/>
-            <a:r>
-              <a:rPr lang="en-US" dirty="0" smtClean="0"/>
-              <a:t>Not required for SMBKC as we estimate initial numbers as free parameters</a:t>
-            </a:r>
-          </a:p>
-          <a:p>
-            <a:pPr lvl="1"/>
-            <a:r>
-              <a:rPr lang="en-US" dirty="0" smtClean="0"/>
-              <a:t>The new function is complete but yet to be put in the right places</a:t>
-            </a:r>
-          </a:p>
-          <a:p>
-            <a:r>
-              <a:rPr lang="en-US" dirty="0" smtClean="0"/>
-              <a:t>SPR calculations</a:t>
-            </a:r>
-          </a:p>
-          <a:p>
-            <a:pPr lvl="1"/>
-            <a:r>
-              <a:rPr lang="en-US" dirty="0" smtClean="0"/>
-              <a:t>As above/requires equilibrium numbers</a:t>
-            </a:r>
-          </a:p>
-          <a:p>
-            <a:pPr lvl="1"/>
-            <a:r>
-              <a:rPr lang="en-US" dirty="0" smtClean="0"/>
-              <a:t>Probably only a day or two of work but I fell asleep yesterday</a:t>
-            </a:r>
-          </a:p>
-          <a:p>
-            <a:r>
-              <a:rPr lang="en-US" dirty="0" smtClean="0"/>
-              <a:t>Began retrospective code</a:t>
-            </a:r>
-          </a:p>
-          <a:p>
-            <a:r>
-              <a:rPr lang="en-US" dirty="0" smtClean="0"/>
-              <a:t>BBRKC model</a:t>
-            </a:r>
-          </a:p>
-          <a:p>
-            <a:pPr lvl="1"/>
-            <a:r>
-              <a:rPr lang="en-US" dirty="0" smtClean="0"/>
-              <a:t>Runs but as above</a:t>
-            </a:r>
-            <a:r>
-              <a:rPr lang="en-US" dirty="0"/>
-              <a:t>/requires equilibrium numbers</a:t>
-            </a:r>
-            <a:endParaRPr lang="en-NZ" dirty="0"/>
-          </a:p>
-        </p:txBody>
-      </p:sp>
-    </p:spTree>
-    <p:extLst>
-      <p:ext uri="{BB962C8B-B14F-4D97-AF65-F5344CB8AC3E}">
-        <p14:creationId xmlns:p14="http://schemas.microsoft.com/office/powerpoint/2010/main" val="939631492"/>
-      </p:ext>
-    </p:extLst>
-  </p:cSld>
-  <p:clrMapOvr>
-    <a:masterClrMapping/>
-  </p:clrMapOvr>
-</p:sld>
-</file>
-
-<file path=ppt/slides/slide4.xml><?xml version="1.0" encoding="utf-8"?>
-<p:sld xmlns:a="http://schemas.openxmlformats.org/drawingml/2006/main" xmlns:r="http://schemas.openxmlformats.org/officeDocument/2006/relationships" xmlns:p="http://schemas.openxmlformats.org/presentationml/2006/main">
-  <p:cSld>
-    <p:spTree>
-      <p:nvGrpSpPr>
-        <p:cNvPr id="1" name=""/>
-        <p:cNvGrpSpPr/>
-        <p:nvPr/>
-      </p:nvGrpSpPr>
-      <p:grpSpPr>
-        <a:xfrm>
-          <a:off x="0" y="0"/>
-          <a:ext cx="0" cy="0"/>
-          <a:chOff x="0" y="0"/>
-          <a:chExt cx="0" cy="0"/>
-        </a:xfrm>
-      </p:grpSpPr>
-      <p:sp>
-        <p:nvSpPr>
-          <p:cNvPr id="2" name="Title 1"/>
-          <p:cNvSpPr>
-            <a:spLocks noGrp="1"/>
-          </p:cNvSpPr>
-          <p:nvPr>
-            <p:ph type="title"/>
-          </p:nvPr>
-        </p:nvSpPr>
-        <p:spPr/>
-        <p:txBody>
-          <a:bodyPr/>
-          <a:lstStyle/>
-          <a:p>
-            <a:r>
-              <a:rPr lang="en-US" dirty="0" smtClean="0"/>
-              <a:t>SMBKC in </a:t>
-            </a:r>
-            <a:r>
-              <a:rPr lang="en-US" dirty="0" err="1" smtClean="0"/>
-              <a:t>Gmacs</a:t>
-            </a:r>
-            <a:endParaRPr lang="en-NZ" dirty="0"/>
-          </a:p>
-        </p:txBody>
-      </p:sp>
-      <p:sp>
-        <p:nvSpPr>
-          <p:cNvPr id="3" name="Content Placeholder 2"/>
-          <p:cNvSpPr>
-            <a:spLocks noGrp="1"/>
-          </p:cNvSpPr>
-          <p:nvPr>
-            <p:ph idx="1"/>
-          </p:nvPr>
-        </p:nvSpPr>
-        <p:spPr/>
-        <p:txBody>
-          <a:bodyPr>
-            <a:normAutofit fontScale="92500" lnSpcReduction="20000"/>
-          </a:bodyPr>
-          <a:lstStyle/>
-          <a:p>
-            <a:r>
-              <a:rPr lang="en-US" dirty="0" smtClean="0"/>
-              <a:t>1978-2015</a:t>
-            </a:r>
-          </a:p>
-          <a:p>
-            <a:r>
-              <a:rPr lang="en-US" dirty="0" smtClean="0"/>
-              <a:t>4 seasons (M = 0, 0.44, 0.185, 0.375)</a:t>
-            </a:r>
-          </a:p>
-          <a:p>
-            <a:r>
-              <a:rPr lang="en-US" dirty="0" smtClean="0"/>
-              <a:t>3 </a:t>
-            </a:r>
-            <a:r>
-              <a:rPr lang="en-US" dirty="0"/>
-              <a:t>stages </a:t>
-            </a:r>
-            <a:r>
-              <a:rPr lang="en-US" dirty="0" smtClean="0"/>
-              <a:t>(90-104, 105-119, 120+)</a:t>
-            </a:r>
-            <a:endParaRPr lang="en-US" dirty="0"/>
-          </a:p>
-          <a:p>
-            <a:r>
-              <a:rPr lang="en-US" dirty="0"/>
-              <a:t>1 sex, 1 shell type, 1 maturity class</a:t>
-            </a:r>
-          </a:p>
-          <a:p>
-            <a:r>
-              <a:rPr lang="en-US" dirty="0" smtClean="0"/>
-              <a:t>3 </a:t>
-            </a:r>
-            <a:r>
-              <a:rPr lang="en-US" dirty="0" smtClean="0"/>
-              <a:t>fleets (pot</a:t>
-            </a:r>
-            <a:r>
-              <a:rPr lang="en-US" dirty="0"/>
-              <a:t>, trawl </a:t>
-            </a:r>
-            <a:r>
-              <a:rPr lang="en-US" dirty="0" err="1"/>
-              <a:t>bycatch</a:t>
-            </a:r>
-            <a:r>
-              <a:rPr lang="en-US" dirty="0"/>
-              <a:t>, fixed </a:t>
-            </a:r>
-            <a:r>
-              <a:rPr lang="en-US" dirty="0" err="1" smtClean="0"/>
-              <a:t>bycatch</a:t>
-            </a:r>
-            <a:r>
-              <a:rPr lang="en-US" dirty="0" smtClean="0"/>
-              <a:t>)</a:t>
-            </a:r>
-            <a:endParaRPr lang="en-US" dirty="0"/>
-          </a:p>
-          <a:p>
-            <a:r>
-              <a:rPr lang="en-US" dirty="0"/>
-              <a:t>2 surveys (NMFS trawl and ADF&amp;G </a:t>
-            </a:r>
-            <a:r>
-              <a:rPr lang="en-US" dirty="0" smtClean="0"/>
-              <a:t>pot CPUE) </a:t>
-            </a:r>
-            <a:r>
-              <a:rPr lang="en-US" dirty="0"/>
-              <a:t>both in season 1</a:t>
-            </a:r>
-          </a:p>
-          <a:p>
-            <a:r>
-              <a:rPr lang="en-US" dirty="0" smtClean="0"/>
-              <a:t>4 catch types (directed pot, pot discards, trawl </a:t>
-            </a:r>
-            <a:r>
-              <a:rPr lang="en-US" dirty="0" err="1" smtClean="0"/>
-              <a:t>bycatch</a:t>
-            </a:r>
-            <a:r>
-              <a:rPr lang="en-US" dirty="0" smtClean="0"/>
-              <a:t>, fixed </a:t>
-            </a:r>
-            <a:r>
-              <a:rPr lang="en-US" dirty="0" err="1" smtClean="0"/>
-              <a:t>bycatch</a:t>
-            </a:r>
-            <a:r>
-              <a:rPr lang="en-US" dirty="0" smtClean="0"/>
-              <a:t>) all during season 2</a:t>
-            </a:r>
-          </a:p>
-          <a:p>
-            <a:r>
-              <a:rPr lang="en-US" dirty="0" smtClean="0"/>
-              <a:t>3 size compositions (pot </a:t>
-            </a:r>
-            <a:r>
-              <a:rPr lang="en-US" dirty="0" smtClean="0"/>
-              <a:t>in season </a:t>
-            </a:r>
-            <a:r>
-              <a:rPr lang="en-US" dirty="0" smtClean="0"/>
-              <a:t>2, NMFS trawl </a:t>
-            </a:r>
-            <a:r>
-              <a:rPr lang="en-US" dirty="0" smtClean="0"/>
-              <a:t>in season </a:t>
-            </a:r>
-            <a:r>
-              <a:rPr lang="en-US" dirty="0" smtClean="0"/>
-              <a:t>1, ADF&amp;G pot </a:t>
-            </a:r>
-            <a:r>
-              <a:rPr lang="en-US" dirty="0" smtClean="0"/>
-              <a:t>in season </a:t>
-            </a:r>
-            <a:r>
-              <a:rPr lang="en-US" dirty="0" smtClean="0"/>
-              <a:t>1)</a:t>
-            </a:r>
-            <a:endParaRPr lang="en-NZ" dirty="0"/>
-          </a:p>
-        </p:txBody>
-      </p:sp>
-    </p:spTree>
-    <p:extLst>
-      <p:ext uri="{BB962C8B-B14F-4D97-AF65-F5344CB8AC3E}">
-        <p14:creationId xmlns:p14="http://schemas.microsoft.com/office/powerpoint/2010/main" val="3508581728"/>
-      </p:ext>
-    </p:extLst>
-  </p:cSld>
-  <p:clrMapOvr>
-    <a:masterClrMapping/>
-  </p:clrMapOvr>
-</p:sld>
-</file>
-
-<file path=ppt/slides/slide5.xml><?xml version="1.0" encoding="utf-8"?>
-<p:sld xmlns:a="http://schemas.openxmlformats.org/drawingml/2006/main" xmlns:r="http://schemas.openxmlformats.org/officeDocument/2006/relationships" xmlns:p="http://schemas.openxmlformats.org/presentationml/2006/main">
-  <p:cSld>
-    <p:spTree>
-      <p:nvGrpSpPr>
-        <p:cNvPr id="1" name=""/>
-        <p:cNvGrpSpPr/>
-        <p:nvPr/>
-      </p:nvGrpSpPr>
-      <p:grpSpPr>
-        <a:xfrm>
-          <a:off x="0" y="0"/>
-          <a:ext cx="0" cy="0"/>
-          <a:chOff x="0" y="0"/>
-          <a:chExt cx="0" cy="0"/>
-        </a:xfrm>
-      </p:grpSpPr>
-      <p:sp>
-        <p:nvSpPr>
-          <p:cNvPr id="2" name="Title 1"/>
-          <p:cNvSpPr>
-            <a:spLocks noGrp="1"/>
-          </p:cNvSpPr>
-          <p:nvPr>
-            <p:ph type="title"/>
-          </p:nvPr>
-        </p:nvSpPr>
-        <p:spPr/>
-        <p:txBody>
-          <a:bodyPr/>
-          <a:lstStyle/>
-          <a:p>
-            <a:r>
-              <a:rPr lang="en-US" dirty="0" smtClean="0"/>
-              <a:t>SMBKC dynamics</a:t>
-            </a:r>
-            <a:endParaRPr lang="en-NZ" dirty="0"/>
-          </a:p>
-        </p:txBody>
-      </p:sp>
-      <p:sp>
-        <p:nvSpPr>
-          <p:cNvPr id="3" name="Content Placeholder 2"/>
-          <p:cNvSpPr>
-            <a:spLocks noGrp="1"/>
-          </p:cNvSpPr>
-          <p:nvPr>
-            <p:ph idx="1"/>
-          </p:nvPr>
-        </p:nvSpPr>
-        <p:spPr/>
-        <p:txBody>
-          <a:bodyPr>
-            <a:normAutofit fontScale="92500" lnSpcReduction="20000"/>
-          </a:bodyPr>
-          <a:lstStyle/>
-          <a:p>
-            <a:r>
-              <a:rPr lang="en-US" dirty="0" smtClean="0"/>
-              <a:t>Season 1</a:t>
-            </a:r>
-          </a:p>
-          <a:p>
-            <a:pPr lvl="1"/>
-            <a:r>
-              <a:rPr lang="en-US" dirty="0" smtClean="0"/>
-              <a:t>1 July, start of fishing year</a:t>
-            </a:r>
-          </a:p>
-          <a:p>
-            <a:pPr lvl="1"/>
-            <a:r>
-              <a:rPr lang="en-US" dirty="0" smtClean="0"/>
-              <a:t>Surveys</a:t>
-            </a:r>
-          </a:p>
-          <a:p>
-            <a:r>
-              <a:rPr lang="en-US" dirty="0" smtClean="0"/>
-              <a:t>Season 2</a:t>
-            </a:r>
-          </a:p>
-          <a:p>
-            <a:pPr lvl="1"/>
-            <a:r>
-              <a:rPr lang="en-US" dirty="0" smtClean="0"/>
-              <a:t>M=0.44 &amp; catch</a:t>
-            </a:r>
-          </a:p>
-          <a:p>
-            <a:r>
-              <a:rPr lang="en-US" dirty="0" smtClean="0"/>
-              <a:t>Season 3</a:t>
-            </a:r>
-          </a:p>
-          <a:p>
-            <a:pPr lvl="1"/>
-            <a:r>
-              <a:rPr lang="en-US" dirty="0" smtClean="0"/>
-              <a:t>M=0.185</a:t>
-            </a:r>
-          </a:p>
-          <a:p>
-            <a:pPr lvl="1"/>
-            <a:r>
-              <a:rPr lang="en-US" dirty="0" smtClean="0"/>
-              <a:t>Calculate MMB</a:t>
-            </a:r>
-          </a:p>
-          <a:p>
-            <a:r>
-              <a:rPr lang="en-US" dirty="0" smtClean="0"/>
-              <a:t>Season 4</a:t>
-            </a:r>
-          </a:p>
-          <a:p>
-            <a:pPr lvl="1"/>
-            <a:r>
-              <a:rPr lang="en-US" dirty="0" smtClean="0"/>
-              <a:t>M=0.375</a:t>
-            </a:r>
-          </a:p>
-          <a:p>
-            <a:pPr lvl="1"/>
-            <a:r>
-              <a:rPr lang="en-US" dirty="0" smtClean="0"/>
-              <a:t>Growth and molting</a:t>
-            </a:r>
-          </a:p>
-          <a:p>
-            <a:pPr lvl="1"/>
-            <a:r>
-              <a:rPr lang="en-US" dirty="0" smtClean="0"/>
-              <a:t>Recruitment (all to stage-1)</a:t>
-            </a:r>
-            <a:endParaRPr lang="en-NZ" dirty="0"/>
-          </a:p>
-        </p:txBody>
-      </p:sp>
-    </p:spTree>
-    <p:extLst>
-      <p:ext uri="{BB962C8B-B14F-4D97-AF65-F5344CB8AC3E}">
-        <p14:creationId xmlns:p14="http://schemas.microsoft.com/office/powerpoint/2010/main" val="26533852"/>
-      </p:ext>
-    </p:extLst>
-  </p:cSld>
-  <p:clrMapOvr>
-    <a:masterClrMapping/>
-  </p:clrMapOvr>
-</p:sld>
-</file>
-
-<file path=ppt/slides/slide6.xml><?xml version="1.0" encoding="utf-8"?>
-<p:sld xmlns:a="http://schemas.openxmlformats.org/drawingml/2006/main" xmlns:r="http://schemas.openxmlformats.org/officeDocument/2006/relationships" xmlns:p="http://schemas.openxmlformats.org/presentationml/2006/main">
-  <p:cSld>
-    <p:spTree>
-      <p:nvGrpSpPr>
-        <p:cNvPr id="1" name=""/>
-        <p:cNvGrpSpPr/>
-        <p:nvPr/>
-      </p:nvGrpSpPr>
-      <p:grpSpPr>
-        <a:xfrm>
-          <a:off x="0" y="0"/>
-          <a:ext cx="0" cy="0"/>
-          <a:chOff x="0" y="0"/>
-          <a:chExt cx="0" cy="0"/>
-        </a:xfrm>
-      </p:grpSpPr>
-      <p:sp>
-        <p:nvSpPr>
-          <p:cNvPr id="2" name="Title 1"/>
-          <p:cNvSpPr>
-            <a:spLocks noGrp="1"/>
-          </p:cNvSpPr>
-          <p:nvPr>
-            <p:ph type="title"/>
-          </p:nvPr>
-        </p:nvSpPr>
-        <p:spPr/>
-        <p:txBody>
-          <a:bodyPr/>
-          <a:lstStyle/>
-          <a:p>
-            <a:r>
-              <a:rPr lang="en-US" dirty="0" smtClean="0"/>
-              <a:t>Da</a:t>
-            </a:r>
-            <a:r>
-              <a:rPr lang="en-US" dirty="0" smtClean="0"/>
-              <a:t>ta</a:t>
-            </a:r>
-            <a:endParaRPr lang="en-NZ" dirty="0"/>
-          </a:p>
-        </p:txBody>
-      </p:sp>
-      <p:pic>
-        <p:nvPicPr>
-          <p:cNvPr id="4" name="Content Placeholder 3"/>
-          <p:cNvPicPr>
-            <a:picLocks noGrp="1" noChangeAspect="1"/>
-          </p:cNvPicPr>
-          <p:nvPr>
-            <p:ph idx="1"/>
-          </p:nvPr>
-        </p:nvPicPr>
-        <p:blipFill rotWithShape="1">
-          <a:blip r:embed="rId2">
-            <a:extLst>
-              <a:ext uri="{28A0092B-C50C-407E-A947-70E740481C1C}">
-                <a14:useLocalDpi xmlns:a14="http://schemas.microsoft.com/office/drawing/2010/main" val="0"/>
-              </a:ext>
-            </a:extLst>
-          </a:blip>
-          <a:srcRect t="8787"/>
-          <a:stretch/>
-        </p:blipFill>
-        <p:spPr>
-          <a:xfrm>
-            <a:off x="1" y="1639023"/>
-            <a:ext cx="9144000" cy="4865298"/>
-          </a:xfrm>
-        </p:spPr>
-      </p:pic>
-    </p:spTree>
-    <p:extLst>
-      <p:ext uri="{BB962C8B-B14F-4D97-AF65-F5344CB8AC3E}">
-        <p14:creationId xmlns:p14="http://schemas.microsoft.com/office/powerpoint/2010/main" val="1030929791"/>
-      </p:ext>
-    </p:extLst>
-  </p:cSld>
-  <p:clrMapOvr>
-    <a:masterClrMapping/>
-  </p:clrMapOvr>
-</p:sld>
-</file>
-
-<file path=ppt/slides/slide7.xml><?xml version="1.0" encoding="utf-8"?>
 <p:sld xmlns:a="http://schemas.openxmlformats.org/drawingml/2006/main" xmlns:r="http://schemas.openxmlformats.org/officeDocument/2006/relationships" xmlns:p="http://schemas.openxmlformats.org/presentationml/2006/main">
   <p:cSld>
     <p:spTree>
@@ -5307,7 +3202,7 @@
 </p:sld>
 </file>
 
-<file path=ppt/slides/slide8.xml><?xml version="1.0" encoding="utf-8"?>
+<file path=ppt/slides/slide11.xml><?xml version="1.0" encoding="utf-8"?>
 <p:sld xmlns:a="http://schemas.openxmlformats.org/drawingml/2006/main" xmlns:r="http://schemas.openxmlformats.org/officeDocument/2006/relationships" xmlns:p="http://schemas.openxmlformats.org/presentationml/2006/main">
   <p:cSld>
     <p:spTree>
@@ -5367,7 +3262,7 @@
             </a:pPr>
             <a:r>
               <a:rPr lang="en-US" dirty="0" smtClean="0"/>
-              <a:t>See document</a:t>
+              <a:t>Jump to document</a:t>
             </a:r>
             <a:endParaRPr lang="en-NZ" dirty="0"/>
           </a:p>
@@ -5386,7 +3281,104 @@
 </p:sld>
 </file>
 
-<file path=ppt/slides/slide9.xml><?xml version="1.0" encoding="utf-8"?>
+<file path=ppt/slides/slide12.xml><?xml version="1.0" encoding="utf-8"?>
+<p:sld xmlns:a="http://schemas.openxmlformats.org/drawingml/2006/main" xmlns:r="http://schemas.openxmlformats.org/officeDocument/2006/relationships" xmlns:p="http://schemas.openxmlformats.org/presentationml/2006/main">
+  <p:cSld>
+    <p:spTree>
+      <p:nvGrpSpPr>
+        <p:cNvPr id="1" name=""/>
+        <p:cNvGrpSpPr/>
+        <p:nvPr/>
+      </p:nvGrpSpPr>
+      <p:grpSpPr>
+        <a:xfrm>
+          <a:off x="0" y="0"/>
+          <a:ext cx="0" cy="0"/>
+          <a:chOff x="0" y="0"/>
+          <a:chExt cx="0" cy="0"/>
+        </a:xfrm>
+      </p:grpSpPr>
+      <p:sp>
+        <p:nvSpPr>
+          <p:cNvPr id="2" name="Title 1"/>
+          <p:cNvSpPr>
+            <a:spLocks noGrp="1"/>
+          </p:cNvSpPr>
+          <p:nvPr>
+            <p:ph type="title"/>
+          </p:nvPr>
+        </p:nvSpPr>
+        <p:spPr/>
+        <p:txBody>
+          <a:bodyPr/>
+          <a:lstStyle/>
+          <a:p>
+            <a:r>
+              <a:rPr lang="en-US" dirty="0" smtClean="0"/>
+              <a:t>What else would people like to see?</a:t>
+            </a:r>
+            <a:endParaRPr lang="en-NZ" dirty="0"/>
+          </a:p>
+        </p:txBody>
+      </p:sp>
+      <p:sp>
+        <p:nvSpPr>
+          <p:cNvPr id="3" name="Content Placeholder 2"/>
+          <p:cNvSpPr>
+            <a:spLocks noGrp="1"/>
+          </p:cNvSpPr>
+          <p:nvPr>
+            <p:ph idx="1"/>
+          </p:nvPr>
+        </p:nvSpPr>
+        <p:spPr/>
+        <p:txBody>
+          <a:bodyPr/>
+          <a:lstStyle/>
+          <a:p>
+            <a:r>
+              <a:rPr lang="en-US" dirty="0" smtClean="0"/>
+              <a:t>Model runs:</a:t>
+            </a:r>
+          </a:p>
+          <a:p>
+            <a:pPr lvl="1"/>
+            <a:r>
+              <a:rPr lang="en-US" dirty="0" smtClean="0"/>
+              <a:t>Estimate M</a:t>
+            </a:r>
+            <a:r>
+              <a:rPr lang="en-US" baseline="-25000" dirty="0" smtClean="0"/>
+              <a:t>1998</a:t>
+            </a:r>
+            <a:r>
+              <a:rPr lang="en-US" dirty="0" smtClean="0"/>
+              <a:t> but with smaller SD constraining random-walk?</a:t>
+            </a:r>
+          </a:p>
+          <a:p>
+            <a:r>
+              <a:rPr lang="en-US" dirty="0" smtClean="0"/>
+              <a:t>Plots…</a:t>
+            </a:r>
+            <a:endParaRPr lang="en-NZ" dirty="0"/>
+          </a:p>
+        </p:txBody>
+      </p:sp>
+    </p:spTree>
+    <p:extLst>
+      <p:ext uri="{BB962C8B-B14F-4D97-AF65-F5344CB8AC3E}">
+        <p14:creationId xmlns:p14="http://schemas.microsoft.com/office/powerpoint/2010/main" val="334652935"/>
+      </p:ext>
+    </p:extLst>
+  </p:cSld>
+  <p:clrMapOvr>
+    <a:masterClrMapping/>
+  </p:clrMapOvr>
+</p:sld>
+</file>
+
+<file path=ppt/slides/slide13.xml><?xml version="1.0" encoding="utf-8"?>
 <p:sld xmlns:a="http://schemas.openxmlformats.org/drawingml/2006/main" xmlns:r="http://schemas.openxmlformats.org/officeDocument/2006/relationships" xmlns:p="http://schemas.openxmlformats.org/presentationml/2006/main">
   <p:cSld>
     <p:spTree>
@@ -5545,6 +3537,2365 @@
     <p:extLst>
       <p:ext uri="{BB962C8B-B14F-4D97-AF65-F5344CB8AC3E}">
         <p14:creationId xmlns:p14="http://schemas.microsoft.com/office/powerpoint/2010/main" val="2921751489"/>
+      </p:ext>
+    </p:extLst>
+  </p:cSld>
+  <p:clrMapOvr>
+    <a:masterClrMapping/>
+  </p:clrMapOvr>
+</p:sld>
+</file>
+
+<file path=ppt/slides/slide14.xml><?xml version="1.0" encoding="utf-8"?>
+<p:sld xmlns:a="http://schemas.openxmlformats.org/drawingml/2006/main" xmlns:r="http://schemas.openxmlformats.org/officeDocument/2006/relationships" xmlns:p="http://schemas.openxmlformats.org/presentationml/2006/main">
+  <p:cSld>
+    <p:spTree>
+      <p:nvGrpSpPr>
+        <p:cNvPr id="1" name=""/>
+        <p:cNvGrpSpPr/>
+        <p:nvPr/>
+      </p:nvGrpSpPr>
+      <p:grpSpPr>
+        <a:xfrm>
+          <a:off x="0" y="0"/>
+          <a:ext cx="0" cy="0"/>
+          <a:chOff x="0" y="0"/>
+          <a:chExt cx="0" cy="0"/>
+        </a:xfrm>
+      </p:grpSpPr>
+      <p:sp>
+        <p:nvSpPr>
+          <p:cNvPr id="2" name="Title 1"/>
+          <p:cNvSpPr>
+            <a:spLocks noGrp="1"/>
+          </p:cNvSpPr>
+          <p:nvPr>
+            <p:ph type="title"/>
+          </p:nvPr>
+        </p:nvSpPr>
+        <p:spPr/>
+        <p:txBody>
+          <a:bodyPr/>
+          <a:lstStyle/>
+          <a:p>
+            <a:endParaRPr lang="en-NZ" dirty="0"/>
+          </a:p>
+        </p:txBody>
+      </p:sp>
+      <p:pic>
+        <p:nvPicPr>
+          <p:cNvPr id="4" name="Content Placeholder 3"/>
+          <p:cNvPicPr>
+            <a:picLocks noGrp="1" noChangeAspect="1"/>
+          </p:cNvPicPr>
+          <p:nvPr>
+            <p:ph idx="1"/>
+          </p:nvPr>
+        </p:nvPicPr>
+        <p:blipFill>
+          <a:blip r:embed="rId2">
+            <a:extLst>
+              <a:ext uri="{28A0092B-C50C-407E-A947-70E740481C1C}">
+                <a14:useLocalDpi xmlns:a14="http://schemas.microsoft.com/office/drawing/2010/main" val="0"/>
+              </a:ext>
+            </a:extLst>
+          </a:blip>
+          <a:stretch>
+            <a:fillRect/>
+          </a:stretch>
+        </p:blipFill>
+        <p:spPr>
+          <a:xfrm>
+            <a:off x="2493034" y="103967"/>
+            <a:ext cx="6650966" cy="6650966"/>
+          </a:xfrm>
+        </p:spPr>
+      </p:pic>
+    </p:spTree>
+    <p:extLst>
+      <p:ext uri="{BB962C8B-B14F-4D97-AF65-F5344CB8AC3E}">
+        <p14:creationId xmlns:p14="http://schemas.microsoft.com/office/powerpoint/2010/main" val="2388954811"/>
+      </p:ext>
+    </p:extLst>
+  </p:cSld>
+  <p:clrMapOvr>
+    <a:masterClrMapping/>
+  </p:clrMapOvr>
+</p:sld>
+</file>
+
+<file path=ppt/slides/slide15.xml><?xml version="1.0" encoding="utf-8"?>
+<p:sld xmlns:a="http://schemas.openxmlformats.org/drawingml/2006/main" xmlns:r="http://schemas.openxmlformats.org/officeDocument/2006/relationships" xmlns:p="http://schemas.openxmlformats.org/presentationml/2006/main">
+  <p:cSld>
+    <p:spTree>
+      <p:nvGrpSpPr>
+        <p:cNvPr id="1" name=""/>
+        <p:cNvGrpSpPr/>
+        <p:nvPr/>
+      </p:nvGrpSpPr>
+      <p:grpSpPr>
+        <a:xfrm>
+          <a:off x="0" y="0"/>
+          <a:ext cx="0" cy="0"/>
+          <a:chOff x="0" y="0"/>
+          <a:chExt cx="0" cy="0"/>
+        </a:xfrm>
+      </p:grpSpPr>
+      <p:sp>
+        <p:nvSpPr>
+          <p:cNvPr id="2" name="Title 1"/>
+          <p:cNvSpPr>
+            <a:spLocks noGrp="1"/>
+          </p:cNvSpPr>
+          <p:nvPr>
+            <p:ph type="title"/>
+          </p:nvPr>
+        </p:nvSpPr>
+        <p:spPr/>
+        <p:txBody>
+          <a:bodyPr/>
+          <a:lstStyle/>
+          <a:p>
+            <a:endParaRPr lang="en-NZ"/>
+          </a:p>
+        </p:txBody>
+      </p:sp>
+      <p:pic>
+        <p:nvPicPr>
+          <p:cNvPr id="4" name="Content Placeholder 3"/>
+          <p:cNvPicPr>
+            <a:picLocks noGrp="1" noChangeAspect="1"/>
+          </p:cNvPicPr>
+          <p:nvPr>
+            <p:ph idx="1"/>
+          </p:nvPr>
+        </p:nvPicPr>
+        <p:blipFill>
+          <a:blip r:embed="rId2">
+            <a:extLst>
+              <a:ext uri="{28A0092B-C50C-407E-A947-70E740481C1C}">
+                <a14:useLocalDpi xmlns:a14="http://schemas.microsoft.com/office/drawing/2010/main" val="0"/>
+              </a:ext>
+            </a:extLst>
+          </a:blip>
+          <a:stretch>
+            <a:fillRect/>
+          </a:stretch>
+        </p:blipFill>
+        <p:spPr>
+          <a:xfrm>
+            <a:off x="0" y="1523999"/>
+            <a:ext cx="9144000" cy="5334001"/>
+          </a:xfrm>
+        </p:spPr>
+      </p:pic>
+    </p:spTree>
+    <p:extLst>
+      <p:ext uri="{BB962C8B-B14F-4D97-AF65-F5344CB8AC3E}">
+        <p14:creationId xmlns:p14="http://schemas.microsoft.com/office/powerpoint/2010/main" val="3657479237"/>
+      </p:ext>
+    </p:extLst>
+  </p:cSld>
+  <p:clrMapOvr>
+    <a:masterClrMapping/>
+  </p:clrMapOvr>
+</p:sld>
+</file>
+
+<file path=ppt/slides/slide16.xml><?xml version="1.0" encoding="utf-8"?>
+<p:sld xmlns:a="http://schemas.openxmlformats.org/drawingml/2006/main" xmlns:r="http://schemas.openxmlformats.org/officeDocument/2006/relationships" xmlns:p="http://schemas.openxmlformats.org/presentationml/2006/main">
+  <p:cSld>
+    <p:spTree>
+      <p:nvGrpSpPr>
+        <p:cNvPr id="1" name=""/>
+        <p:cNvGrpSpPr/>
+        <p:nvPr/>
+      </p:nvGrpSpPr>
+      <p:grpSpPr>
+        <a:xfrm>
+          <a:off x="0" y="0"/>
+          <a:ext cx="0" cy="0"/>
+          <a:chOff x="0" y="0"/>
+          <a:chExt cx="0" cy="0"/>
+        </a:xfrm>
+      </p:grpSpPr>
+      <p:sp>
+        <p:nvSpPr>
+          <p:cNvPr id="2" name="Title 1"/>
+          <p:cNvSpPr>
+            <a:spLocks noGrp="1"/>
+          </p:cNvSpPr>
+          <p:nvPr>
+            <p:ph type="title"/>
+          </p:nvPr>
+        </p:nvSpPr>
+        <p:spPr/>
+        <p:txBody>
+          <a:bodyPr/>
+          <a:lstStyle/>
+          <a:p>
+            <a:endParaRPr lang="en-NZ"/>
+          </a:p>
+        </p:txBody>
+      </p:sp>
+      <p:pic>
+        <p:nvPicPr>
+          <p:cNvPr id="4" name="Content Placeholder 3"/>
+          <p:cNvPicPr>
+            <a:picLocks noGrp="1" noChangeAspect="1"/>
+          </p:cNvPicPr>
+          <p:nvPr>
+            <p:ph idx="1"/>
+          </p:nvPr>
+        </p:nvPicPr>
+        <p:blipFill>
+          <a:blip r:embed="rId2">
+            <a:extLst>
+              <a:ext uri="{28A0092B-C50C-407E-A947-70E740481C1C}">
+                <a14:useLocalDpi xmlns:a14="http://schemas.microsoft.com/office/drawing/2010/main" val="0"/>
+              </a:ext>
+            </a:extLst>
+          </a:blip>
+          <a:stretch>
+            <a:fillRect/>
+          </a:stretch>
+        </p:blipFill>
+        <p:spPr>
+          <a:xfrm>
+            <a:off x="0" y="1523999"/>
+            <a:ext cx="9144000" cy="5334001"/>
+          </a:xfrm>
+        </p:spPr>
+      </p:pic>
+    </p:spTree>
+    <p:extLst>
+      <p:ext uri="{BB962C8B-B14F-4D97-AF65-F5344CB8AC3E}">
+        <p14:creationId xmlns:p14="http://schemas.microsoft.com/office/powerpoint/2010/main" val="2727842710"/>
+      </p:ext>
+    </p:extLst>
+  </p:cSld>
+  <p:clrMapOvr>
+    <a:masterClrMapping/>
+  </p:clrMapOvr>
+</p:sld>
+</file>
+
+<file path=ppt/slides/slide17.xml><?xml version="1.0" encoding="utf-8"?>
+<p:sld xmlns:a="http://schemas.openxmlformats.org/drawingml/2006/main" xmlns:r="http://schemas.openxmlformats.org/officeDocument/2006/relationships" xmlns:p="http://schemas.openxmlformats.org/presentationml/2006/main">
+  <p:cSld>
+    <p:spTree>
+      <p:nvGrpSpPr>
+        <p:cNvPr id="1" name=""/>
+        <p:cNvGrpSpPr/>
+        <p:nvPr/>
+      </p:nvGrpSpPr>
+      <p:grpSpPr>
+        <a:xfrm>
+          <a:off x="0" y="0"/>
+          <a:ext cx="0" cy="0"/>
+          <a:chOff x="0" y="0"/>
+          <a:chExt cx="0" cy="0"/>
+        </a:xfrm>
+      </p:grpSpPr>
+      <p:sp>
+        <p:nvSpPr>
+          <p:cNvPr id="2" name="Title 1"/>
+          <p:cNvSpPr>
+            <a:spLocks noGrp="1"/>
+          </p:cNvSpPr>
+          <p:nvPr>
+            <p:ph type="title"/>
+          </p:nvPr>
+        </p:nvSpPr>
+        <p:spPr/>
+        <p:txBody>
+          <a:bodyPr/>
+          <a:lstStyle/>
+          <a:p>
+            <a:endParaRPr lang="en-NZ"/>
+          </a:p>
+        </p:txBody>
+      </p:sp>
+      <p:pic>
+        <p:nvPicPr>
+          <p:cNvPr id="4" name="Content Placeholder 3"/>
+          <p:cNvPicPr>
+            <a:picLocks noGrp="1" noChangeAspect="1"/>
+          </p:cNvPicPr>
+          <p:nvPr>
+            <p:ph idx="1"/>
+          </p:nvPr>
+        </p:nvPicPr>
+        <p:blipFill>
+          <a:blip r:embed="rId2">
+            <a:extLst>
+              <a:ext uri="{28A0092B-C50C-407E-A947-70E740481C1C}">
+                <a14:useLocalDpi xmlns:a14="http://schemas.microsoft.com/office/drawing/2010/main" val="0"/>
+              </a:ext>
+            </a:extLst>
+          </a:blip>
+          <a:stretch>
+            <a:fillRect/>
+          </a:stretch>
+        </p:blipFill>
+        <p:spPr>
+          <a:xfrm>
+            <a:off x="842282" y="1825625"/>
+            <a:ext cx="7459435" cy="4351338"/>
+          </a:xfrm>
+        </p:spPr>
+      </p:pic>
+    </p:spTree>
+    <p:extLst>
+      <p:ext uri="{BB962C8B-B14F-4D97-AF65-F5344CB8AC3E}">
+        <p14:creationId xmlns:p14="http://schemas.microsoft.com/office/powerpoint/2010/main" val="2495900732"/>
+      </p:ext>
+    </p:extLst>
+  </p:cSld>
+  <p:clrMapOvr>
+    <a:masterClrMapping/>
+  </p:clrMapOvr>
+</p:sld>
+</file>
+
+<file path=ppt/slides/slide18.xml><?xml version="1.0" encoding="utf-8"?>
+<p:sld xmlns:a="http://schemas.openxmlformats.org/drawingml/2006/main" xmlns:r="http://schemas.openxmlformats.org/officeDocument/2006/relationships" xmlns:p="http://schemas.openxmlformats.org/presentationml/2006/main">
+  <p:cSld>
+    <p:spTree>
+      <p:nvGrpSpPr>
+        <p:cNvPr id="1" name=""/>
+        <p:cNvGrpSpPr/>
+        <p:nvPr/>
+      </p:nvGrpSpPr>
+      <p:grpSpPr>
+        <a:xfrm>
+          <a:off x="0" y="0"/>
+          <a:ext cx="0" cy="0"/>
+          <a:chOff x="0" y="0"/>
+          <a:chExt cx="0" cy="0"/>
+        </a:xfrm>
+      </p:grpSpPr>
+      <p:sp>
+        <p:nvSpPr>
+          <p:cNvPr id="2" name="Title 1"/>
+          <p:cNvSpPr>
+            <a:spLocks noGrp="1"/>
+          </p:cNvSpPr>
+          <p:nvPr>
+            <p:ph type="title"/>
+          </p:nvPr>
+        </p:nvSpPr>
+        <p:spPr/>
+        <p:txBody>
+          <a:bodyPr/>
+          <a:lstStyle/>
+          <a:p>
+            <a:endParaRPr lang="en-NZ"/>
+          </a:p>
+        </p:txBody>
+      </p:sp>
+      <p:pic>
+        <p:nvPicPr>
+          <p:cNvPr id="4" name="Content Placeholder 3"/>
+          <p:cNvPicPr>
+            <a:picLocks noGrp="1" noChangeAspect="1"/>
+          </p:cNvPicPr>
+          <p:nvPr>
+            <p:ph idx="1"/>
+          </p:nvPr>
+        </p:nvPicPr>
+        <p:blipFill>
+          <a:blip r:embed="rId2">
+            <a:extLst>
+              <a:ext uri="{28A0092B-C50C-407E-A947-70E740481C1C}">
+                <a14:useLocalDpi xmlns:a14="http://schemas.microsoft.com/office/drawing/2010/main" val="0"/>
+              </a:ext>
+            </a:extLst>
+          </a:blip>
+          <a:stretch>
+            <a:fillRect/>
+          </a:stretch>
+        </p:blipFill>
+        <p:spPr>
+          <a:xfrm>
+            <a:off x="842282" y="1825625"/>
+            <a:ext cx="7459435" cy="4351338"/>
+          </a:xfrm>
+        </p:spPr>
+      </p:pic>
+    </p:spTree>
+    <p:extLst>
+      <p:ext uri="{BB962C8B-B14F-4D97-AF65-F5344CB8AC3E}">
+        <p14:creationId xmlns:p14="http://schemas.microsoft.com/office/powerpoint/2010/main" val="2974112269"/>
+      </p:ext>
+    </p:extLst>
+  </p:cSld>
+  <p:clrMapOvr>
+    <a:masterClrMapping/>
+  </p:clrMapOvr>
+</p:sld>
+</file>
+
+<file path=ppt/slides/slide19.xml><?xml version="1.0" encoding="utf-8"?>
+<p:sld xmlns:a="http://schemas.openxmlformats.org/drawingml/2006/main" xmlns:r="http://schemas.openxmlformats.org/officeDocument/2006/relationships" xmlns:p="http://schemas.openxmlformats.org/presentationml/2006/main">
+  <p:cSld>
+    <p:spTree>
+      <p:nvGrpSpPr>
+        <p:cNvPr id="1" name=""/>
+        <p:cNvGrpSpPr/>
+        <p:nvPr/>
+      </p:nvGrpSpPr>
+      <p:grpSpPr>
+        <a:xfrm>
+          <a:off x="0" y="0"/>
+          <a:ext cx="0" cy="0"/>
+          <a:chOff x="0" y="0"/>
+          <a:chExt cx="0" cy="0"/>
+        </a:xfrm>
+      </p:grpSpPr>
+      <p:sp>
+        <p:nvSpPr>
+          <p:cNvPr id="2" name="Title 1"/>
+          <p:cNvSpPr>
+            <a:spLocks noGrp="1"/>
+          </p:cNvSpPr>
+          <p:nvPr>
+            <p:ph type="title"/>
+          </p:nvPr>
+        </p:nvSpPr>
+        <p:spPr/>
+        <p:txBody>
+          <a:bodyPr/>
+          <a:lstStyle/>
+          <a:p>
+            <a:endParaRPr lang="en-NZ"/>
+          </a:p>
+        </p:txBody>
+      </p:sp>
+      <p:pic>
+        <p:nvPicPr>
+          <p:cNvPr id="4" name="Content Placeholder 3"/>
+          <p:cNvPicPr>
+            <a:picLocks noGrp="1" noChangeAspect="1"/>
+          </p:cNvPicPr>
+          <p:nvPr>
+            <p:ph idx="1"/>
+          </p:nvPr>
+        </p:nvPicPr>
+        <p:blipFill>
+          <a:blip r:embed="rId2" cstate="print">
+            <a:extLst>
+              <a:ext uri="{28A0092B-C50C-407E-A947-70E740481C1C}">
+                <a14:useLocalDpi xmlns:a14="http://schemas.microsoft.com/office/drawing/2010/main" val="0"/>
+              </a:ext>
+            </a:extLst>
+          </a:blip>
+          <a:stretch>
+            <a:fillRect/>
+          </a:stretch>
+        </p:blipFill>
+        <p:spPr>
+          <a:xfrm>
+            <a:off x="3795622" y="172528"/>
+            <a:ext cx="5348377" cy="6685472"/>
+          </a:xfrm>
+        </p:spPr>
+      </p:pic>
+    </p:spTree>
+    <p:extLst>
+      <p:ext uri="{BB962C8B-B14F-4D97-AF65-F5344CB8AC3E}">
+        <p14:creationId xmlns:p14="http://schemas.microsoft.com/office/powerpoint/2010/main" val="3326670117"/>
+      </p:ext>
+    </p:extLst>
+  </p:cSld>
+  <p:clrMapOvr>
+    <a:masterClrMapping/>
+  </p:clrMapOvr>
+</p:sld>
+</file>
+
+<file path=ppt/slides/slide2.xml><?xml version="1.0" encoding="utf-8"?>
+<p:sld xmlns:a="http://schemas.openxmlformats.org/drawingml/2006/main" xmlns:r="http://schemas.openxmlformats.org/officeDocument/2006/relationships" xmlns:p="http://schemas.openxmlformats.org/presentationml/2006/main">
+  <p:cSld>
+    <p:spTree>
+      <p:nvGrpSpPr>
+        <p:cNvPr id="1" name=""/>
+        <p:cNvGrpSpPr/>
+        <p:nvPr/>
+      </p:nvGrpSpPr>
+      <p:grpSpPr>
+        <a:xfrm>
+          <a:off x="0" y="0"/>
+          <a:ext cx="0" cy="0"/>
+          <a:chOff x="0" y="0"/>
+          <a:chExt cx="0" cy="0"/>
+        </a:xfrm>
+      </p:grpSpPr>
+      <p:sp>
+        <p:nvSpPr>
+          <p:cNvPr id="2" name="Title 1"/>
+          <p:cNvSpPr>
+            <a:spLocks noGrp="1"/>
+          </p:cNvSpPr>
+          <p:nvPr>
+            <p:ph type="title"/>
+          </p:nvPr>
+        </p:nvSpPr>
+        <p:spPr/>
+        <p:txBody>
+          <a:bodyPr/>
+          <a:lstStyle/>
+          <a:p>
+            <a:r>
+              <a:rPr lang="en-US" dirty="0" err="1" smtClean="0"/>
+              <a:t>Gmacs</a:t>
+            </a:r>
+            <a:r>
+              <a:rPr lang="en-US" dirty="0" smtClean="0"/>
+              <a:t> progress</a:t>
+            </a:r>
+            <a:endParaRPr lang="en-NZ" dirty="0"/>
+          </a:p>
+        </p:txBody>
+      </p:sp>
+      <p:sp>
+        <p:nvSpPr>
+          <p:cNvPr id="3" name="Content Placeholder 2"/>
+          <p:cNvSpPr>
+            <a:spLocks noGrp="1"/>
+          </p:cNvSpPr>
+          <p:nvPr>
+            <p:ph idx="1"/>
+          </p:nvPr>
+        </p:nvSpPr>
+        <p:spPr/>
+        <p:txBody>
+          <a:bodyPr>
+            <a:normAutofit fontScale="92500" lnSpcReduction="10000"/>
+          </a:bodyPr>
+          <a:lstStyle/>
+          <a:p>
+            <a:r>
+              <a:rPr lang="en-US" dirty="0" smtClean="0"/>
+              <a:t>Added seasons to </a:t>
+            </a:r>
+            <a:r>
+              <a:rPr lang="en-US" dirty="0" err="1" smtClean="0"/>
+              <a:t>Gmacs</a:t>
+            </a:r>
+            <a:r>
+              <a:rPr lang="en-US" dirty="0" smtClean="0"/>
+              <a:t> dynamics</a:t>
+            </a:r>
+          </a:p>
+          <a:p>
+            <a:pPr lvl="1"/>
+            <a:r>
+              <a:rPr lang="en-US" dirty="0" smtClean="0"/>
+              <a:t>Continuous </a:t>
+            </a:r>
+            <a:r>
+              <a:rPr lang="en-US" i="1" dirty="0" smtClean="0"/>
+              <a:t>M</a:t>
+            </a:r>
+            <a:r>
+              <a:rPr lang="en-US" dirty="0" smtClean="0"/>
+              <a:t>/</a:t>
+            </a:r>
+            <a:r>
+              <a:rPr lang="en-US" i="1" dirty="0" smtClean="0"/>
+              <a:t>F</a:t>
+            </a:r>
+            <a:r>
+              <a:rPr lang="en-US" dirty="0" smtClean="0"/>
+              <a:t> within seasons</a:t>
+            </a:r>
+            <a:endParaRPr lang="en-US" i="1" dirty="0"/>
+          </a:p>
+          <a:p>
+            <a:pPr lvl="1"/>
+            <a:r>
+              <a:rPr lang="en-US" dirty="0" smtClean="0"/>
+              <a:t>Number </a:t>
+            </a:r>
+            <a:r>
+              <a:rPr lang="en-US" dirty="0" smtClean="0"/>
+              <a:t>of seasons</a:t>
+            </a:r>
+          </a:p>
+          <a:p>
+            <a:pPr lvl="1"/>
+            <a:r>
+              <a:rPr lang="en-US" dirty="0" smtClean="0"/>
+              <a:t>Proportion of </a:t>
+            </a:r>
+            <a:r>
+              <a:rPr lang="en-US" i="1" dirty="0" smtClean="0"/>
+              <a:t>M</a:t>
+            </a:r>
+            <a:r>
+              <a:rPr lang="en-US" dirty="0" smtClean="0"/>
+              <a:t> each season</a:t>
+            </a:r>
+          </a:p>
+          <a:p>
+            <a:pPr lvl="1"/>
+            <a:r>
+              <a:rPr lang="en-US" dirty="0" smtClean="0"/>
+              <a:t>Season molting and </a:t>
+            </a:r>
+            <a:r>
+              <a:rPr lang="en-US" dirty="0" smtClean="0"/>
+              <a:t>growth occur</a:t>
+            </a:r>
+            <a:endParaRPr lang="en-US" dirty="0" smtClean="0"/>
+          </a:p>
+          <a:p>
+            <a:pPr lvl="1"/>
+            <a:r>
+              <a:rPr lang="en-US" dirty="0" smtClean="0"/>
+              <a:t>Season </a:t>
+            </a:r>
+            <a:r>
+              <a:rPr lang="en-US" dirty="0" smtClean="0"/>
+              <a:t>recruitment occurs</a:t>
+            </a:r>
+            <a:endParaRPr lang="en-US" dirty="0" smtClean="0"/>
+          </a:p>
+          <a:p>
+            <a:pPr lvl="1"/>
+            <a:r>
+              <a:rPr lang="en-US" dirty="0" smtClean="0"/>
+              <a:t>Season </a:t>
+            </a:r>
+            <a:r>
+              <a:rPr lang="en-US" dirty="0" smtClean="0"/>
+              <a:t>SSB is to be calculated</a:t>
+            </a:r>
+            <a:endParaRPr lang="en-US" dirty="0" smtClean="0"/>
+          </a:p>
+          <a:p>
+            <a:pPr lvl="1"/>
+            <a:r>
+              <a:rPr lang="en-US" dirty="0" smtClean="0"/>
+              <a:t>All </a:t>
+            </a:r>
+            <a:r>
+              <a:rPr lang="en-US" dirty="0" smtClean="0"/>
+              <a:t>data sets have a time stamp (season/year)</a:t>
+            </a:r>
+          </a:p>
+          <a:p>
+            <a:r>
+              <a:rPr lang="en-US" dirty="0" smtClean="0"/>
+              <a:t>Added option to initialize numbers as free parameters</a:t>
+            </a:r>
+          </a:p>
+          <a:p>
+            <a:r>
+              <a:rPr lang="en-US" dirty="0" smtClean="0"/>
+              <a:t>New plotting functions in </a:t>
+            </a:r>
+            <a:r>
+              <a:rPr lang="en-US" dirty="0" err="1" smtClean="0"/>
+              <a:t>gmr</a:t>
+            </a:r>
+            <a:endParaRPr lang="en-US" dirty="0" smtClean="0"/>
+          </a:p>
+          <a:p>
+            <a:r>
+              <a:rPr lang="en-US" dirty="0" smtClean="0"/>
+              <a:t>Draft SMBKC document</a:t>
+            </a:r>
+            <a:endParaRPr lang="en-US" dirty="0" smtClean="0"/>
+          </a:p>
+        </p:txBody>
+      </p:sp>
+    </p:spTree>
+    <p:extLst>
+      <p:ext uri="{BB962C8B-B14F-4D97-AF65-F5344CB8AC3E}">
+        <p14:creationId xmlns:p14="http://schemas.microsoft.com/office/powerpoint/2010/main" val="1127452723"/>
+      </p:ext>
+    </p:extLst>
+  </p:cSld>
+  <p:clrMapOvr>
+    <a:masterClrMapping/>
+  </p:clrMapOvr>
+</p:sld>
+</file>
+
+<file path=ppt/slides/slide20.xml><?xml version="1.0" encoding="utf-8"?>
+<p:sld xmlns:a="http://schemas.openxmlformats.org/drawingml/2006/main" xmlns:r="http://schemas.openxmlformats.org/officeDocument/2006/relationships" xmlns:p="http://schemas.openxmlformats.org/presentationml/2006/main">
+  <p:cSld>
+    <p:spTree>
+      <p:nvGrpSpPr>
+        <p:cNvPr id="1" name=""/>
+        <p:cNvGrpSpPr/>
+        <p:nvPr/>
+      </p:nvGrpSpPr>
+      <p:grpSpPr>
+        <a:xfrm>
+          <a:off x="0" y="0"/>
+          <a:ext cx="0" cy="0"/>
+          <a:chOff x="0" y="0"/>
+          <a:chExt cx="0" cy="0"/>
+        </a:xfrm>
+      </p:grpSpPr>
+      <p:sp>
+        <p:nvSpPr>
+          <p:cNvPr id="2" name="Title 1"/>
+          <p:cNvSpPr>
+            <a:spLocks noGrp="1"/>
+          </p:cNvSpPr>
+          <p:nvPr>
+            <p:ph type="title"/>
+          </p:nvPr>
+        </p:nvSpPr>
+        <p:spPr/>
+        <p:txBody>
+          <a:bodyPr/>
+          <a:lstStyle/>
+          <a:p>
+            <a:endParaRPr lang="en-NZ"/>
+          </a:p>
+        </p:txBody>
+      </p:sp>
+      <p:pic>
+        <p:nvPicPr>
+          <p:cNvPr id="4" name="Content Placeholder 3"/>
+          <p:cNvPicPr>
+            <a:picLocks noGrp="1" noChangeAspect="1"/>
+          </p:cNvPicPr>
+          <p:nvPr>
+            <p:ph idx="1"/>
+          </p:nvPr>
+        </p:nvPicPr>
+        <p:blipFill>
+          <a:blip r:embed="rId2" cstate="print">
+            <a:extLst>
+              <a:ext uri="{28A0092B-C50C-407E-A947-70E740481C1C}">
+                <a14:useLocalDpi xmlns:a14="http://schemas.microsoft.com/office/drawing/2010/main" val="0"/>
+              </a:ext>
+            </a:extLst>
+          </a:blip>
+          <a:stretch>
+            <a:fillRect/>
+          </a:stretch>
+        </p:blipFill>
+        <p:spPr>
+          <a:xfrm>
+            <a:off x="3735238" y="97047"/>
+            <a:ext cx="5408762" cy="6760953"/>
+          </a:xfrm>
+        </p:spPr>
+      </p:pic>
+    </p:spTree>
+    <p:extLst>
+      <p:ext uri="{BB962C8B-B14F-4D97-AF65-F5344CB8AC3E}">
+        <p14:creationId xmlns:p14="http://schemas.microsoft.com/office/powerpoint/2010/main" val="2798668124"/>
+      </p:ext>
+    </p:extLst>
+  </p:cSld>
+  <p:clrMapOvr>
+    <a:masterClrMapping/>
+  </p:clrMapOvr>
+</p:sld>
+</file>
+
+<file path=ppt/slides/slide21.xml><?xml version="1.0" encoding="utf-8"?>
+<p:sld xmlns:a="http://schemas.openxmlformats.org/drawingml/2006/main" xmlns:r="http://schemas.openxmlformats.org/officeDocument/2006/relationships" xmlns:p="http://schemas.openxmlformats.org/presentationml/2006/main">
+  <p:cSld>
+    <p:spTree>
+      <p:nvGrpSpPr>
+        <p:cNvPr id="1" name=""/>
+        <p:cNvGrpSpPr/>
+        <p:nvPr/>
+      </p:nvGrpSpPr>
+      <p:grpSpPr>
+        <a:xfrm>
+          <a:off x="0" y="0"/>
+          <a:ext cx="0" cy="0"/>
+          <a:chOff x="0" y="0"/>
+          <a:chExt cx="0" cy="0"/>
+        </a:xfrm>
+      </p:grpSpPr>
+      <p:sp>
+        <p:nvSpPr>
+          <p:cNvPr id="2" name="Title 1"/>
+          <p:cNvSpPr>
+            <a:spLocks noGrp="1"/>
+          </p:cNvSpPr>
+          <p:nvPr>
+            <p:ph type="title"/>
+          </p:nvPr>
+        </p:nvSpPr>
+        <p:spPr/>
+        <p:txBody>
+          <a:bodyPr/>
+          <a:lstStyle/>
+          <a:p>
+            <a:endParaRPr lang="en-NZ"/>
+          </a:p>
+        </p:txBody>
+      </p:sp>
+      <p:pic>
+        <p:nvPicPr>
+          <p:cNvPr id="4" name="Content Placeholder 3"/>
+          <p:cNvPicPr>
+            <a:picLocks noGrp="1" noChangeAspect="1"/>
+          </p:cNvPicPr>
+          <p:nvPr>
+            <p:ph idx="1"/>
+          </p:nvPr>
+        </p:nvPicPr>
+        <p:blipFill>
+          <a:blip r:embed="rId2">
+            <a:extLst>
+              <a:ext uri="{28A0092B-C50C-407E-A947-70E740481C1C}">
+                <a14:useLocalDpi xmlns:a14="http://schemas.microsoft.com/office/drawing/2010/main" val="0"/>
+              </a:ext>
+            </a:extLst>
+          </a:blip>
+          <a:stretch>
+            <a:fillRect/>
+          </a:stretch>
+        </p:blipFill>
+        <p:spPr>
+          <a:xfrm>
+            <a:off x="842282" y="1825625"/>
+            <a:ext cx="7459435" cy="4351338"/>
+          </a:xfrm>
+        </p:spPr>
+      </p:pic>
+    </p:spTree>
+    <p:extLst>
+      <p:ext uri="{BB962C8B-B14F-4D97-AF65-F5344CB8AC3E}">
+        <p14:creationId xmlns:p14="http://schemas.microsoft.com/office/powerpoint/2010/main" val="1181803697"/>
+      </p:ext>
+    </p:extLst>
+  </p:cSld>
+  <p:clrMapOvr>
+    <a:masterClrMapping/>
+  </p:clrMapOvr>
+</p:sld>
+</file>
+
+<file path=ppt/slides/slide22.xml><?xml version="1.0" encoding="utf-8"?>
+<p:sld xmlns:a="http://schemas.openxmlformats.org/drawingml/2006/main" xmlns:r="http://schemas.openxmlformats.org/officeDocument/2006/relationships" xmlns:p="http://schemas.openxmlformats.org/presentationml/2006/main">
+  <p:cSld>
+    <p:spTree>
+      <p:nvGrpSpPr>
+        <p:cNvPr id="1" name=""/>
+        <p:cNvGrpSpPr/>
+        <p:nvPr/>
+      </p:nvGrpSpPr>
+      <p:grpSpPr>
+        <a:xfrm>
+          <a:off x="0" y="0"/>
+          <a:ext cx="0" cy="0"/>
+          <a:chOff x="0" y="0"/>
+          <a:chExt cx="0" cy="0"/>
+        </a:xfrm>
+      </p:grpSpPr>
+      <p:sp>
+        <p:nvSpPr>
+          <p:cNvPr id="2" name="Title 1"/>
+          <p:cNvSpPr>
+            <a:spLocks noGrp="1"/>
+          </p:cNvSpPr>
+          <p:nvPr>
+            <p:ph type="title"/>
+          </p:nvPr>
+        </p:nvSpPr>
+        <p:spPr/>
+        <p:txBody>
+          <a:bodyPr/>
+          <a:lstStyle/>
+          <a:p>
+            <a:endParaRPr lang="en-NZ"/>
+          </a:p>
+        </p:txBody>
+      </p:sp>
+      <p:pic>
+        <p:nvPicPr>
+          <p:cNvPr id="4" name="Content Placeholder 3"/>
+          <p:cNvPicPr>
+            <a:picLocks noGrp="1" noChangeAspect="1"/>
+          </p:cNvPicPr>
+          <p:nvPr>
+            <p:ph idx="1"/>
+          </p:nvPr>
+        </p:nvPicPr>
+        <p:blipFill>
+          <a:blip r:embed="rId2">
+            <a:extLst>
+              <a:ext uri="{28A0092B-C50C-407E-A947-70E740481C1C}">
+                <a14:useLocalDpi xmlns:a14="http://schemas.microsoft.com/office/drawing/2010/main" val="0"/>
+              </a:ext>
+            </a:extLst>
+          </a:blip>
+          <a:stretch>
+            <a:fillRect/>
+          </a:stretch>
+        </p:blipFill>
+        <p:spPr>
+          <a:xfrm>
+            <a:off x="1" y="1523999"/>
+            <a:ext cx="9144000" cy="5334001"/>
+          </a:xfrm>
+        </p:spPr>
+      </p:pic>
+    </p:spTree>
+    <p:extLst>
+      <p:ext uri="{BB962C8B-B14F-4D97-AF65-F5344CB8AC3E}">
+        <p14:creationId xmlns:p14="http://schemas.microsoft.com/office/powerpoint/2010/main" val="1579544255"/>
+      </p:ext>
+    </p:extLst>
+  </p:cSld>
+  <p:clrMapOvr>
+    <a:masterClrMapping/>
+  </p:clrMapOvr>
+</p:sld>
+</file>
+
+<file path=ppt/slides/slide23.xml><?xml version="1.0" encoding="utf-8"?>
+<p:sld xmlns:a="http://schemas.openxmlformats.org/drawingml/2006/main" xmlns:r="http://schemas.openxmlformats.org/officeDocument/2006/relationships" xmlns:p="http://schemas.openxmlformats.org/presentationml/2006/main">
+  <p:cSld>
+    <p:spTree>
+      <p:nvGrpSpPr>
+        <p:cNvPr id="1" name=""/>
+        <p:cNvGrpSpPr/>
+        <p:nvPr/>
+      </p:nvGrpSpPr>
+      <p:grpSpPr>
+        <a:xfrm>
+          <a:off x="0" y="0"/>
+          <a:ext cx="0" cy="0"/>
+          <a:chOff x="0" y="0"/>
+          <a:chExt cx="0" cy="0"/>
+        </a:xfrm>
+      </p:grpSpPr>
+      <p:sp>
+        <p:nvSpPr>
+          <p:cNvPr id="2" name="Title 1"/>
+          <p:cNvSpPr>
+            <a:spLocks noGrp="1"/>
+          </p:cNvSpPr>
+          <p:nvPr>
+            <p:ph type="title"/>
+          </p:nvPr>
+        </p:nvSpPr>
+        <p:spPr/>
+        <p:txBody>
+          <a:bodyPr/>
+          <a:lstStyle/>
+          <a:p>
+            <a:endParaRPr lang="en-NZ"/>
+          </a:p>
+        </p:txBody>
+      </p:sp>
+      <p:pic>
+        <p:nvPicPr>
+          <p:cNvPr id="4" name="Content Placeholder 3"/>
+          <p:cNvPicPr>
+            <a:picLocks noGrp="1" noChangeAspect="1"/>
+          </p:cNvPicPr>
+          <p:nvPr>
+            <p:ph idx="1"/>
+          </p:nvPr>
+        </p:nvPicPr>
+        <p:blipFill>
+          <a:blip r:embed="rId2">
+            <a:extLst>
+              <a:ext uri="{28A0092B-C50C-407E-A947-70E740481C1C}">
+                <a14:useLocalDpi xmlns:a14="http://schemas.microsoft.com/office/drawing/2010/main" val="0"/>
+              </a:ext>
+            </a:extLst>
+          </a:blip>
+          <a:stretch>
+            <a:fillRect/>
+          </a:stretch>
+        </p:blipFill>
+        <p:spPr>
+          <a:xfrm>
+            <a:off x="842282" y="1825625"/>
+            <a:ext cx="7459435" cy="4351338"/>
+          </a:xfrm>
+        </p:spPr>
+      </p:pic>
+    </p:spTree>
+    <p:extLst>
+      <p:ext uri="{BB962C8B-B14F-4D97-AF65-F5344CB8AC3E}">
+        <p14:creationId xmlns:p14="http://schemas.microsoft.com/office/powerpoint/2010/main" val="1624705444"/>
+      </p:ext>
+    </p:extLst>
+  </p:cSld>
+  <p:clrMapOvr>
+    <a:masterClrMapping/>
+  </p:clrMapOvr>
+</p:sld>
+</file>
+
+<file path=ppt/slides/slide24.xml><?xml version="1.0" encoding="utf-8"?>
+<p:sld xmlns:a="http://schemas.openxmlformats.org/drawingml/2006/main" xmlns:r="http://schemas.openxmlformats.org/officeDocument/2006/relationships" xmlns:p="http://schemas.openxmlformats.org/presentationml/2006/main">
+  <p:cSld>
+    <p:spTree>
+      <p:nvGrpSpPr>
+        <p:cNvPr id="1" name=""/>
+        <p:cNvGrpSpPr/>
+        <p:nvPr/>
+      </p:nvGrpSpPr>
+      <p:grpSpPr>
+        <a:xfrm>
+          <a:off x="0" y="0"/>
+          <a:ext cx="0" cy="0"/>
+          <a:chOff x="0" y="0"/>
+          <a:chExt cx="0" cy="0"/>
+        </a:xfrm>
+      </p:grpSpPr>
+      <p:sp>
+        <p:nvSpPr>
+          <p:cNvPr id="2" name="Title 1"/>
+          <p:cNvSpPr>
+            <a:spLocks noGrp="1"/>
+          </p:cNvSpPr>
+          <p:nvPr>
+            <p:ph type="title"/>
+          </p:nvPr>
+        </p:nvSpPr>
+        <p:spPr/>
+        <p:txBody>
+          <a:bodyPr/>
+          <a:lstStyle/>
+          <a:p>
+            <a:endParaRPr lang="en-NZ"/>
+          </a:p>
+        </p:txBody>
+      </p:sp>
+      <p:pic>
+        <p:nvPicPr>
+          <p:cNvPr id="4" name="Content Placeholder 3"/>
+          <p:cNvPicPr>
+            <a:picLocks noGrp="1" noChangeAspect="1"/>
+          </p:cNvPicPr>
+          <p:nvPr>
+            <p:ph idx="1"/>
+          </p:nvPr>
+        </p:nvPicPr>
+        <p:blipFill>
+          <a:blip r:embed="rId2">
+            <a:extLst>
+              <a:ext uri="{28A0092B-C50C-407E-A947-70E740481C1C}">
+                <a14:useLocalDpi xmlns:a14="http://schemas.microsoft.com/office/drawing/2010/main" val="0"/>
+              </a:ext>
+            </a:extLst>
+          </a:blip>
+          <a:stretch>
+            <a:fillRect/>
+          </a:stretch>
+        </p:blipFill>
+        <p:spPr>
+          <a:xfrm>
+            <a:off x="842282" y="1825625"/>
+            <a:ext cx="7459435" cy="4351338"/>
+          </a:xfrm>
+        </p:spPr>
+      </p:pic>
+    </p:spTree>
+    <p:extLst>
+      <p:ext uri="{BB962C8B-B14F-4D97-AF65-F5344CB8AC3E}">
+        <p14:creationId xmlns:p14="http://schemas.microsoft.com/office/powerpoint/2010/main" val="2122499807"/>
+      </p:ext>
+    </p:extLst>
+  </p:cSld>
+  <p:clrMapOvr>
+    <a:masterClrMapping/>
+  </p:clrMapOvr>
+</p:sld>
+</file>
+
+<file path=ppt/slides/slide25.xml><?xml version="1.0" encoding="utf-8"?>
+<p:sld xmlns:a="http://schemas.openxmlformats.org/drawingml/2006/main" xmlns:r="http://schemas.openxmlformats.org/officeDocument/2006/relationships" xmlns:p="http://schemas.openxmlformats.org/presentationml/2006/main">
+  <p:cSld>
+    <p:spTree>
+      <p:nvGrpSpPr>
+        <p:cNvPr id="1" name=""/>
+        <p:cNvGrpSpPr/>
+        <p:nvPr/>
+      </p:nvGrpSpPr>
+      <p:grpSpPr>
+        <a:xfrm>
+          <a:off x="0" y="0"/>
+          <a:ext cx="0" cy="0"/>
+          <a:chOff x="0" y="0"/>
+          <a:chExt cx="0" cy="0"/>
+        </a:xfrm>
+      </p:grpSpPr>
+      <p:sp>
+        <p:nvSpPr>
+          <p:cNvPr id="2" name="Title 1"/>
+          <p:cNvSpPr>
+            <a:spLocks noGrp="1"/>
+          </p:cNvSpPr>
+          <p:nvPr>
+            <p:ph type="title"/>
+          </p:nvPr>
+        </p:nvSpPr>
+        <p:spPr/>
+        <p:txBody>
+          <a:bodyPr/>
+          <a:lstStyle/>
+          <a:p>
+            <a:endParaRPr lang="en-NZ"/>
+          </a:p>
+        </p:txBody>
+      </p:sp>
+      <p:pic>
+        <p:nvPicPr>
+          <p:cNvPr id="4" name="Content Placeholder 3"/>
+          <p:cNvPicPr>
+            <a:picLocks noGrp="1" noChangeAspect="1"/>
+          </p:cNvPicPr>
+          <p:nvPr>
+            <p:ph idx="1"/>
+          </p:nvPr>
+        </p:nvPicPr>
+        <p:blipFill>
+          <a:blip r:embed="rId2">
+            <a:extLst>
+              <a:ext uri="{28A0092B-C50C-407E-A947-70E740481C1C}">
+                <a14:useLocalDpi xmlns:a14="http://schemas.microsoft.com/office/drawing/2010/main" val="0"/>
+              </a:ext>
+            </a:extLst>
+          </a:blip>
+          <a:stretch>
+            <a:fillRect/>
+          </a:stretch>
+        </p:blipFill>
+        <p:spPr>
+          <a:xfrm>
+            <a:off x="842282" y="1825625"/>
+            <a:ext cx="7459435" cy="4351338"/>
+          </a:xfrm>
+        </p:spPr>
+      </p:pic>
+    </p:spTree>
+    <p:extLst>
+      <p:ext uri="{BB962C8B-B14F-4D97-AF65-F5344CB8AC3E}">
+        <p14:creationId xmlns:p14="http://schemas.microsoft.com/office/powerpoint/2010/main" val="1977388319"/>
+      </p:ext>
+    </p:extLst>
+  </p:cSld>
+  <p:clrMapOvr>
+    <a:masterClrMapping/>
+  </p:clrMapOvr>
+</p:sld>
+</file>
+
+<file path=ppt/slides/slide26.xml><?xml version="1.0" encoding="utf-8"?>
+<p:sld xmlns:a="http://schemas.openxmlformats.org/drawingml/2006/main" xmlns:r="http://schemas.openxmlformats.org/officeDocument/2006/relationships" xmlns:p="http://schemas.openxmlformats.org/presentationml/2006/main">
+  <p:cSld>
+    <p:spTree>
+      <p:nvGrpSpPr>
+        <p:cNvPr id="1" name=""/>
+        <p:cNvGrpSpPr/>
+        <p:nvPr/>
+      </p:nvGrpSpPr>
+      <p:grpSpPr>
+        <a:xfrm>
+          <a:off x="0" y="0"/>
+          <a:ext cx="0" cy="0"/>
+          <a:chOff x="0" y="0"/>
+          <a:chExt cx="0" cy="0"/>
+        </a:xfrm>
+      </p:grpSpPr>
+      <p:sp>
+        <p:nvSpPr>
+          <p:cNvPr id="2" name="Title 1"/>
+          <p:cNvSpPr>
+            <a:spLocks noGrp="1"/>
+          </p:cNvSpPr>
+          <p:nvPr>
+            <p:ph type="title"/>
+          </p:nvPr>
+        </p:nvSpPr>
+        <p:spPr/>
+        <p:txBody>
+          <a:bodyPr/>
+          <a:lstStyle/>
+          <a:p>
+            <a:endParaRPr lang="en-NZ"/>
+          </a:p>
+        </p:txBody>
+      </p:sp>
+      <p:pic>
+        <p:nvPicPr>
+          <p:cNvPr id="4" name="Content Placeholder 3"/>
+          <p:cNvPicPr>
+            <a:picLocks noGrp="1" noChangeAspect="1"/>
+          </p:cNvPicPr>
+          <p:nvPr>
+            <p:ph idx="1"/>
+          </p:nvPr>
+        </p:nvPicPr>
+        <p:blipFill>
+          <a:blip r:embed="rId2">
+            <a:extLst>
+              <a:ext uri="{28A0092B-C50C-407E-A947-70E740481C1C}">
+                <a14:useLocalDpi xmlns:a14="http://schemas.microsoft.com/office/drawing/2010/main" val="0"/>
+              </a:ext>
+            </a:extLst>
+          </a:blip>
+          <a:stretch>
+            <a:fillRect/>
+          </a:stretch>
+        </p:blipFill>
+        <p:spPr>
+          <a:xfrm>
+            <a:off x="842282" y="1825625"/>
+            <a:ext cx="7459435" cy="4351338"/>
+          </a:xfrm>
+        </p:spPr>
+      </p:pic>
+    </p:spTree>
+    <p:extLst>
+      <p:ext uri="{BB962C8B-B14F-4D97-AF65-F5344CB8AC3E}">
+        <p14:creationId xmlns:p14="http://schemas.microsoft.com/office/powerpoint/2010/main" val="1816968888"/>
+      </p:ext>
+    </p:extLst>
+  </p:cSld>
+  <p:clrMapOvr>
+    <a:masterClrMapping/>
+  </p:clrMapOvr>
+</p:sld>
+</file>
+
+<file path=ppt/slides/slide27.xml><?xml version="1.0" encoding="utf-8"?>
+<p:sld xmlns:a="http://schemas.openxmlformats.org/drawingml/2006/main" xmlns:r="http://schemas.openxmlformats.org/officeDocument/2006/relationships" xmlns:p="http://schemas.openxmlformats.org/presentationml/2006/main">
+  <p:cSld>
+    <p:spTree>
+      <p:nvGrpSpPr>
+        <p:cNvPr id="1" name=""/>
+        <p:cNvGrpSpPr/>
+        <p:nvPr/>
+      </p:nvGrpSpPr>
+      <p:grpSpPr>
+        <a:xfrm>
+          <a:off x="0" y="0"/>
+          <a:ext cx="0" cy="0"/>
+          <a:chOff x="0" y="0"/>
+          <a:chExt cx="0" cy="0"/>
+        </a:xfrm>
+      </p:grpSpPr>
+      <p:sp>
+        <p:nvSpPr>
+          <p:cNvPr id="2" name="Title 1"/>
+          <p:cNvSpPr>
+            <a:spLocks noGrp="1"/>
+          </p:cNvSpPr>
+          <p:nvPr>
+            <p:ph type="title"/>
+          </p:nvPr>
+        </p:nvSpPr>
+        <p:spPr/>
+        <p:txBody>
+          <a:bodyPr/>
+          <a:lstStyle/>
+          <a:p>
+            <a:endParaRPr lang="en-NZ"/>
+          </a:p>
+        </p:txBody>
+      </p:sp>
+      <p:pic>
+        <p:nvPicPr>
+          <p:cNvPr id="4" name="Content Placeholder 3"/>
+          <p:cNvPicPr>
+            <a:picLocks noGrp="1" noChangeAspect="1"/>
+          </p:cNvPicPr>
+          <p:nvPr>
+            <p:ph idx="1"/>
+          </p:nvPr>
+        </p:nvPicPr>
+        <p:blipFill>
+          <a:blip r:embed="rId2">
+            <a:extLst>
+              <a:ext uri="{28A0092B-C50C-407E-A947-70E740481C1C}">
+                <a14:useLocalDpi xmlns:a14="http://schemas.microsoft.com/office/drawing/2010/main" val="0"/>
+              </a:ext>
+            </a:extLst>
+          </a:blip>
+          <a:stretch>
+            <a:fillRect/>
+          </a:stretch>
+        </p:blipFill>
+        <p:spPr>
+          <a:xfrm>
+            <a:off x="842282" y="1825625"/>
+            <a:ext cx="7459435" cy="4351338"/>
+          </a:xfrm>
+        </p:spPr>
+      </p:pic>
+    </p:spTree>
+    <p:extLst>
+      <p:ext uri="{BB962C8B-B14F-4D97-AF65-F5344CB8AC3E}">
+        <p14:creationId xmlns:p14="http://schemas.microsoft.com/office/powerpoint/2010/main" val="387008885"/>
+      </p:ext>
+    </p:extLst>
+  </p:cSld>
+  <p:clrMapOvr>
+    <a:masterClrMapping/>
+  </p:clrMapOvr>
+</p:sld>
+</file>
+
+<file path=ppt/slides/slide28.xml><?xml version="1.0" encoding="utf-8"?>
+<p:sld xmlns:a="http://schemas.openxmlformats.org/drawingml/2006/main" xmlns:r="http://schemas.openxmlformats.org/officeDocument/2006/relationships" xmlns:p="http://schemas.openxmlformats.org/presentationml/2006/main">
+  <p:cSld>
+    <p:spTree>
+      <p:nvGrpSpPr>
+        <p:cNvPr id="1" name=""/>
+        <p:cNvGrpSpPr/>
+        <p:nvPr/>
+      </p:nvGrpSpPr>
+      <p:grpSpPr>
+        <a:xfrm>
+          <a:off x="0" y="0"/>
+          <a:ext cx="0" cy="0"/>
+          <a:chOff x="0" y="0"/>
+          <a:chExt cx="0" cy="0"/>
+        </a:xfrm>
+      </p:grpSpPr>
+      <p:sp>
+        <p:nvSpPr>
+          <p:cNvPr id="2" name="Title 1"/>
+          <p:cNvSpPr>
+            <a:spLocks noGrp="1"/>
+          </p:cNvSpPr>
+          <p:nvPr>
+            <p:ph type="title"/>
+          </p:nvPr>
+        </p:nvSpPr>
+        <p:spPr/>
+        <p:txBody>
+          <a:bodyPr/>
+          <a:lstStyle/>
+          <a:p>
+            <a:endParaRPr lang="en-NZ"/>
+          </a:p>
+        </p:txBody>
+      </p:sp>
+      <p:pic>
+        <p:nvPicPr>
+          <p:cNvPr id="4" name="Content Placeholder 3"/>
+          <p:cNvPicPr>
+            <a:picLocks noGrp="1" noChangeAspect="1"/>
+          </p:cNvPicPr>
+          <p:nvPr>
+            <p:ph idx="1"/>
+          </p:nvPr>
+        </p:nvPicPr>
+        <p:blipFill>
+          <a:blip r:embed="rId2">
+            <a:extLst>
+              <a:ext uri="{28A0092B-C50C-407E-A947-70E740481C1C}">
+                <a14:useLocalDpi xmlns:a14="http://schemas.microsoft.com/office/drawing/2010/main" val="0"/>
+              </a:ext>
+            </a:extLst>
+          </a:blip>
+          <a:stretch>
+            <a:fillRect/>
+          </a:stretch>
+        </p:blipFill>
+        <p:spPr>
+          <a:xfrm>
+            <a:off x="842282" y="1825625"/>
+            <a:ext cx="7459435" cy="4351338"/>
+          </a:xfrm>
+        </p:spPr>
+      </p:pic>
+    </p:spTree>
+    <p:extLst>
+      <p:ext uri="{BB962C8B-B14F-4D97-AF65-F5344CB8AC3E}">
+        <p14:creationId xmlns:p14="http://schemas.microsoft.com/office/powerpoint/2010/main" val="173411110"/>
+      </p:ext>
+    </p:extLst>
+  </p:cSld>
+  <p:clrMapOvr>
+    <a:masterClrMapping/>
+  </p:clrMapOvr>
+</p:sld>
+</file>
+
+<file path=ppt/slides/slide29.xml><?xml version="1.0" encoding="utf-8"?>
+<p:sld xmlns:a="http://schemas.openxmlformats.org/drawingml/2006/main" xmlns:r="http://schemas.openxmlformats.org/officeDocument/2006/relationships" xmlns:p="http://schemas.openxmlformats.org/presentationml/2006/main">
+  <p:cSld>
+    <p:spTree>
+      <p:nvGrpSpPr>
+        <p:cNvPr id="1" name=""/>
+        <p:cNvGrpSpPr/>
+        <p:nvPr/>
+      </p:nvGrpSpPr>
+      <p:grpSpPr>
+        <a:xfrm>
+          <a:off x="0" y="0"/>
+          <a:ext cx="0" cy="0"/>
+          <a:chOff x="0" y="0"/>
+          <a:chExt cx="0" cy="0"/>
+        </a:xfrm>
+      </p:grpSpPr>
+      <p:sp>
+        <p:nvSpPr>
+          <p:cNvPr id="2" name="Title 1"/>
+          <p:cNvSpPr>
+            <a:spLocks noGrp="1"/>
+          </p:cNvSpPr>
+          <p:nvPr>
+            <p:ph type="title"/>
+          </p:nvPr>
+        </p:nvSpPr>
+        <p:spPr/>
+        <p:txBody>
+          <a:bodyPr/>
+          <a:lstStyle/>
+          <a:p>
+            <a:endParaRPr lang="en-NZ"/>
+          </a:p>
+        </p:txBody>
+      </p:sp>
+      <p:pic>
+        <p:nvPicPr>
+          <p:cNvPr id="4" name="Content Placeholder 3"/>
+          <p:cNvPicPr>
+            <a:picLocks noGrp="1" noChangeAspect="1"/>
+          </p:cNvPicPr>
+          <p:nvPr>
+            <p:ph idx="1"/>
+          </p:nvPr>
+        </p:nvPicPr>
+        <p:blipFill>
+          <a:blip r:embed="rId2">
+            <a:extLst>
+              <a:ext uri="{28A0092B-C50C-407E-A947-70E740481C1C}">
+                <a14:useLocalDpi xmlns:a14="http://schemas.microsoft.com/office/drawing/2010/main" val="0"/>
+              </a:ext>
+            </a:extLst>
+          </a:blip>
+          <a:stretch>
+            <a:fillRect/>
+          </a:stretch>
+        </p:blipFill>
+        <p:spPr>
+          <a:xfrm>
+            <a:off x="842282" y="1825625"/>
+            <a:ext cx="7459435" cy="4351338"/>
+          </a:xfrm>
+        </p:spPr>
+      </p:pic>
+    </p:spTree>
+    <p:extLst>
+      <p:ext uri="{BB962C8B-B14F-4D97-AF65-F5344CB8AC3E}">
+        <p14:creationId xmlns:p14="http://schemas.microsoft.com/office/powerpoint/2010/main" val="3318011065"/>
+      </p:ext>
+    </p:extLst>
+  </p:cSld>
+  <p:clrMapOvr>
+    <a:masterClrMapping/>
+  </p:clrMapOvr>
+</p:sld>
+</file>
+
+<file path=ppt/slides/slide3.xml><?xml version="1.0" encoding="utf-8"?>
+<p:sld xmlns:a="http://schemas.openxmlformats.org/drawingml/2006/main" xmlns:r="http://schemas.openxmlformats.org/officeDocument/2006/relationships" xmlns:p="http://schemas.openxmlformats.org/presentationml/2006/main">
+  <p:cSld>
+    <p:spTree>
+      <p:nvGrpSpPr>
+        <p:cNvPr id="1" name=""/>
+        <p:cNvGrpSpPr/>
+        <p:nvPr/>
+      </p:nvGrpSpPr>
+      <p:grpSpPr>
+        <a:xfrm>
+          <a:off x="0" y="0"/>
+          <a:ext cx="0" cy="0"/>
+          <a:chOff x="0" y="0"/>
+          <a:chExt cx="0" cy="0"/>
+        </a:xfrm>
+      </p:grpSpPr>
+      <p:sp>
+        <p:nvSpPr>
+          <p:cNvPr id="2" name="Title 1"/>
+          <p:cNvSpPr>
+            <a:spLocks noGrp="1"/>
+          </p:cNvSpPr>
+          <p:nvPr>
+            <p:ph type="title"/>
+          </p:nvPr>
+        </p:nvSpPr>
+        <p:spPr/>
+        <p:txBody>
+          <a:bodyPr/>
+          <a:lstStyle/>
+          <a:p>
+            <a:endParaRPr lang="en-NZ"/>
+          </a:p>
+        </p:txBody>
+      </p:sp>
+      <p:pic>
+        <p:nvPicPr>
+          <p:cNvPr id="4" name="Content Placeholder 3"/>
+          <p:cNvPicPr>
+            <a:picLocks noGrp="1" noChangeAspect="1"/>
+          </p:cNvPicPr>
+          <p:nvPr>
+            <p:ph idx="1"/>
+          </p:nvPr>
+        </p:nvPicPr>
+        <p:blipFill>
+          <a:blip r:embed="rId2" cstate="print">
+            <a:extLst>
+              <a:ext uri="{28A0092B-C50C-407E-A947-70E740481C1C}">
+                <a14:useLocalDpi xmlns:a14="http://schemas.microsoft.com/office/drawing/2010/main" val="0"/>
+              </a:ext>
+            </a:extLst>
+          </a:blip>
+          <a:stretch>
+            <a:fillRect/>
+          </a:stretch>
+        </p:blipFill>
+        <p:spPr>
+          <a:xfrm>
+            <a:off x="628650" y="2029619"/>
+            <a:ext cx="7886700" cy="3943350"/>
+          </a:xfrm>
+        </p:spPr>
+      </p:pic>
+    </p:spTree>
+    <p:extLst>
+      <p:ext uri="{BB962C8B-B14F-4D97-AF65-F5344CB8AC3E}">
+        <p14:creationId xmlns:p14="http://schemas.microsoft.com/office/powerpoint/2010/main" val="3160728246"/>
+      </p:ext>
+    </p:extLst>
+  </p:cSld>
+  <p:clrMapOvr>
+    <a:masterClrMapping/>
+  </p:clrMapOvr>
+</p:sld>
+</file>
+
+<file path=ppt/slides/slide30.xml><?xml version="1.0" encoding="utf-8"?>
+<p:sld xmlns:a="http://schemas.openxmlformats.org/drawingml/2006/main" xmlns:r="http://schemas.openxmlformats.org/officeDocument/2006/relationships" xmlns:p="http://schemas.openxmlformats.org/presentationml/2006/main">
+  <p:cSld>
+    <p:spTree>
+      <p:nvGrpSpPr>
+        <p:cNvPr id="1" name=""/>
+        <p:cNvGrpSpPr/>
+        <p:nvPr/>
+      </p:nvGrpSpPr>
+      <p:grpSpPr>
+        <a:xfrm>
+          <a:off x="0" y="0"/>
+          <a:ext cx="0" cy="0"/>
+          <a:chOff x="0" y="0"/>
+          <a:chExt cx="0" cy="0"/>
+        </a:xfrm>
+      </p:grpSpPr>
+      <p:sp>
+        <p:nvSpPr>
+          <p:cNvPr id="2" name="Title 1"/>
+          <p:cNvSpPr>
+            <a:spLocks noGrp="1"/>
+          </p:cNvSpPr>
+          <p:nvPr>
+            <p:ph type="title"/>
+          </p:nvPr>
+        </p:nvSpPr>
+        <p:spPr/>
+        <p:txBody>
+          <a:bodyPr/>
+          <a:lstStyle/>
+          <a:p>
+            <a:endParaRPr lang="en-NZ"/>
+          </a:p>
+        </p:txBody>
+      </p:sp>
+      <p:pic>
+        <p:nvPicPr>
+          <p:cNvPr id="4" name="Content Placeholder 3"/>
+          <p:cNvPicPr>
+            <a:picLocks noGrp="1" noChangeAspect="1"/>
+          </p:cNvPicPr>
+          <p:nvPr>
+            <p:ph idx="1"/>
+          </p:nvPr>
+        </p:nvPicPr>
+        <p:blipFill>
+          <a:blip r:embed="rId2">
+            <a:extLst>
+              <a:ext uri="{28A0092B-C50C-407E-A947-70E740481C1C}">
+                <a14:useLocalDpi xmlns:a14="http://schemas.microsoft.com/office/drawing/2010/main" val="0"/>
+              </a:ext>
+            </a:extLst>
+          </a:blip>
+          <a:stretch>
+            <a:fillRect/>
+          </a:stretch>
+        </p:blipFill>
+        <p:spPr>
+          <a:xfrm>
+            <a:off x="842282" y="1825625"/>
+            <a:ext cx="7459435" cy="4351338"/>
+          </a:xfrm>
+        </p:spPr>
+      </p:pic>
+    </p:spTree>
+    <p:extLst>
+      <p:ext uri="{BB962C8B-B14F-4D97-AF65-F5344CB8AC3E}">
+        <p14:creationId xmlns:p14="http://schemas.microsoft.com/office/powerpoint/2010/main" val="166404701"/>
+      </p:ext>
+    </p:extLst>
+  </p:cSld>
+  <p:clrMapOvr>
+    <a:masterClrMapping/>
+  </p:clrMapOvr>
+</p:sld>
+</file>
+
+<file path=ppt/slides/slide4.xml><?xml version="1.0" encoding="utf-8"?>
+<p:sld xmlns:a="http://schemas.openxmlformats.org/drawingml/2006/main" xmlns:r="http://schemas.openxmlformats.org/officeDocument/2006/relationships" xmlns:p="http://schemas.openxmlformats.org/presentationml/2006/main">
+  <p:cSld>
+    <p:spTree>
+      <p:nvGrpSpPr>
+        <p:cNvPr id="1" name=""/>
+        <p:cNvGrpSpPr/>
+        <p:nvPr/>
+      </p:nvGrpSpPr>
+      <p:grpSpPr>
+        <a:xfrm>
+          <a:off x="0" y="0"/>
+          <a:ext cx="0" cy="0"/>
+          <a:chOff x="0" y="0"/>
+          <a:chExt cx="0" cy="0"/>
+        </a:xfrm>
+      </p:grpSpPr>
+      <p:sp>
+        <p:nvSpPr>
+          <p:cNvPr id="2" name="Title 1"/>
+          <p:cNvSpPr>
+            <a:spLocks noGrp="1"/>
+          </p:cNvSpPr>
+          <p:nvPr>
+            <p:ph type="title"/>
+          </p:nvPr>
+        </p:nvSpPr>
+        <p:spPr/>
+        <p:txBody>
+          <a:bodyPr/>
+          <a:lstStyle/>
+          <a:p>
+            <a:endParaRPr lang="en-NZ"/>
+          </a:p>
+        </p:txBody>
+      </p:sp>
+      <p:pic>
+        <p:nvPicPr>
+          <p:cNvPr id="4" name="Content Placeholder 3"/>
+          <p:cNvPicPr>
+            <a:picLocks noGrp="1" noChangeAspect="1"/>
+          </p:cNvPicPr>
+          <p:nvPr>
+            <p:ph idx="1"/>
+          </p:nvPr>
+        </p:nvPicPr>
+        <p:blipFill>
+          <a:blip r:embed="rId2" cstate="print">
+            <a:extLst>
+              <a:ext uri="{28A0092B-C50C-407E-A947-70E740481C1C}">
+                <a14:useLocalDpi xmlns:a14="http://schemas.microsoft.com/office/drawing/2010/main" val="0"/>
+              </a:ext>
+            </a:extLst>
+          </a:blip>
+          <a:stretch>
+            <a:fillRect/>
+          </a:stretch>
+        </p:blipFill>
+        <p:spPr>
+          <a:xfrm>
+            <a:off x="628650" y="2686844"/>
+            <a:ext cx="7886700" cy="2628899"/>
+          </a:xfrm>
+        </p:spPr>
+      </p:pic>
+    </p:spTree>
+    <p:extLst>
+      <p:ext uri="{BB962C8B-B14F-4D97-AF65-F5344CB8AC3E}">
+        <p14:creationId xmlns:p14="http://schemas.microsoft.com/office/powerpoint/2010/main" val="3527560919"/>
+      </p:ext>
+    </p:extLst>
+  </p:cSld>
+  <p:clrMapOvr>
+    <a:masterClrMapping/>
+  </p:clrMapOvr>
+</p:sld>
+</file>
+
+<file path=ppt/slides/slide5.xml><?xml version="1.0" encoding="utf-8"?>
+<p:sld xmlns:a="http://schemas.openxmlformats.org/drawingml/2006/main" xmlns:r="http://schemas.openxmlformats.org/officeDocument/2006/relationships" xmlns:p="http://schemas.openxmlformats.org/presentationml/2006/main">
+  <p:cSld>
+    <p:spTree>
+      <p:nvGrpSpPr>
+        <p:cNvPr id="1" name=""/>
+        <p:cNvGrpSpPr/>
+        <p:nvPr/>
+      </p:nvGrpSpPr>
+      <p:grpSpPr>
+        <a:xfrm>
+          <a:off x="0" y="0"/>
+          <a:ext cx="0" cy="0"/>
+          <a:chOff x="0" y="0"/>
+          <a:chExt cx="0" cy="0"/>
+        </a:xfrm>
+      </p:grpSpPr>
+      <p:sp>
+        <p:nvSpPr>
+          <p:cNvPr id="2" name="Title 1"/>
+          <p:cNvSpPr>
+            <a:spLocks noGrp="1"/>
+          </p:cNvSpPr>
+          <p:nvPr>
+            <p:ph type="title"/>
+          </p:nvPr>
+        </p:nvSpPr>
+        <p:spPr/>
+        <p:txBody>
+          <a:bodyPr/>
+          <a:lstStyle/>
+          <a:p>
+            <a:endParaRPr lang="en-NZ"/>
+          </a:p>
+        </p:txBody>
+      </p:sp>
+      <p:pic>
+        <p:nvPicPr>
+          <p:cNvPr id="4" name="Content Placeholder 3"/>
+          <p:cNvPicPr>
+            <a:picLocks noGrp="1" noChangeAspect="1"/>
+          </p:cNvPicPr>
+          <p:nvPr>
+            <p:ph idx="1"/>
+          </p:nvPr>
+        </p:nvPicPr>
+        <p:blipFill>
+          <a:blip r:embed="rId2" cstate="print">
+            <a:extLst>
+              <a:ext uri="{28A0092B-C50C-407E-A947-70E740481C1C}">
+                <a14:useLocalDpi xmlns:a14="http://schemas.microsoft.com/office/drawing/2010/main" val="0"/>
+              </a:ext>
+            </a:extLst>
+          </a:blip>
+          <a:stretch>
+            <a:fillRect/>
+          </a:stretch>
+        </p:blipFill>
+        <p:spPr>
+          <a:xfrm>
+            <a:off x="628650" y="2029619"/>
+            <a:ext cx="7886700" cy="3943350"/>
+          </a:xfrm>
+        </p:spPr>
+      </p:pic>
+    </p:spTree>
+    <p:extLst>
+      <p:ext uri="{BB962C8B-B14F-4D97-AF65-F5344CB8AC3E}">
+        <p14:creationId xmlns:p14="http://schemas.microsoft.com/office/powerpoint/2010/main" val="1763595561"/>
+      </p:ext>
+    </p:extLst>
+  </p:cSld>
+  <p:clrMapOvr>
+    <a:masterClrMapping/>
+  </p:clrMapOvr>
+</p:sld>
+</file>
+
+<file path=ppt/slides/slide6.xml><?xml version="1.0" encoding="utf-8"?>
+<p:sld xmlns:a="http://schemas.openxmlformats.org/drawingml/2006/main" xmlns:r="http://schemas.openxmlformats.org/officeDocument/2006/relationships" xmlns:p="http://schemas.openxmlformats.org/presentationml/2006/main">
+  <p:cSld>
+    <p:spTree>
+      <p:nvGrpSpPr>
+        <p:cNvPr id="1" name=""/>
+        <p:cNvGrpSpPr/>
+        <p:nvPr/>
+      </p:nvGrpSpPr>
+      <p:grpSpPr>
+        <a:xfrm>
+          <a:off x="0" y="0"/>
+          <a:ext cx="0" cy="0"/>
+          <a:chOff x="0" y="0"/>
+          <a:chExt cx="0" cy="0"/>
+        </a:xfrm>
+      </p:grpSpPr>
+      <p:sp>
+        <p:nvSpPr>
+          <p:cNvPr id="2" name="Title 1"/>
+          <p:cNvSpPr>
+            <a:spLocks noGrp="1"/>
+          </p:cNvSpPr>
+          <p:nvPr>
+            <p:ph type="title"/>
+          </p:nvPr>
+        </p:nvSpPr>
+        <p:spPr/>
+        <p:txBody>
+          <a:bodyPr/>
+          <a:lstStyle/>
+          <a:p>
+            <a:r>
+              <a:rPr lang="en-US" dirty="0" err="1" smtClean="0"/>
+              <a:t>Gmacs</a:t>
+            </a:r>
+            <a:r>
+              <a:rPr lang="en-US" dirty="0" smtClean="0"/>
+              <a:t> in progress</a:t>
+            </a:r>
+            <a:endParaRPr lang="en-NZ" dirty="0"/>
+          </a:p>
+        </p:txBody>
+      </p:sp>
+      <p:sp>
+        <p:nvSpPr>
+          <p:cNvPr id="3" name="Content Placeholder 2"/>
+          <p:cNvSpPr>
+            <a:spLocks noGrp="1"/>
+          </p:cNvSpPr>
+          <p:nvPr>
+            <p:ph idx="1"/>
+          </p:nvPr>
+        </p:nvSpPr>
+        <p:spPr/>
+        <p:txBody>
+          <a:bodyPr>
+            <a:normAutofit fontScale="92500" lnSpcReduction="20000"/>
+          </a:bodyPr>
+          <a:lstStyle/>
+          <a:p>
+            <a:r>
+              <a:rPr lang="en-US" dirty="0" smtClean="0"/>
+              <a:t>Equilibrium numbers at length</a:t>
+            </a:r>
+          </a:p>
+          <a:p>
+            <a:pPr lvl="1"/>
+            <a:r>
+              <a:rPr lang="en-US" dirty="0" smtClean="0"/>
+              <a:t>Broke when seasonal changes added, can’t use the elegant solutions anymore</a:t>
+            </a:r>
+          </a:p>
+          <a:p>
+            <a:pPr lvl="1"/>
+            <a:r>
+              <a:rPr lang="en-US" dirty="0" smtClean="0"/>
+              <a:t>Not required for SMBKC as we estimate initial numbers as free parameters</a:t>
+            </a:r>
+          </a:p>
+          <a:p>
+            <a:pPr lvl="1"/>
+            <a:r>
+              <a:rPr lang="en-US" dirty="0" smtClean="0"/>
+              <a:t>The new function is complete but yet to be put in the right places</a:t>
+            </a:r>
+          </a:p>
+          <a:p>
+            <a:r>
+              <a:rPr lang="en-US" dirty="0" smtClean="0"/>
+              <a:t>SPR calculations</a:t>
+            </a:r>
+          </a:p>
+          <a:p>
+            <a:pPr lvl="1"/>
+            <a:r>
+              <a:rPr lang="en-US" dirty="0" smtClean="0"/>
+              <a:t>As above/requires equilibrium numbers</a:t>
+            </a:r>
+          </a:p>
+          <a:p>
+            <a:pPr lvl="1"/>
+            <a:r>
+              <a:rPr lang="en-US" dirty="0" smtClean="0"/>
+              <a:t>Probably only a day or two of work but I fell asleep yesterday</a:t>
+            </a:r>
+          </a:p>
+          <a:p>
+            <a:r>
+              <a:rPr lang="en-US" dirty="0" smtClean="0"/>
+              <a:t>Began retrospective code</a:t>
+            </a:r>
+          </a:p>
+          <a:p>
+            <a:r>
+              <a:rPr lang="en-US" dirty="0" smtClean="0"/>
+              <a:t>BBRKC model</a:t>
+            </a:r>
+          </a:p>
+          <a:p>
+            <a:pPr lvl="1"/>
+            <a:r>
+              <a:rPr lang="en-US" dirty="0" smtClean="0"/>
+              <a:t>Runs but as above</a:t>
+            </a:r>
+            <a:r>
+              <a:rPr lang="en-US" dirty="0"/>
+              <a:t>/requires equilibrium numbers</a:t>
+            </a:r>
+            <a:endParaRPr lang="en-NZ" dirty="0"/>
+          </a:p>
+        </p:txBody>
+      </p:sp>
+    </p:spTree>
+    <p:extLst>
+      <p:ext uri="{BB962C8B-B14F-4D97-AF65-F5344CB8AC3E}">
+        <p14:creationId xmlns:p14="http://schemas.microsoft.com/office/powerpoint/2010/main" val="939631492"/>
+      </p:ext>
+    </p:extLst>
+  </p:cSld>
+  <p:clrMapOvr>
+    <a:masterClrMapping/>
+  </p:clrMapOvr>
+</p:sld>
+</file>
+
+<file path=ppt/slides/slide7.xml><?xml version="1.0" encoding="utf-8"?>
+<p:sld xmlns:a="http://schemas.openxmlformats.org/drawingml/2006/main" xmlns:r="http://schemas.openxmlformats.org/officeDocument/2006/relationships" xmlns:p="http://schemas.openxmlformats.org/presentationml/2006/main">
+  <p:cSld>
+    <p:spTree>
+      <p:nvGrpSpPr>
+        <p:cNvPr id="1" name=""/>
+        <p:cNvGrpSpPr/>
+        <p:nvPr/>
+      </p:nvGrpSpPr>
+      <p:grpSpPr>
+        <a:xfrm>
+          <a:off x="0" y="0"/>
+          <a:ext cx="0" cy="0"/>
+          <a:chOff x="0" y="0"/>
+          <a:chExt cx="0" cy="0"/>
+        </a:xfrm>
+      </p:grpSpPr>
+      <p:sp>
+        <p:nvSpPr>
+          <p:cNvPr id="2" name="Title 1"/>
+          <p:cNvSpPr>
+            <a:spLocks noGrp="1"/>
+          </p:cNvSpPr>
+          <p:nvPr>
+            <p:ph type="title"/>
+          </p:nvPr>
+        </p:nvSpPr>
+        <p:spPr/>
+        <p:txBody>
+          <a:bodyPr/>
+          <a:lstStyle/>
+          <a:p>
+            <a:r>
+              <a:rPr lang="en-US" dirty="0" smtClean="0"/>
+              <a:t>SMBKC in </a:t>
+            </a:r>
+            <a:r>
+              <a:rPr lang="en-US" dirty="0" err="1" smtClean="0"/>
+              <a:t>Gmacs</a:t>
+            </a:r>
+            <a:endParaRPr lang="en-NZ" dirty="0"/>
+          </a:p>
+        </p:txBody>
+      </p:sp>
+      <p:sp>
+        <p:nvSpPr>
+          <p:cNvPr id="3" name="Content Placeholder 2"/>
+          <p:cNvSpPr>
+            <a:spLocks noGrp="1"/>
+          </p:cNvSpPr>
+          <p:nvPr>
+            <p:ph idx="1"/>
+          </p:nvPr>
+        </p:nvSpPr>
+        <p:spPr/>
+        <p:txBody>
+          <a:bodyPr>
+            <a:normAutofit fontScale="92500" lnSpcReduction="20000"/>
+          </a:bodyPr>
+          <a:lstStyle/>
+          <a:p>
+            <a:r>
+              <a:rPr lang="en-US" dirty="0" smtClean="0"/>
+              <a:t>1978-2015</a:t>
+            </a:r>
+          </a:p>
+          <a:p>
+            <a:r>
+              <a:rPr lang="en-US" dirty="0" smtClean="0"/>
+              <a:t>4 seasons (M = 0, 0.44, 0.185, 0.375)</a:t>
+            </a:r>
+          </a:p>
+          <a:p>
+            <a:r>
+              <a:rPr lang="en-US" dirty="0" smtClean="0"/>
+              <a:t>3 </a:t>
+            </a:r>
+            <a:r>
+              <a:rPr lang="en-US" dirty="0"/>
+              <a:t>stages </a:t>
+            </a:r>
+            <a:r>
+              <a:rPr lang="en-US" dirty="0" smtClean="0"/>
+              <a:t>(90-104, 105-119, 120+)</a:t>
+            </a:r>
+            <a:endParaRPr lang="en-US" dirty="0"/>
+          </a:p>
+          <a:p>
+            <a:r>
+              <a:rPr lang="en-US" dirty="0"/>
+              <a:t>1 sex, 1 shell type, 1 maturity class</a:t>
+            </a:r>
+          </a:p>
+          <a:p>
+            <a:r>
+              <a:rPr lang="en-US" dirty="0" smtClean="0"/>
+              <a:t>3 </a:t>
+            </a:r>
+            <a:r>
+              <a:rPr lang="en-US" dirty="0" smtClean="0"/>
+              <a:t>fleets (pot</a:t>
+            </a:r>
+            <a:r>
+              <a:rPr lang="en-US" dirty="0"/>
+              <a:t>, trawl </a:t>
+            </a:r>
+            <a:r>
+              <a:rPr lang="en-US" dirty="0" err="1"/>
+              <a:t>bycatch</a:t>
+            </a:r>
+            <a:r>
+              <a:rPr lang="en-US" dirty="0"/>
+              <a:t>, fixed </a:t>
+            </a:r>
+            <a:r>
+              <a:rPr lang="en-US" dirty="0" err="1" smtClean="0"/>
+              <a:t>bycatch</a:t>
+            </a:r>
+            <a:r>
+              <a:rPr lang="en-US" dirty="0" smtClean="0"/>
+              <a:t>)</a:t>
+            </a:r>
+            <a:endParaRPr lang="en-US" dirty="0"/>
+          </a:p>
+          <a:p>
+            <a:r>
+              <a:rPr lang="en-US" dirty="0"/>
+              <a:t>2 surveys (NMFS trawl and ADF&amp;G </a:t>
+            </a:r>
+            <a:r>
+              <a:rPr lang="en-US" dirty="0" smtClean="0"/>
+              <a:t>pot CPUE) </a:t>
+            </a:r>
+            <a:r>
+              <a:rPr lang="en-US" dirty="0"/>
+              <a:t>both in season 1</a:t>
+            </a:r>
+          </a:p>
+          <a:p>
+            <a:r>
+              <a:rPr lang="en-US" dirty="0" smtClean="0"/>
+              <a:t>4 catch types (directed pot, pot discards, trawl </a:t>
+            </a:r>
+            <a:r>
+              <a:rPr lang="en-US" dirty="0" err="1" smtClean="0"/>
+              <a:t>bycatch</a:t>
+            </a:r>
+            <a:r>
+              <a:rPr lang="en-US" dirty="0" smtClean="0"/>
+              <a:t>, fixed </a:t>
+            </a:r>
+            <a:r>
+              <a:rPr lang="en-US" dirty="0" err="1" smtClean="0"/>
+              <a:t>bycatch</a:t>
+            </a:r>
+            <a:r>
+              <a:rPr lang="en-US" dirty="0" smtClean="0"/>
+              <a:t>) all during season 2</a:t>
+            </a:r>
+          </a:p>
+          <a:p>
+            <a:r>
+              <a:rPr lang="en-US" dirty="0" smtClean="0"/>
+              <a:t>3 size compositions (pot </a:t>
+            </a:r>
+            <a:r>
+              <a:rPr lang="en-US" dirty="0" smtClean="0"/>
+              <a:t>in season </a:t>
+            </a:r>
+            <a:r>
+              <a:rPr lang="en-US" dirty="0" smtClean="0"/>
+              <a:t>2, NMFS trawl </a:t>
+            </a:r>
+            <a:r>
+              <a:rPr lang="en-US" dirty="0" smtClean="0"/>
+              <a:t>in season </a:t>
+            </a:r>
+            <a:r>
+              <a:rPr lang="en-US" dirty="0" smtClean="0"/>
+              <a:t>1, ADF&amp;G pot </a:t>
+            </a:r>
+            <a:r>
+              <a:rPr lang="en-US" dirty="0" smtClean="0"/>
+              <a:t>in season </a:t>
+            </a:r>
+            <a:r>
+              <a:rPr lang="en-US" dirty="0" smtClean="0"/>
+              <a:t>1)</a:t>
+            </a:r>
+            <a:endParaRPr lang="en-NZ" dirty="0"/>
+          </a:p>
+        </p:txBody>
+      </p:sp>
+    </p:spTree>
+    <p:extLst>
+      <p:ext uri="{BB962C8B-B14F-4D97-AF65-F5344CB8AC3E}">
+        <p14:creationId xmlns:p14="http://schemas.microsoft.com/office/powerpoint/2010/main" val="3508581728"/>
+      </p:ext>
+    </p:extLst>
+  </p:cSld>
+  <p:clrMapOvr>
+    <a:masterClrMapping/>
+  </p:clrMapOvr>
+</p:sld>
+</file>
+
+<file path=ppt/slides/slide8.xml><?xml version="1.0" encoding="utf-8"?>
+<p:sld xmlns:a="http://schemas.openxmlformats.org/drawingml/2006/main" xmlns:r="http://schemas.openxmlformats.org/officeDocument/2006/relationships" xmlns:p="http://schemas.openxmlformats.org/presentationml/2006/main">
+  <p:cSld>
+    <p:spTree>
+      <p:nvGrpSpPr>
+        <p:cNvPr id="1" name=""/>
+        <p:cNvGrpSpPr/>
+        <p:nvPr/>
+      </p:nvGrpSpPr>
+      <p:grpSpPr>
+        <a:xfrm>
+          <a:off x="0" y="0"/>
+          <a:ext cx="0" cy="0"/>
+          <a:chOff x="0" y="0"/>
+          <a:chExt cx="0" cy="0"/>
+        </a:xfrm>
+      </p:grpSpPr>
+      <p:sp>
+        <p:nvSpPr>
+          <p:cNvPr id="2" name="Title 1"/>
+          <p:cNvSpPr>
+            <a:spLocks noGrp="1"/>
+          </p:cNvSpPr>
+          <p:nvPr>
+            <p:ph type="title"/>
+          </p:nvPr>
+        </p:nvSpPr>
+        <p:spPr/>
+        <p:txBody>
+          <a:bodyPr/>
+          <a:lstStyle/>
+          <a:p>
+            <a:r>
+              <a:rPr lang="en-US" dirty="0" smtClean="0"/>
+              <a:t>SMBKC dynamics</a:t>
+            </a:r>
+            <a:endParaRPr lang="en-NZ" dirty="0"/>
+          </a:p>
+        </p:txBody>
+      </p:sp>
+      <p:sp>
+        <p:nvSpPr>
+          <p:cNvPr id="3" name="Content Placeholder 2"/>
+          <p:cNvSpPr>
+            <a:spLocks noGrp="1"/>
+          </p:cNvSpPr>
+          <p:nvPr>
+            <p:ph idx="1"/>
+          </p:nvPr>
+        </p:nvSpPr>
+        <p:spPr/>
+        <p:txBody>
+          <a:bodyPr>
+            <a:normAutofit fontScale="92500" lnSpcReduction="20000"/>
+          </a:bodyPr>
+          <a:lstStyle/>
+          <a:p>
+            <a:r>
+              <a:rPr lang="en-US" dirty="0" smtClean="0"/>
+              <a:t>Season 1</a:t>
+            </a:r>
+          </a:p>
+          <a:p>
+            <a:pPr lvl="1"/>
+            <a:r>
+              <a:rPr lang="en-US" dirty="0" smtClean="0"/>
+              <a:t>1 July, start of fishing year</a:t>
+            </a:r>
+          </a:p>
+          <a:p>
+            <a:pPr lvl="1"/>
+            <a:r>
+              <a:rPr lang="en-US" dirty="0" smtClean="0"/>
+              <a:t>Surveys</a:t>
+            </a:r>
+          </a:p>
+          <a:p>
+            <a:r>
+              <a:rPr lang="en-US" dirty="0" smtClean="0"/>
+              <a:t>Season 2</a:t>
+            </a:r>
+          </a:p>
+          <a:p>
+            <a:pPr lvl="1"/>
+            <a:r>
+              <a:rPr lang="en-US" dirty="0" smtClean="0"/>
+              <a:t>M=0.44 &amp; catch</a:t>
+            </a:r>
+          </a:p>
+          <a:p>
+            <a:r>
+              <a:rPr lang="en-US" dirty="0" smtClean="0"/>
+              <a:t>Season 3</a:t>
+            </a:r>
+          </a:p>
+          <a:p>
+            <a:pPr lvl="1"/>
+            <a:r>
+              <a:rPr lang="en-US" dirty="0" smtClean="0"/>
+              <a:t>M=0.185</a:t>
+            </a:r>
+          </a:p>
+          <a:p>
+            <a:pPr lvl="1"/>
+            <a:r>
+              <a:rPr lang="en-US" dirty="0" smtClean="0"/>
+              <a:t>Calculate MMB</a:t>
+            </a:r>
+          </a:p>
+          <a:p>
+            <a:r>
+              <a:rPr lang="en-US" dirty="0" smtClean="0"/>
+              <a:t>Season 4</a:t>
+            </a:r>
+          </a:p>
+          <a:p>
+            <a:pPr lvl="1"/>
+            <a:r>
+              <a:rPr lang="en-US" dirty="0" smtClean="0"/>
+              <a:t>M=0.375</a:t>
+            </a:r>
+          </a:p>
+          <a:p>
+            <a:pPr lvl="1"/>
+            <a:r>
+              <a:rPr lang="en-US" dirty="0" smtClean="0"/>
+              <a:t>Growth and molting</a:t>
+            </a:r>
+          </a:p>
+          <a:p>
+            <a:pPr lvl="1"/>
+            <a:r>
+              <a:rPr lang="en-US" dirty="0" smtClean="0"/>
+              <a:t>Recruitment (all to stage-1)</a:t>
+            </a:r>
+            <a:endParaRPr lang="en-NZ" dirty="0"/>
+          </a:p>
+        </p:txBody>
+      </p:sp>
+    </p:spTree>
+    <p:extLst>
+      <p:ext uri="{BB962C8B-B14F-4D97-AF65-F5344CB8AC3E}">
+        <p14:creationId xmlns:p14="http://schemas.microsoft.com/office/powerpoint/2010/main" val="26533852"/>
+      </p:ext>
+    </p:extLst>
+  </p:cSld>
+  <p:clrMapOvr>
+    <a:masterClrMapping/>
+  </p:clrMapOvr>
+</p:sld>
+</file>
+
+<file path=ppt/slides/slide9.xml><?xml version="1.0" encoding="utf-8"?>
+<p:sld xmlns:a="http://schemas.openxmlformats.org/drawingml/2006/main" xmlns:r="http://schemas.openxmlformats.org/officeDocument/2006/relationships" xmlns:p="http://schemas.openxmlformats.org/presentationml/2006/main">
+  <p:cSld>
+    <p:spTree>
+      <p:nvGrpSpPr>
+        <p:cNvPr id="1" name=""/>
+        <p:cNvGrpSpPr/>
+        <p:nvPr/>
+      </p:nvGrpSpPr>
+      <p:grpSpPr>
+        <a:xfrm>
+          <a:off x="0" y="0"/>
+          <a:ext cx="0" cy="0"/>
+          <a:chOff x="0" y="0"/>
+          <a:chExt cx="0" cy="0"/>
+        </a:xfrm>
+      </p:grpSpPr>
+      <p:sp>
+        <p:nvSpPr>
+          <p:cNvPr id="2" name="Title 1"/>
+          <p:cNvSpPr>
+            <a:spLocks noGrp="1"/>
+          </p:cNvSpPr>
+          <p:nvPr>
+            <p:ph type="title"/>
+          </p:nvPr>
+        </p:nvSpPr>
+        <p:spPr/>
+        <p:txBody>
+          <a:bodyPr/>
+          <a:lstStyle/>
+          <a:p>
+            <a:r>
+              <a:rPr lang="en-US" dirty="0" smtClean="0"/>
+              <a:t>Da</a:t>
+            </a:r>
+            <a:r>
+              <a:rPr lang="en-US" dirty="0" smtClean="0"/>
+              <a:t>ta</a:t>
+            </a:r>
+            <a:endParaRPr lang="en-NZ" dirty="0"/>
+          </a:p>
+        </p:txBody>
+      </p:sp>
+      <p:pic>
+        <p:nvPicPr>
+          <p:cNvPr id="4" name="Content Placeholder 3"/>
+          <p:cNvPicPr>
+            <a:picLocks noGrp="1" noChangeAspect="1"/>
+          </p:cNvPicPr>
+          <p:nvPr>
+            <p:ph idx="1"/>
+          </p:nvPr>
+        </p:nvPicPr>
+        <p:blipFill rotWithShape="1">
+          <a:blip r:embed="rId2">
+            <a:extLst>
+              <a:ext uri="{28A0092B-C50C-407E-A947-70E740481C1C}">
+                <a14:useLocalDpi xmlns:a14="http://schemas.microsoft.com/office/drawing/2010/main" val="0"/>
+              </a:ext>
+            </a:extLst>
+          </a:blip>
+          <a:srcRect t="8787"/>
+          <a:stretch/>
+        </p:blipFill>
+        <p:spPr>
+          <a:xfrm>
+            <a:off x="1" y="1639023"/>
+            <a:ext cx="9144000" cy="4865298"/>
+          </a:xfrm>
+        </p:spPr>
+      </p:pic>
+    </p:spTree>
+    <p:extLst>
+      <p:ext uri="{BB962C8B-B14F-4D97-AF65-F5344CB8AC3E}">
+        <p14:creationId xmlns:p14="http://schemas.microsoft.com/office/powerpoint/2010/main" val="1030929791"/>
       </p:ext>
     </p:extLst>
   </p:cSld>

</xml_diff>

<commit_message>
updated the Makefile for smbkc and the appendix
</commit_message>
<xml_diff>
--- a/docs/smbkc/smbkc.pptx
+++ b/docs/smbkc/smbkc.pptx
@@ -7,34 +7,37 @@
   <p:sldIdLst>
     <p:sldId id="256" r:id="rId2"/>
     <p:sldId id="276" r:id="rId3"/>
-    <p:sldId id="283" r:id="rId4"/>
-    <p:sldId id="284" r:id="rId5"/>
+    <p:sldId id="286" r:id="rId4"/>
+    <p:sldId id="287" r:id="rId5"/>
     <p:sldId id="285" r:id="rId6"/>
-    <p:sldId id="279" r:id="rId7"/>
-    <p:sldId id="277" r:id="rId8"/>
-    <p:sldId id="278" r:id="rId9"/>
-    <p:sldId id="258" r:id="rId10"/>
-    <p:sldId id="281" r:id="rId11"/>
-    <p:sldId id="280" r:id="rId12"/>
-    <p:sldId id="282" r:id="rId13"/>
-    <p:sldId id="257" r:id="rId14"/>
-    <p:sldId id="259" r:id="rId15"/>
-    <p:sldId id="260" r:id="rId16"/>
-    <p:sldId id="268" r:id="rId17"/>
-    <p:sldId id="267" r:id="rId18"/>
-    <p:sldId id="261" r:id="rId19"/>
-    <p:sldId id="262" r:id="rId20"/>
-    <p:sldId id="263" r:id="rId21"/>
-    <p:sldId id="264" r:id="rId22"/>
-    <p:sldId id="265" r:id="rId23"/>
-    <p:sldId id="266" r:id="rId24"/>
-    <p:sldId id="269" r:id="rId25"/>
-    <p:sldId id="270" r:id="rId26"/>
-    <p:sldId id="271" r:id="rId27"/>
-    <p:sldId id="272" r:id="rId28"/>
-    <p:sldId id="273" r:id="rId29"/>
-    <p:sldId id="274" r:id="rId30"/>
-    <p:sldId id="275" r:id="rId31"/>
+    <p:sldId id="290" r:id="rId7"/>
+    <p:sldId id="279" r:id="rId8"/>
+    <p:sldId id="277" r:id="rId9"/>
+    <p:sldId id="278" r:id="rId10"/>
+    <p:sldId id="258" r:id="rId11"/>
+    <p:sldId id="257" r:id="rId12"/>
+    <p:sldId id="281" r:id="rId13"/>
+    <p:sldId id="288" r:id="rId14"/>
+    <p:sldId id="280" r:id="rId15"/>
+    <p:sldId id="282" r:id="rId16"/>
+    <p:sldId id="291" r:id="rId17"/>
+    <p:sldId id="259" r:id="rId18"/>
+    <p:sldId id="260" r:id="rId19"/>
+    <p:sldId id="268" r:id="rId20"/>
+    <p:sldId id="267" r:id="rId21"/>
+    <p:sldId id="261" r:id="rId22"/>
+    <p:sldId id="262" r:id="rId23"/>
+    <p:sldId id="263" r:id="rId24"/>
+    <p:sldId id="264" r:id="rId25"/>
+    <p:sldId id="265" r:id="rId26"/>
+    <p:sldId id="266" r:id="rId27"/>
+    <p:sldId id="269" r:id="rId28"/>
+    <p:sldId id="270" r:id="rId29"/>
+    <p:sldId id="271" r:id="rId30"/>
+    <p:sldId id="272" r:id="rId31"/>
+    <p:sldId id="273" r:id="rId32"/>
+    <p:sldId id="274" r:id="rId33"/>
+    <p:sldId id="275" r:id="rId34"/>
   </p:sldIdLst>
   <p:sldSz cx="9144000" cy="6858000" type="screen4x3"/>
   <p:notesSz cx="6858000" cy="9144000"/>
@@ -3012,7 +3015,7 @@
         </p:nvSpPr>
         <p:spPr>
           <a:xfrm>
-            <a:off x="685800" y="1993628"/>
+            <a:off x="685800" y="2045384"/>
             <a:ext cx="7772400" cy="2387600"/>
           </a:xfrm>
         </p:spPr>
@@ -3071,17 +3074,31 @@
         </p:nvSpPr>
         <p:spPr>
           <a:xfrm>
-            <a:off x="1143000" y="5016761"/>
-            <a:ext cx="6858000" cy="1655762"/>
+            <a:off x="1143000" y="5128899"/>
+            <a:ext cx="6858000" cy="1073488"/>
           </a:xfrm>
         </p:spPr>
         <p:txBody>
-          <a:bodyPr/>
-          <a:lstStyle/>
-          <a:p>
-            <a:r>
-              <a:rPr lang="en-US" dirty="0" smtClean="0"/>
-              <a:t>D’Arcy Webber, </a:t>
+          <a:bodyPr>
+            <a:normAutofit fontScale="92500" lnSpcReduction="10000"/>
+          </a:bodyPr>
+          <a:lstStyle/>
+          <a:p>
+            <a:r>
+              <a:rPr lang="en-US" dirty="0" smtClean="0"/>
+              <a:t>D’Arcy </a:t>
+            </a:r>
+            <a:r>
+              <a:rPr lang="en-US" dirty="0" smtClean="0"/>
+              <a:t>Webber</a:t>
+            </a:r>
+            <a:r>
+              <a:rPr lang="en-US" baseline="30000" dirty="0" smtClean="0"/>
+              <a:t>1</a:t>
+            </a:r>
+            <a:r>
+              <a:rPr lang="en-US" dirty="0" smtClean="0"/>
+              <a:t>, </a:t>
             </a:r>
             <a:r>
               <a:rPr lang="en-US" dirty="0" err="1" smtClean="0"/>
@@ -3092,16 +3109,54 @@
               <a:t> </a:t>
             </a:r>
             <a:r>
-              <a:rPr lang="en-US" dirty="0" err="1" smtClean="0"/>
+              <a:rPr lang="en-US" dirty="0" smtClean="0"/>
               <a:t>Zheng</a:t>
             </a:r>
             <a:r>
-              <a:rPr lang="en-US" dirty="0" smtClean="0"/>
-              <a:t>, James </a:t>
-            </a:r>
-            <a:r>
-              <a:rPr lang="en-US" dirty="0" err="1" smtClean="0"/>
+              <a:rPr lang="en-US" baseline="30000" dirty="0" smtClean="0"/>
+              <a:t>2</a:t>
+            </a:r>
+            <a:r>
+              <a:rPr lang="en-US" dirty="0" smtClean="0"/>
+              <a:t>, </a:t>
+            </a:r>
+            <a:r>
+              <a:rPr lang="en-US" dirty="0" smtClean="0"/>
+              <a:t>James </a:t>
+            </a:r>
+            <a:r>
+              <a:rPr lang="en-US" dirty="0" smtClean="0"/>
               <a:t>Ianelli</a:t>
+            </a:r>
+            <a:r>
+              <a:rPr lang="en-US" baseline="30000" dirty="0" smtClean="0"/>
+              <a:t>3</a:t>
+            </a:r>
+          </a:p>
+          <a:p>
+            <a:r>
+              <a:rPr lang="en-US" baseline="30000" dirty="0" smtClean="0"/>
+              <a:t>1</a:t>
+            </a:r>
+            <a:r>
+              <a:rPr lang="en-US" dirty="0" smtClean="0"/>
+              <a:t>University of Washington, </a:t>
+            </a:r>
+            <a:r>
+              <a:rPr lang="en-US" baseline="30000" dirty="0" smtClean="0"/>
+              <a:t>2</a:t>
+            </a:r>
+            <a:r>
+              <a:rPr lang="en-US" dirty="0" smtClean="0"/>
+              <a:t>Alaska Department of Fish and Game, </a:t>
+            </a:r>
+            <a:r>
+              <a:rPr lang="en-US" baseline="30000" dirty="0" smtClean="0"/>
+              <a:t>3</a:t>
+            </a:r>
+            <a:r>
+              <a:rPr lang="en-US" dirty="0" smtClean="0"/>
+              <a:t>NOAA</a:t>
             </a:r>
             <a:endParaRPr lang="en-NZ" dirty="0"/>
           </a:p>
@@ -3154,7 +3209,11 @@
           <a:p>
             <a:r>
               <a:rPr lang="en-US" dirty="0" smtClean="0"/>
-              <a:t>Size transition matrix</a:t>
+              <a:t>Da</a:t>
+            </a:r>
+            <a:r>
+              <a:rPr lang="en-US" dirty="0" smtClean="0"/>
+              <a:t>ta</a:t>
             </a:r>
             <a:endParaRPr lang="en-NZ" dirty="0"/>
           </a:p>
@@ -3170,7 +3229,7 @@
             <p:ph idx="1"/>
           </p:nvPr>
         </p:nvPicPr>
-        <p:blipFill>
+        <p:blipFill rotWithShape="1">
           <a:blip r:embed="rId2">
             <a:extLst>
               <a:ext uri="{28A0092B-C50C-407E-A947-70E740481C1C}">
@@ -3178,21 +3237,20 @@
               </a:ext>
             </a:extLst>
           </a:blip>
-          <a:stretch>
-            <a:fillRect/>
-          </a:stretch>
+          <a:srcRect t="8787"/>
+          <a:stretch/>
         </p:blipFill>
         <p:spPr>
           <a:xfrm>
-            <a:off x="842282" y="1825625"/>
-            <a:ext cx="7459435" cy="4351337"/>
+            <a:off x="1" y="1639023"/>
+            <a:ext cx="9144000" cy="4865298"/>
           </a:xfrm>
         </p:spPr>
       </p:pic>
     </p:spTree>
     <p:extLst>
       <p:ext uri="{BB962C8B-B14F-4D97-AF65-F5344CB8AC3E}">
-        <p14:creationId xmlns:p14="http://schemas.microsoft.com/office/powerpoint/2010/main" val="1273947952"/>
+        <p14:creationId xmlns:p14="http://schemas.microsoft.com/office/powerpoint/2010/main" val="1030929791"/>
       </p:ext>
     </p:extLst>
   </p:cSld>
@@ -3234,44 +3292,73 @@
           <a:bodyPr/>
           <a:lstStyle/>
           <a:p>
-            <a:r>
-              <a:rPr lang="en-US" dirty="0" smtClean="0"/>
-              <a:t>SMBKC</a:t>
-            </a:r>
-            <a:endParaRPr lang="en-NZ" dirty="0"/>
-          </a:p>
-        </p:txBody>
-      </p:sp>
-      <p:sp>
-        <p:nvSpPr>
-          <p:cNvPr id="3" name="Content Placeholder 2"/>
-          <p:cNvSpPr>
-            <a:spLocks noGrp="1"/>
-          </p:cNvSpPr>
+            <a:endParaRPr lang="en-NZ"/>
+          </a:p>
+        </p:txBody>
+      </p:sp>
+      <p:pic>
+        <p:nvPicPr>
+          <p:cNvPr id="6" name="Content Placeholder 5"/>
+          <p:cNvPicPr>
+            <a:picLocks noGrp="1" noChangeAspect="1"/>
+          </p:cNvPicPr>
           <p:nvPr>
             <p:ph idx="1"/>
           </p:nvPr>
-        </p:nvSpPr>
-        <p:spPr/>
-        <p:txBody>
-          <a:bodyPr/>
-          <a:lstStyle/>
-          <a:p>
-            <a:pPr marL="0" indent="0">
-              <a:buNone/>
-            </a:pPr>
-            <a:r>
-              <a:rPr lang="en-US" dirty="0" smtClean="0"/>
-              <a:t>Jump to document</a:t>
-            </a:r>
-            <a:endParaRPr lang="en-NZ" dirty="0"/>
-          </a:p>
-        </p:txBody>
-      </p:sp>
+        </p:nvPicPr>
+        <p:blipFill>
+          <a:blip r:embed="rId2">
+            <a:extLst>
+              <a:ext uri="{28A0092B-C50C-407E-A947-70E740481C1C}">
+                <a14:useLocalDpi xmlns:a14="http://schemas.microsoft.com/office/drawing/2010/main" val="0"/>
+              </a:ext>
+            </a:extLst>
+          </a:blip>
+          <a:stretch>
+            <a:fillRect/>
+          </a:stretch>
+        </p:blipFill>
+        <p:spPr>
+          <a:xfrm>
+            <a:off x="99564" y="212485"/>
+            <a:ext cx="5550996" cy="3238082"/>
+          </a:xfrm>
+        </p:spPr>
+      </p:pic>
+      <p:pic>
+        <p:nvPicPr>
+          <p:cNvPr id="10" name="Picture 9"/>
+          <p:cNvPicPr>
+            <a:picLocks noChangeAspect="1"/>
+          </p:cNvPicPr>
+          <p:nvPr/>
+        </p:nvPicPr>
+        <p:blipFill>
+          <a:blip r:embed="rId3">
+            <a:extLst>
+              <a:ext uri="{28A0092B-C50C-407E-A947-70E740481C1C}">
+                <a14:useLocalDpi xmlns:a14="http://schemas.microsoft.com/office/drawing/2010/main" val="0"/>
+              </a:ext>
+            </a:extLst>
+          </a:blip>
+          <a:stretch>
+            <a:fillRect/>
+          </a:stretch>
+        </p:blipFill>
+        <p:spPr>
+          <a:xfrm>
+            <a:off x="3295291" y="3432063"/>
+            <a:ext cx="5649620" cy="3295613"/>
+          </a:xfrm>
+          <a:prstGeom prst="rect">
+            <a:avLst/>
+          </a:prstGeom>
+        </p:spPr>
+      </p:pic>
     </p:spTree>
     <p:extLst>
       <p:ext uri="{BB962C8B-B14F-4D97-AF65-F5344CB8AC3E}">
-        <p14:creationId xmlns:p14="http://schemas.microsoft.com/office/powerpoint/2010/main" val="1571411259"/>
+        <p14:creationId xmlns:p14="http://schemas.microsoft.com/office/powerpoint/2010/main" val="2921751489"/>
       </p:ext>
     </p:extLst>
   </p:cSld>
@@ -3315,60 +3402,45 @@
           <a:p>
             <a:r>
               <a:rPr lang="en-US" dirty="0" smtClean="0"/>
-              <a:t>What else would people like to see?</a:t>
+              <a:t>Size transition matrix</a:t>
             </a:r>
             <a:endParaRPr lang="en-NZ" dirty="0"/>
           </a:p>
         </p:txBody>
       </p:sp>
-      <p:sp>
-        <p:nvSpPr>
-          <p:cNvPr id="3" name="Content Placeholder 2"/>
-          <p:cNvSpPr>
-            <a:spLocks noGrp="1"/>
-          </p:cNvSpPr>
+      <p:pic>
+        <p:nvPicPr>
+          <p:cNvPr id="4" name="Content Placeholder 3"/>
+          <p:cNvPicPr>
+            <a:picLocks noGrp="1" noChangeAspect="1"/>
+          </p:cNvPicPr>
           <p:nvPr>
             <p:ph idx="1"/>
           </p:nvPr>
-        </p:nvSpPr>
-        <p:spPr/>
-        <p:txBody>
-          <a:bodyPr/>
-          <a:lstStyle/>
-          <a:p>
-            <a:r>
-              <a:rPr lang="en-US" dirty="0" smtClean="0"/>
-              <a:t>Model runs:</a:t>
-            </a:r>
-          </a:p>
-          <a:p>
-            <a:pPr lvl="1"/>
-            <a:r>
-              <a:rPr lang="en-US" dirty="0" smtClean="0"/>
-              <a:t>Estimate M</a:t>
-            </a:r>
-            <a:r>
-              <a:rPr lang="en-US" baseline="-25000" dirty="0" smtClean="0"/>
-              <a:t>1998</a:t>
-            </a:r>
-            <a:r>
-              <a:rPr lang="en-US" dirty="0" smtClean="0"/>
-              <a:t> but with smaller SD constraining random-walk?</a:t>
-            </a:r>
-          </a:p>
-          <a:p>
-            <a:r>
-              <a:rPr lang="en-US" dirty="0" smtClean="0"/>
-              <a:t>Plots…</a:t>
-            </a:r>
-            <a:endParaRPr lang="en-NZ" dirty="0"/>
-          </a:p>
-        </p:txBody>
-      </p:sp>
+        </p:nvPicPr>
+        <p:blipFill>
+          <a:blip r:embed="rId2">
+            <a:extLst>
+              <a:ext uri="{28A0092B-C50C-407E-A947-70E740481C1C}">
+                <a14:useLocalDpi xmlns:a14="http://schemas.microsoft.com/office/drawing/2010/main" val="0"/>
+              </a:ext>
+            </a:extLst>
+          </a:blip>
+          <a:stretch>
+            <a:fillRect/>
+          </a:stretch>
+        </p:blipFill>
+        <p:spPr>
+          <a:xfrm>
+            <a:off x="195301" y="1437436"/>
+            <a:ext cx="8833963" cy="5153145"/>
+          </a:xfrm>
+        </p:spPr>
+      </p:pic>
     </p:spTree>
     <p:extLst>
       <p:ext uri="{BB962C8B-B14F-4D97-AF65-F5344CB8AC3E}">
-        <p14:creationId xmlns:p14="http://schemas.microsoft.com/office/powerpoint/2010/main" val="334652935"/>
+        <p14:creationId xmlns:p14="http://schemas.microsoft.com/office/powerpoint/2010/main" val="1273947952"/>
       </p:ext>
     </p:extLst>
   </p:cSld>
@@ -3416,13 +3488,11 @@
       </p:sp>
       <p:pic>
         <p:nvPicPr>
-          <p:cNvPr id="6" name="Content Placeholder 5"/>
+          <p:cNvPr id="7" name="Picture 6"/>
           <p:cNvPicPr>
-            <a:picLocks noGrp="1" noChangeAspect="1"/>
+            <a:picLocks noChangeAspect="1"/>
           </p:cNvPicPr>
-          <p:nvPr>
-            <p:ph idx="1"/>
-          </p:nvPr>
+          <p:nvPr/>
         </p:nvPicPr>
         <p:blipFill>
           <a:blip r:embed="rId2">
@@ -3438,14 +3508,17 @@
         </p:blipFill>
         <p:spPr>
           <a:xfrm>
-            <a:off x="-63491" y="1980901"/>
-            <a:ext cx="3598960" cy="2099394"/>
+            <a:off x="3467820" y="3374159"/>
+            <a:ext cx="5615794" cy="3275880"/>
           </a:xfrm>
+          <a:prstGeom prst="rect">
+            <a:avLst/>
+          </a:prstGeom>
         </p:spPr>
       </p:pic>
       <p:pic>
         <p:nvPicPr>
-          <p:cNvPr id="7" name="Picture 6"/>
+          <p:cNvPr id="9" name="Picture 8"/>
           <p:cNvPicPr>
             <a:picLocks noChangeAspect="1"/>
           </p:cNvPicPr>
@@ -3465,68 +3538,8 @@
         </p:blipFill>
         <p:spPr>
           <a:xfrm>
-            <a:off x="4285965" y="1101231"/>
-            <a:ext cx="4702757" cy="2743275"/>
-          </a:xfrm>
-          <a:prstGeom prst="rect">
-            <a:avLst/>
-          </a:prstGeom>
-        </p:spPr>
-      </p:pic>
-      <p:pic>
-        <p:nvPicPr>
-          <p:cNvPr id="8" name="Picture 7"/>
-          <p:cNvPicPr>
-            <a:picLocks noChangeAspect="1"/>
-          </p:cNvPicPr>
-          <p:nvPr/>
-        </p:nvPicPr>
-        <p:blipFill>
-          <a:blip r:embed="rId4">
-            <a:extLst>
-              <a:ext uri="{28A0092B-C50C-407E-A947-70E740481C1C}">
-                <a14:useLocalDpi xmlns:a14="http://schemas.microsoft.com/office/drawing/2010/main" val="0"/>
-              </a:ext>
-            </a:extLst>
-          </a:blip>
-          <a:stretch>
-            <a:fillRect/>
-          </a:stretch>
-        </p:blipFill>
-        <p:spPr>
-          <a:xfrm>
-            <a:off x="4761099" y="4370507"/>
-            <a:ext cx="3907766" cy="2279531"/>
-          </a:xfrm>
-          <a:prstGeom prst="rect">
-            <a:avLst/>
-          </a:prstGeom>
-        </p:spPr>
-      </p:pic>
-      <p:pic>
-        <p:nvPicPr>
-          <p:cNvPr id="9" name="Picture 8"/>
-          <p:cNvPicPr>
-            <a:picLocks noChangeAspect="1"/>
-          </p:cNvPicPr>
-          <p:nvPr/>
-        </p:nvPicPr>
-        <p:blipFill>
-          <a:blip r:embed="rId5">
-            <a:extLst>
-              <a:ext uri="{28A0092B-C50C-407E-A947-70E740481C1C}">
-                <a14:useLocalDpi xmlns:a14="http://schemas.microsoft.com/office/drawing/2010/main" val="0"/>
-              </a:ext>
-            </a:extLst>
-          </a:blip>
-          <a:stretch>
-            <a:fillRect/>
-          </a:stretch>
-        </p:blipFill>
-        <p:spPr>
-          <a:xfrm>
-            <a:off x="378199" y="4370507"/>
-            <a:ext cx="3907766" cy="2279531"/>
+            <a:off x="222922" y="195322"/>
+            <a:ext cx="5402959" cy="3151727"/>
           </a:xfrm>
           <a:prstGeom prst="rect">
             <a:avLst/>
@@ -3536,7 +3549,7 @@
     </p:spTree>
     <p:extLst>
       <p:ext uri="{BB962C8B-B14F-4D97-AF65-F5344CB8AC3E}">
-        <p14:creationId xmlns:p14="http://schemas.microsoft.com/office/powerpoint/2010/main" val="2921751489"/>
+        <p14:creationId xmlns:p14="http://schemas.microsoft.com/office/powerpoint/2010/main" val="345144300"/>
       </p:ext>
     </p:extLst>
   </p:cSld>
@@ -3547,6 +3560,250 @@
 </file>
 
 <file path=ppt/slides/slide14.xml><?xml version="1.0" encoding="utf-8"?>
+<p:sld xmlns:a="http://schemas.openxmlformats.org/drawingml/2006/main" xmlns:r="http://schemas.openxmlformats.org/officeDocument/2006/relationships" xmlns:p="http://schemas.openxmlformats.org/presentationml/2006/main">
+  <p:cSld>
+    <p:spTree>
+      <p:nvGrpSpPr>
+        <p:cNvPr id="1" name=""/>
+        <p:cNvGrpSpPr/>
+        <p:nvPr/>
+      </p:nvGrpSpPr>
+      <p:grpSpPr>
+        <a:xfrm>
+          <a:off x="0" y="0"/>
+          <a:ext cx="0" cy="0"/>
+          <a:chOff x="0" y="0"/>
+          <a:chExt cx="0" cy="0"/>
+        </a:xfrm>
+      </p:grpSpPr>
+      <p:sp>
+        <p:nvSpPr>
+          <p:cNvPr id="2" name="Title 1"/>
+          <p:cNvSpPr>
+            <a:spLocks noGrp="1"/>
+          </p:cNvSpPr>
+          <p:nvPr>
+            <p:ph type="title"/>
+          </p:nvPr>
+        </p:nvSpPr>
+        <p:spPr/>
+        <p:txBody>
+          <a:bodyPr/>
+          <a:lstStyle/>
+          <a:p>
+            <a:r>
+              <a:rPr lang="en-US" dirty="0" smtClean="0"/>
+              <a:t>SMBKC</a:t>
+            </a:r>
+            <a:endParaRPr lang="en-NZ" dirty="0"/>
+          </a:p>
+        </p:txBody>
+      </p:sp>
+      <p:sp>
+        <p:nvSpPr>
+          <p:cNvPr id="3" name="Content Placeholder 2"/>
+          <p:cNvSpPr>
+            <a:spLocks noGrp="1"/>
+          </p:cNvSpPr>
+          <p:nvPr>
+            <p:ph idx="1"/>
+          </p:nvPr>
+        </p:nvSpPr>
+        <p:spPr/>
+        <p:txBody>
+          <a:bodyPr/>
+          <a:lstStyle/>
+          <a:p>
+            <a:pPr marL="0" indent="0">
+              <a:buNone/>
+            </a:pPr>
+            <a:r>
+              <a:rPr lang="en-US" dirty="0" smtClean="0"/>
+              <a:t>Jump to document</a:t>
+            </a:r>
+            <a:endParaRPr lang="en-NZ" dirty="0"/>
+          </a:p>
+        </p:txBody>
+      </p:sp>
+    </p:spTree>
+    <p:extLst>
+      <p:ext uri="{BB962C8B-B14F-4D97-AF65-F5344CB8AC3E}">
+        <p14:creationId xmlns:p14="http://schemas.microsoft.com/office/powerpoint/2010/main" val="1571411259"/>
+      </p:ext>
+    </p:extLst>
+  </p:cSld>
+  <p:clrMapOvr>
+    <a:masterClrMapping/>
+  </p:clrMapOvr>
+</p:sld>
+</file>
+
+<file path=ppt/slides/slide15.xml><?xml version="1.0" encoding="utf-8"?>
+<p:sld xmlns:a="http://schemas.openxmlformats.org/drawingml/2006/main" xmlns:r="http://schemas.openxmlformats.org/officeDocument/2006/relationships" xmlns:p="http://schemas.openxmlformats.org/presentationml/2006/main">
+  <p:cSld>
+    <p:spTree>
+      <p:nvGrpSpPr>
+        <p:cNvPr id="1" name=""/>
+        <p:cNvGrpSpPr/>
+        <p:nvPr/>
+      </p:nvGrpSpPr>
+      <p:grpSpPr>
+        <a:xfrm>
+          <a:off x="0" y="0"/>
+          <a:ext cx="0" cy="0"/>
+          <a:chOff x="0" y="0"/>
+          <a:chExt cx="0" cy="0"/>
+        </a:xfrm>
+      </p:grpSpPr>
+      <p:sp>
+        <p:nvSpPr>
+          <p:cNvPr id="2" name="Title 1"/>
+          <p:cNvSpPr>
+            <a:spLocks noGrp="1"/>
+          </p:cNvSpPr>
+          <p:nvPr>
+            <p:ph type="title"/>
+          </p:nvPr>
+        </p:nvSpPr>
+        <p:spPr/>
+        <p:txBody>
+          <a:bodyPr/>
+          <a:lstStyle/>
+          <a:p>
+            <a:r>
+              <a:rPr lang="en-US" dirty="0" smtClean="0"/>
+              <a:t>What else would people like to see?</a:t>
+            </a:r>
+            <a:endParaRPr lang="en-NZ" dirty="0"/>
+          </a:p>
+        </p:txBody>
+      </p:sp>
+      <p:sp>
+        <p:nvSpPr>
+          <p:cNvPr id="3" name="Content Placeholder 2"/>
+          <p:cNvSpPr>
+            <a:spLocks noGrp="1"/>
+          </p:cNvSpPr>
+          <p:nvPr>
+            <p:ph idx="1"/>
+          </p:nvPr>
+        </p:nvSpPr>
+        <p:spPr/>
+        <p:txBody>
+          <a:bodyPr/>
+          <a:lstStyle/>
+          <a:p>
+            <a:r>
+              <a:rPr lang="en-US" dirty="0" smtClean="0"/>
+              <a:t>Model runs:</a:t>
+            </a:r>
+          </a:p>
+          <a:p>
+            <a:pPr lvl="1"/>
+            <a:r>
+              <a:rPr lang="en-US" dirty="0" smtClean="0"/>
+              <a:t>Estimate M</a:t>
+            </a:r>
+            <a:r>
+              <a:rPr lang="en-US" baseline="-25000" dirty="0" smtClean="0"/>
+              <a:t>1998</a:t>
+            </a:r>
+            <a:r>
+              <a:rPr lang="en-US" dirty="0" smtClean="0"/>
+              <a:t> but with smaller SD constraining deviation?</a:t>
+            </a:r>
+          </a:p>
+          <a:p>
+            <a:r>
+              <a:rPr lang="en-US" dirty="0" smtClean="0"/>
+              <a:t>Plots…</a:t>
+            </a:r>
+            <a:endParaRPr lang="en-NZ" dirty="0"/>
+          </a:p>
+        </p:txBody>
+      </p:sp>
+    </p:spTree>
+    <p:extLst>
+      <p:ext uri="{BB962C8B-B14F-4D97-AF65-F5344CB8AC3E}">
+        <p14:creationId xmlns:p14="http://schemas.microsoft.com/office/powerpoint/2010/main" val="334652935"/>
+      </p:ext>
+    </p:extLst>
+  </p:cSld>
+  <p:clrMapOvr>
+    <a:masterClrMapping/>
+  </p:clrMapOvr>
+</p:sld>
+</file>
+
+<file path=ppt/slides/slide16.xml><?xml version="1.0" encoding="utf-8"?>
+<p:sld xmlns:a="http://schemas.openxmlformats.org/drawingml/2006/main" xmlns:r="http://schemas.openxmlformats.org/officeDocument/2006/relationships" xmlns:p="http://schemas.openxmlformats.org/presentationml/2006/main">
+  <p:cSld>
+    <p:spTree>
+      <p:nvGrpSpPr>
+        <p:cNvPr id="1" name=""/>
+        <p:cNvGrpSpPr/>
+        <p:nvPr/>
+      </p:nvGrpSpPr>
+      <p:grpSpPr>
+        <a:xfrm>
+          <a:off x="0" y="0"/>
+          <a:ext cx="0" cy="0"/>
+          <a:chOff x="0" y="0"/>
+          <a:chExt cx="0" cy="0"/>
+        </a:xfrm>
+      </p:grpSpPr>
+      <p:sp>
+        <p:nvSpPr>
+          <p:cNvPr id="2" name="Title 1"/>
+          <p:cNvSpPr>
+            <a:spLocks noGrp="1"/>
+          </p:cNvSpPr>
+          <p:nvPr>
+            <p:ph type="title"/>
+          </p:nvPr>
+        </p:nvSpPr>
+        <p:spPr/>
+        <p:txBody>
+          <a:bodyPr/>
+          <a:lstStyle/>
+          <a:p>
+            <a:endParaRPr lang="en-NZ"/>
+          </a:p>
+        </p:txBody>
+      </p:sp>
+      <p:sp>
+        <p:nvSpPr>
+          <p:cNvPr id="3" name="Content Placeholder 2"/>
+          <p:cNvSpPr>
+            <a:spLocks noGrp="1"/>
+          </p:cNvSpPr>
+          <p:nvPr>
+            <p:ph idx="1"/>
+          </p:nvPr>
+        </p:nvSpPr>
+        <p:spPr/>
+        <p:txBody>
+          <a:bodyPr/>
+          <a:lstStyle/>
+          <a:p>
+            <a:endParaRPr lang="en-NZ"/>
+          </a:p>
+        </p:txBody>
+      </p:sp>
+    </p:spTree>
+    <p:extLst>
+      <p:ext uri="{BB962C8B-B14F-4D97-AF65-F5344CB8AC3E}">
+        <p14:creationId xmlns:p14="http://schemas.microsoft.com/office/powerpoint/2010/main" val="153069590"/>
+      </p:ext>
+    </p:extLst>
+  </p:cSld>
+  <p:clrMapOvr>
+    <a:masterClrMapping/>
+  </p:clrMapOvr>
+</p:sld>
+</file>
+
+<file path=ppt/slides/slide17.xml><?xml version="1.0" encoding="utf-8"?>
 <p:sld xmlns:a="http://schemas.openxmlformats.org/drawingml/2006/main" xmlns:r="http://schemas.openxmlformats.org/officeDocument/2006/relationships" xmlns:p="http://schemas.openxmlformats.org/presentationml/2006/main">
   <p:cSld>
     <p:spTree>
@@ -3624,7 +3881,7 @@
 </p:sld>
 </file>
 
-<file path=ppt/slides/slide15.xml><?xml version="1.0" encoding="utf-8"?>
+<file path=ppt/slides/slide18.xml><?xml version="1.0" encoding="utf-8"?>
 <p:sld xmlns:a="http://schemas.openxmlformats.org/drawingml/2006/main" xmlns:r="http://schemas.openxmlformats.org/officeDocument/2006/relationships" xmlns:p="http://schemas.openxmlformats.org/presentationml/2006/main">
   <p:cSld>
     <p:spTree>
@@ -3702,7 +3959,7 @@
 </p:sld>
 </file>
 
-<file path=ppt/slides/slide16.xml><?xml version="1.0" encoding="utf-8"?>
+<file path=ppt/slides/slide19.xml><?xml version="1.0" encoding="utf-8"?>
 <p:sld xmlns:a="http://schemas.openxmlformats.org/drawingml/2006/main" xmlns:r="http://schemas.openxmlformats.org/officeDocument/2006/relationships" xmlns:p="http://schemas.openxmlformats.org/presentationml/2006/main">
   <p:cSld>
     <p:spTree>
@@ -3780,7 +4037,217 @@
 </p:sld>
 </file>
 
-<file path=ppt/slides/slide17.xml><?xml version="1.0" encoding="utf-8"?>
+<file path=ppt/slides/slide2.xml><?xml version="1.0" encoding="utf-8"?>
+<p:sld xmlns:a="http://schemas.openxmlformats.org/drawingml/2006/main" xmlns:r="http://schemas.openxmlformats.org/officeDocument/2006/relationships" xmlns:p="http://schemas.openxmlformats.org/presentationml/2006/main">
+  <p:cSld>
+    <p:spTree>
+      <p:nvGrpSpPr>
+        <p:cNvPr id="1" name=""/>
+        <p:cNvGrpSpPr/>
+        <p:nvPr/>
+      </p:nvGrpSpPr>
+      <p:grpSpPr>
+        <a:xfrm>
+          <a:off x="0" y="0"/>
+          <a:ext cx="0" cy="0"/>
+          <a:chOff x="0" y="0"/>
+          <a:chExt cx="0" cy="0"/>
+        </a:xfrm>
+      </p:grpSpPr>
+      <p:sp>
+        <p:nvSpPr>
+          <p:cNvPr id="2" name="Title 1"/>
+          <p:cNvSpPr>
+            <a:spLocks noGrp="1"/>
+          </p:cNvSpPr>
+          <p:nvPr>
+            <p:ph type="title"/>
+          </p:nvPr>
+        </p:nvSpPr>
+        <p:spPr/>
+        <p:txBody>
+          <a:bodyPr/>
+          <a:lstStyle/>
+          <a:p>
+            <a:r>
+              <a:rPr lang="en-US" dirty="0" err="1" smtClean="0"/>
+              <a:t>Gmacs</a:t>
+            </a:r>
+            <a:r>
+              <a:rPr lang="en-US" dirty="0" smtClean="0"/>
+              <a:t> progress</a:t>
+            </a:r>
+            <a:endParaRPr lang="en-NZ" dirty="0"/>
+          </a:p>
+        </p:txBody>
+      </p:sp>
+      <p:sp>
+        <p:nvSpPr>
+          <p:cNvPr id="3" name="Content Placeholder 2"/>
+          <p:cNvSpPr>
+            <a:spLocks noGrp="1"/>
+          </p:cNvSpPr>
+          <p:nvPr>
+            <p:ph idx="1"/>
+          </p:nvPr>
+        </p:nvSpPr>
+        <p:spPr/>
+        <p:txBody>
+          <a:bodyPr>
+            <a:normAutofit fontScale="92500" lnSpcReduction="10000"/>
+          </a:bodyPr>
+          <a:lstStyle/>
+          <a:p>
+            <a:r>
+              <a:rPr lang="en-US" dirty="0" smtClean="0"/>
+              <a:t>Added seasons to </a:t>
+            </a:r>
+            <a:r>
+              <a:rPr lang="en-US" dirty="0" err="1" smtClean="0"/>
+              <a:t>Gmacs</a:t>
+            </a:r>
+            <a:r>
+              <a:rPr lang="en-US" dirty="0" smtClean="0"/>
+              <a:t> dynamics</a:t>
+            </a:r>
+          </a:p>
+          <a:p>
+            <a:pPr lvl="1"/>
+            <a:r>
+              <a:rPr lang="en-US" dirty="0" smtClean="0"/>
+              <a:t>Retained continuous </a:t>
+            </a:r>
+            <a:r>
+              <a:rPr lang="en-US" i="1" dirty="0" smtClean="0"/>
+              <a:t>M</a:t>
+            </a:r>
+            <a:r>
+              <a:rPr lang="en-US" dirty="0" smtClean="0"/>
+              <a:t>/</a:t>
+            </a:r>
+            <a:r>
+              <a:rPr lang="en-US" i="1" dirty="0" smtClean="0"/>
+              <a:t>F</a:t>
+            </a:r>
+            <a:r>
+              <a:rPr lang="en-US" dirty="0" smtClean="0"/>
+              <a:t> (within each season)</a:t>
+            </a:r>
+            <a:endParaRPr lang="en-US" i="1" dirty="0"/>
+          </a:p>
+          <a:p>
+            <a:pPr lvl="1"/>
+            <a:r>
+              <a:rPr lang="en-US" dirty="0" smtClean="0"/>
+              <a:t>Number </a:t>
+            </a:r>
+            <a:r>
+              <a:rPr lang="en-US" dirty="0" smtClean="0"/>
+              <a:t>of seasons</a:t>
+            </a:r>
+          </a:p>
+          <a:p>
+            <a:pPr lvl="1"/>
+            <a:r>
+              <a:rPr lang="en-US" dirty="0" smtClean="0"/>
+              <a:t>Proportion of </a:t>
+            </a:r>
+            <a:r>
+              <a:rPr lang="en-US" i="1" dirty="0" smtClean="0"/>
+              <a:t>M</a:t>
+            </a:r>
+            <a:r>
+              <a:rPr lang="en-US" dirty="0" smtClean="0"/>
+              <a:t> each season</a:t>
+            </a:r>
+          </a:p>
+          <a:p>
+            <a:pPr lvl="1"/>
+            <a:r>
+              <a:rPr lang="en-US" dirty="0" smtClean="0"/>
+              <a:t>Season molting and </a:t>
+            </a:r>
+            <a:r>
+              <a:rPr lang="en-US" dirty="0" smtClean="0"/>
+              <a:t>growth occur</a:t>
+            </a:r>
+            <a:endParaRPr lang="en-US" dirty="0" smtClean="0"/>
+          </a:p>
+          <a:p>
+            <a:pPr lvl="1"/>
+            <a:r>
+              <a:rPr lang="en-US" dirty="0" smtClean="0"/>
+              <a:t>Season </a:t>
+            </a:r>
+            <a:r>
+              <a:rPr lang="en-US" dirty="0" smtClean="0"/>
+              <a:t>recruitment occurs</a:t>
+            </a:r>
+            <a:endParaRPr lang="en-US" dirty="0" smtClean="0"/>
+          </a:p>
+          <a:p>
+            <a:pPr lvl="1"/>
+            <a:r>
+              <a:rPr lang="en-US" dirty="0" smtClean="0"/>
+              <a:t>Season </a:t>
+            </a:r>
+            <a:r>
+              <a:rPr lang="en-US" dirty="0" smtClean="0"/>
+              <a:t>SSB is to be calculated</a:t>
+            </a:r>
+            <a:endParaRPr lang="en-US" dirty="0" smtClean="0"/>
+          </a:p>
+          <a:p>
+            <a:pPr lvl="1"/>
+            <a:r>
+              <a:rPr lang="en-US" dirty="0" smtClean="0"/>
+              <a:t>All </a:t>
+            </a:r>
+            <a:r>
+              <a:rPr lang="en-US" dirty="0" smtClean="0"/>
+              <a:t>data sets have a time stamp (season/year)</a:t>
+            </a:r>
+          </a:p>
+          <a:p>
+            <a:r>
+              <a:rPr lang="en-US" dirty="0" smtClean="0"/>
+              <a:t>Added option to initialize numbers as free parameters</a:t>
+            </a:r>
+          </a:p>
+          <a:p>
+            <a:r>
+              <a:rPr lang="en-US" dirty="0" smtClean="0"/>
+              <a:t>New plotting functions in </a:t>
+            </a:r>
+            <a:r>
+              <a:rPr lang="en-US" dirty="0" err="1" smtClean="0"/>
+              <a:t>gmr</a:t>
+            </a:r>
+            <a:endParaRPr lang="en-US" dirty="0" smtClean="0"/>
+          </a:p>
+          <a:p>
+            <a:r>
+              <a:rPr lang="en-US" dirty="0" smtClean="0"/>
+              <a:t>Draft SMBKC document</a:t>
+            </a:r>
+            <a:endParaRPr lang="en-US" dirty="0" smtClean="0"/>
+          </a:p>
+        </p:txBody>
+      </p:sp>
+    </p:spTree>
+    <p:extLst>
+      <p:ext uri="{BB962C8B-B14F-4D97-AF65-F5344CB8AC3E}">
+        <p14:creationId xmlns:p14="http://schemas.microsoft.com/office/powerpoint/2010/main" val="1127452723"/>
+      </p:ext>
+    </p:extLst>
+  </p:cSld>
+  <p:clrMapOvr>
+    <a:masterClrMapping/>
+  </p:clrMapOvr>
+</p:sld>
+</file>
+
+<file path=ppt/slides/slide20.xml><?xml version="1.0" encoding="utf-8"?>
 <p:sld xmlns:a="http://schemas.openxmlformats.org/drawingml/2006/main" xmlns:r="http://schemas.openxmlformats.org/officeDocument/2006/relationships" xmlns:p="http://schemas.openxmlformats.org/presentationml/2006/main">
   <p:cSld>
     <p:spTree>
@@ -3858,7 +4325,7 @@
 </p:sld>
 </file>
 
-<file path=ppt/slides/slide18.xml><?xml version="1.0" encoding="utf-8"?>
+<file path=ppt/slides/slide21.xml><?xml version="1.0" encoding="utf-8"?>
 <p:sld xmlns:a="http://schemas.openxmlformats.org/drawingml/2006/main" xmlns:r="http://schemas.openxmlformats.org/officeDocument/2006/relationships" xmlns:p="http://schemas.openxmlformats.org/presentationml/2006/main">
   <p:cSld>
     <p:spTree>
@@ -3936,7 +4403,7 @@
 </p:sld>
 </file>
 
-<file path=ppt/slides/slide19.xml><?xml version="1.0" encoding="utf-8"?>
+<file path=ppt/slides/slide22.xml><?xml version="1.0" encoding="utf-8"?>
 <p:sld xmlns:a="http://schemas.openxmlformats.org/drawingml/2006/main" xmlns:r="http://schemas.openxmlformats.org/officeDocument/2006/relationships" xmlns:p="http://schemas.openxmlformats.org/presentationml/2006/main">
   <p:cSld>
     <p:spTree>
@@ -4014,217 +4481,7 @@
 </p:sld>
 </file>
 
-<file path=ppt/slides/slide2.xml><?xml version="1.0" encoding="utf-8"?>
-<p:sld xmlns:a="http://schemas.openxmlformats.org/drawingml/2006/main" xmlns:r="http://schemas.openxmlformats.org/officeDocument/2006/relationships" xmlns:p="http://schemas.openxmlformats.org/presentationml/2006/main">
-  <p:cSld>
-    <p:spTree>
-      <p:nvGrpSpPr>
-        <p:cNvPr id="1" name=""/>
-        <p:cNvGrpSpPr/>
-        <p:nvPr/>
-      </p:nvGrpSpPr>
-      <p:grpSpPr>
-        <a:xfrm>
-          <a:off x="0" y="0"/>
-          <a:ext cx="0" cy="0"/>
-          <a:chOff x="0" y="0"/>
-          <a:chExt cx="0" cy="0"/>
-        </a:xfrm>
-      </p:grpSpPr>
-      <p:sp>
-        <p:nvSpPr>
-          <p:cNvPr id="2" name="Title 1"/>
-          <p:cNvSpPr>
-            <a:spLocks noGrp="1"/>
-          </p:cNvSpPr>
-          <p:nvPr>
-            <p:ph type="title"/>
-          </p:nvPr>
-        </p:nvSpPr>
-        <p:spPr/>
-        <p:txBody>
-          <a:bodyPr/>
-          <a:lstStyle/>
-          <a:p>
-            <a:r>
-              <a:rPr lang="en-US" dirty="0" err="1" smtClean="0"/>
-              <a:t>Gmacs</a:t>
-            </a:r>
-            <a:r>
-              <a:rPr lang="en-US" dirty="0" smtClean="0"/>
-              <a:t> progress</a:t>
-            </a:r>
-            <a:endParaRPr lang="en-NZ" dirty="0"/>
-          </a:p>
-        </p:txBody>
-      </p:sp>
-      <p:sp>
-        <p:nvSpPr>
-          <p:cNvPr id="3" name="Content Placeholder 2"/>
-          <p:cNvSpPr>
-            <a:spLocks noGrp="1"/>
-          </p:cNvSpPr>
-          <p:nvPr>
-            <p:ph idx="1"/>
-          </p:nvPr>
-        </p:nvSpPr>
-        <p:spPr/>
-        <p:txBody>
-          <a:bodyPr>
-            <a:normAutofit fontScale="92500" lnSpcReduction="10000"/>
-          </a:bodyPr>
-          <a:lstStyle/>
-          <a:p>
-            <a:r>
-              <a:rPr lang="en-US" dirty="0" smtClean="0"/>
-              <a:t>Added seasons to </a:t>
-            </a:r>
-            <a:r>
-              <a:rPr lang="en-US" dirty="0" err="1" smtClean="0"/>
-              <a:t>Gmacs</a:t>
-            </a:r>
-            <a:r>
-              <a:rPr lang="en-US" dirty="0" smtClean="0"/>
-              <a:t> dynamics</a:t>
-            </a:r>
-          </a:p>
-          <a:p>
-            <a:pPr lvl="1"/>
-            <a:r>
-              <a:rPr lang="en-US" dirty="0" smtClean="0"/>
-              <a:t>Continuous </a:t>
-            </a:r>
-            <a:r>
-              <a:rPr lang="en-US" i="1" dirty="0" smtClean="0"/>
-              <a:t>M</a:t>
-            </a:r>
-            <a:r>
-              <a:rPr lang="en-US" dirty="0" smtClean="0"/>
-              <a:t>/</a:t>
-            </a:r>
-            <a:r>
-              <a:rPr lang="en-US" i="1" dirty="0" smtClean="0"/>
-              <a:t>F</a:t>
-            </a:r>
-            <a:r>
-              <a:rPr lang="en-US" dirty="0" smtClean="0"/>
-              <a:t> within seasons</a:t>
-            </a:r>
-            <a:endParaRPr lang="en-US" i="1" dirty="0"/>
-          </a:p>
-          <a:p>
-            <a:pPr lvl="1"/>
-            <a:r>
-              <a:rPr lang="en-US" dirty="0" smtClean="0"/>
-              <a:t>Number </a:t>
-            </a:r>
-            <a:r>
-              <a:rPr lang="en-US" dirty="0" smtClean="0"/>
-              <a:t>of seasons</a:t>
-            </a:r>
-          </a:p>
-          <a:p>
-            <a:pPr lvl="1"/>
-            <a:r>
-              <a:rPr lang="en-US" dirty="0" smtClean="0"/>
-              <a:t>Proportion of </a:t>
-            </a:r>
-            <a:r>
-              <a:rPr lang="en-US" i="1" dirty="0" smtClean="0"/>
-              <a:t>M</a:t>
-            </a:r>
-            <a:r>
-              <a:rPr lang="en-US" dirty="0" smtClean="0"/>
-              <a:t> each season</a:t>
-            </a:r>
-          </a:p>
-          <a:p>
-            <a:pPr lvl="1"/>
-            <a:r>
-              <a:rPr lang="en-US" dirty="0" smtClean="0"/>
-              <a:t>Season molting and </a:t>
-            </a:r>
-            <a:r>
-              <a:rPr lang="en-US" dirty="0" smtClean="0"/>
-              <a:t>growth occur</a:t>
-            </a:r>
-            <a:endParaRPr lang="en-US" dirty="0" smtClean="0"/>
-          </a:p>
-          <a:p>
-            <a:pPr lvl="1"/>
-            <a:r>
-              <a:rPr lang="en-US" dirty="0" smtClean="0"/>
-              <a:t>Season </a:t>
-            </a:r>
-            <a:r>
-              <a:rPr lang="en-US" dirty="0" smtClean="0"/>
-              <a:t>recruitment occurs</a:t>
-            </a:r>
-            <a:endParaRPr lang="en-US" dirty="0" smtClean="0"/>
-          </a:p>
-          <a:p>
-            <a:pPr lvl="1"/>
-            <a:r>
-              <a:rPr lang="en-US" dirty="0" smtClean="0"/>
-              <a:t>Season </a:t>
-            </a:r>
-            <a:r>
-              <a:rPr lang="en-US" dirty="0" smtClean="0"/>
-              <a:t>SSB is to be calculated</a:t>
-            </a:r>
-            <a:endParaRPr lang="en-US" dirty="0" smtClean="0"/>
-          </a:p>
-          <a:p>
-            <a:pPr lvl="1"/>
-            <a:r>
-              <a:rPr lang="en-US" dirty="0" smtClean="0"/>
-              <a:t>All </a:t>
-            </a:r>
-            <a:r>
-              <a:rPr lang="en-US" dirty="0" smtClean="0"/>
-              <a:t>data sets have a time stamp (season/year)</a:t>
-            </a:r>
-          </a:p>
-          <a:p>
-            <a:r>
-              <a:rPr lang="en-US" dirty="0" smtClean="0"/>
-              <a:t>Added option to initialize numbers as free parameters</a:t>
-            </a:r>
-          </a:p>
-          <a:p>
-            <a:r>
-              <a:rPr lang="en-US" dirty="0" smtClean="0"/>
-              <a:t>New plotting functions in </a:t>
-            </a:r>
-            <a:r>
-              <a:rPr lang="en-US" dirty="0" err="1" smtClean="0"/>
-              <a:t>gmr</a:t>
-            </a:r>
-            <a:endParaRPr lang="en-US" dirty="0" smtClean="0"/>
-          </a:p>
-          <a:p>
-            <a:r>
-              <a:rPr lang="en-US" dirty="0" smtClean="0"/>
-              <a:t>Draft SMBKC document</a:t>
-            </a:r>
-            <a:endParaRPr lang="en-US" dirty="0" smtClean="0"/>
-          </a:p>
-        </p:txBody>
-      </p:sp>
-    </p:spTree>
-    <p:extLst>
-      <p:ext uri="{BB962C8B-B14F-4D97-AF65-F5344CB8AC3E}">
-        <p14:creationId xmlns:p14="http://schemas.microsoft.com/office/powerpoint/2010/main" val="1127452723"/>
-      </p:ext>
-    </p:extLst>
-  </p:cSld>
-  <p:clrMapOvr>
-    <a:masterClrMapping/>
-  </p:clrMapOvr>
-</p:sld>
-</file>
-
-<file path=ppt/slides/slide20.xml><?xml version="1.0" encoding="utf-8"?>
+<file path=ppt/slides/slide23.xml><?xml version="1.0" encoding="utf-8"?>
 <p:sld xmlns:a="http://schemas.openxmlformats.org/drawingml/2006/main" xmlns:r="http://schemas.openxmlformats.org/officeDocument/2006/relationships" xmlns:p="http://schemas.openxmlformats.org/presentationml/2006/main">
   <p:cSld>
     <p:spTree>
@@ -4302,7 +4559,7 @@
 </p:sld>
 </file>
 
-<file path=ppt/slides/slide21.xml><?xml version="1.0" encoding="utf-8"?>
+<file path=ppt/slides/slide24.xml><?xml version="1.0" encoding="utf-8"?>
 <p:sld xmlns:a="http://schemas.openxmlformats.org/drawingml/2006/main" xmlns:r="http://schemas.openxmlformats.org/officeDocument/2006/relationships" xmlns:p="http://schemas.openxmlformats.org/presentationml/2006/main">
   <p:cSld>
     <p:spTree>
@@ -4380,7 +4637,7 @@
 </p:sld>
 </file>
 
-<file path=ppt/slides/slide22.xml><?xml version="1.0" encoding="utf-8"?>
+<file path=ppt/slides/slide25.xml><?xml version="1.0" encoding="utf-8"?>
 <p:sld xmlns:a="http://schemas.openxmlformats.org/drawingml/2006/main" xmlns:r="http://schemas.openxmlformats.org/officeDocument/2006/relationships" xmlns:p="http://schemas.openxmlformats.org/presentationml/2006/main">
   <p:cSld>
     <p:spTree>
@@ -4458,7 +4715,7 @@
 </p:sld>
 </file>
 
-<file path=ppt/slides/slide23.xml><?xml version="1.0" encoding="utf-8"?>
+<file path=ppt/slides/slide26.xml><?xml version="1.0" encoding="utf-8"?>
 <p:sld xmlns:a="http://schemas.openxmlformats.org/drawingml/2006/main" xmlns:r="http://schemas.openxmlformats.org/officeDocument/2006/relationships" xmlns:p="http://schemas.openxmlformats.org/presentationml/2006/main">
   <p:cSld>
     <p:spTree>
@@ -4536,7 +4793,7 @@
 </p:sld>
 </file>
 
-<file path=ppt/slides/slide24.xml><?xml version="1.0" encoding="utf-8"?>
+<file path=ppt/slides/slide27.xml><?xml version="1.0" encoding="utf-8"?>
 <p:sld xmlns:a="http://schemas.openxmlformats.org/drawingml/2006/main" xmlns:r="http://schemas.openxmlformats.org/officeDocument/2006/relationships" xmlns:p="http://schemas.openxmlformats.org/presentationml/2006/main">
   <p:cSld>
     <p:spTree>
@@ -4614,7 +4871,7 @@
 </p:sld>
 </file>
 
-<file path=ppt/slides/slide25.xml><?xml version="1.0" encoding="utf-8"?>
+<file path=ppt/slides/slide28.xml><?xml version="1.0" encoding="utf-8"?>
 <p:sld xmlns:a="http://schemas.openxmlformats.org/drawingml/2006/main" xmlns:r="http://schemas.openxmlformats.org/officeDocument/2006/relationships" xmlns:p="http://schemas.openxmlformats.org/presentationml/2006/main">
   <p:cSld>
     <p:spTree>
@@ -4692,7 +4949,7 @@
 </p:sld>
 </file>
 
-<file path=ppt/slides/slide26.xml><?xml version="1.0" encoding="utf-8"?>
+<file path=ppt/slides/slide29.xml><?xml version="1.0" encoding="utf-8"?>
 <p:sld xmlns:a="http://schemas.openxmlformats.org/drawingml/2006/main" xmlns:r="http://schemas.openxmlformats.org/officeDocument/2006/relationships" xmlns:p="http://schemas.openxmlformats.org/presentationml/2006/main">
   <p:cSld>
     <p:spTree>
@@ -4770,7 +5027,115 @@
 </p:sld>
 </file>
 
-<file path=ppt/slides/slide27.xml><?xml version="1.0" encoding="utf-8"?>
+<file path=ppt/slides/slide3.xml><?xml version="1.0" encoding="utf-8"?>
+<p:sld xmlns:a="http://schemas.openxmlformats.org/drawingml/2006/main" xmlns:r="http://schemas.openxmlformats.org/officeDocument/2006/relationships" xmlns:p="http://schemas.openxmlformats.org/presentationml/2006/main">
+  <p:cSld>
+    <p:spTree>
+      <p:nvGrpSpPr>
+        <p:cNvPr id="1" name=""/>
+        <p:cNvGrpSpPr/>
+        <p:nvPr/>
+      </p:nvGrpSpPr>
+      <p:grpSpPr>
+        <a:xfrm>
+          <a:off x="0" y="0"/>
+          <a:ext cx="0" cy="0"/>
+          <a:chOff x="0" y="0"/>
+          <a:chExt cx="0" cy="0"/>
+        </a:xfrm>
+      </p:grpSpPr>
+      <p:sp>
+        <p:nvSpPr>
+          <p:cNvPr id="2" name="Title 1"/>
+          <p:cNvSpPr>
+            <a:spLocks noGrp="1"/>
+          </p:cNvSpPr>
+          <p:nvPr>
+            <p:ph type="title"/>
+          </p:nvPr>
+        </p:nvSpPr>
+        <p:spPr/>
+        <p:txBody>
+          <a:bodyPr/>
+          <a:lstStyle/>
+          <a:p>
+            <a:endParaRPr lang="en-NZ"/>
+          </a:p>
+        </p:txBody>
+      </p:sp>
+      <p:pic>
+        <p:nvPicPr>
+          <p:cNvPr id="4" name="Content Placeholder 3"/>
+          <p:cNvPicPr>
+            <a:picLocks noGrp="1" noChangeAspect="1"/>
+          </p:cNvPicPr>
+          <p:nvPr>
+            <p:ph idx="1"/>
+          </p:nvPr>
+        </p:nvPicPr>
+        <p:blipFill>
+          <a:blip r:embed="rId2" cstate="print">
+            <a:extLst>
+              <a:ext uri="{28A0092B-C50C-407E-A947-70E740481C1C}">
+                <a14:useLocalDpi xmlns:a14="http://schemas.microsoft.com/office/drawing/2010/main" val="0"/>
+              </a:ext>
+            </a:extLst>
+          </a:blip>
+          <a:stretch>
+            <a:fillRect/>
+          </a:stretch>
+        </p:blipFill>
+        <p:spPr>
+          <a:xfrm>
+            <a:off x="97891" y="100342"/>
+            <a:ext cx="5221605" cy="4351338"/>
+          </a:xfrm>
+        </p:spPr>
+      </p:pic>
+      <p:pic>
+        <p:nvPicPr>
+          <p:cNvPr id="5" name="Content Placeholder 3"/>
+          <p:cNvPicPr>
+            <a:picLocks noChangeAspect="1"/>
+          </p:cNvPicPr>
+          <p:nvPr/>
+        </p:nvPicPr>
+        <p:blipFill>
+          <a:blip r:embed="rId3" cstate="print">
+            <a:extLst>
+              <a:ext uri="{28A0092B-C50C-407E-A947-70E740481C1C}">
+                <a14:useLocalDpi xmlns:a14="http://schemas.microsoft.com/office/drawing/2010/main" val="0"/>
+              </a:ext>
+            </a:extLst>
+          </a:blip>
+          <a:stretch>
+            <a:fillRect/>
+          </a:stretch>
+        </p:blipFill>
+        <p:spPr>
+          <a:xfrm>
+            <a:off x="1103103" y="2840502"/>
+            <a:ext cx="7886700" cy="3943350"/>
+          </a:xfrm>
+          <a:prstGeom prst="rect">
+            <a:avLst/>
+          </a:prstGeom>
+        </p:spPr>
+      </p:pic>
+    </p:spTree>
+    <p:extLst>
+      <p:ext uri="{BB962C8B-B14F-4D97-AF65-F5344CB8AC3E}">
+        <p14:creationId xmlns:p14="http://schemas.microsoft.com/office/powerpoint/2010/main" val="789734272"/>
+      </p:ext>
+    </p:extLst>
+  </p:cSld>
+  <p:clrMapOvr>
+    <a:masterClrMapping/>
+  </p:clrMapOvr>
+</p:sld>
+</file>
+
+<file path=ppt/slides/slide30.xml><?xml version="1.0" encoding="utf-8"?>
 <p:sld xmlns:a="http://schemas.openxmlformats.org/drawingml/2006/main" xmlns:r="http://schemas.openxmlformats.org/officeDocument/2006/relationships" xmlns:p="http://schemas.openxmlformats.org/presentationml/2006/main">
   <p:cSld>
     <p:spTree>
@@ -4848,7 +5213,7 @@
 </p:sld>
 </file>
 
-<file path=ppt/slides/slide28.xml><?xml version="1.0" encoding="utf-8"?>
+<file path=ppt/slides/slide31.xml><?xml version="1.0" encoding="utf-8"?>
 <p:sld xmlns:a="http://schemas.openxmlformats.org/drawingml/2006/main" xmlns:r="http://schemas.openxmlformats.org/officeDocument/2006/relationships" xmlns:p="http://schemas.openxmlformats.org/presentationml/2006/main">
   <p:cSld>
     <p:spTree>
@@ -4926,7 +5291,7 @@
 </p:sld>
 </file>
 
-<file path=ppt/slides/slide29.xml><?xml version="1.0" encoding="utf-8"?>
+<file path=ppt/slides/slide32.xml><?xml version="1.0" encoding="utf-8"?>
 <p:sld xmlns:a="http://schemas.openxmlformats.org/drawingml/2006/main" xmlns:r="http://schemas.openxmlformats.org/officeDocument/2006/relationships" xmlns:p="http://schemas.openxmlformats.org/presentationml/2006/main">
   <p:cSld>
     <p:spTree>
@@ -5004,85 +5369,7 @@
 </p:sld>
 </file>
 
-<file path=ppt/slides/slide3.xml><?xml version="1.0" encoding="utf-8"?>
-<p:sld xmlns:a="http://schemas.openxmlformats.org/drawingml/2006/main" xmlns:r="http://schemas.openxmlformats.org/officeDocument/2006/relationships" xmlns:p="http://schemas.openxmlformats.org/presentationml/2006/main">
-  <p:cSld>
-    <p:spTree>
-      <p:nvGrpSpPr>
-        <p:cNvPr id="1" name=""/>
-        <p:cNvGrpSpPr/>
-        <p:nvPr/>
-      </p:nvGrpSpPr>
-      <p:grpSpPr>
-        <a:xfrm>
-          <a:off x="0" y="0"/>
-          <a:ext cx="0" cy="0"/>
-          <a:chOff x="0" y="0"/>
-          <a:chExt cx="0" cy="0"/>
-        </a:xfrm>
-      </p:grpSpPr>
-      <p:sp>
-        <p:nvSpPr>
-          <p:cNvPr id="2" name="Title 1"/>
-          <p:cNvSpPr>
-            <a:spLocks noGrp="1"/>
-          </p:cNvSpPr>
-          <p:nvPr>
-            <p:ph type="title"/>
-          </p:nvPr>
-        </p:nvSpPr>
-        <p:spPr/>
-        <p:txBody>
-          <a:bodyPr/>
-          <a:lstStyle/>
-          <a:p>
-            <a:endParaRPr lang="en-NZ"/>
-          </a:p>
-        </p:txBody>
-      </p:sp>
-      <p:pic>
-        <p:nvPicPr>
-          <p:cNvPr id="4" name="Content Placeholder 3"/>
-          <p:cNvPicPr>
-            <a:picLocks noGrp="1" noChangeAspect="1"/>
-          </p:cNvPicPr>
-          <p:nvPr>
-            <p:ph idx="1"/>
-          </p:nvPr>
-        </p:nvPicPr>
-        <p:blipFill>
-          <a:blip r:embed="rId2" cstate="print">
-            <a:extLst>
-              <a:ext uri="{28A0092B-C50C-407E-A947-70E740481C1C}">
-                <a14:useLocalDpi xmlns:a14="http://schemas.microsoft.com/office/drawing/2010/main" val="0"/>
-              </a:ext>
-            </a:extLst>
-          </a:blip>
-          <a:stretch>
-            <a:fillRect/>
-          </a:stretch>
-        </p:blipFill>
-        <p:spPr>
-          <a:xfrm>
-            <a:off x="628650" y="2029619"/>
-            <a:ext cx="7886700" cy="3943350"/>
-          </a:xfrm>
-        </p:spPr>
-      </p:pic>
-    </p:spTree>
-    <p:extLst>
-      <p:ext uri="{BB962C8B-B14F-4D97-AF65-F5344CB8AC3E}">
-        <p14:creationId xmlns:p14="http://schemas.microsoft.com/office/powerpoint/2010/main" val="3160728246"/>
-      </p:ext>
-    </p:extLst>
-  </p:cSld>
-  <p:clrMapOvr>
-    <a:masterClrMapping/>
-  </p:clrMapOvr>
-</p:sld>
-</file>
-
-<file path=ppt/slides/slide30.xml><?xml version="1.0" encoding="utf-8"?>
+<file path=ppt/slides/slide33.xml><?xml version="1.0" encoding="utf-8"?>
 <p:sld xmlns:a="http://schemas.openxmlformats.org/drawingml/2006/main" xmlns:r="http://schemas.openxmlformats.org/officeDocument/2006/relationships" xmlns:p="http://schemas.openxmlformats.org/presentationml/2006/main">
   <p:cSld>
     <p:spTree>
@@ -5220,15 +5507,45 @@
         </p:blipFill>
         <p:spPr>
           <a:xfrm>
-            <a:off x="628650" y="2686844"/>
+            <a:off x="628646" y="866656"/>
             <a:ext cx="7886700" cy="2628899"/>
           </a:xfrm>
+        </p:spPr>
+      </p:pic>
+      <p:pic>
+        <p:nvPicPr>
+          <p:cNvPr id="5" name="Content Placeholder 3"/>
+          <p:cNvPicPr>
+            <a:picLocks noChangeAspect="1"/>
+          </p:cNvPicPr>
+          <p:nvPr/>
+        </p:nvPicPr>
+        <p:blipFill>
+          <a:blip r:embed="rId3" cstate="print">
+            <a:extLst>
+              <a:ext uri="{28A0092B-C50C-407E-A947-70E740481C1C}">
+                <a14:useLocalDpi xmlns:a14="http://schemas.microsoft.com/office/drawing/2010/main" val="0"/>
+              </a:ext>
+            </a:extLst>
+          </a:blip>
+          <a:stretch>
+            <a:fillRect/>
+          </a:stretch>
+        </p:blipFill>
+        <p:spPr>
+          <a:xfrm>
+            <a:off x="637275" y="3376942"/>
+            <a:ext cx="7886697" cy="2628899"/>
+          </a:xfrm>
+          <a:prstGeom prst="rect">
+            <a:avLst/>
+          </a:prstGeom>
         </p:spPr>
       </p:pic>
     </p:spTree>
     <p:extLst>
       <p:ext uri="{BB962C8B-B14F-4D97-AF65-F5344CB8AC3E}">
-        <p14:creationId xmlns:p14="http://schemas.microsoft.com/office/powerpoint/2010/main" val="3527560919"/>
+        <p14:creationId xmlns:p14="http://schemas.microsoft.com/office/powerpoint/2010/main" val="1943509154"/>
       </p:ext>
     </p:extLst>
   </p:cSld>
@@ -5348,111 +5665,43 @@
           <a:bodyPr/>
           <a:lstStyle/>
           <a:p>
-            <a:r>
-              <a:rPr lang="en-US" dirty="0" err="1" smtClean="0"/>
-              <a:t>Gmacs</a:t>
-            </a:r>
-            <a:r>
-              <a:rPr lang="en-US" dirty="0" smtClean="0"/>
-              <a:t> in progress</a:t>
-            </a:r>
-            <a:endParaRPr lang="en-NZ" dirty="0"/>
-          </a:p>
-        </p:txBody>
-      </p:sp>
-      <p:sp>
-        <p:nvSpPr>
-          <p:cNvPr id="3" name="Content Placeholder 2"/>
-          <p:cNvSpPr>
-            <a:spLocks noGrp="1"/>
-          </p:cNvSpPr>
+            <a:endParaRPr lang="en-NZ"/>
+          </a:p>
+        </p:txBody>
+      </p:sp>
+      <p:pic>
+        <p:nvPicPr>
+          <p:cNvPr id="4" name="Content Placeholder 3"/>
+          <p:cNvPicPr>
+            <a:picLocks noGrp="1" noChangeAspect="1"/>
+          </p:cNvPicPr>
           <p:nvPr>
             <p:ph idx="1"/>
           </p:nvPr>
-        </p:nvSpPr>
-        <p:spPr/>
-        <p:txBody>
-          <a:bodyPr>
-            <a:normAutofit fontScale="92500" lnSpcReduction="20000"/>
-          </a:bodyPr>
-          <a:lstStyle/>
-          <a:p>
-            <a:r>
-              <a:rPr lang="en-US" dirty="0" smtClean="0"/>
-              <a:t>Equilibrium numbers at length</a:t>
-            </a:r>
-          </a:p>
-          <a:p>
-            <a:pPr lvl="1"/>
-            <a:r>
-              <a:rPr lang="en-US" dirty="0" smtClean="0"/>
-              <a:t>Broke when seasonal changes added, can’t use the elegant solutions anymore</a:t>
-            </a:r>
-          </a:p>
-          <a:p>
-            <a:pPr lvl="1"/>
-            <a:r>
-              <a:rPr lang="en-US" dirty="0" smtClean="0"/>
-              <a:t>Not required for SMBKC as we estimate initial numbers as free parameters</a:t>
-            </a:r>
-          </a:p>
-          <a:p>
-            <a:pPr lvl="1"/>
-            <a:r>
-              <a:rPr lang="en-US" dirty="0" smtClean="0"/>
-              <a:t>The new function is complete but yet to be put in the right places</a:t>
-            </a:r>
-          </a:p>
-          <a:p>
-            <a:r>
-              <a:rPr lang="en-US" dirty="0" smtClean="0"/>
-              <a:t>SPR calculations</a:t>
-            </a:r>
-          </a:p>
-          <a:p>
-            <a:pPr lvl="1"/>
-            <a:r>
-              <a:rPr lang="en-US" dirty="0" smtClean="0"/>
-              <a:t>As above/requires equilibrium numbers</a:t>
-            </a:r>
-          </a:p>
-          <a:p>
-            <a:pPr lvl="1"/>
-            <a:r>
-              <a:rPr lang="en-US" dirty="0" smtClean="0"/>
-              <a:t>Probably only a day or two of work but I fell asleep yesterday</a:t>
-            </a:r>
-          </a:p>
-          <a:p>
-            <a:r>
-              <a:rPr lang="en-US" dirty="0" smtClean="0"/>
-              <a:t>Began retrospective code</a:t>
-            </a:r>
-          </a:p>
-          <a:p>
-            <a:r>
-              <a:rPr lang="en-US" dirty="0" smtClean="0"/>
-              <a:t>BBRKC model</a:t>
-            </a:r>
-          </a:p>
-          <a:p>
-            <a:pPr lvl="1"/>
-            <a:r>
-              <a:rPr lang="en-US" dirty="0" smtClean="0"/>
-              <a:t>Runs but as above</a:t>
-            </a:r>
-            <a:r>
-              <a:rPr lang="en-US" dirty="0"/>
-              <a:t>/requires equilibrium numbers</a:t>
-            </a:r>
-            <a:endParaRPr lang="en-NZ" dirty="0"/>
-          </a:p>
-        </p:txBody>
-      </p:sp>
+        </p:nvPicPr>
+        <p:blipFill>
+          <a:blip r:embed="rId2">
+            <a:extLst>
+              <a:ext uri="{28A0092B-C50C-407E-A947-70E740481C1C}">
+                <a14:useLocalDpi xmlns:a14="http://schemas.microsoft.com/office/drawing/2010/main" val="0"/>
+              </a:ext>
+            </a:extLst>
+          </a:blip>
+          <a:stretch>
+            <a:fillRect/>
+          </a:stretch>
+        </p:blipFill>
+        <p:spPr>
+          <a:xfrm>
+            <a:off x="842282" y="1963648"/>
+            <a:ext cx="7459435" cy="4351338"/>
+          </a:xfrm>
+        </p:spPr>
+      </p:pic>
     </p:spTree>
     <p:extLst>
       <p:ext uri="{BB962C8B-B14F-4D97-AF65-F5344CB8AC3E}">
-        <p14:creationId xmlns:p14="http://schemas.microsoft.com/office/powerpoint/2010/main" val="939631492"/>
+        <p14:creationId xmlns:p14="http://schemas.microsoft.com/office/powerpoint/2010/main" val="2962195950"/>
       </p:ext>
     </p:extLst>
   </p:cSld>
@@ -5495,13 +5744,13 @@
           <a:lstStyle/>
           <a:p>
             <a:r>
-              <a:rPr lang="en-US" dirty="0" smtClean="0"/>
-              <a:t>SMBKC in </a:t>
-            </a:r>
-            <a:r>
               <a:rPr lang="en-US" dirty="0" err="1" smtClean="0"/>
               <a:t>Gmacs</a:t>
             </a:r>
+            <a:r>
+              <a:rPr lang="en-US" dirty="0" smtClean="0"/>
+              <a:t> in progress</a:t>
+            </a:r>
             <a:endParaRPr lang="en-NZ" dirty="0"/>
           </a:p>
         </p:txBody>
@@ -5519,137 +5768,71 @@
         <p:spPr/>
         <p:txBody>
           <a:bodyPr>
-            <a:normAutofit fontScale="92500" lnSpcReduction="20000"/>
+            <a:normAutofit fontScale="92500" lnSpcReduction="10000"/>
           </a:bodyPr>
           <a:lstStyle/>
           <a:p>
             <a:r>
               <a:rPr lang="en-US" dirty="0" smtClean="0"/>
-              <a:t>1978-2015</a:t>
-            </a:r>
-          </a:p>
-          <a:p>
-            <a:r>
-              <a:rPr lang="en-US" dirty="0" smtClean="0"/>
-              <a:t>4 seasons (M = 0, 0.44, 0.185, 0.375)</a:t>
-            </a:r>
-          </a:p>
-          <a:p>
-            <a:r>
-              <a:rPr lang="en-US" dirty="0" smtClean="0"/>
-              <a:t>3 </a:t>
+              <a:t>Equilibrium numbers at length</a:t>
+            </a:r>
+          </a:p>
+          <a:p>
+            <a:pPr lvl="1"/>
+            <a:r>
+              <a:rPr lang="en-US" dirty="0" smtClean="0"/>
+              <a:t>Broke when seasonal changes added, can’t use the elegant solutions anymore</a:t>
+            </a:r>
+          </a:p>
+          <a:p>
+            <a:pPr lvl="1"/>
+            <a:r>
+              <a:rPr lang="en-US" dirty="0" smtClean="0"/>
+              <a:t>Not required for SMBKC as we estimate initial numbers as free parameters</a:t>
+            </a:r>
+          </a:p>
+          <a:p>
+            <a:pPr lvl="1"/>
+            <a:r>
+              <a:rPr lang="en-US" dirty="0" smtClean="0"/>
+              <a:t>The new function is complete but yet to be put in the right places</a:t>
+            </a:r>
+          </a:p>
+          <a:p>
+            <a:r>
+              <a:rPr lang="en-US" dirty="0" smtClean="0"/>
+              <a:t>SPR calculations</a:t>
+            </a:r>
+          </a:p>
+          <a:p>
+            <a:pPr lvl="1"/>
+            <a:r>
+              <a:rPr lang="en-US" dirty="0" smtClean="0"/>
+              <a:t>As above/requires equilibrium numbers</a:t>
+            </a:r>
+          </a:p>
+          <a:p>
+            <a:pPr lvl="1"/>
+            <a:r>
+              <a:rPr lang="en-US" dirty="0" smtClean="0"/>
+              <a:t>Probably only a day or two of work but I fell asleep yesterday</a:t>
+            </a:r>
+          </a:p>
+          <a:p>
+            <a:r>
+              <a:rPr lang="en-US" dirty="0" smtClean="0"/>
+              <a:t>BBRKC model</a:t>
+            </a:r>
+          </a:p>
+          <a:p>
+            <a:pPr lvl="1"/>
+            <a:r>
+              <a:rPr lang="en-US" dirty="0" smtClean="0"/>
+              <a:t>Runs but as above</a:t>
             </a:r>
             <a:r>
               <a:rPr lang="en-US" dirty="0"/>
-              <a:t>stages </a:t>
-            </a:r>
-            <a:r>
-              <a:rPr lang="en-US" dirty="0" smtClean="0"/>
-              <a:t>(90-104, 105-119, 120+)</a:t>
-            </a:r>
-            <a:endParaRPr lang="en-US" dirty="0"/>
-          </a:p>
-          <a:p>
-            <a:r>
-              <a:rPr lang="en-US" dirty="0"/>
-              <a:t>1 sex, 1 shell type, 1 maturity class</a:t>
-            </a:r>
-          </a:p>
-          <a:p>
-            <a:r>
-              <a:rPr lang="en-US" dirty="0" smtClean="0"/>
-              <a:t>3 </a:t>
-            </a:r>
-            <a:r>
-              <a:rPr lang="en-US" dirty="0" smtClean="0"/>
-              <a:t>fleets (pot</a:t>
-            </a:r>
-            <a:r>
-              <a:rPr lang="en-US" dirty="0"/>
-              <a:t>, trawl </a:t>
-            </a:r>
-            <a:r>
-              <a:rPr lang="en-US" dirty="0" err="1"/>
-              <a:t>bycatch</a:t>
-            </a:r>
-            <a:r>
-              <a:rPr lang="en-US" dirty="0"/>
-              <a:t>, fixed </a:t>
-            </a:r>
-            <a:r>
-              <a:rPr lang="en-US" dirty="0" err="1" smtClean="0"/>
-              <a:t>bycatch</a:t>
-            </a:r>
-            <a:r>
-              <a:rPr lang="en-US" dirty="0" smtClean="0"/>
-              <a:t>)</a:t>
-            </a:r>
-            <a:endParaRPr lang="en-US" dirty="0"/>
-          </a:p>
-          <a:p>
-            <a:r>
-              <a:rPr lang="en-US" dirty="0"/>
-              <a:t>2 surveys (NMFS trawl and ADF&amp;G </a:t>
-            </a:r>
-            <a:r>
-              <a:rPr lang="en-US" dirty="0" smtClean="0"/>
-              <a:t>pot CPUE) </a:t>
-            </a:r>
-            <a:r>
-              <a:rPr lang="en-US" dirty="0"/>
-              <a:t>both in season 1</a:t>
-            </a:r>
-          </a:p>
-          <a:p>
-            <a:r>
-              <a:rPr lang="en-US" dirty="0" smtClean="0"/>
-              <a:t>4 catch types (directed pot, pot discards, trawl </a:t>
-            </a:r>
-            <a:r>
-              <a:rPr lang="en-US" dirty="0" err="1" smtClean="0"/>
-              <a:t>bycatch</a:t>
-            </a:r>
-            <a:r>
-              <a:rPr lang="en-US" dirty="0" smtClean="0"/>
-              <a:t>, fixed </a:t>
-            </a:r>
-            <a:r>
-              <a:rPr lang="en-US" dirty="0" err="1" smtClean="0"/>
-              <a:t>bycatch</a:t>
-            </a:r>
-            <a:r>
-              <a:rPr lang="en-US" dirty="0" smtClean="0"/>
-              <a:t>) all during season 2</a:t>
-            </a:r>
-          </a:p>
-          <a:p>
-            <a:r>
-              <a:rPr lang="en-US" dirty="0" smtClean="0"/>
-              <a:t>3 size compositions (pot </a:t>
-            </a:r>
-            <a:r>
-              <a:rPr lang="en-US" dirty="0" smtClean="0"/>
-              <a:t>in season </a:t>
-            </a:r>
-            <a:r>
-              <a:rPr lang="en-US" dirty="0" smtClean="0"/>
-              <a:t>2, NMFS trawl </a:t>
-            </a:r>
-            <a:r>
-              <a:rPr lang="en-US" dirty="0" smtClean="0"/>
-              <a:t>in season </a:t>
-            </a:r>
-            <a:r>
-              <a:rPr lang="en-US" dirty="0" smtClean="0"/>
-              <a:t>1, ADF&amp;G pot </a:t>
-            </a:r>
-            <a:r>
-              <a:rPr lang="en-US" dirty="0" smtClean="0"/>
-              <a:t>in season </a:t>
-            </a:r>
-            <a:r>
-              <a:rPr lang="en-US" dirty="0" smtClean="0"/>
-              <a:t>1)</a:t>
+              <a:t>/requires equilibrium numbers</a:t>
             </a:r>
             <a:endParaRPr lang="en-NZ" dirty="0"/>
           </a:p>
@@ -5658,7 +5841,7 @@
     </p:spTree>
     <p:extLst>
       <p:ext uri="{BB962C8B-B14F-4D97-AF65-F5344CB8AC3E}">
-        <p14:creationId xmlns:p14="http://schemas.microsoft.com/office/powerpoint/2010/main" val="3508581728"/>
+        <p14:creationId xmlns:p14="http://schemas.microsoft.com/office/powerpoint/2010/main" val="939631492"/>
       </p:ext>
     </p:extLst>
   </p:cSld>
@@ -5702,7 +5885,11 @@
           <a:p>
             <a:r>
               <a:rPr lang="en-US" dirty="0" smtClean="0"/>
-              <a:t>SMBKC dynamics</a:t>
+              <a:t>SMBKC in </a:t>
+            </a:r>
+            <a:r>
+              <a:rPr lang="en-US" dirty="0" err="1" smtClean="0"/>
+              <a:t>Gmacs</a:t>
             </a:r>
             <a:endParaRPr lang="en-NZ" dirty="0"/>
           </a:p>
@@ -5727,81 +5914,131 @@
           <a:p>
             <a:r>
               <a:rPr lang="en-US" dirty="0" smtClean="0"/>
-              <a:t>Season 1</a:t>
-            </a:r>
-          </a:p>
-          <a:p>
-            <a:pPr lvl="1"/>
-            <a:r>
-              <a:rPr lang="en-US" dirty="0" smtClean="0"/>
-              <a:t>1 July, start of fishing year</a:t>
-            </a:r>
-          </a:p>
-          <a:p>
-            <a:pPr lvl="1"/>
-            <a:r>
-              <a:rPr lang="en-US" dirty="0" smtClean="0"/>
-              <a:t>Surveys</a:t>
-            </a:r>
-          </a:p>
-          <a:p>
-            <a:r>
-              <a:rPr lang="en-US" dirty="0" smtClean="0"/>
-              <a:t>Season 2</a:t>
-            </a:r>
-          </a:p>
-          <a:p>
-            <a:pPr lvl="1"/>
-            <a:r>
-              <a:rPr lang="en-US" dirty="0" smtClean="0"/>
-              <a:t>M=0.44 &amp; catch</a:t>
-            </a:r>
-          </a:p>
-          <a:p>
-            <a:r>
-              <a:rPr lang="en-US" dirty="0" smtClean="0"/>
-              <a:t>Season 3</a:t>
-            </a:r>
-          </a:p>
-          <a:p>
-            <a:pPr lvl="1"/>
-            <a:r>
-              <a:rPr lang="en-US" dirty="0" smtClean="0"/>
-              <a:t>M=0.185</a:t>
-            </a:r>
-          </a:p>
-          <a:p>
-            <a:pPr lvl="1"/>
-            <a:r>
-              <a:rPr lang="en-US" dirty="0" smtClean="0"/>
-              <a:t>Calculate MMB</a:t>
-            </a:r>
-          </a:p>
-          <a:p>
-            <a:r>
-              <a:rPr lang="en-US" dirty="0" smtClean="0"/>
-              <a:t>Season 4</a:t>
-            </a:r>
-          </a:p>
-          <a:p>
-            <a:pPr lvl="1"/>
-            <a:r>
-              <a:rPr lang="en-US" dirty="0" smtClean="0"/>
-              <a:t>M=0.375</a:t>
-            </a:r>
-          </a:p>
-          <a:p>
-            <a:pPr lvl="1"/>
-            <a:r>
-              <a:rPr lang="en-US" dirty="0" smtClean="0"/>
-              <a:t>Growth and molting</a:t>
-            </a:r>
-          </a:p>
-          <a:p>
-            <a:pPr lvl="1"/>
-            <a:r>
-              <a:rPr lang="en-US" dirty="0" smtClean="0"/>
-              <a:t>Recruitment (all to stage-1)</a:t>
+              <a:t>1978-2015</a:t>
+            </a:r>
+          </a:p>
+          <a:p>
+            <a:r>
+              <a:rPr lang="en-US" dirty="0" smtClean="0"/>
+              <a:t>4 seasons (M = 0, 0.44, 0.185, 0.375)</a:t>
+            </a:r>
+          </a:p>
+          <a:p>
+            <a:r>
+              <a:rPr lang="en-US" dirty="0" smtClean="0"/>
+              <a:t>3 </a:t>
+            </a:r>
+            <a:r>
+              <a:rPr lang="en-US" dirty="0"/>
+              <a:t>stages </a:t>
+            </a:r>
+            <a:r>
+              <a:rPr lang="en-US" dirty="0" smtClean="0"/>
+              <a:t>(90-104, 105-119, 120+)</a:t>
+            </a:r>
+            <a:endParaRPr lang="en-US" dirty="0"/>
+          </a:p>
+          <a:p>
+            <a:r>
+              <a:rPr lang="en-US" dirty="0"/>
+              <a:t>1 sex, 1 shell type, 1 maturity class</a:t>
+            </a:r>
+          </a:p>
+          <a:p>
+            <a:r>
+              <a:rPr lang="en-US" dirty="0" smtClean="0"/>
+              <a:t>3 </a:t>
+            </a:r>
+            <a:r>
+              <a:rPr lang="en-US" dirty="0" smtClean="0"/>
+              <a:t>fleets (pot</a:t>
+            </a:r>
+            <a:r>
+              <a:rPr lang="en-US" dirty="0"/>
+              <a:t>, trawl </a:t>
+            </a:r>
+            <a:r>
+              <a:rPr lang="en-US" dirty="0" err="1"/>
+              <a:t>bycatch</a:t>
+            </a:r>
+            <a:r>
+              <a:rPr lang="en-US" dirty="0"/>
+              <a:t>, fixed </a:t>
+            </a:r>
+            <a:r>
+              <a:rPr lang="en-US" dirty="0" err="1" smtClean="0"/>
+              <a:t>bycatch</a:t>
+            </a:r>
+            <a:r>
+              <a:rPr lang="en-US" dirty="0" smtClean="0"/>
+              <a:t>)</a:t>
+            </a:r>
+            <a:endParaRPr lang="en-US" dirty="0"/>
+          </a:p>
+          <a:p>
+            <a:r>
+              <a:rPr lang="en-US" dirty="0"/>
+              <a:t>2 surveys (NMFS trawl and ADF&amp;G </a:t>
+            </a:r>
+            <a:r>
+              <a:rPr lang="en-US" dirty="0" smtClean="0"/>
+              <a:t>pot CPUE) </a:t>
+            </a:r>
+            <a:r>
+              <a:rPr lang="en-US" dirty="0"/>
+              <a:t>both in season 1</a:t>
+            </a:r>
+          </a:p>
+          <a:p>
+            <a:r>
+              <a:rPr lang="en-US" dirty="0" smtClean="0"/>
+              <a:t>4 catch types (directed pot, pot discards, trawl </a:t>
+            </a:r>
+            <a:r>
+              <a:rPr lang="en-US" dirty="0" err="1" smtClean="0"/>
+              <a:t>bycatch</a:t>
+            </a:r>
+            <a:r>
+              <a:rPr lang="en-US" dirty="0" smtClean="0"/>
+              <a:t>, fixed </a:t>
+            </a:r>
+            <a:r>
+              <a:rPr lang="en-US" dirty="0" err="1" smtClean="0"/>
+              <a:t>bycatch</a:t>
+            </a:r>
+            <a:r>
+              <a:rPr lang="en-US" dirty="0" smtClean="0"/>
+              <a:t>) all during season 2</a:t>
+            </a:r>
+          </a:p>
+          <a:p>
+            <a:r>
+              <a:rPr lang="en-US" dirty="0" smtClean="0"/>
+              <a:t>3 size compositions (pot </a:t>
+            </a:r>
+            <a:r>
+              <a:rPr lang="en-US" dirty="0" smtClean="0"/>
+              <a:t>in season </a:t>
+            </a:r>
+            <a:r>
+              <a:rPr lang="en-US" dirty="0" smtClean="0"/>
+              <a:t>2, NMFS trawl </a:t>
+            </a:r>
+            <a:r>
+              <a:rPr lang="en-US" dirty="0" smtClean="0"/>
+              <a:t>in season </a:t>
+            </a:r>
+            <a:r>
+              <a:rPr lang="en-US" dirty="0" smtClean="0"/>
+              <a:t>1, ADF&amp;G pot </a:t>
+            </a:r>
+            <a:r>
+              <a:rPr lang="en-US" dirty="0" smtClean="0"/>
+              <a:t>in season </a:t>
+            </a:r>
+            <a:r>
+              <a:rPr lang="en-US" dirty="0" smtClean="0"/>
+              <a:t>1)</a:t>
             </a:r>
             <a:endParaRPr lang="en-NZ" dirty="0"/>
           </a:p>
@@ -5810,7 +6047,7 @@
     </p:spTree>
     <p:extLst>
       <p:ext uri="{BB962C8B-B14F-4D97-AF65-F5344CB8AC3E}">
-        <p14:creationId xmlns:p14="http://schemas.microsoft.com/office/powerpoint/2010/main" val="26533852"/>
+        <p14:creationId xmlns:p14="http://schemas.microsoft.com/office/powerpoint/2010/main" val="3508581728"/>
       </p:ext>
     </p:extLst>
   </p:cSld>
@@ -5854,48 +6091,115 @@
           <a:p>
             <a:r>
               <a:rPr lang="en-US" dirty="0" smtClean="0"/>
-              <a:t>Da</a:t>
-            </a:r>
-            <a:r>
-              <a:rPr lang="en-US" dirty="0" smtClean="0"/>
-              <a:t>ta</a:t>
+              <a:t>SMBKC dynamics</a:t>
             </a:r>
             <a:endParaRPr lang="en-NZ" dirty="0"/>
           </a:p>
         </p:txBody>
       </p:sp>
-      <p:pic>
-        <p:nvPicPr>
-          <p:cNvPr id="4" name="Content Placeholder 3"/>
-          <p:cNvPicPr>
-            <a:picLocks noGrp="1" noChangeAspect="1"/>
-          </p:cNvPicPr>
+      <p:sp>
+        <p:nvSpPr>
+          <p:cNvPr id="3" name="Content Placeholder 2"/>
+          <p:cNvSpPr>
+            <a:spLocks noGrp="1"/>
+          </p:cNvSpPr>
           <p:nvPr>
             <p:ph idx="1"/>
           </p:nvPr>
-        </p:nvPicPr>
-        <p:blipFill rotWithShape="1">
-          <a:blip r:embed="rId2">
-            <a:extLst>
-              <a:ext uri="{28A0092B-C50C-407E-A947-70E740481C1C}">
-                <a14:useLocalDpi xmlns:a14="http://schemas.microsoft.com/office/drawing/2010/main" val="0"/>
-              </a:ext>
-            </a:extLst>
-          </a:blip>
-          <a:srcRect t="8787"/>
-          <a:stretch/>
-        </p:blipFill>
-        <p:spPr>
-          <a:xfrm>
-            <a:off x="1" y="1639023"/>
-            <a:ext cx="9144000" cy="4865298"/>
-          </a:xfrm>
-        </p:spPr>
-      </p:pic>
+        </p:nvSpPr>
+        <p:spPr/>
+        <p:txBody>
+          <a:bodyPr>
+            <a:normAutofit fontScale="92500" lnSpcReduction="20000"/>
+          </a:bodyPr>
+          <a:lstStyle/>
+          <a:p>
+            <a:r>
+              <a:rPr lang="en-US" dirty="0" smtClean="0"/>
+              <a:t>Season 1</a:t>
+            </a:r>
+          </a:p>
+          <a:p>
+            <a:pPr lvl="1"/>
+            <a:r>
+              <a:rPr lang="en-US" dirty="0" smtClean="0"/>
+              <a:t>1 July, start of fishing year</a:t>
+            </a:r>
+          </a:p>
+          <a:p>
+            <a:pPr lvl="1"/>
+            <a:r>
+              <a:rPr lang="en-US" dirty="0" smtClean="0"/>
+              <a:t>Surveys</a:t>
+            </a:r>
+          </a:p>
+          <a:p>
+            <a:r>
+              <a:rPr lang="en-US" dirty="0" smtClean="0"/>
+              <a:t>Season 2</a:t>
+            </a:r>
+          </a:p>
+          <a:p>
+            <a:pPr lvl="1"/>
+            <a:r>
+              <a:rPr lang="en-US" dirty="0" smtClean="0"/>
+              <a:t>M=0.44 &amp; catch</a:t>
+            </a:r>
+          </a:p>
+          <a:p>
+            <a:r>
+              <a:rPr lang="en-US" dirty="0" smtClean="0"/>
+              <a:t>Season 3</a:t>
+            </a:r>
+          </a:p>
+          <a:p>
+            <a:pPr lvl="1"/>
+            <a:r>
+              <a:rPr lang="en-US" dirty="0" smtClean="0"/>
+              <a:t>M=0.185</a:t>
+            </a:r>
+          </a:p>
+          <a:p>
+            <a:pPr lvl="1"/>
+            <a:r>
+              <a:rPr lang="en-US" dirty="0" smtClean="0"/>
+              <a:t>Calculate MMB</a:t>
+            </a:r>
+          </a:p>
+          <a:p>
+            <a:r>
+              <a:rPr lang="en-US" dirty="0" smtClean="0"/>
+              <a:t>Season 4</a:t>
+            </a:r>
+          </a:p>
+          <a:p>
+            <a:pPr lvl="1"/>
+            <a:r>
+              <a:rPr lang="en-US" dirty="0" smtClean="0"/>
+              <a:t>M=0.375</a:t>
+            </a:r>
+          </a:p>
+          <a:p>
+            <a:pPr lvl="1"/>
+            <a:r>
+              <a:rPr lang="en-US" dirty="0" smtClean="0"/>
+              <a:t>Growth and molting</a:t>
+            </a:r>
+          </a:p>
+          <a:p>
+            <a:pPr lvl="1"/>
+            <a:r>
+              <a:rPr lang="en-US" dirty="0" smtClean="0"/>
+              <a:t>Recruitment (all to stage-1)</a:t>
+            </a:r>
+            <a:endParaRPr lang="en-NZ" dirty="0"/>
+          </a:p>
+        </p:txBody>
+      </p:sp>
     </p:spTree>
     <p:extLst>
       <p:ext uri="{BB962C8B-B14F-4D97-AF65-F5344CB8AC3E}">
-        <p14:creationId xmlns:p14="http://schemas.microsoft.com/office/powerpoint/2010/main" val="1030929791"/>
+        <p14:creationId xmlns:p14="http://schemas.microsoft.com/office/powerpoint/2010/main" val="26533852"/>
       </p:ext>
     </p:extLst>
   </p:cSld>

</xml_diff>

<commit_message>
updated docco and ppt
</commit_message>
<xml_diff>
--- a/docs/smbkc/smbkc.pptx
+++ b/docs/smbkc/smbkc.pptx
@@ -20,24 +20,6 @@
     <p:sldId id="288" r:id="rId14"/>
     <p:sldId id="280" r:id="rId15"/>
     <p:sldId id="282" r:id="rId16"/>
-    <p:sldId id="291" r:id="rId17"/>
-    <p:sldId id="259" r:id="rId18"/>
-    <p:sldId id="260" r:id="rId19"/>
-    <p:sldId id="268" r:id="rId20"/>
-    <p:sldId id="267" r:id="rId21"/>
-    <p:sldId id="261" r:id="rId22"/>
-    <p:sldId id="262" r:id="rId23"/>
-    <p:sldId id="263" r:id="rId24"/>
-    <p:sldId id="264" r:id="rId25"/>
-    <p:sldId id="265" r:id="rId26"/>
-    <p:sldId id="266" r:id="rId27"/>
-    <p:sldId id="269" r:id="rId28"/>
-    <p:sldId id="270" r:id="rId29"/>
-    <p:sldId id="271" r:id="rId30"/>
-    <p:sldId id="272" r:id="rId31"/>
-    <p:sldId id="273" r:id="rId32"/>
-    <p:sldId id="274" r:id="rId33"/>
-    <p:sldId id="275" r:id="rId34"/>
   </p:sldIdLst>
   <p:sldSz cx="9144000" cy="6858000" type="screen4x3"/>
   <p:notesSz cx="6858000" cy="9144000"/>
@@ -3619,7 +3601,22 @@
             </a:pPr>
             <a:r>
               <a:rPr lang="en-US" dirty="0" smtClean="0"/>
-              <a:t>Jump to document</a:t>
+              <a:t>Jump to document.</a:t>
+            </a:r>
+          </a:p>
+          <a:p>
+            <a:pPr marL="0" indent="0">
+              <a:buNone/>
+            </a:pPr>
+            <a:endParaRPr lang="en-US" dirty="0"/>
+          </a:p>
+          <a:p>
+            <a:pPr marL="0" indent="0">
+              <a:buNone/>
+            </a:pPr>
+            <a:r>
+              <a:rPr lang="en-US" dirty="0" smtClean="0"/>
+              <a:t>Start with table of model runs.</a:t>
             </a:r>
             <a:endParaRPr lang="en-NZ" dirty="0"/>
           </a:p>
@@ -3714,6 +3711,13 @@
             </a:r>
           </a:p>
           <a:p>
+            <a:pPr lvl="1"/>
+            <a:r>
+              <a:rPr lang="en-US" dirty="0" smtClean="0"/>
+              <a:t>Fix stage-2 selectivity at 1.0 (rather than stage-1) if estimated stage-2 selectivity &gt; 1.0</a:t>
+            </a:r>
+          </a:p>
+          <a:p>
             <a:r>
               <a:rPr lang="en-US" dirty="0" smtClean="0"/>
               <a:t>Plots…</a:t>
@@ -3726,308 +3730,6 @@
     <p:extLst>
       <p:ext uri="{BB962C8B-B14F-4D97-AF65-F5344CB8AC3E}">
         <p14:creationId xmlns:p14="http://schemas.microsoft.com/office/powerpoint/2010/main" val="334652935"/>
-      </p:ext>
-    </p:extLst>
-  </p:cSld>
-  <p:clrMapOvr>
-    <a:masterClrMapping/>
-  </p:clrMapOvr>
-</p:sld>
-</file>
-
-<file path=ppt/slides/slide16.xml><?xml version="1.0" encoding="utf-8"?>
-<p:sld xmlns:a="http://schemas.openxmlformats.org/drawingml/2006/main" xmlns:r="http://schemas.openxmlformats.org/officeDocument/2006/relationships" xmlns:p="http://schemas.openxmlformats.org/presentationml/2006/main">
-  <p:cSld>
-    <p:spTree>
-      <p:nvGrpSpPr>
-        <p:cNvPr id="1" name=""/>
-        <p:cNvGrpSpPr/>
-        <p:nvPr/>
-      </p:nvGrpSpPr>
-      <p:grpSpPr>
-        <a:xfrm>
-          <a:off x="0" y="0"/>
-          <a:ext cx="0" cy="0"/>
-          <a:chOff x="0" y="0"/>
-          <a:chExt cx="0" cy="0"/>
-        </a:xfrm>
-      </p:grpSpPr>
-      <p:sp>
-        <p:nvSpPr>
-          <p:cNvPr id="2" name="Title 1"/>
-          <p:cNvSpPr>
-            <a:spLocks noGrp="1"/>
-          </p:cNvSpPr>
-          <p:nvPr>
-            <p:ph type="title"/>
-          </p:nvPr>
-        </p:nvSpPr>
-        <p:spPr/>
-        <p:txBody>
-          <a:bodyPr/>
-          <a:lstStyle/>
-          <a:p>
-            <a:endParaRPr lang="en-NZ"/>
-          </a:p>
-        </p:txBody>
-      </p:sp>
-      <p:sp>
-        <p:nvSpPr>
-          <p:cNvPr id="3" name="Content Placeholder 2"/>
-          <p:cNvSpPr>
-            <a:spLocks noGrp="1"/>
-          </p:cNvSpPr>
-          <p:nvPr>
-            <p:ph idx="1"/>
-          </p:nvPr>
-        </p:nvSpPr>
-        <p:spPr/>
-        <p:txBody>
-          <a:bodyPr/>
-          <a:lstStyle/>
-          <a:p>
-            <a:endParaRPr lang="en-NZ"/>
-          </a:p>
-        </p:txBody>
-      </p:sp>
-    </p:spTree>
-    <p:extLst>
-      <p:ext uri="{BB962C8B-B14F-4D97-AF65-F5344CB8AC3E}">
-        <p14:creationId xmlns:p14="http://schemas.microsoft.com/office/powerpoint/2010/main" val="153069590"/>
-      </p:ext>
-    </p:extLst>
-  </p:cSld>
-  <p:clrMapOvr>
-    <a:masterClrMapping/>
-  </p:clrMapOvr>
-</p:sld>
-</file>
-
-<file path=ppt/slides/slide17.xml><?xml version="1.0" encoding="utf-8"?>
-<p:sld xmlns:a="http://schemas.openxmlformats.org/drawingml/2006/main" xmlns:r="http://schemas.openxmlformats.org/officeDocument/2006/relationships" xmlns:p="http://schemas.openxmlformats.org/presentationml/2006/main">
-  <p:cSld>
-    <p:spTree>
-      <p:nvGrpSpPr>
-        <p:cNvPr id="1" name=""/>
-        <p:cNvGrpSpPr/>
-        <p:nvPr/>
-      </p:nvGrpSpPr>
-      <p:grpSpPr>
-        <a:xfrm>
-          <a:off x="0" y="0"/>
-          <a:ext cx="0" cy="0"/>
-          <a:chOff x="0" y="0"/>
-          <a:chExt cx="0" cy="0"/>
-        </a:xfrm>
-      </p:grpSpPr>
-      <p:sp>
-        <p:nvSpPr>
-          <p:cNvPr id="2" name="Title 1"/>
-          <p:cNvSpPr>
-            <a:spLocks noGrp="1"/>
-          </p:cNvSpPr>
-          <p:nvPr>
-            <p:ph type="title"/>
-          </p:nvPr>
-        </p:nvSpPr>
-        <p:spPr/>
-        <p:txBody>
-          <a:bodyPr/>
-          <a:lstStyle/>
-          <a:p>
-            <a:endParaRPr lang="en-NZ" dirty="0"/>
-          </a:p>
-        </p:txBody>
-      </p:sp>
-      <p:pic>
-        <p:nvPicPr>
-          <p:cNvPr id="4" name="Content Placeholder 3"/>
-          <p:cNvPicPr>
-            <a:picLocks noGrp="1" noChangeAspect="1"/>
-          </p:cNvPicPr>
-          <p:nvPr>
-            <p:ph idx="1"/>
-          </p:nvPr>
-        </p:nvPicPr>
-        <p:blipFill>
-          <a:blip r:embed="rId2">
-            <a:extLst>
-              <a:ext uri="{28A0092B-C50C-407E-A947-70E740481C1C}">
-                <a14:useLocalDpi xmlns:a14="http://schemas.microsoft.com/office/drawing/2010/main" val="0"/>
-              </a:ext>
-            </a:extLst>
-          </a:blip>
-          <a:stretch>
-            <a:fillRect/>
-          </a:stretch>
-        </p:blipFill>
-        <p:spPr>
-          <a:xfrm>
-            <a:off x="2493034" y="103967"/>
-            <a:ext cx="6650966" cy="6650966"/>
-          </a:xfrm>
-        </p:spPr>
-      </p:pic>
-    </p:spTree>
-    <p:extLst>
-      <p:ext uri="{BB962C8B-B14F-4D97-AF65-F5344CB8AC3E}">
-        <p14:creationId xmlns:p14="http://schemas.microsoft.com/office/powerpoint/2010/main" val="2388954811"/>
-      </p:ext>
-    </p:extLst>
-  </p:cSld>
-  <p:clrMapOvr>
-    <a:masterClrMapping/>
-  </p:clrMapOvr>
-</p:sld>
-</file>
-
-<file path=ppt/slides/slide18.xml><?xml version="1.0" encoding="utf-8"?>
-<p:sld xmlns:a="http://schemas.openxmlformats.org/drawingml/2006/main" xmlns:r="http://schemas.openxmlformats.org/officeDocument/2006/relationships" xmlns:p="http://schemas.openxmlformats.org/presentationml/2006/main">
-  <p:cSld>
-    <p:spTree>
-      <p:nvGrpSpPr>
-        <p:cNvPr id="1" name=""/>
-        <p:cNvGrpSpPr/>
-        <p:nvPr/>
-      </p:nvGrpSpPr>
-      <p:grpSpPr>
-        <a:xfrm>
-          <a:off x="0" y="0"/>
-          <a:ext cx="0" cy="0"/>
-          <a:chOff x="0" y="0"/>
-          <a:chExt cx="0" cy="0"/>
-        </a:xfrm>
-      </p:grpSpPr>
-      <p:sp>
-        <p:nvSpPr>
-          <p:cNvPr id="2" name="Title 1"/>
-          <p:cNvSpPr>
-            <a:spLocks noGrp="1"/>
-          </p:cNvSpPr>
-          <p:nvPr>
-            <p:ph type="title"/>
-          </p:nvPr>
-        </p:nvSpPr>
-        <p:spPr/>
-        <p:txBody>
-          <a:bodyPr/>
-          <a:lstStyle/>
-          <a:p>
-            <a:endParaRPr lang="en-NZ"/>
-          </a:p>
-        </p:txBody>
-      </p:sp>
-      <p:pic>
-        <p:nvPicPr>
-          <p:cNvPr id="4" name="Content Placeholder 3"/>
-          <p:cNvPicPr>
-            <a:picLocks noGrp="1" noChangeAspect="1"/>
-          </p:cNvPicPr>
-          <p:nvPr>
-            <p:ph idx="1"/>
-          </p:nvPr>
-        </p:nvPicPr>
-        <p:blipFill>
-          <a:blip r:embed="rId2">
-            <a:extLst>
-              <a:ext uri="{28A0092B-C50C-407E-A947-70E740481C1C}">
-                <a14:useLocalDpi xmlns:a14="http://schemas.microsoft.com/office/drawing/2010/main" val="0"/>
-              </a:ext>
-            </a:extLst>
-          </a:blip>
-          <a:stretch>
-            <a:fillRect/>
-          </a:stretch>
-        </p:blipFill>
-        <p:spPr>
-          <a:xfrm>
-            <a:off x="0" y="1523999"/>
-            <a:ext cx="9144000" cy="5334001"/>
-          </a:xfrm>
-        </p:spPr>
-      </p:pic>
-    </p:spTree>
-    <p:extLst>
-      <p:ext uri="{BB962C8B-B14F-4D97-AF65-F5344CB8AC3E}">
-        <p14:creationId xmlns:p14="http://schemas.microsoft.com/office/powerpoint/2010/main" val="3657479237"/>
-      </p:ext>
-    </p:extLst>
-  </p:cSld>
-  <p:clrMapOvr>
-    <a:masterClrMapping/>
-  </p:clrMapOvr>
-</p:sld>
-</file>
-
-<file path=ppt/slides/slide19.xml><?xml version="1.0" encoding="utf-8"?>
-<p:sld xmlns:a="http://schemas.openxmlformats.org/drawingml/2006/main" xmlns:r="http://schemas.openxmlformats.org/officeDocument/2006/relationships" xmlns:p="http://schemas.openxmlformats.org/presentationml/2006/main">
-  <p:cSld>
-    <p:spTree>
-      <p:nvGrpSpPr>
-        <p:cNvPr id="1" name=""/>
-        <p:cNvGrpSpPr/>
-        <p:nvPr/>
-      </p:nvGrpSpPr>
-      <p:grpSpPr>
-        <a:xfrm>
-          <a:off x="0" y="0"/>
-          <a:ext cx="0" cy="0"/>
-          <a:chOff x="0" y="0"/>
-          <a:chExt cx="0" cy="0"/>
-        </a:xfrm>
-      </p:grpSpPr>
-      <p:sp>
-        <p:nvSpPr>
-          <p:cNvPr id="2" name="Title 1"/>
-          <p:cNvSpPr>
-            <a:spLocks noGrp="1"/>
-          </p:cNvSpPr>
-          <p:nvPr>
-            <p:ph type="title"/>
-          </p:nvPr>
-        </p:nvSpPr>
-        <p:spPr/>
-        <p:txBody>
-          <a:bodyPr/>
-          <a:lstStyle/>
-          <a:p>
-            <a:endParaRPr lang="en-NZ"/>
-          </a:p>
-        </p:txBody>
-      </p:sp>
-      <p:pic>
-        <p:nvPicPr>
-          <p:cNvPr id="4" name="Content Placeholder 3"/>
-          <p:cNvPicPr>
-            <a:picLocks noGrp="1" noChangeAspect="1"/>
-          </p:cNvPicPr>
-          <p:nvPr>
-            <p:ph idx="1"/>
-          </p:nvPr>
-        </p:nvPicPr>
-        <p:blipFill>
-          <a:blip r:embed="rId2">
-            <a:extLst>
-              <a:ext uri="{28A0092B-C50C-407E-A947-70E740481C1C}">
-                <a14:useLocalDpi xmlns:a14="http://schemas.microsoft.com/office/drawing/2010/main" val="0"/>
-              </a:ext>
-            </a:extLst>
-          </a:blip>
-          <a:stretch>
-            <a:fillRect/>
-          </a:stretch>
-        </p:blipFill>
-        <p:spPr>
-          <a:xfrm>
-            <a:off x="0" y="1523999"/>
-            <a:ext cx="9144000" cy="5334001"/>
-          </a:xfrm>
-        </p:spPr>
-      </p:pic>
-    </p:spTree>
-    <p:extLst>
-      <p:ext uri="{BB962C8B-B14F-4D97-AF65-F5344CB8AC3E}">
-        <p14:creationId xmlns:p14="http://schemas.microsoft.com/office/powerpoint/2010/main" val="2727842710"/>
       </p:ext>
     </p:extLst>
   </p:cSld>
@@ -4238,786 +3940,6 @@
     <p:extLst>
       <p:ext uri="{BB962C8B-B14F-4D97-AF65-F5344CB8AC3E}">
         <p14:creationId xmlns:p14="http://schemas.microsoft.com/office/powerpoint/2010/main" val="1127452723"/>
-      </p:ext>
-    </p:extLst>
-  </p:cSld>
-  <p:clrMapOvr>
-    <a:masterClrMapping/>
-  </p:clrMapOvr>
-</p:sld>
-</file>
-
-<file path=ppt/slides/slide20.xml><?xml version="1.0" encoding="utf-8"?>
-<p:sld xmlns:a="http://schemas.openxmlformats.org/drawingml/2006/main" xmlns:r="http://schemas.openxmlformats.org/officeDocument/2006/relationships" xmlns:p="http://schemas.openxmlformats.org/presentationml/2006/main">
-  <p:cSld>
-    <p:spTree>
-      <p:nvGrpSpPr>
-        <p:cNvPr id="1" name=""/>
-        <p:cNvGrpSpPr/>
-        <p:nvPr/>
-      </p:nvGrpSpPr>
-      <p:grpSpPr>
-        <a:xfrm>
-          <a:off x="0" y="0"/>
-          <a:ext cx="0" cy="0"/>
-          <a:chOff x="0" y="0"/>
-          <a:chExt cx="0" cy="0"/>
-        </a:xfrm>
-      </p:grpSpPr>
-      <p:sp>
-        <p:nvSpPr>
-          <p:cNvPr id="2" name="Title 1"/>
-          <p:cNvSpPr>
-            <a:spLocks noGrp="1"/>
-          </p:cNvSpPr>
-          <p:nvPr>
-            <p:ph type="title"/>
-          </p:nvPr>
-        </p:nvSpPr>
-        <p:spPr/>
-        <p:txBody>
-          <a:bodyPr/>
-          <a:lstStyle/>
-          <a:p>
-            <a:endParaRPr lang="en-NZ"/>
-          </a:p>
-        </p:txBody>
-      </p:sp>
-      <p:pic>
-        <p:nvPicPr>
-          <p:cNvPr id="4" name="Content Placeholder 3"/>
-          <p:cNvPicPr>
-            <a:picLocks noGrp="1" noChangeAspect="1"/>
-          </p:cNvPicPr>
-          <p:nvPr>
-            <p:ph idx="1"/>
-          </p:nvPr>
-        </p:nvPicPr>
-        <p:blipFill>
-          <a:blip r:embed="rId2">
-            <a:extLst>
-              <a:ext uri="{28A0092B-C50C-407E-A947-70E740481C1C}">
-                <a14:useLocalDpi xmlns:a14="http://schemas.microsoft.com/office/drawing/2010/main" val="0"/>
-              </a:ext>
-            </a:extLst>
-          </a:blip>
-          <a:stretch>
-            <a:fillRect/>
-          </a:stretch>
-        </p:blipFill>
-        <p:spPr>
-          <a:xfrm>
-            <a:off x="842282" y="1825625"/>
-            <a:ext cx="7459435" cy="4351338"/>
-          </a:xfrm>
-        </p:spPr>
-      </p:pic>
-    </p:spTree>
-    <p:extLst>
-      <p:ext uri="{BB962C8B-B14F-4D97-AF65-F5344CB8AC3E}">
-        <p14:creationId xmlns:p14="http://schemas.microsoft.com/office/powerpoint/2010/main" val="2495900732"/>
-      </p:ext>
-    </p:extLst>
-  </p:cSld>
-  <p:clrMapOvr>
-    <a:masterClrMapping/>
-  </p:clrMapOvr>
-</p:sld>
-</file>
-
-<file path=ppt/slides/slide21.xml><?xml version="1.0" encoding="utf-8"?>
-<p:sld xmlns:a="http://schemas.openxmlformats.org/drawingml/2006/main" xmlns:r="http://schemas.openxmlformats.org/officeDocument/2006/relationships" xmlns:p="http://schemas.openxmlformats.org/presentationml/2006/main">
-  <p:cSld>
-    <p:spTree>
-      <p:nvGrpSpPr>
-        <p:cNvPr id="1" name=""/>
-        <p:cNvGrpSpPr/>
-        <p:nvPr/>
-      </p:nvGrpSpPr>
-      <p:grpSpPr>
-        <a:xfrm>
-          <a:off x="0" y="0"/>
-          <a:ext cx="0" cy="0"/>
-          <a:chOff x="0" y="0"/>
-          <a:chExt cx="0" cy="0"/>
-        </a:xfrm>
-      </p:grpSpPr>
-      <p:sp>
-        <p:nvSpPr>
-          <p:cNvPr id="2" name="Title 1"/>
-          <p:cNvSpPr>
-            <a:spLocks noGrp="1"/>
-          </p:cNvSpPr>
-          <p:nvPr>
-            <p:ph type="title"/>
-          </p:nvPr>
-        </p:nvSpPr>
-        <p:spPr/>
-        <p:txBody>
-          <a:bodyPr/>
-          <a:lstStyle/>
-          <a:p>
-            <a:endParaRPr lang="en-NZ"/>
-          </a:p>
-        </p:txBody>
-      </p:sp>
-      <p:pic>
-        <p:nvPicPr>
-          <p:cNvPr id="4" name="Content Placeholder 3"/>
-          <p:cNvPicPr>
-            <a:picLocks noGrp="1" noChangeAspect="1"/>
-          </p:cNvPicPr>
-          <p:nvPr>
-            <p:ph idx="1"/>
-          </p:nvPr>
-        </p:nvPicPr>
-        <p:blipFill>
-          <a:blip r:embed="rId2">
-            <a:extLst>
-              <a:ext uri="{28A0092B-C50C-407E-A947-70E740481C1C}">
-                <a14:useLocalDpi xmlns:a14="http://schemas.microsoft.com/office/drawing/2010/main" val="0"/>
-              </a:ext>
-            </a:extLst>
-          </a:blip>
-          <a:stretch>
-            <a:fillRect/>
-          </a:stretch>
-        </p:blipFill>
-        <p:spPr>
-          <a:xfrm>
-            <a:off x="842282" y="1825625"/>
-            <a:ext cx="7459435" cy="4351338"/>
-          </a:xfrm>
-        </p:spPr>
-      </p:pic>
-    </p:spTree>
-    <p:extLst>
-      <p:ext uri="{BB962C8B-B14F-4D97-AF65-F5344CB8AC3E}">
-        <p14:creationId xmlns:p14="http://schemas.microsoft.com/office/powerpoint/2010/main" val="2974112269"/>
-      </p:ext>
-    </p:extLst>
-  </p:cSld>
-  <p:clrMapOvr>
-    <a:masterClrMapping/>
-  </p:clrMapOvr>
-</p:sld>
-</file>
-
-<file path=ppt/slides/slide22.xml><?xml version="1.0" encoding="utf-8"?>
-<p:sld xmlns:a="http://schemas.openxmlformats.org/drawingml/2006/main" xmlns:r="http://schemas.openxmlformats.org/officeDocument/2006/relationships" xmlns:p="http://schemas.openxmlformats.org/presentationml/2006/main">
-  <p:cSld>
-    <p:spTree>
-      <p:nvGrpSpPr>
-        <p:cNvPr id="1" name=""/>
-        <p:cNvGrpSpPr/>
-        <p:nvPr/>
-      </p:nvGrpSpPr>
-      <p:grpSpPr>
-        <a:xfrm>
-          <a:off x="0" y="0"/>
-          <a:ext cx="0" cy="0"/>
-          <a:chOff x="0" y="0"/>
-          <a:chExt cx="0" cy="0"/>
-        </a:xfrm>
-      </p:grpSpPr>
-      <p:sp>
-        <p:nvSpPr>
-          <p:cNvPr id="2" name="Title 1"/>
-          <p:cNvSpPr>
-            <a:spLocks noGrp="1"/>
-          </p:cNvSpPr>
-          <p:nvPr>
-            <p:ph type="title"/>
-          </p:nvPr>
-        </p:nvSpPr>
-        <p:spPr/>
-        <p:txBody>
-          <a:bodyPr/>
-          <a:lstStyle/>
-          <a:p>
-            <a:endParaRPr lang="en-NZ"/>
-          </a:p>
-        </p:txBody>
-      </p:sp>
-      <p:pic>
-        <p:nvPicPr>
-          <p:cNvPr id="4" name="Content Placeholder 3"/>
-          <p:cNvPicPr>
-            <a:picLocks noGrp="1" noChangeAspect="1"/>
-          </p:cNvPicPr>
-          <p:nvPr>
-            <p:ph idx="1"/>
-          </p:nvPr>
-        </p:nvPicPr>
-        <p:blipFill>
-          <a:blip r:embed="rId2" cstate="print">
-            <a:extLst>
-              <a:ext uri="{28A0092B-C50C-407E-A947-70E740481C1C}">
-                <a14:useLocalDpi xmlns:a14="http://schemas.microsoft.com/office/drawing/2010/main" val="0"/>
-              </a:ext>
-            </a:extLst>
-          </a:blip>
-          <a:stretch>
-            <a:fillRect/>
-          </a:stretch>
-        </p:blipFill>
-        <p:spPr>
-          <a:xfrm>
-            <a:off x="3795622" y="172528"/>
-            <a:ext cx="5348377" cy="6685472"/>
-          </a:xfrm>
-        </p:spPr>
-      </p:pic>
-    </p:spTree>
-    <p:extLst>
-      <p:ext uri="{BB962C8B-B14F-4D97-AF65-F5344CB8AC3E}">
-        <p14:creationId xmlns:p14="http://schemas.microsoft.com/office/powerpoint/2010/main" val="3326670117"/>
-      </p:ext>
-    </p:extLst>
-  </p:cSld>
-  <p:clrMapOvr>
-    <a:masterClrMapping/>
-  </p:clrMapOvr>
-</p:sld>
-</file>
-
-<file path=ppt/slides/slide23.xml><?xml version="1.0" encoding="utf-8"?>
-<p:sld xmlns:a="http://schemas.openxmlformats.org/drawingml/2006/main" xmlns:r="http://schemas.openxmlformats.org/officeDocument/2006/relationships" xmlns:p="http://schemas.openxmlformats.org/presentationml/2006/main">
-  <p:cSld>
-    <p:spTree>
-      <p:nvGrpSpPr>
-        <p:cNvPr id="1" name=""/>
-        <p:cNvGrpSpPr/>
-        <p:nvPr/>
-      </p:nvGrpSpPr>
-      <p:grpSpPr>
-        <a:xfrm>
-          <a:off x="0" y="0"/>
-          <a:ext cx="0" cy="0"/>
-          <a:chOff x="0" y="0"/>
-          <a:chExt cx="0" cy="0"/>
-        </a:xfrm>
-      </p:grpSpPr>
-      <p:sp>
-        <p:nvSpPr>
-          <p:cNvPr id="2" name="Title 1"/>
-          <p:cNvSpPr>
-            <a:spLocks noGrp="1"/>
-          </p:cNvSpPr>
-          <p:nvPr>
-            <p:ph type="title"/>
-          </p:nvPr>
-        </p:nvSpPr>
-        <p:spPr/>
-        <p:txBody>
-          <a:bodyPr/>
-          <a:lstStyle/>
-          <a:p>
-            <a:endParaRPr lang="en-NZ"/>
-          </a:p>
-        </p:txBody>
-      </p:sp>
-      <p:pic>
-        <p:nvPicPr>
-          <p:cNvPr id="4" name="Content Placeholder 3"/>
-          <p:cNvPicPr>
-            <a:picLocks noGrp="1" noChangeAspect="1"/>
-          </p:cNvPicPr>
-          <p:nvPr>
-            <p:ph idx="1"/>
-          </p:nvPr>
-        </p:nvPicPr>
-        <p:blipFill>
-          <a:blip r:embed="rId2" cstate="print">
-            <a:extLst>
-              <a:ext uri="{28A0092B-C50C-407E-A947-70E740481C1C}">
-                <a14:useLocalDpi xmlns:a14="http://schemas.microsoft.com/office/drawing/2010/main" val="0"/>
-              </a:ext>
-            </a:extLst>
-          </a:blip>
-          <a:stretch>
-            <a:fillRect/>
-          </a:stretch>
-        </p:blipFill>
-        <p:spPr>
-          <a:xfrm>
-            <a:off x="3735238" y="97047"/>
-            <a:ext cx="5408762" cy="6760953"/>
-          </a:xfrm>
-        </p:spPr>
-      </p:pic>
-    </p:spTree>
-    <p:extLst>
-      <p:ext uri="{BB962C8B-B14F-4D97-AF65-F5344CB8AC3E}">
-        <p14:creationId xmlns:p14="http://schemas.microsoft.com/office/powerpoint/2010/main" val="2798668124"/>
-      </p:ext>
-    </p:extLst>
-  </p:cSld>
-  <p:clrMapOvr>
-    <a:masterClrMapping/>
-  </p:clrMapOvr>
-</p:sld>
-</file>
-
-<file path=ppt/slides/slide24.xml><?xml version="1.0" encoding="utf-8"?>
-<p:sld xmlns:a="http://schemas.openxmlformats.org/drawingml/2006/main" xmlns:r="http://schemas.openxmlformats.org/officeDocument/2006/relationships" xmlns:p="http://schemas.openxmlformats.org/presentationml/2006/main">
-  <p:cSld>
-    <p:spTree>
-      <p:nvGrpSpPr>
-        <p:cNvPr id="1" name=""/>
-        <p:cNvGrpSpPr/>
-        <p:nvPr/>
-      </p:nvGrpSpPr>
-      <p:grpSpPr>
-        <a:xfrm>
-          <a:off x="0" y="0"/>
-          <a:ext cx="0" cy="0"/>
-          <a:chOff x="0" y="0"/>
-          <a:chExt cx="0" cy="0"/>
-        </a:xfrm>
-      </p:grpSpPr>
-      <p:sp>
-        <p:nvSpPr>
-          <p:cNvPr id="2" name="Title 1"/>
-          <p:cNvSpPr>
-            <a:spLocks noGrp="1"/>
-          </p:cNvSpPr>
-          <p:nvPr>
-            <p:ph type="title"/>
-          </p:nvPr>
-        </p:nvSpPr>
-        <p:spPr/>
-        <p:txBody>
-          <a:bodyPr/>
-          <a:lstStyle/>
-          <a:p>
-            <a:endParaRPr lang="en-NZ"/>
-          </a:p>
-        </p:txBody>
-      </p:sp>
-      <p:pic>
-        <p:nvPicPr>
-          <p:cNvPr id="4" name="Content Placeholder 3"/>
-          <p:cNvPicPr>
-            <a:picLocks noGrp="1" noChangeAspect="1"/>
-          </p:cNvPicPr>
-          <p:nvPr>
-            <p:ph idx="1"/>
-          </p:nvPr>
-        </p:nvPicPr>
-        <p:blipFill>
-          <a:blip r:embed="rId2">
-            <a:extLst>
-              <a:ext uri="{28A0092B-C50C-407E-A947-70E740481C1C}">
-                <a14:useLocalDpi xmlns:a14="http://schemas.microsoft.com/office/drawing/2010/main" val="0"/>
-              </a:ext>
-            </a:extLst>
-          </a:blip>
-          <a:stretch>
-            <a:fillRect/>
-          </a:stretch>
-        </p:blipFill>
-        <p:spPr>
-          <a:xfrm>
-            <a:off x="842282" y="1825625"/>
-            <a:ext cx="7459435" cy="4351338"/>
-          </a:xfrm>
-        </p:spPr>
-      </p:pic>
-    </p:spTree>
-    <p:extLst>
-      <p:ext uri="{BB962C8B-B14F-4D97-AF65-F5344CB8AC3E}">
-        <p14:creationId xmlns:p14="http://schemas.microsoft.com/office/powerpoint/2010/main" val="1181803697"/>
-      </p:ext>
-    </p:extLst>
-  </p:cSld>
-  <p:clrMapOvr>
-    <a:masterClrMapping/>
-  </p:clrMapOvr>
-</p:sld>
-</file>
-
-<file path=ppt/slides/slide25.xml><?xml version="1.0" encoding="utf-8"?>
-<p:sld xmlns:a="http://schemas.openxmlformats.org/drawingml/2006/main" xmlns:r="http://schemas.openxmlformats.org/officeDocument/2006/relationships" xmlns:p="http://schemas.openxmlformats.org/presentationml/2006/main">
-  <p:cSld>
-    <p:spTree>
-      <p:nvGrpSpPr>
-        <p:cNvPr id="1" name=""/>
-        <p:cNvGrpSpPr/>
-        <p:nvPr/>
-      </p:nvGrpSpPr>
-      <p:grpSpPr>
-        <a:xfrm>
-          <a:off x="0" y="0"/>
-          <a:ext cx="0" cy="0"/>
-          <a:chOff x="0" y="0"/>
-          <a:chExt cx="0" cy="0"/>
-        </a:xfrm>
-      </p:grpSpPr>
-      <p:sp>
-        <p:nvSpPr>
-          <p:cNvPr id="2" name="Title 1"/>
-          <p:cNvSpPr>
-            <a:spLocks noGrp="1"/>
-          </p:cNvSpPr>
-          <p:nvPr>
-            <p:ph type="title"/>
-          </p:nvPr>
-        </p:nvSpPr>
-        <p:spPr/>
-        <p:txBody>
-          <a:bodyPr/>
-          <a:lstStyle/>
-          <a:p>
-            <a:endParaRPr lang="en-NZ"/>
-          </a:p>
-        </p:txBody>
-      </p:sp>
-      <p:pic>
-        <p:nvPicPr>
-          <p:cNvPr id="4" name="Content Placeholder 3"/>
-          <p:cNvPicPr>
-            <a:picLocks noGrp="1" noChangeAspect="1"/>
-          </p:cNvPicPr>
-          <p:nvPr>
-            <p:ph idx="1"/>
-          </p:nvPr>
-        </p:nvPicPr>
-        <p:blipFill>
-          <a:blip r:embed="rId2">
-            <a:extLst>
-              <a:ext uri="{28A0092B-C50C-407E-A947-70E740481C1C}">
-                <a14:useLocalDpi xmlns:a14="http://schemas.microsoft.com/office/drawing/2010/main" val="0"/>
-              </a:ext>
-            </a:extLst>
-          </a:blip>
-          <a:stretch>
-            <a:fillRect/>
-          </a:stretch>
-        </p:blipFill>
-        <p:spPr>
-          <a:xfrm>
-            <a:off x="1" y="1523999"/>
-            <a:ext cx="9144000" cy="5334001"/>
-          </a:xfrm>
-        </p:spPr>
-      </p:pic>
-    </p:spTree>
-    <p:extLst>
-      <p:ext uri="{BB962C8B-B14F-4D97-AF65-F5344CB8AC3E}">
-        <p14:creationId xmlns:p14="http://schemas.microsoft.com/office/powerpoint/2010/main" val="1579544255"/>
-      </p:ext>
-    </p:extLst>
-  </p:cSld>
-  <p:clrMapOvr>
-    <a:masterClrMapping/>
-  </p:clrMapOvr>
-</p:sld>
-</file>
-
-<file path=ppt/slides/slide26.xml><?xml version="1.0" encoding="utf-8"?>
-<p:sld xmlns:a="http://schemas.openxmlformats.org/drawingml/2006/main" xmlns:r="http://schemas.openxmlformats.org/officeDocument/2006/relationships" xmlns:p="http://schemas.openxmlformats.org/presentationml/2006/main">
-  <p:cSld>
-    <p:spTree>
-      <p:nvGrpSpPr>
-        <p:cNvPr id="1" name=""/>
-        <p:cNvGrpSpPr/>
-        <p:nvPr/>
-      </p:nvGrpSpPr>
-      <p:grpSpPr>
-        <a:xfrm>
-          <a:off x="0" y="0"/>
-          <a:ext cx="0" cy="0"/>
-          <a:chOff x="0" y="0"/>
-          <a:chExt cx="0" cy="0"/>
-        </a:xfrm>
-      </p:grpSpPr>
-      <p:sp>
-        <p:nvSpPr>
-          <p:cNvPr id="2" name="Title 1"/>
-          <p:cNvSpPr>
-            <a:spLocks noGrp="1"/>
-          </p:cNvSpPr>
-          <p:nvPr>
-            <p:ph type="title"/>
-          </p:nvPr>
-        </p:nvSpPr>
-        <p:spPr/>
-        <p:txBody>
-          <a:bodyPr/>
-          <a:lstStyle/>
-          <a:p>
-            <a:endParaRPr lang="en-NZ"/>
-          </a:p>
-        </p:txBody>
-      </p:sp>
-      <p:pic>
-        <p:nvPicPr>
-          <p:cNvPr id="4" name="Content Placeholder 3"/>
-          <p:cNvPicPr>
-            <a:picLocks noGrp="1" noChangeAspect="1"/>
-          </p:cNvPicPr>
-          <p:nvPr>
-            <p:ph idx="1"/>
-          </p:nvPr>
-        </p:nvPicPr>
-        <p:blipFill>
-          <a:blip r:embed="rId2">
-            <a:extLst>
-              <a:ext uri="{28A0092B-C50C-407E-A947-70E740481C1C}">
-                <a14:useLocalDpi xmlns:a14="http://schemas.microsoft.com/office/drawing/2010/main" val="0"/>
-              </a:ext>
-            </a:extLst>
-          </a:blip>
-          <a:stretch>
-            <a:fillRect/>
-          </a:stretch>
-        </p:blipFill>
-        <p:spPr>
-          <a:xfrm>
-            <a:off x="842282" y="1825625"/>
-            <a:ext cx="7459435" cy="4351338"/>
-          </a:xfrm>
-        </p:spPr>
-      </p:pic>
-    </p:spTree>
-    <p:extLst>
-      <p:ext uri="{BB962C8B-B14F-4D97-AF65-F5344CB8AC3E}">
-        <p14:creationId xmlns:p14="http://schemas.microsoft.com/office/powerpoint/2010/main" val="1624705444"/>
-      </p:ext>
-    </p:extLst>
-  </p:cSld>
-  <p:clrMapOvr>
-    <a:masterClrMapping/>
-  </p:clrMapOvr>
-</p:sld>
-</file>
-
-<file path=ppt/slides/slide27.xml><?xml version="1.0" encoding="utf-8"?>
-<p:sld xmlns:a="http://schemas.openxmlformats.org/drawingml/2006/main" xmlns:r="http://schemas.openxmlformats.org/officeDocument/2006/relationships" xmlns:p="http://schemas.openxmlformats.org/presentationml/2006/main">
-  <p:cSld>
-    <p:spTree>
-      <p:nvGrpSpPr>
-        <p:cNvPr id="1" name=""/>
-        <p:cNvGrpSpPr/>
-        <p:nvPr/>
-      </p:nvGrpSpPr>
-      <p:grpSpPr>
-        <a:xfrm>
-          <a:off x="0" y="0"/>
-          <a:ext cx="0" cy="0"/>
-          <a:chOff x="0" y="0"/>
-          <a:chExt cx="0" cy="0"/>
-        </a:xfrm>
-      </p:grpSpPr>
-      <p:sp>
-        <p:nvSpPr>
-          <p:cNvPr id="2" name="Title 1"/>
-          <p:cNvSpPr>
-            <a:spLocks noGrp="1"/>
-          </p:cNvSpPr>
-          <p:nvPr>
-            <p:ph type="title"/>
-          </p:nvPr>
-        </p:nvSpPr>
-        <p:spPr/>
-        <p:txBody>
-          <a:bodyPr/>
-          <a:lstStyle/>
-          <a:p>
-            <a:endParaRPr lang="en-NZ"/>
-          </a:p>
-        </p:txBody>
-      </p:sp>
-      <p:pic>
-        <p:nvPicPr>
-          <p:cNvPr id="4" name="Content Placeholder 3"/>
-          <p:cNvPicPr>
-            <a:picLocks noGrp="1" noChangeAspect="1"/>
-          </p:cNvPicPr>
-          <p:nvPr>
-            <p:ph idx="1"/>
-          </p:nvPr>
-        </p:nvPicPr>
-        <p:blipFill>
-          <a:blip r:embed="rId2">
-            <a:extLst>
-              <a:ext uri="{28A0092B-C50C-407E-A947-70E740481C1C}">
-                <a14:useLocalDpi xmlns:a14="http://schemas.microsoft.com/office/drawing/2010/main" val="0"/>
-              </a:ext>
-            </a:extLst>
-          </a:blip>
-          <a:stretch>
-            <a:fillRect/>
-          </a:stretch>
-        </p:blipFill>
-        <p:spPr>
-          <a:xfrm>
-            <a:off x="842282" y="1825625"/>
-            <a:ext cx="7459435" cy="4351338"/>
-          </a:xfrm>
-        </p:spPr>
-      </p:pic>
-    </p:spTree>
-    <p:extLst>
-      <p:ext uri="{BB962C8B-B14F-4D97-AF65-F5344CB8AC3E}">
-        <p14:creationId xmlns:p14="http://schemas.microsoft.com/office/powerpoint/2010/main" val="2122499807"/>
-      </p:ext>
-    </p:extLst>
-  </p:cSld>
-  <p:clrMapOvr>
-    <a:masterClrMapping/>
-  </p:clrMapOvr>
-</p:sld>
-</file>
-
-<file path=ppt/slides/slide28.xml><?xml version="1.0" encoding="utf-8"?>
-<p:sld xmlns:a="http://schemas.openxmlformats.org/drawingml/2006/main" xmlns:r="http://schemas.openxmlformats.org/officeDocument/2006/relationships" xmlns:p="http://schemas.openxmlformats.org/presentationml/2006/main">
-  <p:cSld>
-    <p:spTree>
-      <p:nvGrpSpPr>
-        <p:cNvPr id="1" name=""/>
-        <p:cNvGrpSpPr/>
-        <p:nvPr/>
-      </p:nvGrpSpPr>
-      <p:grpSpPr>
-        <a:xfrm>
-          <a:off x="0" y="0"/>
-          <a:ext cx="0" cy="0"/>
-          <a:chOff x="0" y="0"/>
-          <a:chExt cx="0" cy="0"/>
-        </a:xfrm>
-      </p:grpSpPr>
-      <p:sp>
-        <p:nvSpPr>
-          <p:cNvPr id="2" name="Title 1"/>
-          <p:cNvSpPr>
-            <a:spLocks noGrp="1"/>
-          </p:cNvSpPr>
-          <p:nvPr>
-            <p:ph type="title"/>
-          </p:nvPr>
-        </p:nvSpPr>
-        <p:spPr/>
-        <p:txBody>
-          <a:bodyPr/>
-          <a:lstStyle/>
-          <a:p>
-            <a:endParaRPr lang="en-NZ"/>
-          </a:p>
-        </p:txBody>
-      </p:sp>
-      <p:pic>
-        <p:nvPicPr>
-          <p:cNvPr id="4" name="Content Placeholder 3"/>
-          <p:cNvPicPr>
-            <a:picLocks noGrp="1" noChangeAspect="1"/>
-          </p:cNvPicPr>
-          <p:nvPr>
-            <p:ph idx="1"/>
-          </p:nvPr>
-        </p:nvPicPr>
-        <p:blipFill>
-          <a:blip r:embed="rId2">
-            <a:extLst>
-              <a:ext uri="{28A0092B-C50C-407E-A947-70E740481C1C}">
-                <a14:useLocalDpi xmlns:a14="http://schemas.microsoft.com/office/drawing/2010/main" val="0"/>
-              </a:ext>
-            </a:extLst>
-          </a:blip>
-          <a:stretch>
-            <a:fillRect/>
-          </a:stretch>
-        </p:blipFill>
-        <p:spPr>
-          <a:xfrm>
-            <a:off x="842282" y="1825625"/>
-            <a:ext cx="7459435" cy="4351338"/>
-          </a:xfrm>
-        </p:spPr>
-      </p:pic>
-    </p:spTree>
-    <p:extLst>
-      <p:ext uri="{BB962C8B-B14F-4D97-AF65-F5344CB8AC3E}">
-        <p14:creationId xmlns:p14="http://schemas.microsoft.com/office/powerpoint/2010/main" val="1977388319"/>
-      </p:ext>
-    </p:extLst>
-  </p:cSld>
-  <p:clrMapOvr>
-    <a:masterClrMapping/>
-  </p:clrMapOvr>
-</p:sld>
-</file>
-
-<file path=ppt/slides/slide29.xml><?xml version="1.0" encoding="utf-8"?>
-<p:sld xmlns:a="http://schemas.openxmlformats.org/drawingml/2006/main" xmlns:r="http://schemas.openxmlformats.org/officeDocument/2006/relationships" xmlns:p="http://schemas.openxmlformats.org/presentationml/2006/main">
-  <p:cSld>
-    <p:spTree>
-      <p:nvGrpSpPr>
-        <p:cNvPr id="1" name=""/>
-        <p:cNvGrpSpPr/>
-        <p:nvPr/>
-      </p:nvGrpSpPr>
-      <p:grpSpPr>
-        <a:xfrm>
-          <a:off x="0" y="0"/>
-          <a:ext cx="0" cy="0"/>
-          <a:chOff x="0" y="0"/>
-          <a:chExt cx="0" cy="0"/>
-        </a:xfrm>
-      </p:grpSpPr>
-      <p:sp>
-        <p:nvSpPr>
-          <p:cNvPr id="2" name="Title 1"/>
-          <p:cNvSpPr>
-            <a:spLocks noGrp="1"/>
-          </p:cNvSpPr>
-          <p:nvPr>
-            <p:ph type="title"/>
-          </p:nvPr>
-        </p:nvSpPr>
-        <p:spPr/>
-        <p:txBody>
-          <a:bodyPr/>
-          <a:lstStyle/>
-          <a:p>
-            <a:endParaRPr lang="en-NZ"/>
-          </a:p>
-        </p:txBody>
-      </p:sp>
-      <p:pic>
-        <p:nvPicPr>
-          <p:cNvPr id="4" name="Content Placeholder 3"/>
-          <p:cNvPicPr>
-            <a:picLocks noGrp="1" noChangeAspect="1"/>
-          </p:cNvPicPr>
-          <p:nvPr>
-            <p:ph idx="1"/>
-          </p:nvPr>
-        </p:nvPicPr>
-        <p:blipFill>
-          <a:blip r:embed="rId2">
-            <a:extLst>
-              <a:ext uri="{28A0092B-C50C-407E-A947-70E740481C1C}">
-                <a14:useLocalDpi xmlns:a14="http://schemas.microsoft.com/office/drawing/2010/main" val="0"/>
-              </a:ext>
-            </a:extLst>
-          </a:blip>
-          <a:stretch>
-            <a:fillRect/>
-          </a:stretch>
-        </p:blipFill>
-        <p:spPr>
-          <a:xfrm>
-            <a:off x="842282" y="1825625"/>
-            <a:ext cx="7459435" cy="4351338"/>
-          </a:xfrm>
-        </p:spPr>
-      </p:pic>
-    </p:spTree>
-    <p:extLst>
-      <p:ext uri="{BB962C8B-B14F-4D97-AF65-F5344CB8AC3E}">
-        <p14:creationId xmlns:p14="http://schemas.microsoft.com/office/powerpoint/2010/main" val="1816968888"/>
       </p:ext>
     </p:extLst>
   </p:cSld>
@@ -5126,318 +4048,6 @@
     <p:extLst>
       <p:ext uri="{BB962C8B-B14F-4D97-AF65-F5344CB8AC3E}">
         <p14:creationId xmlns:p14="http://schemas.microsoft.com/office/powerpoint/2010/main" val="789734272"/>
-      </p:ext>
-    </p:extLst>
-  </p:cSld>
-  <p:clrMapOvr>
-    <a:masterClrMapping/>
-  </p:clrMapOvr>
-</p:sld>
-</file>
-
-<file path=ppt/slides/slide30.xml><?xml version="1.0" encoding="utf-8"?>
-<p:sld xmlns:a="http://schemas.openxmlformats.org/drawingml/2006/main" xmlns:r="http://schemas.openxmlformats.org/officeDocument/2006/relationships" xmlns:p="http://schemas.openxmlformats.org/presentationml/2006/main">
-  <p:cSld>
-    <p:spTree>
-      <p:nvGrpSpPr>
-        <p:cNvPr id="1" name=""/>
-        <p:cNvGrpSpPr/>
-        <p:nvPr/>
-      </p:nvGrpSpPr>
-      <p:grpSpPr>
-        <a:xfrm>
-          <a:off x="0" y="0"/>
-          <a:ext cx="0" cy="0"/>
-          <a:chOff x="0" y="0"/>
-          <a:chExt cx="0" cy="0"/>
-        </a:xfrm>
-      </p:grpSpPr>
-      <p:sp>
-        <p:nvSpPr>
-          <p:cNvPr id="2" name="Title 1"/>
-          <p:cNvSpPr>
-            <a:spLocks noGrp="1"/>
-          </p:cNvSpPr>
-          <p:nvPr>
-            <p:ph type="title"/>
-          </p:nvPr>
-        </p:nvSpPr>
-        <p:spPr/>
-        <p:txBody>
-          <a:bodyPr/>
-          <a:lstStyle/>
-          <a:p>
-            <a:endParaRPr lang="en-NZ"/>
-          </a:p>
-        </p:txBody>
-      </p:sp>
-      <p:pic>
-        <p:nvPicPr>
-          <p:cNvPr id="4" name="Content Placeholder 3"/>
-          <p:cNvPicPr>
-            <a:picLocks noGrp="1" noChangeAspect="1"/>
-          </p:cNvPicPr>
-          <p:nvPr>
-            <p:ph idx="1"/>
-          </p:nvPr>
-        </p:nvPicPr>
-        <p:blipFill>
-          <a:blip r:embed="rId2">
-            <a:extLst>
-              <a:ext uri="{28A0092B-C50C-407E-A947-70E740481C1C}">
-                <a14:useLocalDpi xmlns:a14="http://schemas.microsoft.com/office/drawing/2010/main" val="0"/>
-              </a:ext>
-            </a:extLst>
-          </a:blip>
-          <a:stretch>
-            <a:fillRect/>
-          </a:stretch>
-        </p:blipFill>
-        <p:spPr>
-          <a:xfrm>
-            <a:off x="842282" y="1825625"/>
-            <a:ext cx="7459435" cy="4351338"/>
-          </a:xfrm>
-        </p:spPr>
-      </p:pic>
-    </p:spTree>
-    <p:extLst>
-      <p:ext uri="{BB962C8B-B14F-4D97-AF65-F5344CB8AC3E}">
-        <p14:creationId xmlns:p14="http://schemas.microsoft.com/office/powerpoint/2010/main" val="387008885"/>
-      </p:ext>
-    </p:extLst>
-  </p:cSld>
-  <p:clrMapOvr>
-    <a:masterClrMapping/>
-  </p:clrMapOvr>
-</p:sld>
-</file>
-
-<file path=ppt/slides/slide31.xml><?xml version="1.0" encoding="utf-8"?>
-<p:sld xmlns:a="http://schemas.openxmlformats.org/drawingml/2006/main" xmlns:r="http://schemas.openxmlformats.org/officeDocument/2006/relationships" xmlns:p="http://schemas.openxmlformats.org/presentationml/2006/main">
-  <p:cSld>
-    <p:spTree>
-      <p:nvGrpSpPr>
-        <p:cNvPr id="1" name=""/>
-        <p:cNvGrpSpPr/>
-        <p:nvPr/>
-      </p:nvGrpSpPr>
-      <p:grpSpPr>
-        <a:xfrm>
-          <a:off x="0" y="0"/>
-          <a:ext cx="0" cy="0"/>
-          <a:chOff x="0" y="0"/>
-          <a:chExt cx="0" cy="0"/>
-        </a:xfrm>
-      </p:grpSpPr>
-      <p:sp>
-        <p:nvSpPr>
-          <p:cNvPr id="2" name="Title 1"/>
-          <p:cNvSpPr>
-            <a:spLocks noGrp="1"/>
-          </p:cNvSpPr>
-          <p:nvPr>
-            <p:ph type="title"/>
-          </p:nvPr>
-        </p:nvSpPr>
-        <p:spPr/>
-        <p:txBody>
-          <a:bodyPr/>
-          <a:lstStyle/>
-          <a:p>
-            <a:endParaRPr lang="en-NZ"/>
-          </a:p>
-        </p:txBody>
-      </p:sp>
-      <p:pic>
-        <p:nvPicPr>
-          <p:cNvPr id="4" name="Content Placeholder 3"/>
-          <p:cNvPicPr>
-            <a:picLocks noGrp="1" noChangeAspect="1"/>
-          </p:cNvPicPr>
-          <p:nvPr>
-            <p:ph idx="1"/>
-          </p:nvPr>
-        </p:nvPicPr>
-        <p:blipFill>
-          <a:blip r:embed="rId2">
-            <a:extLst>
-              <a:ext uri="{28A0092B-C50C-407E-A947-70E740481C1C}">
-                <a14:useLocalDpi xmlns:a14="http://schemas.microsoft.com/office/drawing/2010/main" val="0"/>
-              </a:ext>
-            </a:extLst>
-          </a:blip>
-          <a:stretch>
-            <a:fillRect/>
-          </a:stretch>
-        </p:blipFill>
-        <p:spPr>
-          <a:xfrm>
-            <a:off x="842282" y="1825625"/>
-            <a:ext cx="7459435" cy="4351338"/>
-          </a:xfrm>
-        </p:spPr>
-      </p:pic>
-    </p:spTree>
-    <p:extLst>
-      <p:ext uri="{BB962C8B-B14F-4D97-AF65-F5344CB8AC3E}">
-        <p14:creationId xmlns:p14="http://schemas.microsoft.com/office/powerpoint/2010/main" val="173411110"/>
-      </p:ext>
-    </p:extLst>
-  </p:cSld>
-  <p:clrMapOvr>
-    <a:masterClrMapping/>
-  </p:clrMapOvr>
-</p:sld>
-</file>
-
-<file path=ppt/slides/slide32.xml><?xml version="1.0" encoding="utf-8"?>
-<p:sld xmlns:a="http://schemas.openxmlformats.org/drawingml/2006/main" xmlns:r="http://schemas.openxmlformats.org/officeDocument/2006/relationships" xmlns:p="http://schemas.openxmlformats.org/presentationml/2006/main">
-  <p:cSld>
-    <p:spTree>
-      <p:nvGrpSpPr>
-        <p:cNvPr id="1" name=""/>
-        <p:cNvGrpSpPr/>
-        <p:nvPr/>
-      </p:nvGrpSpPr>
-      <p:grpSpPr>
-        <a:xfrm>
-          <a:off x="0" y="0"/>
-          <a:ext cx="0" cy="0"/>
-          <a:chOff x="0" y="0"/>
-          <a:chExt cx="0" cy="0"/>
-        </a:xfrm>
-      </p:grpSpPr>
-      <p:sp>
-        <p:nvSpPr>
-          <p:cNvPr id="2" name="Title 1"/>
-          <p:cNvSpPr>
-            <a:spLocks noGrp="1"/>
-          </p:cNvSpPr>
-          <p:nvPr>
-            <p:ph type="title"/>
-          </p:nvPr>
-        </p:nvSpPr>
-        <p:spPr/>
-        <p:txBody>
-          <a:bodyPr/>
-          <a:lstStyle/>
-          <a:p>
-            <a:endParaRPr lang="en-NZ"/>
-          </a:p>
-        </p:txBody>
-      </p:sp>
-      <p:pic>
-        <p:nvPicPr>
-          <p:cNvPr id="4" name="Content Placeholder 3"/>
-          <p:cNvPicPr>
-            <a:picLocks noGrp="1" noChangeAspect="1"/>
-          </p:cNvPicPr>
-          <p:nvPr>
-            <p:ph idx="1"/>
-          </p:nvPr>
-        </p:nvPicPr>
-        <p:blipFill>
-          <a:blip r:embed="rId2">
-            <a:extLst>
-              <a:ext uri="{28A0092B-C50C-407E-A947-70E740481C1C}">
-                <a14:useLocalDpi xmlns:a14="http://schemas.microsoft.com/office/drawing/2010/main" val="0"/>
-              </a:ext>
-            </a:extLst>
-          </a:blip>
-          <a:stretch>
-            <a:fillRect/>
-          </a:stretch>
-        </p:blipFill>
-        <p:spPr>
-          <a:xfrm>
-            <a:off x="842282" y="1825625"/>
-            <a:ext cx="7459435" cy="4351338"/>
-          </a:xfrm>
-        </p:spPr>
-      </p:pic>
-    </p:spTree>
-    <p:extLst>
-      <p:ext uri="{BB962C8B-B14F-4D97-AF65-F5344CB8AC3E}">
-        <p14:creationId xmlns:p14="http://schemas.microsoft.com/office/powerpoint/2010/main" val="3318011065"/>
-      </p:ext>
-    </p:extLst>
-  </p:cSld>
-  <p:clrMapOvr>
-    <a:masterClrMapping/>
-  </p:clrMapOvr>
-</p:sld>
-</file>
-
-<file path=ppt/slides/slide33.xml><?xml version="1.0" encoding="utf-8"?>
-<p:sld xmlns:a="http://schemas.openxmlformats.org/drawingml/2006/main" xmlns:r="http://schemas.openxmlformats.org/officeDocument/2006/relationships" xmlns:p="http://schemas.openxmlformats.org/presentationml/2006/main">
-  <p:cSld>
-    <p:spTree>
-      <p:nvGrpSpPr>
-        <p:cNvPr id="1" name=""/>
-        <p:cNvGrpSpPr/>
-        <p:nvPr/>
-      </p:nvGrpSpPr>
-      <p:grpSpPr>
-        <a:xfrm>
-          <a:off x="0" y="0"/>
-          <a:ext cx="0" cy="0"/>
-          <a:chOff x="0" y="0"/>
-          <a:chExt cx="0" cy="0"/>
-        </a:xfrm>
-      </p:grpSpPr>
-      <p:sp>
-        <p:nvSpPr>
-          <p:cNvPr id="2" name="Title 1"/>
-          <p:cNvSpPr>
-            <a:spLocks noGrp="1"/>
-          </p:cNvSpPr>
-          <p:nvPr>
-            <p:ph type="title"/>
-          </p:nvPr>
-        </p:nvSpPr>
-        <p:spPr/>
-        <p:txBody>
-          <a:bodyPr/>
-          <a:lstStyle/>
-          <a:p>
-            <a:endParaRPr lang="en-NZ"/>
-          </a:p>
-        </p:txBody>
-      </p:sp>
-      <p:pic>
-        <p:nvPicPr>
-          <p:cNvPr id="4" name="Content Placeholder 3"/>
-          <p:cNvPicPr>
-            <a:picLocks noGrp="1" noChangeAspect="1"/>
-          </p:cNvPicPr>
-          <p:nvPr>
-            <p:ph idx="1"/>
-          </p:nvPr>
-        </p:nvPicPr>
-        <p:blipFill>
-          <a:blip r:embed="rId2">
-            <a:extLst>
-              <a:ext uri="{28A0092B-C50C-407E-A947-70E740481C1C}">
-                <a14:useLocalDpi xmlns:a14="http://schemas.microsoft.com/office/drawing/2010/main" val="0"/>
-              </a:ext>
-            </a:extLst>
-          </a:blip>
-          <a:stretch>
-            <a:fillRect/>
-          </a:stretch>
-        </p:blipFill>
-        <p:spPr>
-          <a:xfrm>
-            <a:off x="842282" y="1825625"/>
-            <a:ext cx="7459435" cy="4351338"/>
-          </a:xfrm>
-        </p:spPr>
-      </p:pic>
-    </p:spTree>
-    <p:extLst>
-      <p:ext uri="{BB962C8B-B14F-4D97-AF65-F5344CB8AC3E}">
-        <p14:creationId xmlns:p14="http://schemas.microsoft.com/office/powerpoint/2010/main" val="166404701"/>
       </p:ext>
     </p:extLst>
   </p:cSld>

</xml_diff>

<commit_message>
minor edits to SMBKC document
</commit_message>
<xml_diff>
--- a/docs/smbkc/smbkc.pptx
+++ b/docs/smbkc/smbkc.pptx
@@ -4753,8 +4753,13 @@
             <a:pPr lvl="1"/>
             <a:r>
               <a:rPr lang="en-US" dirty="0" smtClean="0"/>
-              <a:t>M=0.44 &amp; catch</a:t>
-            </a:r>
+              <a:t>M=0.44 &amp; </a:t>
+            </a:r>
+            <a:r>
+              <a:rPr lang="en-US" dirty="0" smtClean="0"/>
+              <a:t>catch (note that this differs from 2015 model)</a:t>
+            </a:r>
+            <a:endParaRPr lang="en-US" dirty="0" smtClean="0"/>
           </a:p>
           <a:p>
             <a:r>

</xml_diff>

<commit_message>
some eds to doc
</commit_message>
<xml_diff>
--- a/docs/smbkc/smbkc.pptx
+++ b/docs/smbkc/smbkc.pptx
@@ -3873,8 +3873,13 @@
             </a:pPr>
             <a:r>
               <a:rPr lang="en-US" dirty="0" smtClean="0"/>
-              <a:t>Tried running the model using the same units as 2015 model</a:t>
-            </a:r>
+              <a:t>Tried running the model using the same units as 2015 </a:t>
+            </a:r>
+            <a:r>
+              <a:rPr lang="en-US" dirty="0" smtClean="0"/>
+              <a:t>model, checked all data units and CV’s</a:t>
+            </a:r>
+            <a:endParaRPr lang="en-US" dirty="0" smtClean="0"/>
           </a:p>
           <a:p>
             <a:endParaRPr lang="en-NZ" dirty="0"/>
@@ -3982,7 +3987,6 @@
               <a:rPr lang="en-US" dirty="0" smtClean="0"/>
               <a:t>Variable proportion of natural mortality</a:t>
             </a:r>
-            <a:endParaRPr lang="en-US" dirty="0" smtClean="0"/>
           </a:p>
           <a:p>
             <a:r>
@@ -4018,7 +4022,6 @@
               <a:rPr lang="en-US" dirty="0" smtClean="0"/>
               <a:t>mortality</a:t>
             </a:r>
-            <a:endParaRPr lang="en-US" dirty="0" smtClean="0"/>
           </a:p>
           <a:p>
             <a:pPr lvl="1"/>
@@ -4030,13 +4033,8 @@
           <a:p>
             <a:r>
               <a:rPr lang="en-US" dirty="0" smtClean="0"/>
-              <a:t>Season </a:t>
-            </a:r>
-            <a:r>
-              <a:rPr lang="en-US" dirty="0" smtClean="0"/>
-              <a:t>5</a:t>
-            </a:r>
-            <a:endParaRPr lang="en-US" dirty="0" smtClean="0"/>
+              <a:t>Season 5</a:t>
+            </a:r>
           </a:p>
           <a:p>
             <a:pPr lvl="1"/>
@@ -4052,7 +4050,6 @@
               <a:rPr lang="en-US" dirty="0" smtClean="0"/>
               <a:t>= 0.375</a:t>
             </a:r>
-            <a:endParaRPr lang="en-US" dirty="0" smtClean="0"/>
           </a:p>
           <a:p>
             <a:pPr lvl="1"/>

</xml_diff>